<commit_message>
Add revision to slides
</commit_message>
<xml_diff>
--- a/presentation/syscon-2022.pptx
+++ b/presentation/syscon-2022.pptx
@@ -5,7 +5,7 @@
     <p:sldMasterId id="2147483684" r:id="rId1"/>
   </p:sldMasterIdLst>
   <p:notesMasterIdLst>
-    <p:notesMasterId r:id="rId12"/>
+    <p:notesMasterId r:id="rId15"/>
   </p:notesMasterIdLst>
   <p:sldIdLst>
     <p:sldId id="256" r:id="rId2"/>
@@ -16,8 +16,11 @@
     <p:sldId id="264" r:id="rId7"/>
     <p:sldId id="265" r:id="rId8"/>
     <p:sldId id="266" r:id="rId9"/>
-    <p:sldId id="267" r:id="rId10"/>
-    <p:sldId id="269" r:id="rId11"/>
+    <p:sldId id="270" r:id="rId10"/>
+    <p:sldId id="271" r:id="rId11"/>
+    <p:sldId id="272" r:id="rId12"/>
+    <p:sldId id="267" r:id="rId13"/>
+    <p:sldId id="269" r:id="rId14"/>
   </p:sldIdLst>
   <p:sldSz cx="12192000" cy="6858000"/>
   <p:notesSz cx="6858000" cy="9144000"/>
@@ -1155,7 +1158,175 @@
           <a:p>
             <a:fld id="{438ED187-F6C5-A545-9BCA-551DE666D003}" type="slidenum">
               <a:rPr lang="en-US" smtClean="0"/>
-              <a:t>9</a:t>
+              <a:t>10</a:t>
+            </a:fld>
+            <a:endParaRPr lang="en-US"/>
+          </a:p>
+        </p:txBody>
+      </p:sp>
+    </p:spTree>
+    <p:extLst>
+      <p:ext uri="{BB962C8B-B14F-4D97-AF65-F5344CB8AC3E}">
+        <p14:creationId xmlns:p14="http://schemas.microsoft.com/office/powerpoint/2010/main" val="3238173814"/>
+      </p:ext>
+    </p:extLst>
+  </p:cSld>
+  <p:clrMapOvr>
+    <a:masterClrMapping/>
+  </p:clrMapOvr>
+</p:notes>
+</file>
+
+<file path=ppt/notesSlides/notesSlide8.xml><?xml version="1.0" encoding="utf-8"?>
+<p:notes xmlns:a="http://schemas.openxmlformats.org/drawingml/2006/main" xmlns:r="http://schemas.openxmlformats.org/officeDocument/2006/relationships" xmlns:p="http://schemas.openxmlformats.org/presentationml/2006/main">
+  <p:cSld>
+    <p:spTree>
+      <p:nvGrpSpPr>
+        <p:cNvPr id="1" name=""/>
+        <p:cNvGrpSpPr/>
+        <p:nvPr/>
+      </p:nvGrpSpPr>
+      <p:grpSpPr>
+        <a:xfrm>
+          <a:off x="0" y="0"/>
+          <a:ext cx="0" cy="0"/>
+          <a:chOff x="0" y="0"/>
+          <a:chExt cx="0" cy="0"/>
+        </a:xfrm>
+      </p:grpSpPr>
+      <p:sp>
+        <p:nvSpPr>
+          <p:cNvPr id="2" name="Slide Image Placeholder 1"/>
+          <p:cNvSpPr>
+            <a:spLocks noGrp="1" noRot="1" noChangeAspect="1"/>
+          </p:cNvSpPr>
+          <p:nvPr>
+            <p:ph type="sldImg"/>
+          </p:nvPr>
+        </p:nvSpPr>
+        <p:spPr/>
+      </p:sp>
+      <p:sp>
+        <p:nvSpPr>
+          <p:cNvPr id="3" name="Notes Placeholder 2"/>
+          <p:cNvSpPr>
+            <a:spLocks noGrp="1"/>
+          </p:cNvSpPr>
+          <p:nvPr>
+            <p:ph type="body" idx="1"/>
+          </p:nvPr>
+        </p:nvSpPr>
+        <p:spPr/>
+        <p:txBody>
+          <a:bodyPr/>
+          <a:lstStyle/>
+          <a:p>
+            <a:endParaRPr lang="en-US" dirty="0"/>
+          </a:p>
+        </p:txBody>
+      </p:sp>
+      <p:sp>
+        <p:nvSpPr>
+          <p:cNvPr id="4" name="Slide Number Placeholder 3"/>
+          <p:cNvSpPr>
+            <a:spLocks noGrp="1"/>
+          </p:cNvSpPr>
+          <p:nvPr>
+            <p:ph type="sldNum" sz="quarter" idx="5"/>
+          </p:nvPr>
+        </p:nvSpPr>
+        <p:spPr/>
+        <p:txBody>
+          <a:bodyPr/>
+          <a:lstStyle/>
+          <a:p>
+            <a:fld id="{438ED187-F6C5-A545-9BCA-551DE666D003}" type="slidenum">
+              <a:rPr lang="en-US" smtClean="0"/>
+              <a:t>11</a:t>
+            </a:fld>
+            <a:endParaRPr lang="en-US"/>
+          </a:p>
+        </p:txBody>
+      </p:sp>
+    </p:spTree>
+    <p:extLst>
+      <p:ext uri="{BB962C8B-B14F-4D97-AF65-F5344CB8AC3E}">
+        <p14:creationId xmlns:p14="http://schemas.microsoft.com/office/powerpoint/2010/main" val="1237010263"/>
+      </p:ext>
+    </p:extLst>
+  </p:cSld>
+  <p:clrMapOvr>
+    <a:masterClrMapping/>
+  </p:clrMapOvr>
+</p:notes>
+</file>
+
+<file path=ppt/notesSlides/notesSlide9.xml><?xml version="1.0" encoding="utf-8"?>
+<p:notes xmlns:a="http://schemas.openxmlformats.org/drawingml/2006/main" xmlns:r="http://schemas.openxmlformats.org/officeDocument/2006/relationships" xmlns:p="http://schemas.openxmlformats.org/presentationml/2006/main">
+  <p:cSld>
+    <p:spTree>
+      <p:nvGrpSpPr>
+        <p:cNvPr id="1" name=""/>
+        <p:cNvGrpSpPr/>
+        <p:nvPr/>
+      </p:nvGrpSpPr>
+      <p:grpSpPr>
+        <a:xfrm>
+          <a:off x="0" y="0"/>
+          <a:ext cx="0" cy="0"/>
+          <a:chOff x="0" y="0"/>
+          <a:chExt cx="0" cy="0"/>
+        </a:xfrm>
+      </p:grpSpPr>
+      <p:sp>
+        <p:nvSpPr>
+          <p:cNvPr id="2" name="Slide Image Placeholder 1"/>
+          <p:cNvSpPr>
+            <a:spLocks noGrp="1" noRot="1" noChangeAspect="1"/>
+          </p:cNvSpPr>
+          <p:nvPr>
+            <p:ph type="sldImg"/>
+          </p:nvPr>
+        </p:nvSpPr>
+        <p:spPr/>
+      </p:sp>
+      <p:sp>
+        <p:nvSpPr>
+          <p:cNvPr id="3" name="Notes Placeholder 2"/>
+          <p:cNvSpPr>
+            <a:spLocks noGrp="1"/>
+          </p:cNvSpPr>
+          <p:nvPr>
+            <p:ph type="body" idx="1"/>
+          </p:nvPr>
+        </p:nvSpPr>
+        <p:spPr/>
+        <p:txBody>
+          <a:bodyPr/>
+          <a:lstStyle/>
+          <a:p>
+            <a:endParaRPr lang="en-US" dirty="0"/>
+          </a:p>
+        </p:txBody>
+      </p:sp>
+      <p:sp>
+        <p:nvSpPr>
+          <p:cNvPr id="4" name="Slide Number Placeholder 3"/>
+          <p:cNvSpPr>
+            <a:spLocks noGrp="1"/>
+          </p:cNvSpPr>
+          <p:nvPr>
+            <p:ph type="sldNum" sz="quarter" idx="5"/>
+          </p:nvPr>
+        </p:nvSpPr>
+        <p:spPr/>
+        <p:txBody>
+          <a:bodyPr/>
+          <a:lstStyle/>
+          <a:p>
+            <a:fld id="{438ED187-F6C5-A545-9BCA-551DE666D003}" type="slidenum">
+              <a:rPr lang="en-US" smtClean="0"/>
+              <a:t>12</a:t>
             </a:fld>
             <a:endParaRPr lang="en-US"/>
           </a:p>
@@ -4310,6 +4481,2364 @@
 </file>
 
 <file path=ppt/slides/slide10.xml><?xml version="1.0" encoding="utf-8"?>
+<p:sld xmlns:a="http://schemas.openxmlformats.org/drawingml/2006/main" xmlns:r="http://schemas.openxmlformats.org/officeDocument/2006/relationships" xmlns:p="http://schemas.openxmlformats.org/presentationml/2006/main">
+  <p:cSld>
+    <p:bg>
+      <p:bgPr>
+        <a:solidFill>
+          <a:schemeClr val="bg1"/>
+        </a:solidFill>
+        <a:effectLst/>
+      </p:bgPr>
+    </p:bg>
+    <p:spTree>
+      <p:nvGrpSpPr>
+        <p:cNvPr id="1" name=""/>
+        <p:cNvGrpSpPr/>
+        <p:nvPr/>
+      </p:nvGrpSpPr>
+      <p:grpSpPr>
+        <a:xfrm>
+          <a:off x="0" y="0"/>
+          <a:ext cx="0" cy="0"/>
+          <a:chOff x="0" y="0"/>
+          <a:chExt cx="0" cy="0"/>
+        </a:xfrm>
+      </p:grpSpPr>
+      <p:sp>
+        <p:nvSpPr>
+          <p:cNvPr id="2" name="Title 1">
+            <a:extLst>
+              <a:ext uri="{FF2B5EF4-FFF2-40B4-BE49-F238E27FC236}">
+                <a16:creationId xmlns:a16="http://schemas.microsoft.com/office/drawing/2014/main" id="{99CAA5FC-2208-7049-AB92-558CE18EF253}"/>
+              </a:ext>
+            </a:extLst>
+          </p:cNvPr>
+          <p:cNvSpPr>
+            <a:spLocks noGrp="1"/>
+          </p:cNvSpPr>
+          <p:nvPr>
+            <p:ph type="title"/>
+          </p:nvPr>
+        </p:nvSpPr>
+        <p:spPr>
+          <a:xfrm>
+            <a:off x="648929" y="629266"/>
+            <a:ext cx="4944152" cy="1622321"/>
+          </a:xfrm>
+        </p:spPr>
+        <p:txBody>
+          <a:bodyPr vert="horz" lIns="91440" tIns="45720" rIns="91440" bIns="45720" rtlCol="0" anchor="ctr">
+            <a:normAutofit/>
+          </a:bodyPr>
+          <a:lstStyle/>
+          <a:p>
+            <a:r>
+              <a:rPr lang="en-US" kern="1200" dirty="0">
+                <a:solidFill>
+                  <a:schemeClr val="tx1"/>
+                </a:solidFill>
+                <a:latin typeface="+mj-lt"/>
+                <a:ea typeface="+mj-ea"/>
+                <a:cs typeface="+mj-cs"/>
+              </a:rPr>
+              <a:t>CWP States</a:t>
+            </a:r>
+          </a:p>
+        </p:txBody>
+      </p:sp>
+      <p:sp>
+        <p:nvSpPr>
+          <p:cNvPr id="9" name="TextBox 8">
+            <a:extLst>
+              <a:ext uri="{FF2B5EF4-FFF2-40B4-BE49-F238E27FC236}">
+                <a16:creationId xmlns:a16="http://schemas.microsoft.com/office/drawing/2014/main" id="{89351F4F-61D5-4340-9901-7F71C76D5E90}"/>
+              </a:ext>
+            </a:extLst>
+          </p:cNvPr>
+          <p:cNvSpPr txBox="1"/>
+          <p:nvPr/>
+        </p:nvSpPr>
+        <p:spPr>
+          <a:xfrm>
+            <a:off x="203325" y="2089127"/>
+            <a:ext cx="5686300" cy="937610"/>
+          </a:xfrm>
+          <a:prstGeom prst="rect">
+            <a:avLst/>
+          </a:prstGeom>
+        </p:spPr>
+        <p:txBody>
+          <a:bodyPr vert="horz" lIns="91440" tIns="45720" rIns="91440" bIns="45720" rtlCol="0">
+            <a:normAutofit/>
+          </a:bodyPr>
+          <a:lstStyle/>
+          <a:p>
+            <a:pPr marL="457200" indent="-457200" defTabSz="914400">
+              <a:lnSpc>
+                <a:spcPct val="90000"/>
+              </a:lnSpc>
+              <a:spcAft>
+                <a:spcPts val="600"/>
+              </a:spcAft>
+              <a:buFont typeface="Arial" panose="020B0604020202020204" pitchFamily="34" charset="0"/>
+              <a:buChar char="•"/>
+            </a:pPr>
+            <a:r>
+              <a:rPr lang="en-US" sz="2400" b="0" dirty="0">
+                <a:latin typeface="Cambria Math" panose="02040503050406030204" pitchFamily="18" charset="0"/>
+              </a:rPr>
+              <a:t>Must satisfy input conditions and</a:t>
+            </a:r>
+            <a:endParaRPr lang="en-US" sz="2400" dirty="0">
+              <a:latin typeface="Cambria Math" panose="02040503050406030204" pitchFamily="18" charset="0"/>
+            </a:endParaRPr>
+          </a:p>
+          <a:p>
+            <a:pPr marL="457200" indent="-457200" defTabSz="914400">
+              <a:lnSpc>
+                <a:spcPct val="90000"/>
+              </a:lnSpc>
+              <a:spcAft>
+                <a:spcPts val="600"/>
+              </a:spcAft>
+              <a:buFont typeface="Arial" panose="020B0604020202020204" pitchFamily="34" charset="0"/>
+              <a:buChar char="•"/>
+            </a:pPr>
+            <a:r>
+              <a:rPr lang="en-US" sz="2400" dirty="0">
+                <a:latin typeface="Cambria Math" panose="02040503050406030204" pitchFamily="18" charset="0"/>
+              </a:rPr>
+              <a:t>Must not satisfy any output conditions</a:t>
+            </a:r>
+            <a:endParaRPr lang="en-US" sz="2400" b="0" dirty="0">
+              <a:latin typeface="Cambria Math" panose="02040503050406030204" pitchFamily="18" charset="0"/>
+            </a:endParaRPr>
+          </a:p>
+        </p:txBody>
+      </p:sp>
+      <p:sp>
+        <p:nvSpPr>
+          <p:cNvPr id="22" name="Rectangle 21">
+            <a:extLst>
+              <a:ext uri="{FF2B5EF4-FFF2-40B4-BE49-F238E27FC236}">
+                <a16:creationId xmlns:a16="http://schemas.microsoft.com/office/drawing/2014/main" id="{46F7435D-E3DB-47B1-BA61-B00ACC83A9DE}"/>
+              </a:ext>
+              <a:ext uri="{C183D7F6-B498-43B3-948B-1728B52AA6E4}">
+                <adec:decorative xmlns:adec="http://schemas.microsoft.com/office/drawing/2017/decorative" val="1"/>
+              </a:ext>
+            </a:extLst>
+          </p:cNvPr>
+          <p:cNvSpPr>
+            <a:spLocks noGrp="1" noRot="1" noChangeAspect="1" noMove="1" noResize="1" noEditPoints="1" noAdjustHandles="1" noChangeArrowheads="1" noChangeShapeType="1" noTextEdit="1"/>
+          </p:cNvSpPr>
+          <p:nvPr>
+            <p:extLst>
+              <p:ext uri="{386F3935-93C4-4BCD-93E2-E3B085C9AB24}">
+                <p16:designElem xmlns:p16="http://schemas.microsoft.com/office/powerpoint/2015/main" val="1"/>
+              </p:ext>
+            </p:extLst>
+          </p:nvPr>
+        </p:nvSpPr>
+        <p:spPr>
+          <a:xfrm>
+            <a:off x="6092950" y="0"/>
+            <a:ext cx="6099050" cy="6858000"/>
+          </a:xfrm>
+          <a:prstGeom prst="rect">
+            <a:avLst/>
+          </a:prstGeom>
+          <a:solidFill>
+            <a:srgbClr val="C8CACA"/>
+          </a:solidFill>
+          <a:ln>
+            <a:noFill/>
+          </a:ln>
+        </p:spPr>
+        <p:style>
+          <a:lnRef idx="2">
+            <a:schemeClr val="accent1">
+              <a:shade val="50000"/>
+            </a:schemeClr>
+          </a:lnRef>
+          <a:fillRef idx="1">
+            <a:schemeClr val="accent1"/>
+          </a:fillRef>
+          <a:effectRef idx="0">
+            <a:schemeClr val="accent1"/>
+          </a:effectRef>
+          <a:fontRef idx="minor">
+            <a:schemeClr val="lt1"/>
+          </a:fontRef>
+        </p:style>
+        <p:txBody>
+          <a:bodyPr rtlCol="0" anchor="ctr"/>
+          <a:lstStyle/>
+          <a:p>
+            <a:pPr algn="ctr"/>
+            <a:endParaRPr lang="en-US"/>
+          </a:p>
+        </p:txBody>
+      </p:sp>
+      <p:sp>
+        <p:nvSpPr>
+          <p:cNvPr id="24" name="Rounded Rectangle 9">
+            <a:extLst>
+              <a:ext uri="{FF2B5EF4-FFF2-40B4-BE49-F238E27FC236}">
+                <a16:creationId xmlns:a16="http://schemas.microsoft.com/office/drawing/2014/main" id="{F263A0B5-F8C4-4116-809F-78A768EA79A6}"/>
+              </a:ext>
+              <a:ext uri="{C183D7F6-B498-43B3-948B-1728B52AA6E4}">
+                <adec:decorative xmlns:adec="http://schemas.microsoft.com/office/drawing/2017/decorative" val="1"/>
+              </a:ext>
+            </a:extLst>
+          </p:cNvPr>
+          <p:cNvSpPr>
+            <a:spLocks noGrp="1" noRot="1" noChangeAspect="1" noMove="1" noResize="1" noEditPoints="1" noAdjustHandles="1" noChangeArrowheads="1" noChangeShapeType="1" noTextEdit="1"/>
+          </p:cNvSpPr>
+          <p:nvPr>
+            <p:extLst>
+              <p:ext uri="{386F3935-93C4-4BCD-93E2-E3B085C9AB24}">
+                <p16:designElem xmlns:p16="http://schemas.microsoft.com/office/powerpoint/2015/main" val="1"/>
+              </p:ext>
+            </p:extLst>
+          </p:nvPr>
+        </p:nvSpPr>
+        <p:spPr>
+          <a:xfrm>
+            <a:off x="6577582" y="557784"/>
+            <a:ext cx="5130204" cy="5739187"/>
+          </a:xfrm>
+          <a:prstGeom prst="roundRect">
+            <a:avLst>
+              <a:gd name="adj" fmla="val 0"/>
+            </a:avLst>
+          </a:prstGeom>
+          <a:solidFill>
+            <a:srgbClr val="FFFFFF"/>
+          </a:solidFill>
+          <a:ln w="9525">
+            <a:solidFill>
+              <a:srgbClr val="C8CACA"/>
+            </a:solidFill>
+          </a:ln>
+          <a:effectLst>
+            <a:outerShdw blurRad="57150" dist="19050" dir="5400000" algn="t" rotWithShape="0">
+              <a:prstClr val="black">
+                <a:alpha val="63000"/>
+              </a:prstClr>
+            </a:outerShdw>
+          </a:effectLst>
+        </p:spPr>
+        <p:style>
+          <a:lnRef idx="2">
+            <a:schemeClr val="accent1">
+              <a:shade val="50000"/>
+            </a:schemeClr>
+          </a:lnRef>
+          <a:fillRef idx="1">
+            <a:schemeClr val="accent1"/>
+          </a:fillRef>
+          <a:effectRef idx="0">
+            <a:schemeClr val="accent1"/>
+          </a:effectRef>
+          <a:fontRef idx="minor">
+            <a:schemeClr val="lt1"/>
+          </a:fontRef>
+        </p:style>
+        <p:txBody>
+          <a:bodyPr rtlCol="0" anchor="ctr"/>
+          <a:lstStyle/>
+          <a:p>
+            <a:pPr algn="ctr"/>
+            <a:endParaRPr lang="en-US"/>
+          </a:p>
+        </p:txBody>
+      </p:sp>
+      <p:pic>
+        <p:nvPicPr>
+          <p:cNvPr id="4" name="Picture 3">
+            <a:extLst>
+              <a:ext uri="{FF2B5EF4-FFF2-40B4-BE49-F238E27FC236}">
+                <a16:creationId xmlns:a16="http://schemas.microsoft.com/office/drawing/2014/main" id="{370DA1EA-A310-1049-BE30-B028F697C064}"/>
+              </a:ext>
+            </a:extLst>
+          </p:cNvPr>
+          <p:cNvPicPr>
+            <a:picLocks noChangeAspect="1"/>
+          </p:cNvPicPr>
+          <p:nvPr/>
+        </p:nvPicPr>
+        <p:blipFill>
+          <a:blip r:embed="rId3"/>
+          <a:stretch>
+            <a:fillRect/>
+          </a:stretch>
+        </p:blipFill>
+        <p:spPr>
+          <a:xfrm>
+            <a:off x="6904708" y="1492706"/>
+            <a:ext cx="4456376" cy="3859435"/>
+          </a:xfrm>
+          <a:prstGeom prst="rect">
+            <a:avLst/>
+          </a:prstGeom>
+        </p:spPr>
+      </p:pic>
+      <mc:AlternateContent xmlns:mc="http://schemas.openxmlformats.org/markup-compatibility/2006">
+        <mc:Choice xmlns:a14="http://schemas.microsoft.com/office/drawing/2010/main" Requires="a14">
+          <p:sp>
+            <p:nvSpPr>
+              <p:cNvPr id="11" name="Rectangle 10">
+                <a:extLst>
+                  <a:ext uri="{FF2B5EF4-FFF2-40B4-BE49-F238E27FC236}">
+                    <a16:creationId xmlns:a16="http://schemas.microsoft.com/office/drawing/2014/main" id="{462276C5-C79B-3B46-A292-791439CD118F}"/>
+                  </a:ext>
+                </a:extLst>
+              </p:cNvPr>
+              <p:cNvSpPr/>
+              <p:nvPr/>
+            </p:nvSpPr>
+            <p:spPr>
+              <a:xfrm>
+                <a:off x="203325" y="5028405"/>
+                <a:ext cx="5686300" cy="1200329"/>
+              </a:xfrm>
+              <a:prstGeom prst="rect">
+                <a:avLst/>
+              </a:prstGeom>
+            </p:spPr>
+            <p:txBody>
+              <a:bodyPr wrap="none">
+                <a:spAutoFit/>
+              </a:bodyPr>
+              <a:lstStyle/>
+              <a:p>
+                <a:r>
+                  <a:rPr lang="en-US" sz="3600" dirty="0">
+                    <a:solidFill>
+                      <a:schemeClr val="accent1"/>
+                    </a:solidFill>
+                    <a:latin typeface="Cambria Math" panose="02040503050406030204" pitchFamily="18" charset="0"/>
+                  </a:rPr>
+                  <a:t>Pt in appropriate home care</a:t>
+                </a:r>
+              </a:p>
+              <a:p>
+                <a14:m>
+                  <m:oMathPara xmlns:m="http://schemas.openxmlformats.org/officeDocument/2006/math">
+                    <m:oMathParaPr>
+                      <m:jc m:val="centerGroup"/>
+                    </m:oMathParaPr>
+                    <m:oMath xmlns:m="http://schemas.openxmlformats.org/officeDocument/2006/math">
+                      <m:d>
+                        <m:dPr>
+                          <m:ctrlPr>
+                            <a:rPr lang="en-US" sz="3600" i="1">
+                              <a:latin typeface="Cambria Math" panose="02040503050406030204" pitchFamily="18" charset="0"/>
+                            </a:rPr>
+                          </m:ctrlPr>
+                        </m:dPr>
+                        <m:e>
+                          <m:r>
+                            <a:rPr lang="en-US" sz="3600" i="1">
+                              <a:latin typeface="Cambria Math" panose="02040503050406030204" pitchFamily="18" charset="0"/>
+                            </a:rPr>
+                            <m:t>𝐴</m:t>
+                          </m:r>
+                          <m:r>
+                            <a:rPr lang="en-US" sz="3600" i="1">
+                              <a:latin typeface="Cambria Math" panose="02040503050406030204" pitchFamily="18" charset="0"/>
+                            </a:rPr>
+                            <m:t>∧</m:t>
+                          </m:r>
+                          <m:r>
+                            <a:rPr lang="en-US" sz="3600" i="1">
+                              <a:latin typeface="Cambria Math" panose="02040503050406030204" pitchFamily="18" charset="0"/>
+                            </a:rPr>
+                            <m:t>𝐹</m:t>
+                          </m:r>
+                        </m:e>
+                      </m:d>
+                      <m:r>
+                        <a:rPr lang="en-US" sz="3600" i="1">
+                          <a:latin typeface="Cambria Math" panose="02040503050406030204" pitchFamily="18" charset="0"/>
+                        </a:rPr>
+                        <m:t>∧¬(</m:t>
+                      </m:r>
+                      <m:r>
+                        <a:rPr lang="en-US" sz="3600" i="1">
+                          <a:latin typeface="Cambria Math" panose="02040503050406030204" pitchFamily="18" charset="0"/>
+                        </a:rPr>
+                        <m:t>𝐶</m:t>
+                      </m:r>
+                      <m:r>
+                        <a:rPr lang="en-US" sz="3600" i="1">
+                          <a:latin typeface="Cambria Math" panose="02040503050406030204" pitchFamily="18" charset="0"/>
+                        </a:rPr>
+                        <m:t>∨</m:t>
+                      </m:r>
+                      <m:r>
+                        <a:rPr lang="en-US" sz="3600" i="1">
+                          <a:latin typeface="Cambria Math" panose="02040503050406030204" pitchFamily="18" charset="0"/>
+                        </a:rPr>
+                        <m:t>𝐷</m:t>
+                      </m:r>
+                      <m:r>
+                        <a:rPr lang="en-US" sz="3600" i="1">
+                          <a:latin typeface="Cambria Math" panose="02040503050406030204" pitchFamily="18" charset="0"/>
+                        </a:rPr>
+                        <m:t>)</m:t>
+                      </m:r>
+                    </m:oMath>
+                  </m:oMathPara>
+                </a14:m>
+                <a:endParaRPr lang="en-US" sz="3600" i="1" dirty="0"/>
+              </a:p>
+            </p:txBody>
+          </p:sp>
+        </mc:Choice>
+        <mc:Fallback>
+          <p:sp>
+            <p:nvSpPr>
+              <p:cNvPr id="11" name="Rectangle 10">
+                <a:extLst>
+                  <a:ext uri="{FF2B5EF4-FFF2-40B4-BE49-F238E27FC236}">
+                    <a16:creationId xmlns:a16="http://schemas.microsoft.com/office/drawing/2014/main" id="{462276C5-C79B-3B46-A292-791439CD118F}"/>
+                  </a:ext>
+                </a:extLst>
+              </p:cNvPr>
+              <p:cNvSpPr>
+                <a:spLocks noRot="1" noChangeAspect="1" noMove="1" noResize="1" noEditPoints="1" noAdjustHandles="1" noChangeArrowheads="1" noChangeShapeType="1" noTextEdit="1"/>
+              </p:cNvSpPr>
+              <p:nvPr/>
+            </p:nvSpPr>
+            <p:spPr>
+              <a:xfrm>
+                <a:off x="203325" y="5028405"/>
+                <a:ext cx="5686300" cy="1200329"/>
+              </a:xfrm>
+              <a:prstGeom prst="rect">
+                <a:avLst/>
+              </a:prstGeom>
+              <a:blipFill>
+                <a:blip r:embed="rId4"/>
+                <a:stretch>
+                  <a:fillRect l="-3118" t="-8511" r="-2004" b="-11702"/>
+                </a:stretch>
+              </a:blipFill>
+            </p:spPr>
+            <p:txBody>
+              <a:bodyPr/>
+              <a:lstStyle/>
+              <a:p>
+                <a:r>
+                  <a:rPr lang="en-US">
+                    <a:noFill/>
+                  </a:rPr>
+                  <a:t> </a:t>
+                </a:r>
+              </a:p>
+            </p:txBody>
+          </p:sp>
+        </mc:Fallback>
+      </mc:AlternateContent>
+    </p:spTree>
+    <p:extLst>
+      <p:ext uri="{BB962C8B-B14F-4D97-AF65-F5344CB8AC3E}">
+        <p14:creationId xmlns:p14="http://schemas.microsoft.com/office/powerpoint/2010/main" val="3159576867"/>
+      </p:ext>
+    </p:extLst>
+  </p:cSld>
+  <p:clrMapOvr>
+    <a:masterClrMapping/>
+  </p:clrMapOvr>
+</p:sld>
+</file>
+
+<file path=ppt/slides/slide11.xml><?xml version="1.0" encoding="utf-8"?>
+<p:sld xmlns:a="http://schemas.openxmlformats.org/drawingml/2006/main" xmlns:r="http://schemas.openxmlformats.org/officeDocument/2006/relationships" xmlns:p="http://schemas.openxmlformats.org/presentationml/2006/main">
+  <p:cSld>
+    <p:bg>
+      <p:bgPr>
+        <a:solidFill>
+          <a:schemeClr val="bg1"/>
+        </a:solidFill>
+        <a:effectLst/>
+      </p:bgPr>
+    </p:bg>
+    <p:spTree>
+      <p:nvGrpSpPr>
+        <p:cNvPr id="1" name=""/>
+        <p:cNvGrpSpPr/>
+        <p:nvPr/>
+      </p:nvGrpSpPr>
+      <p:grpSpPr>
+        <a:xfrm>
+          <a:off x="0" y="0"/>
+          <a:ext cx="0" cy="0"/>
+          <a:chOff x="0" y="0"/>
+          <a:chExt cx="0" cy="0"/>
+        </a:xfrm>
+      </p:grpSpPr>
+      <p:sp>
+        <p:nvSpPr>
+          <p:cNvPr id="2" name="Title 1">
+            <a:extLst>
+              <a:ext uri="{FF2B5EF4-FFF2-40B4-BE49-F238E27FC236}">
+                <a16:creationId xmlns:a16="http://schemas.microsoft.com/office/drawing/2014/main" id="{99CAA5FC-2208-7049-AB92-558CE18EF253}"/>
+              </a:ext>
+            </a:extLst>
+          </p:cNvPr>
+          <p:cNvSpPr>
+            <a:spLocks noGrp="1"/>
+          </p:cNvSpPr>
+          <p:nvPr>
+            <p:ph type="title"/>
+          </p:nvPr>
+        </p:nvSpPr>
+        <p:spPr>
+          <a:xfrm>
+            <a:off x="648929" y="629266"/>
+            <a:ext cx="4944152" cy="1622321"/>
+          </a:xfrm>
+        </p:spPr>
+        <p:txBody>
+          <a:bodyPr vert="horz" lIns="91440" tIns="45720" rIns="91440" bIns="45720" rtlCol="0" anchor="ctr">
+            <a:normAutofit/>
+          </a:bodyPr>
+          <a:lstStyle/>
+          <a:p>
+            <a:r>
+              <a:rPr lang="en-US" dirty="0"/>
+              <a:t>Global Properties</a:t>
+            </a:r>
+            <a:endParaRPr lang="en-US" kern="1200" dirty="0">
+              <a:solidFill>
+                <a:schemeClr val="tx1"/>
+              </a:solidFill>
+              <a:latin typeface="+mj-lt"/>
+              <a:ea typeface="+mj-ea"/>
+              <a:cs typeface="+mj-cs"/>
+            </a:endParaRPr>
+          </a:p>
+        </p:txBody>
+      </p:sp>
+      <p:sp>
+        <p:nvSpPr>
+          <p:cNvPr id="22" name="Rectangle 21">
+            <a:extLst>
+              <a:ext uri="{FF2B5EF4-FFF2-40B4-BE49-F238E27FC236}">
+                <a16:creationId xmlns:a16="http://schemas.microsoft.com/office/drawing/2014/main" id="{46F7435D-E3DB-47B1-BA61-B00ACC83A9DE}"/>
+              </a:ext>
+              <a:ext uri="{C183D7F6-B498-43B3-948B-1728B52AA6E4}">
+                <adec:decorative xmlns:adec="http://schemas.microsoft.com/office/drawing/2017/decorative" val="1"/>
+              </a:ext>
+            </a:extLst>
+          </p:cNvPr>
+          <p:cNvSpPr>
+            <a:spLocks noGrp="1" noRot="1" noChangeAspect="1" noMove="1" noResize="1" noEditPoints="1" noAdjustHandles="1" noChangeArrowheads="1" noChangeShapeType="1" noTextEdit="1"/>
+          </p:cNvSpPr>
+          <p:nvPr>
+            <p:extLst>
+              <p:ext uri="{386F3935-93C4-4BCD-93E2-E3B085C9AB24}">
+                <p16:designElem xmlns:p16="http://schemas.microsoft.com/office/powerpoint/2015/main" val="1"/>
+              </p:ext>
+            </p:extLst>
+          </p:nvPr>
+        </p:nvSpPr>
+        <p:spPr>
+          <a:xfrm>
+            <a:off x="6092950" y="0"/>
+            <a:ext cx="6099050" cy="6858000"/>
+          </a:xfrm>
+          <a:prstGeom prst="rect">
+            <a:avLst/>
+          </a:prstGeom>
+          <a:solidFill>
+            <a:srgbClr val="C8CACA"/>
+          </a:solidFill>
+          <a:ln>
+            <a:noFill/>
+          </a:ln>
+        </p:spPr>
+        <p:style>
+          <a:lnRef idx="2">
+            <a:schemeClr val="accent1">
+              <a:shade val="50000"/>
+            </a:schemeClr>
+          </a:lnRef>
+          <a:fillRef idx="1">
+            <a:schemeClr val="accent1"/>
+          </a:fillRef>
+          <a:effectRef idx="0">
+            <a:schemeClr val="accent1"/>
+          </a:effectRef>
+          <a:fontRef idx="minor">
+            <a:schemeClr val="lt1"/>
+          </a:fontRef>
+        </p:style>
+        <p:txBody>
+          <a:bodyPr rtlCol="0" anchor="ctr"/>
+          <a:lstStyle/>
+          <a:p>
+            <a:pPr algn="ctr"/>
+            <a:endParaRPr lang="en-US"/>
+          </a:p>
+        </p:txBody>
+      </p:sp>
+      <p:sp>
+        <p:nvSpPr>
+          <p:cNvPr id="24" name="Rounded Rectangle 9">
+            <a:extLst>
+              <a:ext uri="{FF2B5EF4-FFF2-40B4-BE49-F238E27FC236}">
+                <a16:creationId xmlns:a16="http://schemas.microsoft.com/office/drawing/2014/main" id="{F263A0B5-F8C4-4116-809F-78A768EA79A6}"/>
+              </a:ext>
+              <a:ext uri="{C183D7F6-B498-43B3-948B-1728B52AA6E4}">
+                <adec:decorative xmlns:adec="http://schemas.microsoft.com/office/drawing/2017/decorative" val="1"/>
+              </a:ext>
+            </a:extLst>
+          </p:cNvPr>
+          <p:cNvSpPr>
+            <a:spLocks noGrp="1" noRot="1" noChangeAspect="1" noMove="1" noResize="1" noEditPoints="1" noAdjustHandles="1" noChangeArrowheads="1" noChangeShapeType="1" noTextEdit="1"/>
+          </p:cNvSpPr>
+          <p:nvPr>
+            <p:extLst>
+              <p:ext uri="{386F3935-93C4-4BCD-93E2-E3B085C9AB24}">
+                <p16:designElem xmlns:p16="http://schemas.microsoft.com/office/powerpoint/2015/main" val="1"/>
+              </p:ext>
+            </p:extLst>
+          </p:nvPr>
+        </p:nvSpPr>
+        <p:spPr>
+          <a:xfrm>
+            <a:off x="6577582" y="557784"/>
+            <a:ext cx="5130204" cy="5739187"/>
+          </a:xfrm>
+          <a:prstGeom prst="roundRect">
+            <a:avLst>
+              <a:gd name="adj" fmla="val 0"/>
+            </a:avLst>
+          </a:prstGeom>
+          <a:solidFill>
+            <a:srgbClr val="FFFFFF"/>
+          </a:solidFill>
+          <a:ln w="9525">
+            <a:solidFill>
+              <a:srgbClr val="C8CACA"/>
+            </a:solidFill>
+          </a:ln>
+          <a:effectLst>
+            <a:outerShdw blurRad="57150" dist="19050" dir="5400000" algn="t" rotWithShape="0">
+              <a:prstClr val="black">
+                <a:alpha val="63000"/>
+              </a:prstClr>
+            </a:outerShdw>
+          </a:effectLst>
+        </p:spPr>
+        <p:style>
+          <a:lnRef idx="2">
+            <a:schemeClr val="accent1">
+              <a:shade val="50000"/>
+            </a:schemeClr>
+          </a:lnRef>
+          <a:fillRef idx="1">
+            <a:schemeClr val="accent1"/>
+          </a:fillRef>
+          <a:effectRef idx="0">
+            <a:schemeClr val="accent1"/>
+          </a:effectRef>
+          <a:fontRef idx="minor">
+            <a:schemeClr val="lt1"/>
+          </a:fontRef>
+        </p:style>
+        <p:txBody>
+          <a:bodyPr rtlCol="0" anchor="ctr"/>
+          <a:lstStyle/>
+          <a:p>
+            <a:pPr algn="ctr"/>
+            <a:endParaRPr lang="en-US"/>
+          </a:p>
+        </p:txBody>
+      </p:sp>
+      <p:pic>
+        <p:nvPicPr>
+          <p:cNvPr id="5" name="Picture 4">
+            <a:extLst>
+              <a:ext uri="{FF2B5EF4-FFF2-40B4-BE49-F238E27FC236}">
+                <a16:creationId xmlns:a16="http://schemas.microsoft.com/office/drawing/2014/main" id="{766452C3-623B-094A-957C-C3077F1AD5C6}"/>
+              </a:ext>
+            </a:extLst>
+          </p:cNvPr>
+          <p:cNvPicPr>
+            <a:picLocks noChangeAspect="1"/>
+          </p:cNvPicPr>
+          <p:nvPr/>
+        </p:nvPicPr>
+        <p:blipFill>
+          <a:blip r:embed="rId3"/>
+          <a:stretch>
+            <a:fillRect/>
+          </a:stretch>
+        </p:blipFill>
+        <p:spPr>
+          <a:xfrm>
+            <a:off x="6577582" y="1188647"/>
+            <a:ext cx="5130204" cy="4113680"/>
+          </a:xfrm>
+          <a:prstGeom prst="rect">
+            <a:avLst/>
+          </a:prstGeom>
+        </p:spPr>
+      </p:pic>
+      <p:sp>
+        <p:nvSpPr>
+          <p:cNvPr id="10" name="TextBox 9">
+            <a:extLst>
+              <a:ext uri="{FF2B5EF4-FFF2-40B4-BE49-F238E27FC236}">
+                <a16:creationId xmlns:a16="http://schemas.microsoft.com/office/drawing/2014/main" id="{61764929-3FA0-F540-806D-E7169D36367D}"/>
+              </a:ext>
+            </a:extLst>
+          </p:cNvPr>
+          <p:cNvSpPr txBox="1"/>
+          <p:nvPr/>
+        </p:nvSpPr>
+        <p:spPr>
+          <a:xfrm>
+            <a:off x="212232" y="4842120"/>
+            <a:ext cx="5524080" cy="422078"/>
+          </a:xfrm>
+          <a:prstGeom prst="rect">
+            <a:avLst/>
+          </a:prstGeom>
+        </p:spPr>
+        <p:txBody>
+          <a:bodyPr vert="horz" lIns="91440" tIns="45720" rIns="91440" bIns="45720" rtlCol="0">
+            <a:normAutofit/>
+          </a:bodyPr>
+          <a:lstStyle/>
+          <a:p>
+            <a:pPr algn="ctr" defTabSz="914400">
+              <a:lnSpc>
+                <a:spcPct val="90000"/>
+              </a:lnSpc>
+              <a:spcAft>
+                <a:spcPts val="600"/>
+              </a:spcAft>
+            </a:pPr>
+            <a:r>
+              <a:rPr lang="en-US" sz="2400" dirty="0">
+                <a:latin typeface="Cambria Math" panose="02040503050406030204" pitchFamily="18" charset="0"/>
+              </a:rPr>
+              <a:t>The goal states are reachable (</a:t>
+            </a:r>
+            <a:r>
+              <a:rPr lang="en-US" sz="2400" i="1" dirty="0">
+                <a:solidFill>
+                  <a:schemeClr val="accent1"/>
+                </a:solidFill>
+                <a:latin typeface="Cambria Math" panose="02040503050406030204" pitchFamily="18" charset="0"/>
+              </a:rPr>
+              <a:t>fair</a:t>
+            </a:r>
+            <a:r>
+              <a:rPr lang="en-US" sz="2400" dirty="0">
+                <a:latin typeface="Cambria Math" panose="02040503050406030204" pitchFamily="18" charset="0"/>
+              </a:rPr>
+              <a:t>)</a:t>
+            </a:r>
+            <a:endParaRPr lang="en-US" sz="2400" b="0" dirty="0">
+              <a:latin typeface="Cambria Math" panose="02040503050406030204" pitchFamily="18" charset="0"/>
+            </a:endParaRPr>
+          </a:p>
+        </p:txBody>
+      </p:sp>
+      <mc:AlternateContent xmlns:mc="http://schemas.openxmlformats.org/markup-compatibility/2006">
+        <mc:Choice xmlns:a14="http://schemas.microsoft.com/office/drawing/2010/main" Requires="a14">
+          <p:sp>
+            <p:nvSpPr>
+              <p:cNvPr id="6" name="Rectangle 5">
+                <a:extLst>
+                  <a:ext uri="{FF2B5EF4-FFF2-40B4-BE49-F238E27FC236}">
+                    <a16:creationId xmlns:a16="http://schemas.microsoft.com/office/drawing/2014/main" id="{B652DD3A-082B-724A-9242-78306383475F}"/>
+                  </a:ext>
+                </a:extLst>
+              </p:cNvPr>
+              <p:cNvSpPr/>
+              <p:nvPr/>
+            </p:nvSpPr>
+            <p:spPr>
+              <a:xfrm>
+                <a:off x="2756905" y="3502318"/>
+                <a:ext cx="434734" cy="461665"/>
+              </a:xfrm>
+              <a:prstGeom prst="rect">
+                <a:avLst/>
+              </a:prstGeom>
+            </p:spPr>
+            <p:txBody>
+              <a:bodyPr wrap="none">
+                <a:spAutoFit/>
+              </a:bodyPr>
+              <a:lstStyle/>
+              <a:p>
+                <a14:m>
+                  <m:oMathPara xmlns:m="http://schemas.openxmlformats.org/officeDocument/2006/math">
+                    <m:oMathParaPr>
+                      <m:jc m:val="centerGroup"/>
+                    </m:oMathParaPr>
+                    <m:oMath xmlns:m="http://schemas.openxmlformats.org/officeDocument/2006/math">
+                      <m:r>
+                        <a:rPr lang="en-US" sz="2400" i="1">
+                          <a:latin typeface="Cambria Math" panose="02040503050406030204" pitchFamily="18" charset="0"/>
+                        </a:rPr>
+                        <m:t>∨</m:t>
+                      </m:r>
+                    </m:oMath>
+                  </m:oMathPara>
+                </a14:m>
+                <a:endParaRPr lang="en-US" sz="2400" dirty="0"/>
+              </a:p>
+            </p:txBody>
+          </p:sp>
+        </mc:Choice>
+        <mc:Fallback>
+          <p:sp>
+            <p:nvSpPr>
+              <p:cNvPr id="6" name="Rectangle 5">
+                <a:extLst>
+                  <a:ext uri="{FF2B5EF4-FFF2-40B4-BE49-F238E27FC236}">
+                    <a16:creationId xmlns:a16="http://schemas.microsoft.com/office/drawing/2014/main" id="{B652DD3A-082B-724A-9242-78306383475F}"/>
+                  </a:ext>
+                </a:extLst>
+              </p:cNvPr>
+              <p:cNvSpPr>
+                <a:spLocks noRot="1" noChangeAspect="1" noMove="1" noResize="1" noEditPoints="1" noAdjustHandles="1" noChangeArrowheads="1" noChangeShapeType="1" noTextEdit="1"/>
+              </p:cNvSpPr>
+              <p:nvPr/>
+            </p:nvSpPr>
+            <p:spPr>
+              <a:xfrm>
+                <a:off x="2756905" y="3502318"/>
+                <a:ext cx="434734" cy="461665"/>
+              </a:xfrm>
+              <a:prstGeom prst="rect">
+                <a:avLst/>
+              </a:prstGeom>
+              <a:blipFill>
+                <a:blip r:embed="rId4"/>
+                <a:stretch>
+                  <a:fillRect/>
+                </a:stretch>
+              </a:blipFill>
+            </p:spPr>
+            <p:txBody>
+              <a:bodyPr/>
+              <a:lstStyle/>
+              <a:p>
+                <a:r>
+                  <a:rPr lang="en-US">
+                    <a:noFill/>
+                  </a:rPr>
+                  <a:t> </a:t>
+                </a:r>
+              </a:p>
+            </p:txBody>
+          </p:sp>
+        </mc:Fallback>
+      </mc:AlternateContent>
+      <p:sp>
+        <p:nvSpPr>
+          <p:cNvPr id="7" name="Oval 6">
+            <a:extLst>
+              <a:ext uri="{FF2B5EF4-FFF2-40B4-BE49-F238E27FC236}">
+                <a16:creationId xmlns:a16="http://schemas.microsoft.com/office/drawing/2014/main" id="{7C6A5C07-0483-5744-A5BB-00D79AE18B9F}"/>
+              </a:ext>
+            </a:extLst>
+          </p:cNvPr>
+          <p:cNvSpPr/>
+          <p:nvPr/>
+        </p:nvSpPr>
+        <p:spPr>
+          <a:xfrm>
+            <a:off x="10033026" y="981459"/>
+            <a:ext cx="425303" cy="414376"/>
+          </a:xfrm>
+          <a:prstGeom prst="ellipse">
+            <a:avLst/>
+          </a:prstGeom>
+        </p:spPr>
+        <p:style>
+          <a:lnRef idx="2">
+            <a:schemeClr val="accent4">
+              <a:shade val="50000"/>
+            </a:schemeClr>
+          </a:lnRef>
+          <a:fillRef idx="1">
+            <a:schemeClr val="accent4"/>
+          </a:fillRef>
+          <a:effectRef idx="0">
+            <a:schemeClr val="accent4"/>
+          </a:effectRef>
+          <a:fontRef idx="minor">
+            <a:schemeClr val="lt1"/>
+          </a:fontRef>
+        </p:style>
+        <p:txBody>
+          <a:bodyPr rtlCol="0" anchor="ctr"/>
+          <a:lstStyle/>
+          <a:p>
+            <a:pPr algn="ctr"/>
+            <a:r>
+              <a:rPr lang="en-US" sz="2400" dirty="0"/>
+              <a:t>1</a:t>
+            </a:r>
+          </a:p>
+        </p:txBody>
+      </p:sp>
+      <mc:AlternateContent xmlns:mc="http://schemas.openxmlformats.org/markup-compatibility/2006">
+        <mc:Choice xmlns:a14="http://schemas.microsoft.com/office/drawing/2010/main" Requires="a14">
+          <p:sp>
+            <p:nvSpPr>
+              <p:cNvPr id="29" name="Rectangle 28">
+                <a:extLst>
+                  <a:ext uri="{FF2B5EF4-FFF2-40B4-BE49-F238E27FC236}">
+                    <a16:creationId xmlns:a16="http://schemas.microsoft.com/office/drawing/2014/main" id="{2673529A-4554-FB4B-A319-6865DA1D04CB}"/>
+                  </a:ext>
+                </a:extLst>
+              </p:cNvPr>
+              <p:cNvSpPr/>
+              <p:nvPr/>
+            </p:nvSpPr>
+            <p:spPr>
+              <a:xfrm>
+                <a:off x="2756905" y="2902119"/>
+                <a:ext cx="434734" cy="461665"/>
+              </a:xfrm>
+              <a:prstGeom prst="rect">
+                <a:avLst/>
+              </a:prstGeom>
+            </p:spPr>
+            <p:txBody>
+              <a:bodyPr wrap="none">
+                <a:spAutoFit/>
+              </a:bodyPr>
+              <a:lstStyle/>
+              <a:p>
+                <a14:m>
+                  <m:oMathPara xmlns:m="http://schemas.openxmlformats.org/officeDocument/2006/math">
+                    <m:oMathParaPr>
+                      <m:jc m:val="centerGroup"/>
+                    </m:oMathParaPr>
+                    <m:oMath xmlns:m="http://schemas.openxmlformats.org/officeDocument/2006/math">
+                      <m:r>
+                        <a:rPr lang="en-US" sz="2400" i="1">
+                          <a:latin typeface="Cambria Math" panose="02040503050406030204" pitchFamily="18" charset="0"/>
+                        </a:rPr>
+                        <m:t>∨</m:t>
+                      </m:r>
+                    </m:oMath>
+                  </m:oMathPara>
+                </a14:m>
+                <a:endParaRPr lang="en-US" sz="2400" dirty="0"/>
+              </a:p>
+            </p:txBody>
+          </p:sp>
+        </mc:Choice>
+        <mc:Fallback>
+          <p:sp>
+            <p:nvSpPr>
+              <p:cNvPr id="29" name="Rectangle 28">
+                <a:extLst>
+                  <a:ext uri="{FF2B5EF4-FFF2-40B4-BE49-F238E27FC236}">
+                    <a16:creationId xmlns:a16="http://schemas.microsoft.com/office/drawing/2014/main" id="{2673529A-4554-FB4B-A319-6865DA1D04CB}"/>
+                  </a:ext>
+                </a:extLst>
+              </p:cNvPr>
+              <p:cNvSpPr>
+                <a:spLocks noRot="1" noChangeAspect="1" noMove="1" noResize="1" noEditPoints="1" noAdjustHandles="1" noChangeArrowheads="1" noChangeShapeType="1" noTextEdit="1"/>
+              </p:cNvSpPr>
+              <p:nvPr/>
+            </p:nvSpPr>
+            <p:spPr>
+              <a:xfrm>
+                <a:off x="2756905" y="2902119"/>
+                <a:ext cx="434734" cy="461665"/>
+              </a:xfrm>
+              <a:prstGeom prst="rect">
+                <a:avLst/>
+              </a:prstGeom>
+              <a:blipFill>
+                <a:blip r:embed="rId5"/>
+                <a:stretch>
+                  <a:fillRect/>
+                </a:stretch>
+              </a:blipFill>
+            </p:spPr>
+            <p:txBody>
+              <a:bodyPr/>
+              <a:lstStyle/>
+              <a:p>
+                <a:r>
+                  <a:rPr lang="en-US">
+                    <a:noFill/>
+                  </a:rPr>
+                  <a:t> </a:t>
+                </a:r>
+              </a:p>
+            </p:txBody>
+          </p:sp>
+        </mc:Fallback>
+      </mc:AlternateContent>
+      <mc:AlternateContent xmlns:mc="http://schemas.openxmlformats.org/markup-compatibility/2006">
+        <mc:Choice xmlns:a14="http://schemas.microsoft.com/office/drawing/2010/main" Requires="a14">
+          <p:sp>
+            <p:nvSpPr>
+              <p:cNvPr id="30" name="Rectangle 29">
+                <a:extLst>
+                  <a:ext uri="{FF2B5EF4-FFF2-40B4-BE49-F238E27FC236}">
+                    <a16:creationId xmlns:a16="http://schemas.microsoft.com/office/drawing/2014/main" id="{5701D3AE-CA32-0E4A-8206-76949139C4FD}"/>
+                  </a:ext>
+                </a:extLst>
+              </p:cNvPr>
+              <p:cNvSpPr/>
+              <p:nvPr/>
+            </p:nvSpPr>
+            <p:spPr>
+              <a:xfrm>
+                <a:off x="3496721" y="3502318"/>
+                <a:ext cx="434734" cy="461665"/>
+              </a:xfrm>
+              <a:prstGeom prst="rect">
+                <a:avLst/>
+              </a:prstGeom>
+            </p:spPr>
+            <p:txBody>
+              <a:bodyPr wrap="none">
+                <a:spAutoFit/>
+              </a:bodyPr>
+              <a:lstStyle/>
+              <a:p>
+                <a14:m>
+                  <m:oMathPara xmlns:m="http://schemas.openxmlformats.org/officeDocument/2006/math">
+                    <m:oMathParaPr>
+                      <m:jc m:val="centerGroup"/>
+                    </m:oMathParaPr>
+                    <m:oMath xmlns:m="http://schemas.openxmlformats.org/officeDocument/2006/math">
+                      <m:r>
+                        <a:rPr lang="en-US" sz="2400" i="1">
+                          <a:latin typeface="Cambria Math" panose="02040503050406030204" pitchFamily="18" charset="0"/>
+                        </a:rPr>
+                        <m:t>∨</m:t>
+                      </m:r>
+                    </m:oMath>
+                  </m:oMathPara>
+                </a14:m>
+                <a:endParaRPr lang="en-US" sz="2400" dirty="0"/>
+              </a:p>
+            </p:txBody>
+          </p:sp>
+        </mc:Choice>
+        <mc:Fallback>
+          <p:sp>
+            <p:nvSpPr>
+              <p:cNvPr id="30" name="Rectangle 29">
+                <a:extLst>
+                  <a:ext uri="{FF2B5EF4-FFF2-40B4-BE49-F238E27FC236}">
+                    <a16:creationId xmlns:a16="http://schemas.microsoft.com/office/drawing/2014/main" id="{5701D3AE-CA32-0E4A-8206-76949139C4FD}"/>
+                  </a:ext>
+                </a:extLst>
+              </p:cNvPr>
+              <p:cNvSpPr>
+                <a:spLocks noRot="1" noChangeAspect="1" noMove="1" noResize="1" noEditPoints="1" noAdjustHandles="1" noChangeArrowheads="1" noChangeShapeType="1" noTextEdit="1"/>
+              </p:cNvSpPr>
+              <p:nvPr/>
+            </p:nvSpPr>
+            <p:spPr>
+              <a:xfrm>
+                <a:off x="3496721" y="3502318"/>
+                <a:ext cx="434734" cy="461665"/>
+              </a:xfrm>
+              <a:prstGeom prst="rect">
+                <a:avLst/>
+              </a:prstGeom>
+              <a:blipFill>
+                <a:blip r:embed="rId6"/>
+                <a:stretch>
+                  <a:fillRect/>
+                </a:stretch>
+              </a:blipFill>
+            </p:spPr>
+            <p:txBody>
+              <a:bodyPr/>
+              <a:lstStyle/>
+              <a:p>
+                <a:r>
+                  <a:rPr lang="en-US">
+                    <a:noFill/>
+                  </a:rPr>
+                  <a:t> </a:t>
+                </a:r>
+              </a:p>
+            </p:txBody>
+          </p:sp>
+        </mc:Fallback>
+      </mc:AlternateContent>
+      <mc:AlternateContent xmlns:mc="http://schemas.openxmlformats.org/markup-compatibility/2006">
+        <mc:Choice xmlns:a14="http://schemas.microsoft.com/office/drawing/2010/main" Requires="a14">
+          <p:sp>
+            <p:nvSpPr>
+              <p:cNvPr id="31" name="Rectangle 30">
+                <a:extLst>
+                  <a:ext uri="{FF2B5EF4-FFF2-40B4-BE49-F238E27FC236}">
+                    <a16:creationId xmlns:a16="http://schemas.microsoft.com/office/drawing/2014/main" id="{5003C327-A1D8-8B41-8856-0CF1049E220D}"/>
+                  </a:ext>
+                </a:extLst>
+              </p:cNvPr>
+              <p:cNvSpPr/>
+              <p:nvPr/>
+            </p:nvSpPr>
+            <p:spPr>
+              <a:xfrm>
+                <a:off x="3496721" y="2902119"/>
+                <a:ext cx="434734" cy="461665"/>
+              </a:xfrm>
+              <a:prstGeom prst="rect">
+                <a:avLst/>
+              </a:prstGeom>
+            </p:spPr>
+            <p:txBody>
+              <a:bodyPr wrap="none">
+                <a:spAutoFit/>
+              </a:bodyPr>
+              <a:lstStyle/>
+              <a:p>
+                <a14:m>
+                  <m:oMathPara xmlns:m="http://schemas.openxmlformats.org/officeDocument/2006/math">
+                    <m:oMathParaPr>
+                      <m:jc m:val="centerGroup"/>
+                    </m:oMathParaPr>
+                    <m:oMath xmlns:m="http://schemas.openxmlformats.org/officeDocument/2006/math">
+                      <m:r>
+                        <a:rPr lang="en-US" sz="2400" i="1">
+                          <a:latin typeface="Cambria Math" panose="02040503050406030204" pitchFamily="18" charset="0"/>
+                        </a:rPr>
+                        <m:t>∨</m:t>
+                      </m:r>
+                    </m:oMath>
+                  </m:oMathPara>
+                </a14:m>
+                <a:endParaRPr lang="en-US" sz="2400" dirty="0"/>
+              </a:p>
+            </p:txBody>
+          </p:sp>
+        </mc:Choice>
+        <mc:Fallback>
+          <p:sp>
+            <p:nvSpPr>
+              <p:cNvPr id="31" name="Rectangle 30">
+                <a:extLst>
+                  <a:ext uri="{FF2B5EF4-FFF2-40B4-BE49-F238E27FC236}">
+                    <a16:creationId xmlns:a16="http://schemas.microsoft.com/office/drawing/2014/main" id="{5003C327-A1D8-8B41-8856-0CF1049E220D}"/>
+                  </a:ext>
+                </a:extLst>
+              </p:cNvPr>
+              <p:cNvSpPr>
+                <a:spLocks noRot="1" noChangeAspect="1" noMove="1" noResize="1" noEditPoints="1" noAdjustHandles="1" noChangeArrowheads="1" noChangeShapeType="1" noTextEdit="1"/>
+              </p:cNvSpPr>
+              <p:nvPr/>
+            </p:nvSpPr>
+            <p:spPr>
+              <a:xfrm>
+                <a:off x="3496721" y="2902119"/>
+                <a:ext cx="434734" cy="461665"/>
+              </a:xfrm>
+              <a:prstGeom prst="rect">
+                <a:avLst/>
+              </a:prstGeom>
+              <a:blipFill>
+                <a:blip r:embed="rId7"/>
+                <a:stretch>
+                  <a:fillRect/>
+                </a:stretch>
+              </a:blipFill>
+            </p:spPr>
+            <p:txBody>
+              <a:bodyPr/>
+              <a:lstStyle/>
+              <a:p>
+                <a:r>
+                  <a:rPr lang="en-US">
+                    <a:noFill/>
+                  </a:rPr>
+                  <a:t> </a:t>
+                </a:r>
+              </a:p>
+            </p:txBody>
+          </p:sp>
+        </mc:Fallback>
+      </mc:AlternateContent>
+      <mc:AlternateContent xmlns:mc="http://schemas.openxmlformats.org/markup-compatibility/2006">
+        <mc:Choice xmlns:a14="http://schemas.microsoft.com/office/drawing/2010/main" Requires="a14">
+          <p:sp>
+            <p:nvSpPr>
+              <p:cNvPr id="32" name="Rectangle 31">
+                <a:extLst>
+                  <a:ext uri="{FF2B5EF4-FFF2-40B4-BE49-F238E27FC236}">
+                    <a16:creationId xmlns:a16="http://schemas.microsoft.com/office/drawing/2014/main" id="{767BC28E-0833-6342-84A8-B83E7CCEC5C1}"/>
+                  </a:ext>
+                </a:extLst>
+              </p:cNvPr>
+              <p:cNvSpPr/>
+              <p:nvPr/>
+            </p:nvSpPr>
+            <p:spPr>
+              <a:xfrm>
+                <a:off x="1991582" y="3502318"/>
+                <a:ext cx="434734" cy="461665"/>
+              </a:xfrm>
+              <a:prstGeom prst="rect">
+                <a:avLst/>
+              </a:prstGeom>
+            </p:spPr>
+            <p:txBody>
+              <a:bodyPr wrap="none">
+                <a:spAutoFit/>
+              </a:bodyPr>
+              <a:lstStyle/>
+              <a:p>
+                <a14:m>
+                  <m:oMathPara xmlns:m="http://schemas.openxmlformats.org/officeDocument/2006/math">
+                    <m:oMathParaPr>
+                      <m:jc m:val="centerGroup"/>
+                    </m:oMathParaPr>
+                    <m:oMath xmlns:m="http://schemas.openxmlformats.org/officeDocument/2006/math">
+                      <m:r>
+                        <a:rPr lang="en-US" sz="2400" i="1">
+                          <a:latin typeface="Cambria Math" panose="02040503050406030204" pitchFamily="18" charset="0"/>
+                        </a:rPr>
+                        <m:t>∨</m:t>
+                      </m:r>
+                    </m:oMath>
+                  </m:oMathPara>
+                </a14:m>
+                <a:endParaRPr lang="en-US" sz="2400" dirty="0"/>
+              </a:p>
+            </p:txBody>
+          </p:sp>
+        </mc:Choice>
+        <mc:Fallback>
+          <p:sp>
+            <p:nvSpPr>
+              <p:cNvPr id="32" name="Rectangle 31">
+                <a:extLst>
+                  <a:ext uri="{FF2B5EF4-FFF2-40B4-BE49-F238E27FC236}">
+                    <a16:creationId xmlns:a16="http://schemas.microsoft.com/office/drawing/2014/main" id="{767BC28E-0833-6342-84A8-B83E7CCEC5C1}"/>
+                  </a:ext>
+                </a:extLst>
+              </p:cNvPr>
+              <p:cNvSpPr>
+                <a:spLocks noRot="1" noChangeAspect="1" noMove="1" noResize="1" noEditPoints="1" noAdjustHandles="1" noChangeArrowheads="1" noChangeShapeType="1" noTextEdit="1"/>
+              </p:cNvSpPr>
+              <p:nvPr/>
+            </p:nvSpPr>
+            <p:spPr>
+              <a:xfrm>
+                <a:off x="1991582" y="3502318"/>
+                <a:ext cx="434734" cy="461665"/>
+              </a:xfrm>
+              <a:prstGeom prst="rect">
+                <a:avLst/>
+              </a:prstGeom>
+              <a:blipFill>
+                <a:blip r:embed="rId8"/>
+                <a:stretch>
+                  <a:fillRect/>
+                </a:stretch>
+              </a:blipFill>
+            </p:spPr>
+            <p:txBody>
+              <a:bodyPr/>
+              <a:lstStyle/>
+              <a:p>
+                <a:r>
+                  <a:rPr lang="en-US">
+                    <a:noFill/>
+                  </a:rPr>
+                  <a:t> </a:t>
+                </a:r>
+              </a:p>
+            </p:txBody>
+          </p:sp>
+        </mc:Fallback>
+      </mc:AlternateContent>
+      <p:sp>
+        <p:nvSpPr>
+          <p:cNvPr id="8" name="TextBox 7">
+            <a:extLst>
+              <a:ext uri="{FF2B5EF4-FFF2-40B4-BE49-F238E27FC236}">
+                <a16:creationId xmlns:a16="http://schemas.microsoft.com/office/drawing/2014/main" id="{45B96043-9BB7-8A4A-8009-A6EF3EA85415}"/>
+              </a:ext>
+            </a:extLst>
+          </p:cNvPr>
+          <p:cNvSpPr txBox="1"/>
+          <p:nvPr/>
+        </p:nvSpPr>
+        <p:spPr>
+          <a:xfrm>
+            <a:off x="776520" y="3231267"/>
+            <a:ext cx="1158713" cy="461665"/>
+          </a:xfrm>
+          <a:prstGeom prst="rect">
+            <a:avLst/>
+          </a:prstGeom>
+          <a:noFill/>
+        </p:spPr>
+        <p:txBody>
+          <a:bodyPr wrap="square" rtlCol="0">
+            <a:spAutoFit/>
+          </a:bodyPr>
+          <a:lstStyle/>
+          <a:p>
+            <a:pPr algn="ctr"/>
+            <a:r>
+              <a:rPr lang="en-US" sz="2400" b="1" dirty="0">
+                <a:solidFill>
+                  <a:schemeClr val="accent1"/>
+                </a:solidFill>
+              </a:rPr>
+              <a:t>always</a:t>
+            </a:r>
+          </a:p>
+        </p:txBody>
+      </p:sp>
+      <p:sp>
+        <p:nvSpPr>
+          <p:cNvPr id="34" name="Oval 33">
+            <a:extLst>
+              <a:ext uri="{FF2B5EF4-FFF2-40B4-BE49-F238E27FC236}">
+                <a16:creationId xmlns:a16="http://schemas.microsoft.com/office/drawing/2014/main" id="{2A15E8CE-2138-CF46-B01E-5DF3E2312322}"/>
+              </a:ext>
+            </a:extLst>
+          </p:cNvPr>
+          <p:cNvSpPr/>
+          <p:nvPr/>
+        </p:nvSpPr>
+        <p:spPr>
+          <a:xfrm>
+            <a:off x="7070649" y="1555967"/>
+            <a:ext cx="425303" cy="414376"/>
+          </a:xfrm>
+          <a:prstGeom prst="ellipse">
+            <a:avLst/>
+          </a:prstGeom>
+        </p:spPr>
+        <p:style>
+          <a:lnRef idx="2">
+            <a:schemeClr val="accent4">
+              <a:shade val="50000"/>
+            </a:schemeClr>
+          </a:lnRef>
+          <a:fillRef idx="1">
+            <a:schemeClr val="accent4"/>
+          </a:fillRef>
+          <a:effectRef idx="0">
+            <a:schemeClr val="accent4"/>
+          </a:effectRef>
+          <a:fontRef idx="minor">
+            <a:schemeClr val="lt1"/>
+          </a:fontRef>
+        </p:style>
+        <p:txBody>
+          <a:bodyPr rtlCol="0" anchor="ctr"/>
+          <a:lstStyle/>
+          <a:p>
+            <a:pPr algn="ctr"/>
+            <a:r>
+              <a:rPr lang="en-US" sz="2400" dirty="0"/>
+              <a:t>2</a:t>
+            </a:r>
+          </a:p>
+        </p:txBody>
+      </p:sp>
+      <p:sp>
+        <p:nvSpPr>
+          <p:cNvPr id="35" name="Oval 34">
+            <a:extLst>
+              <a:ext uri="{FF2B5EF4-FFF2-40B4-BE49-F238E27FC236}">
+                <a16:creationId xmlns:a16="http://schemas.microsoft.com/office/drawing/2014/main" id="{BC510946-830B-A245-8D8B-D8735312A6B3}"/>
+              </a:ext>
+            </a:extLst>
+          </p:cNvPr>
+          <p:cNvSpPr/>
+          <p:nvPr/>
+        </p:nvSpPr>
+        <p:spPr>
+          <a:xfrm>
+            <a:off x="7598089" y="3842607"/>
+            <a:ext cx="425303" cy="414376"/>
+          </a:xfrm>
+          <a:prstGeom prst="ellipse">
+            <a:avLst/>
+          </a:prstGeom>
+        </p:spPr>
+        <p:style>
+          <a:lnRef idx="2">
+            <a:schemeClr val="accent4">
+              <a:shade val="50000"/>
+            </a:schemeClr>
+          </a:lnRef>
+          <a:fillRef idx="1">
+            <a:schemeClr val="accent4"/>
+          </a:fillRef>
+          <a:effectRef idx="0">
+            <a:schemeClr val="accent4"/>
+          </a:effectRef>
+          <a:fontRef idx="minor">
+            <a:schemeClr val="lt1"/>
+          </a:fontRef>
+        </p:style>
+        <p:txBody>
+          <a:bodyPr rtlCol="0" anchor="ctr"/>
+          <a:lstStyle/>
+          <a:p>
+            <a:pPr algn="ctr"/>
+            <a:r>
+              <a:rPr lang="en-US" sz="2400" dirty="0"/>
+              <a:t>3</a:t>
+            </a:r>
+          </a:p>
+        </p:txBody>
+      </p:sp>
+      <p:sp>
+        <p:nvSpPr>
+          <p:cNvPr id="36" name="Oval 35">
+            <a:extLst>
+              <a:ext uri="{FF2B5EF4-FFF2-40B4-BE49-F238E27FC236}">
+                <a16:creationId xmlns:a16="http://schemas.microsoft.com/office/drawing/2014/main" id="{F0F0AB0E-B26E-C046-9EE8-3246BE8285D1}"/>
+              </a:ext>
+            </a:extLst>
+          </p:cNvPr>
+          <p:cNvSpPr/>
+          <p:nvPr/>
+        </p:nvSpPr>
+        <p:spPr>
+          <a:xfrm>
+            <a:off x="10139271" y="2780743"/>
+            <a:ext cx="425303" cy="414376"/>
+          </a:xfrm>
+          <a:prstGeom prst="ellipse">
+            <a:avLst/>
+          </a:prstGeom>
+        </p:spPr>
+        <p:style>
+          <a:lnRef idx="2">
+            <a:schemeClr val="accent4">
+              <a:shade val="50000"/>
+            </a:schemeClr>
+          </a:lnRef>
+          <a:fillRef idx="1">
+            <a:schemeClr val="accent4"/>
+          </a:fillRef>
+          <a:effectRef idx="0">
+            <a:schemeClr val="accent4"/>
+          </a:effectRef>
+          <a:fontRef idx="minor">
+            <a:schemeClr val="lt1"/>
+          </a:fontRef>
+        </p:style>
+        <p:txBody>
+          <a:bodyPr rtlCol="0" anchor="ctr"/>
+          <a:lstStyle/>
+          <a:p>
+            <a:pPr algn="ctr"/>
+            <a:r>
+              <a:rPr lang="en-US" sz="2400" dirty="0"/>
+              <a:t>4</a:t>
+            </a:r>
+          </a:p>
+        </p:txBody>
+      </p:sp>
+      <p:sp>
+        <p:nvSpPr>
+          <p:cNvPr id="37" name="Oval 36">
+            <a:extLst>
+              <a:ext uri="{FF2B5EF4-FFF2-40B4-BE49-F238E27FC236}">
+                <a16:creationId xmlns:a16="http://schemas.microsoft.com/office/drawing/2014/main" id="{A4F14E8C-B82B-D246-809C-7FEAF10A29FB}"/>
+              </a:ext>
+            </a:extLst>
+          </p:cNvPr>
+          <p:cNvSpPr/>
+          <p:nvPr/>
+        </p:nvSpPr>
+        <p:spPr>
+          <a:xfrm>
+            <a:off x="7810740" y="5302327"/>
+            <a:ext cx="425303" cy="414376"/>
+          </a:xfrm>
+          <a:prstGeom prst="ellipse">
+            <a:avLst/>
+          </a:prstGeom>
+        </p:spPr>
+        <p:style>
+          <a:lnRef idx="2">
+            <a:schemeClr val="accent3">
+              <a:shade val="50000"/>
+            </a:schemeClr>
+          </a:lnRef>
+          <a:fillRef idx="1">
+            <a:schemeClr val="accent3"/>
+          </a:fillRef>
+          <a:effectRef idx="0">
+            <a:schemeClr val="accent3"/>
+          </a:effectRef>
+          <a:fontRef idx="minor">
+            <a:schemeClr val="lt1"/>
+          </a:fontRef>
+        </p:style>
+        <p:txBody>
+          <a:bodyPr rtlCol="0" anchor="ctr"/>
+          <a:lstStyle/>
+          <a:p>
+            <a:pPr algn="ctr"/>
+            <a:r>
+              <a:rPr lang="en-US" sz="2400" dirty="0"/>
+              <a:t>5</a:t>
+            </a:r>
+          </a:p>
+        </p:txBody>
+      </p:sp>
+      <p:sp>
+        <p:nvSpPr>
+          <p:cNvPr id="38" name="Oval 37">
+            <a:extLst>
+              <a:ext uri="{FF2B5EF4-FFF2-40B4-BE49-F238E27FC236}">
+                <a16:creationId xmlns:a16="http://schemas.microsoft.com/office/drawing/2014/main" id="{0EC774B2-2AA8-8E45-BF63-AAA302CE2942}"/>
+              </a:ext>
+            </a:extLst>
+          </p:cNvPr>
+          <p:cNvSpPr/>
+          <p:nvPr/>
+        </p:nvSpPr>
+        <p:spPr>
+          <a:xfrm>
+            <a:off x="9256549" y="5029616"/>
+            <a:ext cx="425303" cy="414376"/>
+          </a:xfrm>
+          <a:prstGeom prst="ellipse">
+            <a:avLst/>
+          </a:prstGeom>
+        </p:spPr>
+        <p:style>
+          <a:lnRef idx="2">
+            <a:schemeClr val="accent3">
+              <a:shade val="50000"/>
+            </a:schemeClr>
+          </a:lnRef>
+          <a:fillRef idx="1">
+            <a:schemeClr val="accent3"/>
+          </a:fillRef>
+          <a:effectRef idx="0">
+            <a:schemeClr val="accent3"/>
+          </a:effectRef>
+          <a:fontRef idx="minor">
+            <a:schemeClr val="lt1"/>
+          </a:fontRef>
+        </p:style>
+        <p:txBody>
+          <a:bodyPr rtlCol="0" anchor="ctr"/>
+          <a:lstStyle/>
+          <a:p>
+            <a:pPr algn="ctr"/>
+            <a:r>
+              <a:rPr lang="en-US" sz="2400" dirty="0"/>
+              <a:t>6</a:t>
+            </a:r>
+          </a:p>
+        </p:txBody>
+      </p:sp>
+      <p:sp>
+        <p:nvSpPr>
+          <p:cNvPr id="39" name="Oval 38">
+            <a:extLst>
+              <a:ext uri="{FF2B5EF4-FFF2-40B4-BE49-F238E27FC236}">
+                <a16:creationId xmlns:a16="http://schemas.microsoft.com/office/drawing/2014/main" id="{1239C720-72C7-F04F-BE37-3707AFDAF587}"/>
+              </a:ext>
+            </a:extLst>
+          </p:cNvPr>
+          <p:cNvSpPr/>
+          <p:nvPr/>
+        </p:nvSpPr>
+        <p:spPr>
+          <a:xfrm>
+            <a:off x="2401144" y="2962132"/>
+            <a:ext cx="425303" cy="414376"/>
+          </a:xfrm>
+          <a:prstGeom prst="ellipse">
+            <a:avLst/>
+          </a:prstGeom>
+        </p:spPr>
+        <p:style>
+          <a:lnRef idx="2">
+            <a:schemeClr val="accent4">
+              <a:shade val="50000"/>
+            </a:schemeClr>
+          </a:lnRef>
+          <a:fillRef idx="1">
+            <a:schemeClr val="accent4"/>
+          </a:fillRef>
+          <a:effectRef idx="0">
+            <a:schemeClr val="accent4"/>
+          </a:effectRef>
+          <a:fontRef idx="minor">
+            <a:schemeClr val="lt1"/>
+          </a:fontRef>
+        </p:style>
+        <p:txBody>
+          <a:bodyPr rtlCol="0" anchor="ctr"/>
+          <a:lstStyle/>
+          <a:p>
+            <a:pPr algn="ctr"/>
+            <a:r>
+              <a:rPr lang="en-US" sz="2400" dirty="0"/>
+              <a:t>1</a:t>
+            </a:r>
+          </a:p>
+        </p:txBody>
+      </p:sp>
+      <p:sp>
+        <p:nvSpPr>
+          <p:cNvPr id="40" name="Oval 39">
+            <a:extLst>
+              <a:ext uri="{FF2B5EF4-FFF2-40B4-BE49-F238E27FC236}">
+                <a16:creationId xmlns:a16="http://schemas.microsoft.com/office/drawing/2014/main" id="{8F85AAEB-8A6D-124E-9B57-0AEDE579CAEE}"/>
+              </a:ext>
+            </a:extLst>
+          </p:cNvPr>
+          <p:cNvSpPr/>
+          <p:nvPr/>
+        </p:nvSpPr>
+        <p:spPr>
+          <a:xfrm>
+            <a:off x="3131529" y="2959865"/>
+            <a:ext cx="425303" cy="414376"/>
+          </a:xfrm>
+          <a:prstGeom prst="ellipse">
+            <a:avLst/>
+          </a:prstGeom>
+        </p:spPr>
+        <p:style>
+          <a:lnRef idx="2">
+            <a:schemeClr val="accent4">
+              <a:shade val="50000"/>
+            </a:schemeClr>
+          </a:lnRef>
+          <a:fillRef idx="1">
+            <a:schemeClr val="accent4"/>
+          </a:fillRef>
+          <a:effectRef idx="0">
+            <a:schemeClr val="accent4"/>
+          </a:effectRef>
+          <a:fontRef idx="minor">
+            <a:schemeClr val="lt1"/>
+          </a:fontRef>
+        </p:style>
+        <p:txBody>
+          <a:bodyPr rtlCol="0" anchor="ctr"/>
+          <a:lstStyle/>
+          <a:p>
+            <a:pPr algn="ctr"/>
+            <a:r>
+              <a:rPr lang="en-US" sz="2400" dirty="0"/>
+              <a:t>2</a:t>
+            </a:r>
+          </a:p>
+        </p:txBody>
+      </p:sp>
+      <p:sp>
+        <p:nvSpPr>
+          <p:cNvPr id="41" name="Oval 40">
+            <a:extLst>
+              <a:ext uri="{FF2B5EF4-FFF2-40B4-BE49-F238E27FC236}">
+                <a16:creationId xmlns:a16="http://schemas.microsoft.com/office/drawing/2014/main" id="{79D2CAEA-8B1B-714C-95D7-5172D56557FE}"/>
+              </a:ext>
+            </a:extLst>
+          </p:cNvPr>
+          <p:cNvSpPr/>
+          <p:nvPr/>
+        </p:nvSpPr>
+        <p:spPr>
+          <a:xfrm>
+            <a:off x="3861914" y="2930847"/>
+            <a:ext cx="425303" cy="414376"/>
+          </a:xfrm>
+          <a:prstGeom prst="ellipse">
+            <a:avLst/>
+          </a:prstGeom>
+        </p:spPr>
+        <p:style>
+          <a:lnRef idx="2">
+            <a:schemeClr val="accent4">
+              <a:shade val="50000"/>
+            </a:schemeClr>
+          </a:lnRef>
+          <a:fillRef idx="1">
+            <a:schemeClr val="accent4"/>
+          </a:fillRef>
+          <a:effectRef idx="0">
+            <a:schemeClr val="accent4"/>
+          </a:effectRef>
+          <a:fontRef idx="minor">
+            <a:schemeClr val="lt1"/>
+          </a:fontRef>
+        </p:style>
+        <p:txBody>
+          <a:bodyPr rtlCol="0" anchor="ctr"/>
+          <a:lstStyle/>
+          <a:p>
+            <a:pPr algn="ctr"/>
+            <a:r>
+              <a:rPr lang="en-US" sz="2400" dirty="0"/>
+              <a:t>3</a:t>
+            </a:r>
+          </a:p>
+        </p:txBody>
+      </p:sp>
+      <p:sp>
+        <p:nvSpPr>
+          <p:cNvPr id="42" name="Oval 41">
+            <a:extLst>
+              <a:ext uri="{FF2B5EF4-FFF2-40B4-BE49-F238E27FC236}">
+                <a16:creationId xmlns:a16="http://schemas.microsoft.com/office/drawing/2014/main" id="{DD266E10-903D-CF48-A813-A46298D91575}"/>
+              </a:ext>
+            </a:extLst>
+          </p:cNvPr>
+          <p:cNvSpPr/>
+          <p:nvPr/>
+        </p:nvSpPr>
+        <p:spPr>
+          <a:xfrm>
+            <a:off x="2404062" y="3532166"/>
+            <a:ext cx="425303" cy="414376"/>
+          </a:xfrm>
+          <a:prstGeom prst="ellipse">
+            <a:avLst/>
+          </a:prstGeom>
+        </p:spPr>
+        <p:style>
+          <a:lnRef idx="2">
+            <a:schemeClr val="accent4">
+              <a:shade val="50000"/>
+            </a:schemeClr>
+          </a:lnRef>
+          <a:fillRef idx="1">
+            <a:schemeClr val="accent4"/>
+          </a:fillRef>
+          <a:effectRef idx="0">
+            <a:schemeClr val="accent4"/>
+          </a:effectRef>
+          <a:fontRef idx="minor">
+            <a:schemeClr val="lt1"/>
+          </a:fontRef>
+        </p:style>
+        <p:txBody>
+          <a:bodyPr rtlCol="0" anchor="ctr"/>
+          <a:lstStyle/>
+          <a:p>
+            <a:pPr algn="ctr"/>
+            <a:r>
+              <a:rPr lang="en-US" sz="2400" dirty="0"/>
+              <a:t>4</a:t>
+            </a:r>
+          </a:p>
+        </p:txBody>
+      </p:sp>
+      <p:sp>
+        <p:nvSpPr>
+          <p:cNvPr id="43" name="Oval 42">
+            <a:extLst>
+              <a:ext uri="{FF2B5EF4-FFF2-40B4-BE49-F238E27FC236}">
+                <a16:creationId xmlns:a16="http://schemas.microsoft.com/office/drawing/2014/main" id="{A7E57D20-0CE2-BE40-9738-60FF4A1C973D}"/>
+              </a:ext>
+            </a:extLst>
+          </p:cNvPr>
+          <p:cNvSpPr/>
+          <p:nvPr/>
+        </p:nvSpPr>
+        <p:spPr>
+          <a:xfrm>
+            <a:off x="3139145" y="3532166"/>
+            <a:ext cx="425303" cy="414376"/>
+          </a:xfrm>
+          <a:prstGeom prst="ellipse">
+            <a:avLst/>
+          </a:prstGeom>
+        </p:spPr>
+        <p:style>
+          <a:lnRef idx="2">
+            <a:schemeClr val="accent3">
+              <a:shade val="50000"/>
+            </a:schemeClr>
+          </a:lnRef>
+          <a:fillRef idx="1">
+            <a:schemeClr val="accent3"/>
+          </a:fillRef>
+          <a:effectRef idx="0">
+            <a:schemeClr val="accent3"/>
+          </a:effectRef>
+          <a:fontRef idx="minor">
+            <a:schemeClr val="lt1"/>
+          </a:fontRef>
+        </p:style>
+        <p:txBody>
+          <a:bodyPr rtlCol="0" anchor="ctr"/>
+          <a:lstStyle/>
+          <a:p>
+            <a:pPr algn="ctr"/>
+            <a:r>
+              <a:rPr lang="en-US" sz="2400" dirty="0"/>
+              <a:t>5</a:t>
+            </a:r>
+          </a:p>
+        </p:txBody>
+      </p:sp>
+      <p:sp>
+        <p:nvSpPr>
+          <p:cNvPr id="44" name="Oval 43">
+            <a:extLst>
+              <a:ext uri="{FF2B5EF4-FFF2-40B4-BE49-F238E27FC236}">
+                <a16:creationId xmlns:a16="http://schemas.microsoft.com/office/drawing/2014/main" id="{5FEA65F3-3A1F-B44F-8421-E4ACE1671EEE}"/>
+              </a:ext>
+            </a:extLst>
+          </p:cNvPr>
+          <p:cNvSpPr/>
+          <p:nvPr/>
+        </p:nvSpPr>
+        <p:spPr>
+          <a:xfrm>
+            <a:off x="3874665" y="3532166"/>
+            <a:ext cx="425303" cy="414376"/>
+          </a:xfrm>
+          <a:prstGeom prst="ellipse">
+            <a:avLst/>
+          </a:prstGeom>
+        </p:spPr>
+        <p:style>
+          <a:lnRef idx="2">
+            <a:schemeClr val="accent3">
+              <a:shade val="50000"/>
+            </a:schemeClr>
+          </a:lnRef>
+          <a:fillRef idx="1">
+            <a:schemeClr val="accent3"/>
+          </a:fillRef>
+          <a:effectRef idx="0">
+            <a:schemeClr val="accent3"/>
+          </a:effectRef>
+          <a:fontRef idx="minor">
+            <a:schemeClr val="lt1"/>
+          </a:fontRef>
+        </p:style>
+        <p:txBody>
+          <a:bodyPr rtlCol="0" anchor="ctr"/>
+          <a:lstStyle/>
+          <a:p>
+            <a:pPr algn="ctr"/>
+            <a:r>
+              <a:rPr lang="en-US" sz="2400" dirty="0"/>
+              <a:t>6</a:t>
+            </a:r>
+          </a:p>
+        </p:txBody>
+      </p:sp>
+      <p:sp>
+        <p:nvSpPr>
+          <p:cNvPr id="13" name="Double Bracket 12">
+            <a:extLst>
+              <a:ext uri="{FF2B5EF4-FFF2-40B4-BE49-F238E27FC236}">
+                <a16:creationId xmlns:a16="http://schemas.microsoft.com/office/drawing/2014/main" id="{60033CE1-7790-2B46-964F-29A702941036}"/>
+              </a:ext>
+            </a:extLst>
+          </p:cNvPr>
+          <p:cNvSpPr/>
+          <p:nvPr/>
+        </p:nvSpPr>
+        <p:spPr>
+          <a:xfrm>
+            <a:off x="1909091" y="2902119"/>
+            <a:ext cx="2701365" cy="1119963"/>
+          </a:xfrm>
+          <a:prstGeom prst="bracketPair">
+            <a:avLst/>
+          </a:prstGeom>
+        </p:spPr>
+        <p:style>
+          <a:lnRef idx="3">
+            <a:schemeClr val="accent1"/>
+          </a:lnRef>
+          <a:fillRef idx="0">
+            <a:schemeClr val="accent1"/>
+          </a:fillRef>
+          <a:effectRef idx="2">
+            <a:schemeClr val="accent1"/>
+          </a:effectRef>
+          <a:fontRef idx="minor">
+            <a:schemeClr val="tx1"/>
+          </a:fontRef>
+        </p:style>
+        <p:txBody>
+          <a:bodyPr rtlCol="0" anchor="ctr"/>
+          <a:lstStyle/>
+          <a:p>
+            <a:pPr algn="ctr"/>
+            <a:endParaRPr lang="en-US"/>
+          </a:p>
+        </p:txBody>
+      </p:sp>
+      <p:sp>
+        <p:nvSpPr>
+          <p:cNvPr id="45" name="Rectangle 44">
+            <a:extLst>
+              <a:ext uri="{FF2B5EF4-FFF2-40B4-BE49-F238E27FC236}">
+                <a16:creationId xmlns:a16="http://schemas.microsoft.com/office/drawing/2014/main" id="{8F85F42E-536F-7543-8F06-42F26D5436FE}"/>
+              </a:ext>
+            </a:extLst>
+          </p:cNvPr>
+          <p:cNvSpPr/>
+          <p:nvPr/>
+        </p:nvSpPr>
+        <p:spPr>
+          <a:xfrm>
+            <a:off x="662866" y="2230349"/>
+            <a:ext cx="4697376" cy="424732"/>
+          </a:xfrm>
+          <a:prstGeom prst="rect">
+            <a:avLst/>
+          </a:prstGeom>
+        </p:spPr>
+        <p:txBody>
+          <a:bodyPr wrap="none">
+            <a:spAutoFit/>
+          </a:bodyPr>
+          <a:lstStyle/>
+          <a:p>
+            <a:pPr algn="ctr" defTabSz="914400">
+              <a:lnSpc>
+                <a:spcPct val="90000"/>
+              </a:lnSpc>
+              <a:spcAft>
+                <a:spcPts val="600"/>
+              </a:spcAft>
+            </a:pPr>
+            <a:r>
+              <a:rPr lang="en-US" sz="2400" dirty="0">
+                <a:latin typeface="Cambria Math" panose="02040503050406030204" pitchFamily="18" charset="0"/>
+              </a:rPr>
+              <a:t>Object covered by some CWP state</a:t>
+            </a:r>
+          </a:p>
+        </p:txBody>
+      </p:sp>
+      <p:sp>
+        <p:nvSpPr>
+          <p:cNvPr id="46" name="TextBox 45">
+            <a:extLst>
+              <a:ext uri="{FF2B5EF4-FFF2-40B4-BE49-F238E27FC236}">
+                <a16:creationId xmlns:a16="http://schemas.microsoft.com/office/drawing/2014/main" id="{6C6C9DA5-6B6D-484A-918B-E02E00D87CE2}"/>
+              </a:ext>
+            </a:extLst>
+          </p:cNvPr>
+          <p:cNvSpPr txBox="1"/>
+          <p:nvPr/>
+        </p:nvSpPr>
+        <p:spPr>
+          <a:xfrm>
+            <a:off x="1228601" y="5605313"/>
+            <a:ext cx="1788338" cy="461665"/>
+          </a:xfrm>
+          <a:prstGeom prst="rect">
+            <a:avLst/>
+          </a:prstGeom>
+          <a:noFill/>
+        </p:spPr>
+        <p:txBody>
+          <a:bodyPr wrap="square" rtlCol="0">
+            <a:spAutoFit/>
+          </a:bodyPr>
+          <a:lstStyle/>
+          <a:p>
+            <a:pPr algn="ctr"/>
+            <a:r>
+              <a:rPr lang="en-US" sz="2400" b="1" dirty="0">
+                <a:solidFill>
+                  <a:schemeClr val="accent1"/>
+                </a:solidFill>
+              </a:rPr>
+              <a:t>eventually</a:t>
+            </a:r>
+          </a:p>
+        </p:txBody>
+      </p:sp>
+      <p:sp>
+        <p:nvSpPr>
+          <p:cNvPr id="47" name="Double Bracket 46">
+            <a:extLst>
+              <a:ext uri="{FF2B5EF4-FFF2-40B4-BE49-F238E27FC236}">
+                <a16:creationId xmlns:a16="http://schemas.microsoft.com/office/drawing/2014/main" id="{E15A3BE1-5651-6B4B-9153-D49E374A5DF2}"/>
+              </a:ext>
+            </a:extLst>
+          </p:cNvPr>
+          <p:cNvSpPr/>
+          <p:nvPr/>
+        </p:nvSpPr>
+        <p:spPr>
+          <a:xfrm>
+            <a:off x="2947187" y="5507664"/>
+            <a:ext cx="1436349" cy="728417"/>
+          </a:xfrm>
+          <a:prstGeom prst="bracketPair">
+            <a:avLst/>
+          </a:prstGeom>
+        </p:spPr>
+        <p:style>
+          <a:lnRef idx="3">
+            <a:schemeClr val="accent1"/>
+          </a:lnRef>
+          <a:fillRef idx="0">
+            <a:schemeClr val="accent1"/>
+          </a:fillRef>
+          <a:effectRef idx="2">
+            <a:schemeClr val="accent1"/>
+          </a:effectRef>
+          <a:fontRef idx="minor">
+            <a:schemeClr val="tx1"/>
+          </a:fontRef>
+        </p:style>
+        <p:txBody>
+          <a:bodyPr rtlCol="0" anchor="ctr"/>
+          <a:lstStyle/>
+          <a:p>
+            <a:pPr algn="ctr"/>
+            <a:endParaRPr lang="en-US"/>
+          </a:p>
+        </p:txBody>
+      </p:sp>
+      <mc:AlternateContent xmlns:mc="http://schemas.openxmlformats.org/markup-compatibility/2006">
+        <mc:Choice xmlns:a14="http://schemas.microsoft.com/office/drawing/2010/main" Requires="a14">
+          <p:sp>
+            <p:nvSpPr>
+              <p:cNvPr id="48" name="Rectangle 47">
+                <a:extLst>
+                  <a:ext uri="{FF2B5EF4-FFF2-40B4-BE49-F238E27FC236}">
+                    <a16:creationId xmlns:a16="http://schemas.microsoft.com/office/drawing/2014/main" id="{0796FE2B-3547-6E42-A0F4-1F0B28829EFB}"/>
+                  </a:ext>
+                </a:extLst>
+              </p:cNvPr>
+              <p:cNvSpPr/>
+              <p:nvPr/>
+            </p:nvSpPr>
+            <p:spPr>
+              <a:xfrm>
+                <a:off x="3446850" y="5605313"/>
+                <a:ext cx="434734" cy="461665"/>
+              </a:xfrm>
+              <a:prstGeom prst="rect">
+                <a:avLst/>
+              </a:prstGeom>
+            </p:spPr>
+            <p:txBody>
+              <a:bodyPr wrap="none">
+                <a:spAutoFit/>
+              </a:bodyPr>
+              <a:lstStyle/>
+              <a:p>
+                <a14:m>
+                  <m:oMathPara xmlns:m="http://schemas.openxmlformats.org/officeDocument/2006/math">
+                    <m:oMathParaPr>
+                      <m:jc m:val="centerGroup"/>
+                    </m:oMathParaPr>
+                    <m:oMath xmlns:m="http://schemas.openxmlformats.org/officeDocument/2006/math">
+                      <m:r>
+                        <a:rPr lang="en-US" sz="2400" i="1">
+                          <a:latin typeface="Cambria Math" panose="02040503050406030204" pitchFamily="18" charset="0"/>
+                        </a:rPr>
+                        <m:t>∨</m:t>
+                      </m:r>
+                    </m:oMath>
+                  </m:oMathPara>
+                </a14:m>
+                <a:endParaRPr lang="en-US" sz="2400" dirty="0"/>
+              </a:p>
+            </p:txBody>
+          </p:sp>
+        </mc:Choice>
+        <mc:Fallback>
+          <p:sp>
+            <p:nvSpPr>
+              <p:cNvPr id="48" name="Rectangle 47">
+                <a:extLst>
+                  <a:ext uri="{FF2B5EF4-FFF2-40B4-BE49-F238E27FC236}">
+                    <a16:creationId xmlns:a16="http://schemas.microsoft.com/office/drawing/2014/main" id="{0796FE2B-3547-6E42-A0F4-1F0B28829EFB}"/>
+                  </a:ext>
+                </a:extLst>
+              </p:cNvPr>
+              <p:cNvSpPr>
+                <a:spLocks noRot="1" noChangeAspect="1" noMove="1" noResize="1" noEditPoints="1" noAdjustHandles="1" noChangeArrowheads="1" noChangeShapeType="1" noTextEdit="1"/>
+              </p:cNvSpPr>
+              <p:nvPr/>
+            </p:nvSpPr>
+            <p:spPr>
+              <a:xfrm>
+                <a:off x="3446850" y="5605313"/>
+                <a:ext cx="434734" cy="461665"/>
+              </a:xfrm>
+              <a:prstGeom prst="rect">
+                <a:avLst/>
+              </a:prstGeom>
+              <a:blipFill>
+                <a:blip r:embed="rId9"/>
+                <a:stretch>
+                  <a:fillRect/>
+                </a:stretch>
+              </a:blipFill>
+            </p:spPr>
+            <p:txBody>
+              <a:bodyPr/>
+              <a:lstStyle/>
+              <a:p>
+                <a:r>
+                  <a:rPr lang="en-US">
+                    <a:noFill/>
+                  </a:rPr>
+                  <a:t> </a:t>
+                </a:r>
+              </a:p>
+            </p:txBody>
+          </p:sp>
+        </mc:Fallback>
+      </mc:AlternateContent>
+      <p:sp>
+        <p:nvSpPr>
+          <p:cNvPr id="49" name="Oval 48">
+            <a:extLst>
+              <a:ext uri="{FF2B5EF4-FFF2-40B4-BE49-F238E27FC236}">
+                <a16:creationId xmlns:a16="http://schemas.microsoft.com/office/drawing/2014/main" id="{B8961751-ED7C-FF43-8DEF-F1AF96EDE454}"/>
+              </a:ext>
+            </a:extLst>
+          </p:cNvPr>
+          <p:cNvSpPr/>
+          <p:nvPr/>
+        </p:nvSpPr>
+        <p:spPr>
+          <a:xfrm>
+            <a:off x="3089274" y="5635161"/>
+            <a:ext cx="425303" cy="414376"/>
+          </a:xfrm>
+          <a:prstGeom prst="ellipse">
+            <a:avLst/>
+          </a:prstGeom>
+        </p:spPr>
+        <p:style>
+          <a:lnRef idx="2">
+            <a:schemeClr val="accent3">
+              <a:shade val="50000"/>
+            </a:schemeClr>
+          </a:lnRef>
+          <a:fillRef idx="1">
+            <a:schemeClr val="accent3"/>
+          </a:fillRef>
+          <a:effectRef idx="0">
+            <a:schemeClr val="accent3"/>
+          </a:effectRef>
+          <a:fontRef idx="minor">
+            <a:schemeClr val="lt1"/>
+          </a:fontRef>
+        </p:style>
+        <p:txBody>
+          <a:bodyPr rtlCol="0" anchor="ctr"/>
+          <a:lstStyle/>
+          <a:p>
+            <a:pPr algn="ctr"/>
+            <a:r>
+              <a:rPr lang="en-US" sz="2400" dirty="0"/>
+              <a:t>5</a:t>
+            </a:r>
+          </a:p>
+        </p:txBody>
+      </p:sp>
+      <p:sp>
+        <p:nvSpPr>
+          <p:cNvPr id="50" name="Oval 49">
+            <a:extLst>
+              <a:ext uri="{FF2B5EF4-FFF2-40B4-BE49-F238E27FC236}">
+                <a16:creationId xmlns:a16="http://schemas.microsoft.com/office/drawing/2014/main" id="{7DAD041E-621D-CF41-BDEA-CEDE6AAB967F}"/>
+              </a:ext>
+            </a:extLst>
+          </p:cNvPr>
+          <p:cNvSpPr/>
+          <p:nvPr/>
+        </p:nvSpPr>
+        <p:spPr>
+          <a:xfrm>
+            <a:off x="3824794" y="5635161"/>
+            <a:ext cx="425303" cy="414376"/>
+          </a:xfrm>
+          <a:prstGeom prst="ellipse">
+            <a:avLst/>
+          </a:prstGeom>
+        </p:spPr>
+        <p:style>
+          <a:lnRef idx="2">
+            <a:schemeClr val="accent3">
+              <a:shade val="50000"/>
+            </a:schemeClr>
+          </a:lnRef>
+          <a:fillRef idx="1">
+            <a:schemeClr val="accent3"/>
+          </a:fillRef>
+          <a:effectRef idx="0">
+            <a:schemeClr val="accent3"/>
+          </a:effectRef>
+          <a:fontRef idx="minor">
+            <a:schemeClr val="lt1"/>
+          </a:fontRef>
+        </p:style>
+        <p:txBody>
+          <a:bodyPr rtlCol="0" anchor="ctr"/>
+          <a:lstStyle/>
+          <a:p>
+            <a:pPr algn="ctr"/>
+            <a:r>
+              <a:rPr lang="en-US" sz="2400" dirty="0"/>
+              <a:t>6</a:t>
+            </a:r>
+          </a:p>
+        </p:txBody>
+      </p:sp>
+    </p:spTree>
+    <p:extLst>
+      <p:ext uri="{BB962C8B-B14F-4D97-AF65-F5344CB8AC3E}">
+        <p14:creationId xmlns:p14="http://schemas.microsoft.com/office/powerpoint/2010/main" val="2597768355"/>
+      </p:ext>
+    </p:extLst>
+  </p:cSld>
+  <p:clrMapOvr>
+    <a:masterClrMapping/>
+  </p:clrMapOvr>
+</p:sld>
+</file>
+
+<file path=ppt/slides/slide12.xml><?xml version="1.0" encoding="utf-8"?>
+<p:sld xmlns:a="http://schemas.openxmlformats.org/drawingml/2006/main" xmlns:r="http://schemas.openxmlformats.org/officeDocument/2006/relationships" xmlns:p="http://schemas.openxmlformats.org/presentationml/2006/main">
+  <p:cSld>
+    <p:spTree>
+      <p:nvGrpSpPr>
+        <p:cNvPr id="1" name=""/>
+        <p:cNvGrpSpPr/>
+        <p:nvPr/>
+      </p:nvGrpSpPr>
+      <p:grpSpPr>
+        <a:xfrm>
+          <a:off x="0" y="0"/>
+          <a:ext cx="0" cy="0"/>
+          <a:chOff x="0" y="0"/>
+          <a:chExt cx="0" cy="0"/>
+        </a:xfrm>
+      </p:grpSpPr>
+      <p:pic>
+        <p:nvPicPr>
+          <p:cNvPr id="5" name="Picture 4">
+            <a:extLst>
+              <a:ext uri="{FF2B5EF4-FFF2-40B4-BE49-F238E27FC236}">
+                <a16:creationId xmlns:a16="http://schemas.microsoft.com/office/drawing/2014/main" id="{73814504-C2B0-5140-AF81-0C92271E0A6C}"/>
+              </a:ext>
+            </a:extLst>
+          </p:cNvPr>
+          <p:cNvPicPr>
+            <a:picLocks noChangeAspect="1"/>
+          </p:cNvPicPr>
+          <p:nvPr/>
+        </p:nvPicPr>
+        <p:blipFill>
+          <a:blip r:embed="rId3"/>
+          <a:stretch>
+            <a:fillRect/>
+          </a:stretch>
+        </p:blipFill>
+        <p:spPr>
+          <a:xfrm>
+            <a:off x="2622639" y="0"/>
+            <a:ext cx="9559311" cy="6858000"/>
+          </a:xfrm>
+          <a:prstGeom prst="rect">
+            <a:avLst/>
+          </a:prstGeom>
+        </p:spPr>
+      </p:pic>
+      <p:sp>
+        <p:nvSpPr>
+          <p:cNvPr id="11" name="TextBox 10">
+            <a:extLst>
+              <a:ext uri="{FF2B5EF4-FFF2-40B4-BE49-F238E27FC236}">
+                <a16:creationId xmlns:a16="http://schemas.microsoft.com/office/drawing/2014/main" id="{18366F12-6B50-674B-A4B0-52BDE3D816F5}"/>
+              </a:ext>
+            </a:extLst>
+          </p:cNvPr>
+          <p:cNvSpPr txBox="1"/>
+          <p:nvPr/>
+        </p:nvSpPr>
+        <p:spPr>
+          <a:xfrm>
+            <a:off x="10050" y="674466"/>
+            <a:ext cx="2612589" cy="2000548"/>
+          </a:xfrm>
+          <a:prstGeom prst="rect">
+            <a:avLst/>
+          </a:prstGeom>
+          <a:noFill/>
+        </p:spPr>
+        <p:txBody>
+          <a:bodyPr wrap="square" rtlCol="0">
+            <a:spAutoFit/>
+          </a:bodyPr>
+          <a:lstStyle/>
+          <a:p>
+            <a:pPr algn="ctr"/>
+            <a:r>
+              <a:rPr lang="en-US" sz="4800" dirty="0"/>
+              <a:t>BPMN</a:t>
+            </a:r>
+          </a:p>
+          <a:p>
+            <a:pPr algn="ctr"/>
+            <a:endParaRPr lang="en-US" sz="2800" dirty="0"/>
+          </a:p>
+          <a:p>
+            <a:pPr algn="ctr"/>
+            <a:r>
+              <a:rPr lang="en-US" sz="2400" dirty="0" err="1"/>
+              <a:t>PHware</a:t>
+            </a:r>
+            <a:r>
+              <a:rPr lang="en-US" sz="2400" dirty="0"/>
+              <a:t> Remote Patient Monitoring</a:t>
+            </a:r>
+          </a:p>
+        </p:txBody>
+      </p:sp>
+    </p:spTree>
+    <p:extLst>
+      <p:ext uri="{BB962C8B-B14F-4D97-AF65-F5344CB8AC3E}">
+        <p14:creationId xmlns:p14="http://schemas.microsoft.com/office/powerpoint/2010/main" val="2152167134"/>
+      </p:ext>
+    </p:extLst>
+  </p:cSld>
+  <p:clrMapOvr>
+    <a:masterClrMapping/>
+  </p:clrMapOvr>
+</p:sld>
+</file>
+
+<file path=ppt/slides/slide13.xml><?xml version="1.0" encoding="utf-8"?>
 <p:sld xmlns:a="http://schemas.openxmlformats.org/drawingml/2006/main" xmlns:r="http://schemas.openxmlformats.org/officeDocument/2006/relationships" xmlns:p="http://schemas.openxmlformats.org/presentationml/2006/main">
   <p:cSld>
     <p:spTree>
@@ -7372,7 +9901,7 @@
         </p:nvSpPr>
         <p:spPr>
           <a:xfrm>
-            <a:off x="1893718" y="1888182"/>
+            <a:off x="1893717" y="1888183"/>
             <a:ext cx="2917371" cy="995942"/>
           </a:xfrm>
           <a:prstGeom prst="roundRect">
@@ -9083,42 +11612,379 @@
           <a:chExt cx="0" cy="0"/>
         </a:xfrm>
       </p:grpSpPr>
-      <p:pic>
-        <p:nvPicPr>
-          <p:cNvPr id="5" name="Picture 4">
+      <p:sp>
+        <p:nvSpPr>
+          <p:cNvPr id="2" name="Title 1">
             <a:extLst>
               <a:ext uri="{FF2B5EF4-FFF2-40B4-BE49-F238E27FC236}">
-                <a16:creationId xmlns:a16="http://schemas.microsoft.com/office/drawing/2014/main" id="{73814504-C2B0-5140-AF81-0C92271E0A6C}"/>
+                <a16:creationId xmlns:a16="http://schemas.microsoft.com/office/drawing/2014/main" id="{3F32022D-AC32-9841-AABA-1C09A8172381}"/>
               </a:ext>
             </a:extLst>
           </p:cNvPr>
-          <p:cNvPicPr>
-            <a:picLocks noChangeAspect="1"/>
-          </p:cNvPicPr>
+          <p:cNvSpPr>
+            <a:spLocks noGrp="1"/>
+          </p:cNvSpPr>
+          <p:nvPr>
+            <p:ph type="title"/>
+          </p:nvPr>
+        </p:nvSpPr>
+        <p:spPr/>
+        <p:txBody>
+          <a:bodyPr/>
+          <a:lstStyle/>
+          <a:p>
+            <a:r>
+              <a:rPr lang="en-US" dirty="0"/>
+              <a:t>Linear Temporal Logic for the CWP</a:t>
+            </a:r>
+          </a:p>
+        </p:txBody>
+      </p:sp>
+      <p:sp>
+        <p:nvSpPr>
+          <p:cNvPr id="6" name="Rounded Rectangle 5">
+            <a:extLst>
+              <a:ext uri="{FF2B5EF4-FFF2-40B4-BE49-F238E27FC236}">
+                <a16:creationId xmlns:a16="http://schemas.microsoft.com/office/drawing/2014/main" id="{BBDB36EE-298E-4E49-AADB-8BFA525EE74E}"/>
+              </a:ext>
+            </a:extLst>
+          </p:cNvPr>
+          <p:cNvSpPr/>
           <p:nvPr/>
-        </p:nvPicPr>
-        <p:blipFill>
-          <a:blip r:embed="rId3"/>
-          <a:stretch>
-            <a:fillRect/>
-          </a:stretch>
-        </p:blipFill>
+        </p:nvSpPr>
         <p:spPr>
           <a:xfrm>
-            <a:off x="2622639" y="0"/>
-            <a:ext cx="9559311" cy="6858000"/>
-          </a:xfrm>
-          <a:prstGeom prst="rect">
+            <a:off x="738965" y="2519907"/>
+            <a:ext cx="2996609" cy="2137156"/>
+          </a:xfrm>
+          <a:prstGeom prst="roundRect">
             <a:avLst/>
           </a:prstGeom>
         </p:spPr>
-      </p:pic>
-      <p:sp>
-        <p:nvSpPr>
-          <p:cNvPr id="11" name="TextBox 10">
+        <p:style>
+          <a:lnRef idx="2">
+            <a:schemeClr val="accent1">
+              <a:shade val="50000"/>
+            </a:schemeClr>
+          </a:lnRef>
+          <a:fillRef idx="1">
+            <a:schemeClr val="accent1"/>
+          </a:fillRef>
+          <a:effectRef idx="0">
+            <a:schemeClr val="accent1"/>
+          </a:effectRef>
+          <a:fontRef idx="minor">
+            <a:schemeClr val="lt1"/>
+          </a:fontRef>
+        </p:style>
+        <p:txBody>
+          <a:bodyPr rtlCol="0" anchor="ctr"/>
+          <a:lstStyle/>
+          <a:p>
+            <a:pPr algn="ctr"/>
+            <a:r>
+              <a:rPr lang="en-US" sz="2400" u="sng" dirty="0"/>
+              <a:t>CWP States</a:t>
+            </a:r>
+          </a:p>
+          <a:p>
+            <a:pPr algn="ctr"/>
+            <a:endParaRPr lang="en-US" sz="2400" dirty="0"/>
+          </a:p>
+          <a:p>
+            <a:pPr marL="342900" indent="-342900">
+              <a:buFont typeface="Arial" panose="020B0604020202020204" pitchFamily="34" charset="0"/>
+              <a:buChar char="•"/>
+            </a:pPr>
+            <a:r>
+              <a:rPr lang="en-US" sz="2400" dirty="0"/>
+              <a:t>Conjunct inputs</a:t>
+            </a:r>
+          </a:p>
+          <a:p>
+            <a:pPr marL="342900" indent="-342900">
+              <a:buFont typeface="Arial" panose="020B0604020202020204" pitchFamily="34" charset="0"/>
+              <a:buChar char="•"/>
+            </a:pPr>
+            <a:r>
+              <a:rPr lang="en-US" sz="2400" dirty="0"/>
+              <a:t>Negate outputs</a:t>
+            </a:r>
+          </a:p>
+          <a:p>
+            <a:pPr marL="342900" indent="-342900">
+              <a:buFont typeface="Arial" panose="020B0604020202020204" pitchFamily="34" charset="0"/>
+              <a:buChar char="•"/>
+            </a:pPr>
+            <a:endParaRPr lang="en-US" sz="2400" dirty="0"/>
+          </a:p>
+        </p:txBody>
+      </p:sp>
+      <p:sp>
+        <p:nvSpPr>
+          <p:cNvPr id="7" name="Rounded Rectangle 6">
             <a:extLst>
               <a:ext uri="{FF2B5EF4-FFF2-40B4-BE49-F238E27FC236}">
-                <a16:creationId xmlns:a16="http://schemas.microsoft.com/office/drawing/2014/main" id="{18366F12-6B50-674B-A4B0-52BDE3D816F5}"/>
+                <a16:creationId xmlns:a16="http://schemas.microsoft.com/office/drawing/2014/main" id="{022917BD-6531-0242-A1ED-FD4CB4A868E2}"/>
+              </a:ext>
+            </a:extLst>
+          </p:cNvPr>
+          <p:cNvSpPr/>
+          <p:nvPr/>
+        </p:nvSpPr>
+        <p:spPr>
+          <a:xfrm>
+            <a:off x="4605672" y="2519907"/>
+            <a:ext cx="2996609" cy="2137156"/>
+          </a:xfrm>
+          <a:prstGeom prst="roundRect">
+            <a:avLst/>
+          </a:prstGeom>
+        </p:spPr>
+        <p:style>
+          <a:lnRef idx="2">
+            <a:schemeClr val="accent1">
+              <a:shade val="50000"/>
+            </a:schemeClr>
+          </a:lnRef>
+          <a:fillRef idx="1">
+            <a:schemeClr val="accent1"/>
+          </a:fillRef>
+          <a:effectRef idx="0">
+            <a:schemeClr val="accent1"/>
+          </a:effectRef>
+          <a:fontRef idx="minor">
+            <a:schemeClr val="lt1"/>
+          </a:fontRef>
+        </p:style>
+        <p:txBody>
+          <a:bodyPr rtlCol="0" anchor="ctr"/>
+          <a:lstStyle/>
+          <a:p>
+            <a:pPr algn="ctr"/>
+            <a:r>
+              <a:rPr lang="en-US" sz="2400" u="sng" dirty="0"/>
+              <a:t>Global Properties</a:t>
+            </a:r>
+            <a:r>
+              <a:rPr lang="en-US" sz="2400" dirty="0"/>
+              <a:t> </a:t>
+            </a:r>
+          </a:p>
+          <a:p>
+            <a:pPr algn="ctr"/>
+            <a:endParaRPr lang="en-US" sz="2400" dirty="0"/>
+          </a:p>
+          <a:p>
+            <a:pPr marL="342900" indent="-342900">
+              <a:buFont typeface="Arial" panose="020B0604020202020204" pitchFamily="34" charset="0"/>
+              <a:buChar char="•"/>
+            </a:pPr>
+            <a:r>
+              <a:rPr lang="en-US" sz="2400" dirty="0"/>
+              <a:t>All states covered</a:t>
+            </a:r>
+          </a:p>
+          <a:p>
+            <a:pPr marL="342900" indent="-342900">
+              <a:buFont typeface="Arial" panose="020B0604020202020204" pitchFamily="34" charset="0"/>
+              <a:buChar char="•"/>
+            </a:pPr>
+            <a:r>
+              <a:rPr lang="en-US" sz="2400" dirty="0"/>
+              <a:t>Reachable goals </a:t>
+            </a:r>
+          </a:p>
+          <a:p>
+            <a:pPr marL="342900" indent="-342900">
+              <a:buFont typeface="Arial" panose="020B0604020202020204" pitchFamily="34" charset="0"/>
+              <a:buChar char="•"/>
+            </a:pPr>
+            <a:endParaRPr lang="en-US" sz="2400" dirty="0"/>
+          </a:p>
+        </p:txBody>
+      </p:sp>
+      <p:sp>
+        <p:nvSpPr>
+          <p:cNvPr id="8" name="Rounded Rectangle 7">
+            <a:extLst>
+              <a:ext uri="{FF2B5EF4-FFF2-40B4-BE49-F238E27FC236}">
+                <a16:creationId xmlns:a16="http://schemas.microsoft.com/office/drawing/2014/main" id="{484CBC8B-EA27-7F4D-8217-C08E26D74361}"/>
+              </a:ext>
+            </a:extLst>
+          </p:cNvPr>
+          <p:cNvSpPr/>
+          <p:nvPr/>
+        </p:nvSpPr>
+        <p:spPr>
+          <a:xfrm>
+            <a:off x="8472379" y="2519907"/>
+            <a:ext cx="2996609" cy="2137156"/>
+          </a:xfrm>
+          <a:prstGeom prst="roundRect">
+            <a:avLst/>
+          </a:prstGeom>
+        </p:spPr>
+        <p:style>
+          <a:lnRef idx="2">
+            <a:schemeClr val="accent1">
+              <a:shade val="50000"/>
+            </a:schemeClr>
+          </a:lnRef>
+          <a:fillRef idx="1">
+            <a:schemeClr val="accent1"/>
+          </a:fillRef>
+          <a:effectRef idx="0">
+            <a:schemeClr val="accent1"/>
+          </a:effectRef>
+          <a:fontRef idx="minor">
+            <a:schemeClr val="lt1"/>
+          </a:fontRef>
+        </p:style>
+        <p:txBody>
+          <a:bodyPr rtlCol="0" anchor="ctr"/>
+          <a:lstStyle/>
+          <a:p>
+            <a:pPr algn="ctr"/>
+            <a:r>
+              <a:rPr lang="en-US" sz="2400" u="sng" dirty="0"/>
+              <a:t>State Properties</a:t>
+            </a:r>
+          </a:p>
+          <a:p>
+            <a:pPr algn="ctr"/>
+            <a:endParaRPr lang="en-US" sz="2400" u="sng" dirty="0"/>
+          </a:p>
+          <a:p>
+            <a:pPr marL="342900" indent="-342900">
+              <a:buFont typeface="Arial" panose="020B0604020202020204" pitchFamily="34" charset="0"/>
+              <a:buChar char="•"/>
+            </a:pPr>
+            <a:r>
+              <a:rPr lang="en-US" sz="2400" dirty="0"/>
+              <a:t>Reachable</a:t>
+            </a:r>
+          </a:p>
+          <a:p>
+            <a:pPr marL="342900" indent="-342900">
+              <a:buFont typeface="Arial" panose="020B0604020202020204" pitchFamily="34" charset="0"/>
+              <a:buChar char="•"/>
+            </a:pPr>
+            <a:r>
+              <a:rPr lang="en-US" sz="2400" dirty="0"/>
+              <a:t>Unique</a:t>
+            </a:r>
+          </a:p>
+          <a:p>
+            <a:pPr marL="342900" indent="-342900">
+              <a:buFont typeface="Arial" panose="020B0604020202020204" pitchFamily="34" charset="0"/>
+              <a:buChar char="•"/>
+            </a:pPr>
+            <a:r>
+              <a:rPr lang="en-US" sz="2400" dirty="0"/>
+              <a:t>Allowed edges</a:t>
+            </a:r>
+          </a:p>
+        </p:txBody>
+      </p:sp>
+      <p:sp>
+        <p:nvSpPr>
+          <p:cNvPr id="9" name="Right Arrow 8">
+            <a:extLst>
+              <a:ext uri="{FF2B5EF4-FFF2-40B4-BE49-F238E27FC236}">
+                <a16:creationId xmlns:a16="http://schemas.microsoft.com/office/drawing/2014/main" id="{679F529B-4DD1-DD44-9D51-1AE2A542A770}"/>
+              </a:ext>
+            </a:extLst>
+          </p:cNvPr>
+          <p:cNvSpPr/>
+          <p:nvPr/>
+        </p:nvSpPr>
+        <p:spPr>
+          <a:xfrm>
+            <a:off x="3856078" y="3343055"/>
+            <a:ext cx="645042" cy="497959"/>
+          </a:xfrm>
+          <a:prstGeom prst="rightArrow">
+            <a:avLst/>
+          </a:prstGeom>
+        </p:spPr>
+        <p:style>
+          <a:lnRef idx="2">
+            <a:schemeClr val="accent1">
+              <a:shade val="50000"/>
+            </a:schemeClr>
+          </a:lnRef>
+          <a:fillRef idx="1">
+            <a:schemeClr val="accent1"/>
+          </a:fillRef>
+          <a:effectRef idx="0">
+            <a:schemeClr val="accent1"/>
+          </a:effectRef>
+          <a:fontRef idx="minor">
+            <a:schemeClr val="lt1"/>
+          </a:fontRef>
+        </p:style>
+        <p:txBody>
+          <a:bodyPr rtlCol="0" anchor="ctr"/>
+          <a:lstStyle/>
+          <a:p>
+            <a:pPr algn="ctr"/>
+            <a:endParaRPr lang="en-US"/>
+          </a:p>
+        </p:txBody>
+      </p:sp>
+      <p:sp>
+        <p:nvSpPr>
+          <p:cNvPr id="11" name="Right Arrow 10">
+            <a:extLst>
+              <a:ext uri="{FF2B5EF4-FFF2-40B4-BE49-F238E27FC236}">
+                <a16:creationId xmlns:a16="http://schemas.microsoft.com/office/drawing/2014/main" id="{B120CF55-1A43-494C-9D43-462635FB503B}"/>
+              </a:ext>
+            </a:extLst>
+          </p:cNvPr>
+          <p:cNvSpPr/>
+          <p:nvPr/>
+        </p:nvSpPr>
+        <p:spPr>
+          <a:xfrm>
+            <a:off x="7714809" y="3339505"/>
+            <a:ext cx="645042" cy="497959"/>
+          </a:xfrm>
+          <a:prstGeom prst="rightArrow">
+            <a:avLst/>
+          </a:prstGeom>
+        </p:spPr>
+        <p:style>
+          <a:lnRef idx="2">
+            <a:schemeClr val="accent1">
+              <a:shade val="50000"/>
+            </a:schemeClr>
+          </a:lnRef>
+          <a:fillRef idx="1">
+            <a:schemeClr val="accent1"/>
+          </a:fillRef>
+          <a:effectRef idx="0">
+            <a:schemeClr val="accent1"/>
+          </a:effectRef>
+          <a:fontRef idx="minor">
+            <a:schemeClr val="lt1"/>
+          </a:fontRef>
+        </p:style>
+        <p:txBody>
+          <a:bodyPr rtlCol="0" anchor="ctr"/>
+          <a:lstStyle/>
+          <a:p>
+            <a:pPr algn="ctr"/>
+            <a:endParaRPr lang="en-US"/>
+          </a:p>
+        </p:txBody>
+      </p:sp>
+      <p:sp>
+        <p:nvSpPr>
+          <p:cNvPr id="12" name="TextBox 11">
+            <a:extLst>
+              <a:ext uri="{FF2B5EF4-FFF2-40B4-BE49-F238E27FC236}">
+                <a16:creationId xmlns:a16="http://schemas.microsoft.com/office/drawing/2014/main" id="{E966D2FD-75CF-8044-8069-6E7D21A49045}"/>
               </a:ext>
             </a:extLst>
           </p:cNvPr>
@@ -9127,8 +11993,8 @@
         </p:nvSpPr>
         <p:spPr>
           <a:xfrm>
-            <a:off x="10050" y="674466"/>
-            <a:ext cx="2612589" cy="2000548"/>
+            <a:off x="1201479" y="5474883"/>
+            <a:ext cx="9789042" cy="830997"/>
           </a:xfrm>
           <a:prstGeom prst="rect">
             <a:avLst/>
@@ -9143,23 +12009,12 @@
           <a:p>
             <a:pPr algn="ctr"/>
             <a:r>
-              <a:rPr lang="en-US" sz="4800" dirty="0"/>
-              <a:t>BPMN</a:t>
-            </a:r>
-          </a:p>
-          <a:p>
-            <a:pPr algn="ctr"/>
-            <a:endParaRPr lang="en-US" sz="2800" dirty="0"/>
-          </a:p>
-          <a:p>
-            <a:pPr algn="ctr"/>
-            <a:r>
-              <a:rPr lang="en-US" sz="2400" dirty="0" err="1"/>
-              <a:t>PHware</a:t>
-            </a:r>
-            <a:r>
-              <a:rPr lang="en-US" sz="2400" dirty="0"/>
-              <a:t> Remote Patient Monitoring</a:t>
+              <a:rPr lang="en-US" sz="4800" dirty="0">
+                <a:solidFill>
+                  <a:schemeClr val="accent4"/>
+                </a:solidFill>
+              </a:rPr>
+              <a:t>2 + 3N properties to check on BPMN</a:t>
             </a:r>
           </a:p>
         </p:txBody>
@@ -9167,7 +12022,7 @@
     </p:spTree>
     <p:extLst>
       <p:ext uri="{BB962C8B-B14F-4D97-AF65-F5344CB8AC3E}">
-        <p14:creationId xmlns:p14="http://schemas.microsoft.com/office/powerpoint/2010/main" val="2152167134"/>
+        <p14:creationId xmlns:p14="http://schemas.microsoft.com/office/powerpoint/2010/main" val="23924841"/>
       </p:ext>
     </p:extLst>
   </p:cSld>

</xml_diff>

<commit_message>
Add SPIN results and conclusion
</commit_message>
<xml_diff>
--- a/presentation/syscon-2022.pptx
+++ b/presentation/syscon-2022.pptx
@@ -5,7 +5,7 @@
     <p:sldMasterId id="2147483684" r:id="rId1"/>
   </p:sldMasterIdLst>
   <p:notesMasterIdLst>
-    <p:notesMasterId r:id="rId21"/>
+    <p:notesMasterId r:id="rId23"/>
   </p:notesMasterIdLst>
   <p:sldIdLst>
     <p:sldId id="256" r:id="rId2"/>
@@ -27,6 +27,8 @@
     <p:sldId id="278" r:id="rId18"/>
     <p:sldId id="281" r:id="rId19"/>
     <p:sldId id="282" r:id="rId20"/>
+    <p:sldId id="283" r:id="rId21"/>
+    <p:sldId id="284" r:id="rId22"/>
   </p:sldIdLst>
   <p:sldSz cx="12192000" cy="6858000"/>
   <p:notesSz cx="6858000" cy="9144000"/>
@@ -1118,6 +1120,174 @@
     <p:extLst>
       <p:ext uri="{BB962C8B-B14F-4D97-AF65-F5344CB8AC3E}">
         <p14:creationId xmlns:p14="http://schemas.microsoft.com/office/powerpoint/2010/main" val="1058270444"/>
+      </p:ext>
+    </p:extLst>
+  </p:cSld>
+  <p:clrMapOvr>
+    <a:masterClrMapping/>
+  </p:clrMapOvr>
+</p:notes>
+</file>
+
+<file path=ppt/notesSlides/notesSlide16.xml><?xml version="1.0" encoding="utf-8"?>
+<p:notes xmlns:a="http://schemas.openxmlformats.org/drawingml/2006/main" xmlns:r="http://schemas.openxmlformats.org/officeDocument/2006/relationships" xmlns:p="http://schemas.openxmlformats.org/presentationml/2006/main">
+  <p:cSld>
+    <p:spTree>
+      <p:nvGrpSpPr>
+        <p:cNvPr id="1" name=""/>
+        <p:cNvGrpSpPr/>
+        <p:nvPr/>
+      </p:nvGrpSpPr>
+      <p:grpSpPr>
+        <a:xfrm>
+          <a:off x="0" y="0"/>
+          <a:ext cx="0" cy="0"/>
+          <a:chOff x="0" y="0"/>
+          <a:chExt cx="0" cy="0"/>
+        </a:xfrm>
+      </p:grpSpPr>
+      <p:sp>
+        <p:nvSpPr>
+          <p:cNvPr id="2" name="Slide Image Placeholder 1"/>
+          <p:cNvSpPr>
+            <a:spLocks noGrp="1" noRot="1" noChangeAspect="1"/>
+          </p:cNvSpPr>
+          <p:nvPr>
+            <p:ph type="sldImg"/>
+          </p:nvPr>
+        </p:nvSpPr>
+        <p:spPr/>
+      </p:sp>
+      <p:sp>
+        <p:nvSpPr>
+          <p:cNvPr id="3" name="Notes Placeholder 2"/>
+          <p:cNvSpPr>
+            <a:spLocks noGrp="1"/>
+          </p:cNvSpPr>
+          <p:nvPr>
+            <p:ph type="body" idx="1"/>
+          </p:nvPr>
+        </p:nvSpPr>
+        <p:spPr/>
+        <p:txBody>
+          <a:bodyPr/>
+          <a:lstStyle/>
+          <a:p>
+            <a:endParaRPr lang="en-US" dirty="0"/>
+          </a:p>
+        </p:txBody>
+      </p:sp>
+      <p:sp>
+        <p:nvSpPr>
+          <p:cNvPr id="4" name="Slide Number Placeholder 3"/>
+          <p:cNvSpPr>
+            <a:spLocks noGrp="1"/>
+          </p:cNvSpPr>
+          <p:nvPr>
+            <p:ph type="sldNum" sz="quarter" idx="5"/>
+          </p:nvPr>
+        </p:nvSpPr>
+        <p:spPr/>
+        <p:txBody>
+          <a:bodyPr/>
+          <a:lstStyle/>
+          <a:p>
+            <a:fld id="{438ED187-F6C5-A545-9BCA-551DE666D003}" type="slidenum">
+              <a:rPr lang="en-US" smtClean="0"/>
+              <a:t>19</a:t>
+            </a:fld>
+            <a:endParaRPr lang="en-US"/>
+          </a:p>
+        </p:txBody>
+      </p:sp>
+    </p:spTree>
+    <p:extLst>
+      <p:ext uri="{BB962C8B-B14F-4D97-AF65-F5344CB8AC3E}">
+        <p14:creationId xmlns:p14="http://schemas.microsoft.com/office/powerpoint/2010/main" val="3992175538"/>
+      </p:ext>
+    </p:extLst>
+  </p:cSld>
+  <p:clrMapOvr>
+    <a:masterClrMapping/>
+  </p:clrMapOvr>
+</p:notes>
+</file>
+
+<file path=ppt/notesSlides/notesSlide17.xml><?xml version="1.0" encoding="utf-8"?>
+<p:notes xmlns:a="http://schemas.openxmlformats.org/drawingml/2006/main" xmlns:r="http://schemas.openxmlformats.org/officeDocument/2006/relationships" xmlns:p="http://schemas.openxmlformats.org/presentationml/2006/main">
+  <p:cSld>
+    <p:spTree>
+      <p:nvGrpSpPr>
+        <p:cNvPr id="1" name=""/>
+        <p:cNvGrpSpPr/>
+        <p:nvPr/>
+      </p:nvGrpSpPr>
+      <p:grpSpPr>
+        <a:xfrm>
+          <a:off x="0" y="0"/>
+          <a:ext cx="0" cy="0"/>
+          <a:chOff x="0" y="0"/>
+          <a:chExt cx="0" cy="0"/>
+        </a:xfrm>
+      </p:grpSpPr>
+      <p:sp>
+        <p:nvSpPr>
+          <p:cNvPr id="2" name="Slide Image Placeholder 1"/>
+          <p:cNvSpPr>
+            <a:spLocks noGrp="1" noRot="1" noChangeAspect="1"/>
+          </p:cNvSpPr>
+          <p:nvPr>
+            <p:ph type="sldImg"/>
+          </p:nvPr>
+        </p:nvSpPr>
+        <p:spPr/>
+      </p:sp>
+      <p:sp>
+        <p:nvSpPr>
+          <p:cNvPr id="3" name="Notes Placeholder 2"/>
+          <p:cNvSpPr>
+            <a:spLocks noGrp="1"/>
+          </p:cNvSpPr>
+          <p:nvPr>
+            <p:ph type="body" idx="1"/>
+          </p:nvPr>
+        </p:nvSpPr>
+        <p:spPr/>
+        <p:txBody>
+          <a:bodyPr/>
+          <a:lstStyle/>
+          <a:p>
+            <a:endParaRPr lang="en-US" dirty="0"/>
+          </a:p>
+        </p:txBody>
+      </p:sp>
+      <p:sp>
+        <p:nvSpPr>
+          <p:cNvPr id="4" name="Slide Number Placeholder 3"/>
+          <p:cNvSpPr>
+            <a:spLocks noGrp="1"/>
+          </p:cNvSpPr>
+          <p:nvPr>
+            <p:ph type="sldNum" sz="quarter" idx="5"/>
+          </p:nvPr>
+        </p:nvSpPr>
+        <p:spPr/>
+        <p:txBody>
+          <a:bodyPr/>
+          <a:lstStyle/>
+          <a:p>
+            <a:fld id="{438ED187-F6C5-A545-9BCA-551DE666D003}" type="slidenum">
+              <a:rPr lang="en-US" smtClean="0"/>
+              <a:t>20</a:t>
+            </a:fld>
+            <a:endParaRPr lang="en-US"/>
+          </a:p>
+        </p:txBody>
+      </p:sp>
+    </p:spTree>
+    <p:extLst>
+      <p:ext uri="{BB962C8B-B14F-4D97-AF65-F5344CB8AC3E}">
+        <p14:creationId xmlns:p14="http://schemas.microsoft.com/office/powerpoint/2010/main" val="233911423"/>
       </p:ext>
     </p:extLst>
   </p:cSld>
@@ -16991,6 +17161,1691 @@
 </p:sld>
 </file>
 
+<file path=ppt/slides/slide20.xml><?xml version="1.0" encoding="utf-8"?>
+<p:sld xmlns:a="http://schemas.openxmlformats.org/drawingml/2006/main" xmlns:r="http://schemas.openxmlformats.org/officeDocument/2006/relationships" xmlns:p="http://schemas.openxmlformats.org/presentationml/2006/main">
+  <p:cSld>
+    <p:spTree>
+      <p:nvGrpSpPr>
+        <p:cNvPr id="1" name=""/>
+        <p:cNvGrpSpPr/>
+        <p:nvPr/>
+      </p:nvGrpSpPr>
+      <p:grpSpPr>
+        <a:xfrm>
+          <a:off x="0" y="0"/>
+          <a:ext cx="0" cy="0"/>
+          <a:chOff x="0" y="0"/>
+          <a:chExt cx="0" cy="0"/>
+        </a:xfrm>
+      </p:grpSpPr>
+      <p:sp>
+        <p:nvSpPr>
+          <p:cNvPr id="2" name="Title 1">
+            <a:extLst>
+              <a:ext uri="{FF2B5EF4-FFF2-40B4-BE49-F238E27FC236}">
+                <a16:creationId xmlns:a16="http://schemas.microsoft.com/office/drawing/2014/main" id="{1EDEF620-A910-6F46-88D3-7FC73C9197E3}"/>
+              </a:ext>
+            </a:extLst>
+          </p:cNvPr>
+          <p:cNvSpPr>
+            <a:spLocks noGrp="1"/>
+          </p:cNvSpPr>
+          <p:nvPr>
+            <p:ph type="title"/>
+          </p:nvPr>
+        </p:nvSpPr>
+        <p:spPr/>
+        <p:txBody>
+          <a:bodyPr/>
+          <a:lstStyle/>
+          <a:p>
+            <a:r>
+              <a:rPr lang="en-US" dirty="0"/>
+              <a:t>SPIN Verification</a:t>
+            </a:r>
+          </a:p>
+        </p:txBody>
+      </p:sp>
+      <p:sp>
+        <p:nvSpPr>
+          <p:cNvPr id="5" name="Rectangle 4">
+            <a:extLst>
+              <a:ext uri="{FF2B5EF4-FFF2-40B4-BE49-F238E27FC236}">
+                <a16:creationId xmlns:a16="http://schemas.microsoft.com/office/drawing/2014/main" id="{A3F1DA0E-BFB7-174C-9C78-DE0077A81E77}"/>
+              </a:ext>
+            </a:extLst>
+          </p:cNvPr>
+          <p:cNvSpPr/>
+          <p:nvPr/>
+        </p:nvSpPr>
+        <p:spPr>
+          <a:xfrm>
+            <a:off x="3203383" y="3262769"/>
+            <a:ext cx="8827247" cy="1754326"/>
+          </a:xfrm>
+          <a:prstGeom prst="rect">
+            <a:avLst/>
+          </a:prstGeom>
+        </p:spPr>
+        <p:txBody>
+          <a:bodyPr wrap="square">
+            <a:spAutoFit/>
+          </a:bodyPr>
+          <a:lstStyle/>
+          <a:p>
+            <a:r>
+              <a:rPr lang="en-US" dirty="0">
+                <a:solidFill>
+                  <a:srgbClr val="D4D4D4"/>
+                </a:solidFill>
+                <a:latin typeface="Menlo" panose="020B0609030804020204" pitchFamily="49" charset="0"/>
+              </a:rPr>
+              <a:t>never claim + (</a:t>
+            </a:r>
+            <a:r>
+              <a:rPr lang="en-US" dirty="0" err="1">
+                <a:solidFill>
+                  <a:srgbClr val="D4D4D4"/>
+                </a:solidFill>
+                <a:latin typeface="Menlo" panose="020B0609030804020204" pitchFamily="49" charset="0"/>
+              </a:rPr>
+              <a:t>ptInAppropriateHomeCareExists</a:t>
+            </a:r>
+            <a:r>
+              <a:rPr lang="en-US" dirty="0">
+                <a:solidFill>
+                  <a:srgbClr val="D4D4D4"/>
+                </a:solidFill>
+                <a:latin typeface="Menlo" panose="020B0609030804020204" pitchFamily="49" charset="0"/>
+              </a:rPr>
+              <a:t>)</a:t>
+            </a:r>
+          </a:p>
+          <a:p>
+            <a:r>
+              <a:rPr lang="en-US" dirty="0">
+                <a:solidFill>
+                  <a:schemeClr val="tx1">
+                    <a:lumMod val="85000"/>
+                  </a:schemeClr>
+                </a:solidFill>
+                <a:latin typeface="Menlo" panose="020B0609030804020204" pitchFamily="49" charset="0"/>
+              </a:rPr>
+              <a:t>State</a:t>
+            </a:r>
+            <a:r>
+              <a:rPr lang="en-US" dirty="0">
+                <a:solidFill>
+                  <a:srgbClr val="D4D4D4"/>
+                </a:solidFill>
+                <a:latin typeface="Menlo" panose="020B0609030804020204" pitchFamily="49" charset="0"/>
+              </a:rPr>
+              <a:t>-vector </a:t>
+            </a:r>
+            <a:r>
+              <a:rPr lang="en-US" dirty="0">
+                <a:solidFill>
+                  <a:srgbClr val="B5CEA8"/>
+                </a:solidFill>
+                <a:latin typeface="Menlo" panose="020B0609030804020204" pitchFamily="49" charset="0"/>
+              </a:rPr>
+              <a:t>60</a:t>
+            </a:r>
+            <a:r>
+              <a:rPr lang="en-US" dirty="0">
+                <a:solidFill>
+                  <a:srgbClr val="D4D4D4"/>
+                </a:solidFill>
+                <a:latin typeface="Menlo" panose="020B0609030804020204" pitchFamily="49" charset="0"/>
+              </a:rPr>
+              <a:t> byte, depth reached </a:t>
+            </a:r>
+            <a:r>
+              <a:rPr lang="en-US" dirty="0">
+                <a:solidFill>
+                  <a:srgbClr val="B5CEA8"/>
+                </a:solidFill>
+                <a:latin typeface="Menlo" panose="020B0609030804020204" pitchFamily="49" charset="0"/>
+              </a:rPr>
+              <a:t>84</a:t>
+            </a:r>
+            <a:r>
+              <a:rPr lang="en-US" dirty="0">
+                <a:solidFill>
+                  <a:srgbClr val="D4D4D4"/>
+                </a:solidFill>
+                <a:latin typeface="Menlo" panose="020B0609030804020204" pitchFamily="49" charset="0"/>
+              </a:rPr>
+              <a:t>, </a:t>
+            </a:r>
+            <a:r>
+              <a:rPr lang="en-US" dirty="0">
+                <a:solidFill>
+                  <a:srgbClr val="9CDCFE"/>
+                </a:solidFill>
+                <a:latin typeface="Menlo" panose="020B0609030804020204" pitchFamily="49" charset="0"/>
+              </a:rPr>
+              <a:t>errors</a:t>
+            </a:r>
+            <a:r>
+              <a:rPr lang="en-US" dirty="0">
+                <a:solidFill>
+                  <a:srgbClr val="D4D4D4"/>
+                </a:solidFill>
+                <a:latin typeface="Menlo" panose="020B0609030804020204" pitchFamily="49" charset="0"/>
+              </a:rPr>
+              <a:t>: </a:t>
+            </a:r>
+            <a:r>
+              <a:rPr lang="en-US" dirty="0">
+                <a:solidFill>
+                  <a:srgbClr val="B5CEA8"/>
+                </a:solidFill>
+                <a:latin typeface="Menlo" panose="020B0609030804020204" pitchFamily="49" charset="0"/>
+              </a:rPr>
+              <a:t>1</a:t>
+            </a:r>
+            <a:endParaRPr lang="en-US" dirty="0">
+              <a:solidFill>
+                <a:srgbClr val="D4D4D4"/>
+              </a:solidFill>
+              <a:latin typeface="Menlo" panose="020B0609030804020204" pitchFamily="49" charset="0"/>
+            </a:endParaRPr>
+          </a:p>
+          <a:p>
+            <a:r>
+              <a:rPr lang="en-US" dirty="0">
+                <a:solidFill>
+                  <a:srgbClr val="D4D4D4"/>
+                </a:solidFill>
+                <a:latin typeface="Menlo" panose="020B0609030804020204" pitchFamily="49" charset="0"/>
+              </a:rPr>
+              <a:t>never claim + (</a:t>
+            </a:r>
+            <a:r>
+              <a:rPr lang="en-US" dirty="0" err="1">
+                <a:solidFill>
+                  <a:srgbClr val="D4D4D4"/>
+                </a:solidFill>
+                <a:latin typeface="Menlo" panose="020B0609030804020204" pitchFamily="49" charset="0"/>
+              </a:rPr>
+              <a:t>ptInAppropriateHomeCareMutex</a:t>
+            </a:r>
+            <a:r>
+              <a:rPr lang="en-US" dirty="0">
+                <a:solidFill>
+                  <a:srgbClr val="D4D4D4"/>
+                </a:solidFill>
+                <a:latin typeface="Menlo" panose="020B0609030804020204" pitchFamily="49" charset="0"/>
+              </a:rPr>
+              <a:t>)</a:t>
+            </a:r>
+          </a:p>
+          <a:p>
+            <a:r>
+              <a:rPr lang="en-US" dirty="0">
+                <a:solidFill>
+                  <a:schemeClr val="tx1">
+                    <a:lumMod val="85000"/>
+                  </a:schemeClr>
+                </a:solidFill>
+                <a:latin typeface="Menlo" panose="020B0609030804020204" pitchFamily="49" charset="0"/>
+              </a:rPr>
+              <a:t>State</a:t>
+            </a:r>
+            <a:r>
+              <a:rPr lang="en-US" dirty="0">
+                <a:solidFill>
+                  <a:srgbClr val="D4D4D4"/>
+                </a:solidFill>
+                <a:latin typeface="Menlo" panose="020B0609030804020204" pitchFamily="49" charset="0"/>
+              </a:rPr>
+              <a:t>-vector </a:t>
+            </a:r>
+            <a:r>
+              <a:rPr lang="en-US" dirty="0">
+                <a:solidFill>
+                  <a:srgbClr val="B5CEA8"/>
+                </a:solidFill>
+                <a:latin typeface="Menlo" panose="020B0609030804020204" pitchFamily="49" charset="0"/>
+              </a:rPr>
+              <a:t>60</a:t>
+            </a:r>
+            <a:r>
+              <a:rPr lang="en-US" dirty="0">
+                <a:solidFill>
+                  <a:srgbClr val="D4D4D4"/>
+                </a:solidFill>
+                <a:latin typeface="Menlo" panose="020B0609030804020204" pitchFamily="49" charset="0"/>
+              </a:rPr>
+              <a:t> byte, depth reached </a:t>
+            </a:r>
+            <a:r>
+              <a:rPr lang="en-US" dirty="0">
+                <a:solidFill>
+                  <a:srgbClr val="B5CEA8"/>
+                </a:solidFill>
+                <a:latin typeface="Menlo" panose="020B0609030804020204" pitchFamily="49" charset="0"/>
+              </a:rPr>
+              <a:t>3654</a:t>
+            </a:r>
+            <a:r>
+              <a:rPr lang="en-US" dirty="0">
+                <a:solidFill>
+                  <a:srgbClr val="D4D4D4"/>
+                </a:solidFill>
+                <a:latin typeface="Menlo" panose="020B0609030804020204" pitchFamily="49" charset="0"/>
+              </a:rPr>
+              <a:t>, </a:t>
+            </a:r>
+            <a:r>
+              <a:rPr lang="en-US" dirty="0">
+                <a:solidFill>
+                  <a:srgbClr val="9CDCFE"/>
+                </a:solidFill>
+                <a:latin typeface="Menlo" panose="020B0609030804020204" pitchFamily="49" charset="0"/>
+              </a:rPr>
+              <a:t>errors</a:t>
+            </a:r>
+            <a:r>
+              <a:rPr lang="en-US" dirty="0">
+                <a:solidFill>
+                  <a:srgbClr val="D4D4D4"/>
+                </a:solidFill>
+                <a:latin typeface="Menlo" panose="020B0609030804020204" pitchFamily="49" charset="0"/>
+              </a:rPr>
+              <a:t>: </a:t>
+            </a:r>
+            <a:r>
+              <a:rPr lang="en-US" dirty="0">
+                <a:solidFill>
+                  <a:srgbClr val="B5CEA8"/>
+                </a:solidFill>
+                <a:latin typeface="Menlo" panose="020B0609030804020204" pitchFamily="49" charset="0"/>
+              </a:rPr>
+              <a:t>0</a:t>
+            </a:r>
+            <a:endParaRPr lang="en-US" dirty="0">
+              <a:solidFill>
+                <a:srgbClr val="D4D4D4"/>
+              </a:solidFill>
+              <a:latin typeface="Menlo" panose="020B0609030804020204" pitchFamily="49" charset="0"/>
+            </a:endParaRPr>
+          </a:p>
+          <a:p>
+            <a:r>
+              <a:rPr lang="en-US" dirty="0">
+                <a:solidFill>
+                  <a:srgbClr val="D4D4D4"/>
+                </a:solidFill>
+                <a:latin typeface="Menlo" panose="020B0609030804020204" pitchFamily="49" charset="0"/>
+              </a:rPr>
+              <a:t>never claim + (</a:t>
+            </a:r>
+            <a:r>
+              <a:rPr lang="en-US" dirty="0" err="1">
+                <a:solidFill>
+                  <a:srgbClr val="D4D4D4"/>
+                </a:solidFill>
+                <a:latin typeface="Menlo" panose="020B0609030804020204" pitchFamily="49" charset="0"/>
+              </a:rPr>
+              <a:t>ptInAppropriateHomeCareEdges</a:t>
+            </a:r>
+            <a:r>
+              <a:rPr lang="en-US" dirty="0">
+                <a:solidFill>
+                  <a:srgbClr val="D4D4D4"/>
+                </a:solidFill>
+                <a:latin typeface="Menlo" panose="020B0609030804020204" pitchFamily="49" charset="0"/>
+              </a:rPr>
+              <a:t>)</a:t>
+            </a:r>
+          </a:p>
+          <a:p>
+            <a:r>
+              <a:rPr lang="en-US" dirty="0">
+                <a:solidFill>
+                  <a:schemeClr val="tx1">
+                    <a:lumMod val="85000"/>
+                  </a:schemeClr>
+                </a:solidFill>
+                <a:latin typeface="Menlo" panose="020B0609030804020204" pitchFamily="49" charset="0"/>
+              </a:rPr>
+              <a:t>State</a:t>
+            </a:r>
+            <a:r>
+              <a:rPr lang="en-US" dirty="0">
+                <a:solidFill>
+                  <a:srgbClr val="D4D4D4"/>
+                </a:solidFill>
+                <a:latin typeface="Menlo" panose="020B0609030804020204" pitchFamily="49" charset="0"/>
+              </a:rPr>
+              <a:t>-vector </a:t>
+            </a:r>
+            <a:r>
+              <a:rPr lang="en-US" dirty="0">
+                <a:solidFill>
+                  <a:srgbClr val="B5CEA8"/>
+                </a:solidFill>
+                <a:latin typeface="Menlo" panose="020B0609030804020204" pitchFamily="49" charset="0"/>
+              </a:rPr>
+              <a:t>60</a:t>
+            </a:r>
+            <a:r>
+              <a:rPr lang="en-US" dirty="0">
+                <a:solidFill>
+                  <a:srgbClr val="D4D4D4"/>
+                </a:solidFill>
+                <a:latin typeface="Menlo" panose="020B0609030804020204" pitchFamily="49" charset="0"/>
+              </a:rPr>
+              <a:t> byte, depth reached </a:t>
+            </a:r>
+            <a:r>
+              <a:rPr lang="en-US" dirty="0">
+                <a:solidFill>
+                  <a:srgbClr val="B5CEA8"/>
+                </a:solidFill>
+                <a:latin typeface="Menlo" panose="020B0609030804020204" pitchFamily="49" charset="0"/>
+              </a:rPr>
+              <a:t>3654</a:t>
+            </a:r>
+            <a:r>
+              <a:rPr lang="en-US" dirty="0">
+                <a:solidFill>
+                  <a:srgbClr val="D4D4D4"/>
+                </a:solidFill>
+                <a:latin typeface="Menlo" panose="020B0609030804020204" pitchFamily="49" charset="0"/>
+              </a:rPr>
+              <a:t>, </a:t>
+            </a:r>
+            <a:r>
+              <a:rPr lang="en-US" dirty="0">
+                <a:solidFill>
+                  <a:srgbClr val="9CDCFE"/>
+                </a:solidFill>
+                <a:latin typeface="Menlo" panose="020B0609030804020204" pitchFamily="49" charset="0"/>
+              </a:rPr>
+              <a:t>errors</a:t>
+            </a:r>
+            <a:r>
+              <a:rPr lang="en-US" dirty="0">
+                <a:solidFill>
+                  <a:srgbClr val="D4D4D4"/>
+                </a:solidFill>
+                <a:latin typeface="Menlo" panose="020B0609030804020204" pitchFamily="49" charset="0"/>
+              </a:rPr>
+              <a:t>: </a:t>
+            </a:r>
+            <a:r>
+              <a:rPr lang="en-US" dirty="0">
+                <a:solidFill>
+                  <a:srgbClr val="B5CEA8"/>
+                </a:solidFill>
+                <a:latin typeface="Menlo" panose="020B0609030804020204" pitchFamily="49" charset="0"/>
+              </a:rPr>
+              <a:t>0</a:t>
+            </a:r>
+            <a:endParaRPr lang="en-US" b="0" dirty="0">
+              <a:solidFill>
+                <a:srgbClr val="D4D4D4"/>
+              </a:solidFill>
+              <a:effectLst/>
+              <a:latin typeface="Menlo" panose="020B0609030804020204" pitchFamily="49" charset="0"/>
+            </a:endParaRPr>
+          </a:p>
+        </p:txBody>
+      </p:sp>
+      <p:sp>
+        <p:nvSpPr>
+          <p:cNvPr id="6" name="Rectangle 5">
+            <a:extLst>
+              <a:ext uri="{FF2B5EF4-FFF2-40B4-BE49-F238E27FC236}">
+                <a16:creationId xmlns:a16="http://schemas.microsoft.com/office/drawing/2014/main" id="{45D6E434-B121-214C-9619-7DFE6F2A6F25}"/>
+              </a:ext>
+            </a:extLst>
+          </p:cNvPr>
+          <p:cNvSpPr/>
+          <p:nvPr/>
+        </p:nvSpPr>
+        <p:spPr>
+          <a:xfrm>
+            <a:off x="3203383" y="1546750"/>
+            <a:ext cx="7888941" cy="1477328"/>
+          </a:xfrm>
+          <a:prstGeom prst="rect">
+            <a:avLst/>
+          </a:prstGeom>
+        </p:spPr>
+        <p:txBody>
+          <a:bodyPr wrap="square">
+            <a:spAutoFit/>
+          </a:bodyPr>
+          <a:lstStyle/>
+          <a:p>
+            <a:r>
+              <a:rPr lang="en-US" dirty="0">
+                <a:solidFill>
+                  <a:srgbClr val="D4D4D4"/>
+                </a:solidFill>
+                <a:latin typeface="Menlo" panose="020B0609030804020204" pitchFamily="49" charset="0"/>
+              </a:rPr>
+              <a:t>./short-</a:t>
+            </a:r>
+            <a:r>
+              <a:rPr lang="en-US" dirty="0" err="1">
+                <a:solidFill>
+                  <a:srgbClr val="D4D4D4"/>
+                </a:solidFill>
+                <a:latin typeface="Menlo" panose="020B0609030804020204" pitchFamily="49" charset="0"/>
+              </a:rPr>
+              <a:t>verify.sh</a:t>
+            </a:r>
+            <a:r>
+              <a:rPr lang="en-US" dirty="0">
+                <a:solidFill>
+                  <a:srgbClr val="D4D4D4"/>
+                </a:solidFill>
+                <a:latin typeface="Menlo" panose="020B0609030804020204" pitchFamily="49" charset="0"/>
+              </a:rPr>
+              <a:t> </a:t>
+            </a:r>
+          </a:p>
+          <a:p>
+            <a:r>
+              <a:rPr lang="en-US" dirty="0">
+                <a:solidFill>
+                  <a:srgbClr val="D4D4D4"/>
+                </a:solidFill>
+                <a:latin typeface="Menlo" panose="020B0609030804020204" pitchFamily="49" charset="0"/>
+              </a:rPr>
+              <a:t>never claim + (</a:t>
+            </a:r>
+            <a:r>
+              <a:rPr lang="en-US" dirty="0" err="1">
+                <a:solidFill>
+                  <a:srgbClr val="D4D4D4"/>
+                </a:solidFill>
+                <a:latin typeface="Menlo" panose="020B0609030804020204" pitchFamily="49" charset="0"/>
+              </a:rPr>
+              <a:t>alwayInAState</a:t>
+            </a:r>
+            <a:r>
+              <a:rPr lang="en-US" dirty="0">
+                <a:solidFill>
+                  <a:srgbClr val="D4D4D4"/>
+                </a:solidFill>
+                <a:latin typeface="Menlo" panose="020B0609030804020204" pitchFamily="49" charset="0"/>
+              </a:rPr>
+              <a:t>)</a:t>
+            </a:r>
+          </a:p>
+          <a:p>
+            <a:r>
+              <a:rPr lang="en-US" dirty="0">
+                <a:solidFill>
+                  <a:schemeClr val="tx1">
+                    <a:lumMod val="85000"/>
+                  </a:schemeClr>
+                </a:solidFill>
+                <a:latin typeface="Menlo" panose="020B0609030804020204" pitchFamily="49" charset="0"/>
+              </a:rPr>
+              <a:t>State</a:t>
+            </a:r>
+            <a:r>
+              <a:rPr lang="en-US" dirty="0">
+                <a:solidFill>
+                  <a:srgbClr val="D4D4D4"/>
+                </a:solidFill>
+                <a:latin typeface="Menlo" panose="020B0609030804020204" pitchFamily="49" charset="0"/>
+              </a:rPr>
+              <a:t>-vector </a:t>
+            </a:r>
+            <a:r>
+              <a:rPr lang="en-US" dirty="0">
+                <a:solidFill>
+                  <a:srgbClr val="B5CEA8"/>
+                </a:solidFill>
+                <a:latin typeface="Menlo" panose="020B0609030804020204" pitchFamily="49" charset="0"/>
+              </a:rPr>
+              <a:t>60</a:t>
+            </a:r>
+            <a:r>
+              <a:rPr lang="en-US" dirty="0">
+                <a:solidFill>
+                  <a:srgbClr val="D4D4D4"/>
+                </a:solidFill>
+                <a:latin typeface="Menlo" panose="020B0609030804020204" pitchFamily="49" charset="0"/>
+              </a:rPr>
+              <a:t> byte, depth reached </a:t>
+            </a:r>
+            <a:r>
+              <a:rPr lang="en-US" dirty="0">
+                <a:solidFill>
+                  <a:srgbClr val="B5CEA8"/>
+                </a:solidFill>
+                <a:latin typeface="Menlo" panose="020B0609030804020204" pitchFamily="49" charset="0"/>
+              </a:rPr>
+              <a:t>3654</a:t>
+            </a:r>
+            <a:r>
+              <a:rPr lang="en-US" dirty="0">
+                <a:solidFill>
+                  <a:srgbClr val="D4D4D4"/>
+                </a:solidFill>
+                <a:latin typeface="Menlo" panose="020B0609030804020204" pitchFamily="49" charset="0"/>
+              </a:rPr>
+              <a:t>, </a:t>
+            </a:r>
+            <a:r>
+              <a:rPr lang="en-US" dirty="0">
+                <a:solidFill>
+                  <a:srgbClr val="9CDCFE"/>
+                </a:solidFill>
+                <a:latin typeface="Menlo" panose="020B0609030804020204" pitchFamily="49" charset="0"/>
+              </a:rPr>
+              <a:t>errors</a:t>
+            </a:r>
+            <a:r>
+              <a:rPr lang="en-US" dirty="0">
+                <a:solidFill>
+                  <a:srgbClr val="D4D4D4"/>
+                </a:solidFill>
+                <a:latin typeface="Menlo" panose="020B0609030804020204" pitchFamily="49" charset="0"/>
+              </a:rPr>
+              <a:t>: </a:t>
+            </a:r>
+            <a:r>
+              <a:rPr lang="en-US" dirty="0">
+                <a:solidFill>
+                  <a:srgbClr val="B5CEA8"/>
+                </a:solidFill>
+                <a:latin typeface="Menlo" panose="020B0609030804020204" pitchFamily="49" charset="0"/>
+              </a:rPr>
+              <a:t>0</a:t>
+            </a:r>
+            <a:endParaRPr lang="en-US" dirty="0">
+              <a:solidFill>
+                <a:srgbClr val="D4D4D4"/>
+              </a:solidFill>
+              <a:latin typeface="Menlo" panose="020B0609030804020204" pitchFamily="49" charset="0"/>
+            </a:endParaRPr>
+          </a:p>
+          <a:p>
+            <a:r>
+              <a:rPr lang="en-US" dirty="0">
+                <a:solidFill>
+                  <a:srgbClr val="D4D4D4"/>
+                </a:solidFill>
+                <a:latin typeface="Menlo" panose="020B0609030804020204" pitchFamily="49" charset="0"/>
+              </a:rPr>
+              <a:t>never claim + (</a:t>
+            </a:r>
+            <a:r>
+              <a:rPr lang="en-US" dirty="0" err="1">
+                <a:solidFill>
+                  <a:srgbClr val="D4D4D4"/>
+                </a:solidFill>
+                <a:latin typeface="Menlo" panose="020B0609030804020204" pitchFamily="49" charset="0"/>
+              </a:rPr>
+              <a:t>fairPathExists</a:t>
+            </a:r>
+            <a:r>
+              <a:rPr lang="en-US" dirty="0">
+                <a:solidFill>
+                  <a:srgbClr val="D4D4D4"/>
+                </a:solidFill>
+                <a:latin typeface="Menlo" panose="020B0609030804020204" pitchFamily="49" charset="0"/>
+              </a:rPr>
+              <a:t>)</a:t>
+            </a:r>
+          </a:p>
+          <a:p>
+            <a:r>
+              <a:rPr lang="en-US" dirty="0">
+                <a:solidFill>
+                  <a:schemeClr val="tx1">
+                    <a:lumMod val="85000"/>
+                  </a:schemeClr>
+                </a:solidFill>
+                <a:latin typeface="Menlo" panose="020B0609030804020204" pitchFamily="49" charset="0"/>
+              </a:rPr>
+              <a:t>State</a:t>
+            </a:r>
+            <a:r>
+              <a:rPr lang="en-US" dirty="0">
+                <a:solidFill>
+                  <a:srgbClr val="D4D4D4"/>
+                </a:solidFill>
+                <a:latin typeface="Menlo" panose="020B0609030804020204" pitchFamily="49" charset="0"/>
+              </a:rPr>
+              <a:t>-vector </a:t>
+            </a:r>
+            <a:r>
+              <a:rPr lang="en-US" dirty="0">
+                <a:solidFill>
+                  <a:srgbClr val="B5CEA8"/>
+                </a:solidFill>
+                <a:latin typeface="Menlo" panose="020B0609030804020204" pitchFamily="49" charset="0"/>
+              </a:rPr>
+              <a:t>60</a:t>
+            </a:r>
+            <a:r>
+              <a:rPr lang="en-US" dirty="0">
+                <a:solidFill>
+                  <a:srgbClr val="D4D4D4"/>
+                </a:solidFill>
+                <a:latin typeface="Menlo" panose="020B0609030804020204" pitchFamily="49" charset="0"/>
+              </a:rPr>
+              <a:t> byte, depth reached </a:t>
+            </a:r>
+            <a:r>
+              <a:rPr lang="en-US" dirty="0">
+                <a:solidFill>
+                  <a:srgbClr val="B5CEA8"/>
+                </a:solidFill>
+                <a:latin typeface="Menlo" panose="020B0609030804020204" pitchFamily="49" charset="0"/>
+              </a:rPr>
+              <a:t>84</a:t>
+            </a:r>
+            <a:r>
+              <a:rPr lang="en-US" dirty="0">
+                <a:solidFill>
+                  <a:srgbClr val="D4D4D4"/>
+                </a:solidFill>
+                <a:latin typeface="Menlo" panose="020B0609030804020204" pitchFamily="49" charset="0"/>
+              </a:rPr>
+              <a:t>, </a:t>
+            </a:r>
+            <a:r>
+              <a:rPr lang="en-US" dirty="0">
+                <a:solidFill>
+                  <a:srgbClr val="9CDCFE"/>
+                </a:solidFill>
+                <a:latin typeface="Menlo" panose="020B0609030804020204" pitchFamily="49" charset="0"/>
+              </a:rPr>
+              <a:t>errors</a:t>
+            </a:r>
+            <a:r>
+              <a:rPr lang="en-US" dirty="0">
+                <a:solidFill>
+                  <a:srgbClr val="D4D4D4"/>
+                </a:solidFill>
+                <a:latin typeface="Menlo" panose="020B0609030804020204" pitchFamily="49" charset="0"/>
+              </a:rPr>
+              <a:t>: </a:t>
+            </a:r>
+            <a:r>
+              <a:rPr lang="en-US" dirty="0">
+                <a:solidFill>
+                  <a:srgbClr val="B5CEA8"/>
+                </a:solidFill>
+                <a:latin typeface="Menlo" panose="020B0609030804020204" pitchFamily="49" charset="0"/>
+              </a:rPr>
+              <a:t>1</a:t>
+            </a:r>
+            <a:endParaRPr lang="en-US" b="0" dirty="0">
+              <a:solidFill>
+                <a:srgbClr val="D4D4D4"/>
+              </a:solidFill>
+              <a:effectLst/>
+              <a:latin typeface="Menlo" panose="020B0609030804020204" pitchFamily="49" charset="0"/>
+            </a:endParaRPr>
+          </a:p>
+        </p:txBody>
+      </p:sp>
+      <p:sp>
+        <p:nvSpPr>
+          <p:cNvPr id="7" name="Rectangle 6">
+            <a:extLst>
+              <a:ext uri="{FF2B5EF4-FFF2-40B4-BE49-F238E27FC236}">
+                <a16:creationId xmlns:a16="http://schemas.microsoft.com/office/drawing/2014/main" id="{5B69E991-688D-2644-98C7-22644D55D4D2}"/>
+              </a:ext>
+            </a:extLst>
+          </p:cNvPr>
+          <p:cNvSpPr/>
+          <p:nvPr/>
+        </p:nvSpPr>
+        <p:spPr>
+          <a:xfrm>
+            <a:off x="3203383" y="5255786"/>
+            <a:ext cx="7548283" cy="1477328"/>
+          </a:xfrm>
+          <a:prstGeom prst="rect">
+            <a:avLst/>
+          </a:prstGeom>
+        </p:spPr>
+        <p:txBody>
+          <a:bodyPr wrap="square">
+            <a:spAutoFit/>
+          </a:bodyPr>
+          <a:lstStyle/>
+          <a:p>
+            <a:r>
+              <a:rPr lang="en-US" dirty="0">
+                <a:solidFill>
+                  <a:srgbClr val="D4D4D4"/>
+                </a:solidFill>
+                <a:latin typeface="Menlo" panose="020B0609030804020204" pitchFamily="49" charset="0"/>
+              </a:rPr>
+              <a:t>never claim + (</a:t>
+            </a:r>
+            <a:r>
+              <a:rPr lang="en-US" dirty="0" err="1">
+                <a:solidFill>
+                  <a:srgbClr val="D4D4D4"/>
+                </a:solidFill>
+                <a:latin typeface="Menlo" panose="020B0609030804020204" pitchFamily="49" charset="0"/>
+              </a:rPr>
+              <a:t>ptInElevatedRiskHomeCareEdges</a:t>
+            </a:r>
+            <a:r>
+              <a:rPr lang="en-US" dirty="0">
+                <a:solidFill>
+                  <a:srgbClr val="D4D4D4"/>
+                </a:solidFill>
+                <a:latin typeface="Menlo" panose="020B0609030804020204" pitchFamily="49" charset="0"/>
+              </a:rPr>
+              <a:t>)</a:t>
+            </a:r>
+          </a:p>
+          <a:p>
+            <a:r>
+              <a:rPr lang="en-US" dirty="0">
+                <a:solidFill>
+                  <a:srgbClr val="4EC9B0"/>
+                </a:solidFill>
+                <a:latin typeface="Menlo" panose="020B0609030804020204" pitchFamily="49" charset="0"/>
+              </a:rPr>
+              <a:t>State</a:t>
+            </a:r>
+            <a:r>
+              <a:rPr lang="en-US" dirty="0">
+                <a:solidFill>
+                  <a:srgbClr val="D4D4D4"/>
+                </a:solidFill>
+                <a:latin typeface="Menlo" panose="020B0609030804020204" pitchFamily="49" charset="0"/>
+              </a:rPr>
+              <a:t>-vector </a:t>
+            </a:r>
+            <a:r>
+              <a:rPr lang="en-US" dirty="0">
+                <a:solidFill>
+                  <a:srgbClr val="B5CEA8"/>
+                </a:solidFill>
+                <a:latin typeface="Menlo" panose="020B0609030804020204" pitchFamily="49" charset="0"/>
+              </a:rPr>
+              <a:t>60</a:t>
+            </a:r>
+            <a:r>
+              <a:rPr lang="en-US" dirty="0">
+                <a:solidFill>
+                  <a:srgbClr val="D4D4D4"/>
+                </a:solidFill>
+                <a:latin typeface="Menlo" panose="020B0609030804020204" pitchFamily="49" charset="0"/>
+              </a:rPr>
+              <a:t> byte, depth reached </a:t>
+            </a:r>
+            <a:r>
+              <a:rPr lang="en-US" dirty="0">
+                <a:solidFill>
+                  <a:srgbClr val="B5CEA8"/>
+                </a:solidFill>
+                <a:latin typeface="Menlo" panose="020B0609030804020204" pitchFamily="49" charset="0"/>
+              </a:rPr>
+              <a:t>3654</a:t>
+            </a:r>
+            <a:r>
+              <a:rPr lang="en-US" dirty="0">
+                <a:solidFill>
+                  <a:srgbClr val="D4D4D4"/>
+                </a:solidFill>
+                <a:latin typeface="Menlo" panose="020B0609030804020204" pitchFamily="49" charset="0"/>
+              </a:rPr>
+              <a:t>, </a:t>
+            </a:r>
+            <a:r>
+              <a:rPr lang="en-US" dirty="0">
+                <a:solidFill>
+                  <a:srgbClr val="9CDCFE"/>
+                </a:solidFill>
+                <a:latin typeface="Menlo" panose="020B0609030804020204" pitchFamily="49" charset="0"/>
+              </a:rPr>
+              <a:t>errors</a:t>
+            </a:r>
+            <a:r>
+              <a:rPr lang="en-US" dirty="0">
+                <a:solidFill>
+                  <a:srgbClr val="D4D4D4"/>
+                </a:solidFill>
+                <a:latin typeface="Menlo" panose="020B0609030804020204" pitchFamily="49" charset="0"/>
+              </a:rPr>
+              <a:t>: </a:t>
+            </a:r>
+            <a:r>
+              <a:rPr lang="en-US" dirty="0">
+                <a:solidFill>
+                  <a:srgbClr val="B5CEA8"/>
+                </a:solidFill>
+                <a:latin typeface="Menlo" panose="020B0609030804020204" pitchFamily="49" charset="0"/>
+              </a:rPr>
+              <a:t>0</a:t>
+            </a:r>
+            <a:endParaRPr lang="en-US" dirty="0">
+              <a:solidFill>
+                <a:srgbClr val="D4D4D4"/>
+              </a:solidFill>
+              <a:latin typeface="Menlo" panose="020B0609030804020204" pitchFamily="49" charset="0"/>
+            </a:endParaRPr>
+          </a:p>
+          <a:p>
+            <a:r>
+              <a:rPr lang="en-US" dirty="0">
+                <a:solidFill>
+                  <a:srgbClr val="D4D4D4"/>
+                </a:solidFill>
+                <a:latin typeface="Menlo" panose="020B0609030804020204" pitchFamily="49" charset="0"/>
+              </a:rPr>
+              <a:t>real 1m5.452s</a:t>
+            </a:r>
+          </a:p>
+          <a:p>
+            <a:r>
+              <a:rPr lang="en-US" dirty="0">
+                <a:solidFill>
+                  <a:srgbClr val="D4D4D4"/>
+                </a:solidFill>
+                <a:latin typeface="Menlo" panose="020B0609030804020204" pitchFamily="49" charset="0"/>
+              </a:rPr>
+              <a:t>user 1m0.701s</a:t>
+            </a:r>
+          </a:p>
+          <a:p>
+            <a:r>
+              <a:rPr lang="en-US" dirty="0">
+                <a:solidFill>
+                  <a:srgbClr val="D4D4D4"/>
+                </a:solidFill>
+                <a:latin typeface="Menlo" panose="020B0609030804020204" pitchFamily="49" charset="0"/>
+              </a:rPr>
+              <a:t>sys 0m3.009s</a:t>
+            </a:r>
+            <a:endParaRPr lang="en-US" b="0" dirty="0">
+              <a:solidFill>
+                <a:srgbClr val="D4D4D4"/>
+              </a:solidFill>
+              <a:effectLst/>
+              <a:latin typeface="Menlo" panose="020B0609030804020204" pitchFamily="49" charset="0"/>
+            </a:endParaRPr>
+          </a:p>
+        </p:txBody>
+      </p:sp>
+      <p:grpSp>
+        <p:nvGrpSpPr>
+          <p:cNvPr id="11" name="Group 10">
+            <a:extLst>
+              <a:ext uri="{FF2B5EF4-FFF2-40B4-BE49-F238E27FC236}">
+                <a16:creationId xmlns:a16="http://schemas.microsoft.com/office/drawing/2014/main" id="{414F33AD-951A-FB49-89F0-EBE7488FE2D0}"/>
+              </a:ext>
+            </a:extLst>
+          </p:cNvPr>
+          <p:cNvGrpSpPr/>
+          <p:nvPr/>
+        </p:nvGrpSpPr>
+        <p:grpSpPr>
+          <a:xfrm>
+            <a:off x="5779243" y="3101588"/>
+            <a:ext cx="490071" cy="83670"/>
+            <a:chOff x="968188" y="2510118"/>
+            <a:chExt cx="490071" cy="83670"/>
+          </a:xfrm>
+        </p:grpSpPr>
+        <p:sp>
+          <p:nvSpPr>
+            <p:cNvPr id="8" name="Oval 7">
+              <a:extLst>
+                <a:ext uri="{FF2B5EF4-FFF2-40B4-BE49-F238E27FC236}">
+                  <a16:creationId xmlns:a16="http://schemas.microsoft.com/office/drawing/2014/main" id="{7161815A-B35E-6A48-B0E8-3B49E5F7C583}"/>
+                </a:ext>
+              </a:extLst>
+            </p:cNvPr>
+            <p:cNvSpPr/>
+            <p:nvPr/>
+          </p:nvSpPr>
+          <p:spPr>
+            <a:xfrm>
+              <a:off x="968188" y="2510118"/>
+              <a:ext cx="89647" cy="83670"/>
+            </a:xfrm>
+            <a:prstGeom prst="ellipse">
+              <a:avLst/>
+            </a:prstGeom>
+          </p:spPr>
+          <p:style>
+            <a:lnRef idx="2">
+              <a:schemeClr val="accent1">
+                <a:shade val="50000"/>
+              </a:schemeClr>
+            </a:lnRef>
+            <a:fillRef idx="1">
+              <a:schemeClr val="accent1"/>
+            </a:fillRef>
+            <a:effectRef idx="0">
+              <a:schemeClr val="accent1"/>
+            </a:effectRef>
+            <a:fontRef idx="minor">
+              <a:schemeClr val="lt1"/>
+            </a:fontRef>
+          </p:style>
+          <p:txBody>
+            <a:bodyPr rtlCol="0" anchor="ctr"/>
+            <a:lstStyle/>
+            <a:p>
+              <a:pPr algn="ctr"/>
+              <a:endParaRPr lang="en-US"/>
+            </a:p>
+          </p:txBody>
+        </p:sp>
+        <p:sp>
+          <p:nvSpPr>
+            <p:cNvPr id="9" name="Oval 8">
+              <a:extLst>
+                <a:ext uri="{FF2B5EF4-FFF2-40B4-BE49-F238E27FC236}">
+                  <a16:creationId xmlns:a16="http://schemas.microsoft.com/office/drawing/2014/main" id="{E03526FF-C380-9345-99A3-D0D53CC6C46D}"/>
+                </a:ext>
+              </a:extLst>
+            </p:cNvPr>
+            <p:cNvSpPr/>
+            <p:nvPr/>
+          </p:nvSpPr>
+          <p:spPr>
+            <a:xfrm>
+              <a:off x="1168400" y="2510118"/>
+              <a:ext cx="89647" cy="83670"/>
+            </a:xfrm>
+            <a:prstGeom prst="ellipse">
+              <a:avLst/>
+            </a:prstGeom>
+          </p:spPr>
+          <p:style>
+            <a:lnRef idx="2">
+              <a:schemeClr val="accent1">
+                <a:shade val="50000"/>
+              </a:schemeClr>
+            </a:lnRef>
+            <a:fillRef idx="1">
+              <a:schemeClr val="accent1"/>
+            </a:fillRef>
+            <a:effectRef idx="0">
+              <a:schemeClr val="accent1"/>
+            </a:effectRef>
+            <a:fontRef idx="minor">
+              <a:schemeClr val="lt1"/>
+            </a:fontRef>
+          </p:style>
+          <p:txBody>
+            <a:bodyPr rtlCol="0" anchor="ctr"/>
+            <a:lstStyle/>
+            <a:p>
+              <a:pPr algn="ctr"/>
+              <a:endParaRPr lang="en-US"/>
+            </a:p>
+          </p:txBody>
+        </p:sp>
+        <p:sp>
+          <p:nvSpPr>
+            <p:cNvPr id="10" name="Oval 9">
+              <a:extLst>
+                <a:ext uri="{FF2B5EF4-FFF2-40B4-BE49-F238E27FC236}">
+                  <a16:creationId xmlns:a16="http://schemas.microsoft.com/office/drawing/2014/main" id="{5827E62A-8572-D64C-88B2-6CE6FFB83178}"/>
+                </a:ext>
+              </a:extLst>
+            </p:cNvPr>
+            <p:cNvSpPr/>
+            <p:nvPr/>
+          </p:nvSpPr>
+          <p:spPr>
+            <a:xfrm>
+              <a:off x="1368612" y="2510118"/>
+              <a:ext cx="89647" cy="83670"/>
+            </a:xfrm>
+            <a:prstGeom prst="ellipse">
+              <a:avLst/>
+            </a:prstGeom>
+          </p:spPr>
+          <p:style>
+            <a:lnRef idx="2">
+              <a:schemeClr val="accent1">
+                <a:shade val="50000"/>
+              </a:schemeClr>
+            </a:lnRef>
+            <a:fillRef idx="1">
+              <a:schemeClr val="accent1"/>
+            </a:fillRef>
+            <a:effectRef idx="0">
+              <a:schemeClr val="accent1"/>
+            </a:effectRef>
+            <a:fontRef idx="minor">
+              <a:schemeClr val="lt1"/>
+            </a:fontRef>
+          </p:style>
+          <p:txBody>
+            <a:bodyPr rtlCol="0" anchor="ctr"/>
+            <a:lstStyle/>
+            <a:p>
+              <a:pPr algn="ctr"/>
+              <a:endParaRPr lang="en-US"/>
+            </a:p>
+          </p:txBody>
+        </p:sp>
+      </p:grpSp>
+      <p:grpSp>
+        <p:nvGrpSpPr>
+          <p:cNvPr id="12" name="Group 11">
+            <a:extLst>
+              <a:ext uri="{FF2B5EF4-FFF2-40B4-BE49-F238E27FC236}">
+                <a16:creationId xmlns:a16="http://schemas.microsoft.com/office/drawing/2014/main" id="{97759549-5DF6-E34B-8D13-F128863C5C68}"/>
+              </a:ext>
+            </a:extLst>
+          </p:cNvPr>
+          <p:cNvGrpSpPr/>
+          <p:nvPr/>
+        </p:nvGrpSpPr>
+        <p:grpSpPr>
+          <a:xfrm>
+            <a:off x="5782231" y="5105993"/>
+            <a:ext cx="490071" cy="83670"/>
+            <a:chOff x="968188" y="2510118"/>
+            <a:chExt cx="490071" cy="83670"/>
+          </a:xfrm>
+        </p:grpSpPr>
+        <p:sp>
+          <p:nvSpPr>
+            <p:cNvPr id="13" name="Oval 12">
+              <a:extLst>
+                <a:ext uri="{FF2B5EF4-FFF2-40B4-BE49-F238E27FC236}">
+                  <a16:creationId xmlns:a16="http://schemas.microsoft.com/office/drawing/2014/main" id="{6BF545B8-3601-8C41-A76E-F46E3E24CFBA}"/>
+                </a:ext>
+              </a:extLst>
+            </p:cNvPr>
+            <p:cNvSpPr/>
+            <p:nvPr/>
+          </p:nvSpPr>
+          <p:spPr>
+            <a:xfrm>
+              <a:off x="968188" y="2510118"/>
+              <a:ext cx="89647" cy="83670"/>
+            </a:xfrm>
+            <a:prstGeom prst="ellipse">
+              <a:avLst/>
+            </a:prstGeom>
+          </p:spPr>
+          <p:style>
+            <a:lnRef idx="2">
+              <a:schemeClr val="accent1">
+                <a:shade val="50000"/>
+              </a:schemeClr>
+            </a:lnRef>
+            <a:fillRef idx="1">
+              <a:schemeClr val="accent1"/>
+            </a:fillRef>
+            <a:effectRef idx="0">
+              <a:schemeClr val="accent1"/>
+            </a:effectRef>
+            <a:fontRef idx="minor">
+              <a:schemeClr val="lt1"/>
+            </a:fontRef>
+          </p:style>
+          <p:txBody>
+            <a:bodyPr rtlCol="0" anchor="ctr"/>
+            <a:lstStyle/>
+            <a:p>
+              <a:pPr algn="ctr"/>
+              <a:endParaRPr lang="en-US"/>
+            </a:p>
+          </p:txBody>
+        </p:sp>
+        <p:sp>
+          <p:nvSpPr>
+            <p:cNvPr id="14" name="Oval 13">
+              <a:extLst>
+                <a:ext uri="{FF2B5EF4-FFF2-40B4-BE49-F238E27FC236}">
+                  <a16:creationId xmlns:a16="http://schemas.microsoft.com/office/drawing/2014/main" id="{584083FA-A6ED-6641-8700-E0CFF221FE63}"/>
+                </a:ext>
+              </a:extLst>
+            </p:cNvPr>
+            <p:cNvSpPr/>
+            <p:nvPr/>
+          </p:nvSpPr>
+          <p:spPr>
+            <a:xfrm>
+              <a:off x="1168400" y="2510118"/>
+              <a:ext cx="89647" cy="83670"/>
+            </a:xfrm>
+            <a:prstGeom prst="ellipse">
+              <a:avLst/>
+            </a:prstGeom>
+          </p:spPr>
+          <p:style>
+            <a:lnRef idx="2">
+              <a:schemeClr val="accent1">
+                <a:shade val="50000"/>
+              </a:schemeClr>
+            </a:lnRef>
+            <a:fillRef idx="1">
+              <a:schemeClr val="accent1"/>
+            </a:fillRef>
+            <a:effectRef idx="0">
+              <a:schemeClr val="accent1"/>
+            </a:effectRef>
+            <a:fontRef idx="minor">
+              <a:schemeClr val="lt1"/>
+            </a:fontRef>
+          </p:style>
+          <p:txBody>
+            <a:bodyPr rtlCol="0" anchor="ctr"/>
+            <a:lstStyle/>
+            <a:p>
+              <a:pPr algn="ctr"/>
+              <a:endParaRPr lang="en-US"/>
+            </a:p>
+          </p:txBody>
+        </p:sp>
+        <p:sp>
+          <p:nvSpPr>
+            <p:cNvPr id="15" name="Oval 14">
+              <a:extLst>
+                <a:ext uri="{FF2B5EF4-FFF2-40B4-BE49-F238E27FC236}">
+                  <a16:creationId xmlns:a16="http://schemas.microsoft.com/office/drawing/2014/main" id="{0B776DA7-702F-A146-AC3F-A8C2F8AF60BF}"/>
+                </a:ext>
+              </a:extLst>
+            </p:cNvPr>
+            <p:cNvSpPr/>
+            <p:nvPr/>
+          </p:nvSpPr>
+          <p:spPr>
+            <a:xfrm>
+              <a:off x="1368612" y="2510118"/>
+              <a:ext cx="89647" cy="83670"/>
+            </a:xfrm>
+            <a:prstGeom prst="ellipse">
+              <a:avLst/>
+            </a:prstGeom>
+          </p:spPr>
+          <p:style>
+            <a:lnRef idx="2">
+              <a:schemeClr val="accent1">
+                <a:shade val="50000"/>
+              </a:schemeClr>
+            </a:lnRef>
+            <a:fillRef idx="1">
+              <a:schemeClr val="accent1"/>
+            </a:fillRef>
+            <a:effectRef idx="0">
+              <a:schemeClr val="accent1"/>
+            </a:effectRef>
+            <a:fontRef idx="minor">
+              <a:schemeClr val="lt1"/>
+            </a:fontRef>
+          </p:style>
+          <p:txBody>
+            <a:bodyPr rtlCol="0" anchor="ctr"/>
+            <a:lstStyle/>
+            <a:p>
+              <a:pPr algn="ctr"/>
+              <a:endParaRPr lang="en-US"/>
+            </a:p>
+          </p:txBody>
+        </p:sp>
+      </p:grpSp>
+      <p:sp>
+        <p:nvSpPr>
+          <p:cNvPr id="17" name="Left Brace 16">
+            <a:extLst>
+              <a:ext uri="{FF2B5EF4-FFF2-40B4-BE49-F238E27FC236}">
+                <a16:creationId xmlns:a16="http://schemas.microsoft.com/office/drawing/2014/main" id="{16CA9501-148A-B84F-8FF4-A6888194DBB6}"/>
+              </a:ext>
+            </a:extLst>
+          </p:cNvPr>
+          <p:cNvSpPr/>
+          <p:nvPr/>
+        </p:nvSpPr>
+        <p:spPr>
+          <a:xfrm>
+            <a:off x="2832846" y="1882588"/>
+            <a:ext cx="454212" cy="1141490"/>
+          </a:xfrm>
+          <a:prstGeom prst="leftBrace">
+            <a:avLst/>
+          </a:prstGeom>
+        </p:spPr>
+        <p:style>
+          <a:lnRef idx="3">
+            <a:schemeClr val="accent1"/>
+          </a:lnRef>
+          <a:fillRef idx="0">
+            <a:schemeClr val="accent1"/>
+          </a:fillRef>
+          <a:effectRef idx="2">
+            <a:schemeClr val="accent1"/>
+          </a:effectRef>
+          <a:fontRef idx="minor">
+            <a:schemeClr val="tx1"/>
+          </a:fontRef>
+        </p:style>
+        <p:txBody>
+          <a:bodyPr rtlCol="0" anchor="ctr"/>
+          <a:lstStyle/>
+          <a:p>
+            <a:pPr algn="ctr"/>
+            <a:endParaRPr lang="en-US"/>
+          </a:p>
+        </p:txBody>
+      </p:sp>
+      <p:sp>
+        <p:nvSpPr>
+          <p:cNvPr id="18" name="TextBox 17">
+            <a:extLst>
+              <a:ext uri="{FF2B5EF4-FFF2-40B4-BE49-F238E27FC236}">
+                <a16:creationId xmlns:a16="http://schemas.microsoft.com/office/drawing/2014/main" id="{DD7B6961-CB3E-604B-AFCB-07C3E24047BF}"/>
+              </a:ext>
+            </a:extLst>
+          </p:cNvPr>
+          <p:cNvSpPr txBox="1"/>
+          <p:nvPr/>
+        </p:nvSpPr>
+        <p:spPr>
+          <a:xfrm>
+            <a:off x="382493" y="2222500"/>
+            <a:ext cx="2450353" cy="461665"/>
+          </a:xfrm>
+          <a:prstGeom prst="rect">
+            <a:avLst/>
+          </a:prstGeom>
+          <a:noFill/>
+        </p:spPr>
+        <p:txBody>
+          <a:bodyPr wrap="square" rtlCol="0">
+            <a:spAutoFit/>
+          </a:bodyPr>
+          <a:lstStyle/>
+          <a:p>
+            <a:pPr algn="r"/>
+            <a:r>
+              <a:rPr lang="en-US" sz="2400" dirty="0">
+                <a:solidFill>
+                  <a:schemeClr val="accent1"/>
+                </a:solidFill>
+              </a:rPr>
+              <a:t>Global Properties</a:t>
+            </a:r>
+          </a:p>
+        </p:txBody>
+      </p:sp>
+      <p:sp>
+        <p:nvSpPr>
+          <p:cNvPr id="19" name="Left Brace 18">
+            <a:extLst>
+              <a:ext uri="{FF2B5EF4-FFF2-40B4-BE49-F238E27FC236}">
+                <a16:creationId xmlns:a16="http://schemas.microsoft.com/office/drawing/2014/main" id="{DE32F648-65D5-5447-AB40-9C848DA0A414}"/>
+              </a:ext>
+            </a:extLst>
+          </p:cNvPr>
+          <p:cNvSpPr/>
+          <p:nvPr/>
+        </p:nvSpPr>
+        <p:spPr>
+          <a:xfrm>
+            <a:off x="2832839" y="3302237"/>
+            <a:ext cx="454212" cy="1676165"/>
+          </a:xfrm>
+          <a:prstGeom prst="leftBrace">
+            <a:avLst/>
+          </a:prstGeom>
+        </p:spPr>
+        <p:style>
+          <a:lnRef idx="3">
+            <a:schemeClr val="accent1"/>
+          </a:lnRef>
+          <a:fillRef idx="0">
+            <a:schemeClr val="accent1"/>
+          </a:fillRef>
+          <a:effectRef idx="2">
+            <a:schemeClr val="accent1"/>
+          </a:effectRef>
+          <a:fontRef idx="minor">
+            <a:schemeClr val="tx1"/>
+          </a:fontRef>
+        </p:style>
+        <p:txBody>
+          <a:bodyPr rtlCol="0" anchor="ctr"/>
+          <a:lstStyle/>
+          <a:p>
+            <a:pPr algn="ctr"/>
+            <a:endParaRPr lang="en-US"/>
+          </a:p>
+        </p:txBody>
+      </p:sp>
+      <p:sp>
+        <p:nvSpPr>
+          <p:cNvPr id="20" name="TextBox 19">
+            <a:extLst>
+              <a:ext uri="{FF2B5EF4-FFF2-40B4-BE49-F238E27FC236}">
+                <a16:creationId xmlns:a16="http://schemas.microsoft.com/office/drawing/2014/main" id="{F7BE7CC6-F420-6941-BFB3-4F6B84F8A6D0}"/>
+              </a:ext>
+            </a:extLst>
+          </p:cNvPr>
+          <p:cNvSpPr txBox="1"/>
+          <p:nvPr/>
+        </p:nvSpPr>
+        <p:spPr>
+          <a:xfrm>
+            <a:off x="382493" y="3724433"/>
+            <a:ext cx="2450353" cy="830997"/>
+          </a:xfrm>
+          <a:prstGeom prst="rect">
+            <a:avLst/>
+          </a:prstGeom>
+          <a:noFill/>
+        </p:spPr>
+        <p:txBody>
+          <a:bodyPr wrap="square" rtlCol="0">
+            <a:spAutoFit/>
+          </a:bodyPr>
+          <a:lstStyle/>
+          <a:p>
+            <a:pPr algn="r"/>
+            <a:r>
+              <a:rPr lang="en-US" sz="2400" dirty="0">
+                <a:solidFill>
+                  <a:schemeClr val="accent1"/>
+                </a:solidFill>
+              </a:rPr>
+              <a:t>Properties for one of the states</a:t>
+            </a:r>
+          </a:p>
+        </p:txBody>
+      </p:sp>
+      <p:sp>
+        <p:nvSpPr>
+          <p:cNvPr id="21" name="Left Brace 20">
+            <a:extLst>
+              <a:ext uri="{FF2B5EF4-FFF2-40B4-BE49-F238E27FC236}">
+                <a16:creationId xmlns:a16="http://schemas.microsoft.com/office/drawing/2014/main" id="{95B1E26F-1383-034B-AF32-332E496224EC}"/>
+              </a:ext>
+            </a:extLst>
+          </p:cNvPr>
+          <p:cNvSpPr/>
+          <p:nvPr/>
+        </p:nvSpPr>
+        <p:spPr>
+          <a:xfrm>
+            <a:off x="2829864" y="5850964"/>
+            <a:ext cx="454212" cy="887499"/>
+          </a:xfrm>
+          <a:prstGeom prst="leftBrace">
+            <a:avLst/>
+          </a:prstGeom>
+        </p:spPr>
+        <p:style>
+          <a:lnRef idx="3">
+            <a:schemeClr val="accent1"/>
+          </a:lnRef>
+          <a:fillRef idx="0">
+            <a:schemeClr val="accent1"/>
+          </a:fillRef>
+          <a:effectRef idx="2">
+            <a:schemeClr val="accent1"/>
+          </a:effectRef>
+          <a:fontRef idx="minor">
+            <a:schemeClr val="tx1"/>
+          </a:fontRef>
+        </p:style>
+        <p:txBody>
+          <a:bodyPr rtlCol="0" anchor="ctr"/>
+          <a:lstStyle/>
+          <a:p>
+            <a:pPr algn="ctr"/>
+            <a:endParaRPr lang="en-US"/>
+          </a:p>
+        </p:txBody>
+      </p:sp>
+      <p:sp>
+        <p:nvSpPr>
+          <p:cNvPr id="22" name="TextBox 21">
+            <a:extLst>
+              <a:ext uri="{FF2B5EF4-FFF2-40B4-BE49-F238E27FC236}">
+                <a16:creationId xmlns:a16="http://schemas.microsoft.com/office/drawing/2014/main" id="{B4845234-A325-D54B-B850-FE8E00C3599F}"/>
+              </a:ext>
+            </a:extLst>
+          </p:cNvPr>
+          <p:cNvSpPr txBox="1"/>
+          <p:nvPr/>
+        </p:nvSpPr>
+        <p:spPr>
+          <a:xfrm>
+            <a:off x="382493" y="6063880"/>
+            <a:ext cx="2450353" cy="461665"/>
+          </a:xfrm>
+          <a:prstGeom prst="rect">
+            <a:avLst/>
+          </a:prstGeom>
+          <a:noFill/>
+        </p:spPr>
+        <p:txBody>
+          <a:bodyPr wrap="square" rtlCol="0">
+            <a:spAutoFit/>
+          </a:bodyPr>
+          <a:lstStyle/>
+          <a:p>
+            <a:pPr algn="r"/>
+            <a:r>
+              <a:rPr lang="en-US" sz="2400" dirty="0">
+                <a:solidFill>
+                  <a:schemeClr val="accent1"/>
+                </a:solidFill>
+              </a:rPr>
+              <a:t>Verification time</a:t>
+            </a:r>
+          </a:p>
+        </p:txBody>
+      </p:sp>
+      <p:sp>
+        <p:nvSpPr>
+          <p:cNvPr id="23" name="Left Arrow 22">
+            <a:extLst>
+              <a:ext uri="{FF2B5EF4-FFF2-40B4-BE49-F238E27FC236}">
+                <a16:creationId xmlns:a16="http://schemas.microsoft.com/office/drawing/2014/main" id="{3D69E023-3376-7348-BEEA-604B8015D9B6}"/>
+              </a:ext>
+            </a:extLst>
+          </p:cNvPr>
+          <p:cNvSpPr/>
+          <p:nvPr/>
+        </p:nvSpPr>
+        <p:spPr>
+          <a:xfrm>
+            <a:off x="10154024" y="2614436"/>
+            <a:ext cx="1763058" cy="475765"/>
+          </a:xfrm>
+          <a:prstGeom prst="leftArrow">
+            <a:avLst/>
+          </a:prstGeom>
+        </p:spPr>
+        <p:style>
+          <a:lnRef idx="2">
+            <a:schemeClr val="accent1">
+              <a:shade val="50000"/>
+            </a:schemeClr>
+          </a:lnRef>
+          <a:fillRef idx="1">
+            <a:schemeClr val="accent1"/>
+          </a:fillRef>
+          <a:effectRef idx="0">
+            <a:schemeClr val="accent1"/>
+          </a:effectRef>
+          <a:fontRef idx="minor">
+            <a:schemeClr val="lt1"/>
+          </a:fontRef>
+        </p:style>
+        <p:txBody>
+          <a:bodyPr rtlCol="0" anchor="ctr"/>
+          <a:lstStyle/>
+          <a:p>
+            <a:pPr algn="ctr"/>
+            <a:r>
+              <a:rPr lang="en-US" dirty="0"/>
+              <a:t>Witness (good)</a:t>
+            </a:r>
+          </a:p>
+        </p:txBody>
+      </p:sp>
+    </p:spTree>
+    <p:extLst>
+      <p:ext uri="{BB962C8B-B14F-4D97-AF65-F5344CB8AC3E}">
+        <p14:creationId xmlns:p14="http://schemas.microsoft.com/office/powerpoint/2010/main" val="579471279"/>
+      </p:ext>
+    </p:extLst>
+  </p:cSld>
+  <p:clrMapOvr>
+    <a:masterClrMapping/>
+  </p:clrMapOvr>
+</p:sld>
+</file>
+
+<file path=ppt/slides/slide21.xml><?xml version="1.0" encoding="utf-8"?>
+<p:sld xmlns:a="http://schemas.openxmlformats.org/drawingml/2006/main" xmlns:r="http://schemas.openxmlformats.org/officeDocument/2006/relationships" xmlns:p="http://schemas.openxmlformats.org/presentationml/2006/main">
+  <p:cSld>
+    <p:spTree>
+      <p:nvGrpSpPr>
+        <p:cNvPr id="1" name=""/>
+        <p:cNvGrpSpPr/>
+        <p:nvPr/>
+      </p:nvGrpSpPr>
+      <p:grpSpPr>
+        <a:xfrm>
+          <a:off x="0" y="0"/>
+          <a:ext cx="0" cy="0"/>
+          <a:chOff x="0" y="0"/>
+          <a:chExt cx="0" cy="0"/>
+        </a:xfrm>
+      </p:grpSpPr>
+      <p:sp>
+        <p:nvSpPr>
+          <p:cNvPr id="2" name="Title 1">
+            <a:extLst>
+              <a:ext uri="{FF2B5EF4-FFF2-40B4-BE49-F238E27FC236}">
+                <a16:creationId xmlns:a16="http://schemas.microsoft.com/office/drawing/2014/main" id="{E3270F33-2BE4-3F4F-BB75-1986F012CB71}"/>
+              </a:ext>
+            </a:extLst>
+          </p:cNvPr>
+          <p:cNvSpPr>
+            <a:spLocks noGrp="1"/>
+          </p:cNvSpPr>
+          <p:nvPr>
+            <p:ph type="title"/>
+          </p:nvPr>
+        </p:nvSpPr>
+        <p:spPr/>
+        <p:txBody>
+          <a:bodyPr/>
+          <a:lstStyle/>
+          <a:p>
+            <a:r>
+              <a:rPr lang="en-US" dirty="0"/>
+              <a:t>Conclusions and Future Work</a:t>
+            </a:r>
+          </a:p>
+        </p:txBody>
+      </p:sp>
+      <p:sp>
+        <p:nvSpPr>
+          <p:cNvPr id="3" name="Content Placeholder 2">
+            <a:extLst>
+              <a:ext uri="{FF2B5EF4-FFF2-40B4-BE49-F238E27FC236}">
+                <a16:creationId xmlns:a16="http://schemas.microsoft.com/office/drawing/2014/main" id="{35DB7601-C00E-454A-B376-B99AF1D26BCD}"/>
+              </a:ext>
+            </a:extLst>
+          </p:cNvPr>
+          <p:cNvSpPr>
+            <a:spLocks noGrp="1"/>
+          </p:cNvSpPr>
+          <p:nvPr>
+            <p:ph idx="1"/>
+          </p:nvPr>
+        </p:nvSpPr>
+        <p:spPr/>
+        <p:txBody>
+          <a:bodyPr>
+            <a:normAutofit lnSpcReduction="10000"/>
+          </a:bodyPr>
+          <a:lstStyle/>
+          <a:p>
+            <a:r>
+              <a:rPr lang="en-US" dirty="0"/>
+              <a:t>Functional integration of human and machine reasoning is hard</a:t>
+            </a:r>
+          </a:p>
+          <a:p>
+            <a:r>
+              <a:rPr lang="en-US" dirty="0"/>
+              <a:t>Vast performance differences and asynchrony challenge reasoning</a:t>
+            </a:r>
+          </a:p>
+          <a:p>
+            <a:r>
+              <a:rPr lang="en-US" dirty="0"/>
+              <a:t>CWP is a adequate declarative specification of what an integrated human and machine reasoning system must accomplish</a:t>
+            </a:r>
+          </a:p>
+          <a:p>
+            <a:r>
+              <a:rPr lang="en-US" dirty="0"/>
+              <a:t>The integration itself can be defined with with workflows using BPMN</a:t>
+            </a:r>
+          </a:p>
+          <a:p>
+            <a:r>
+              <a:rPr lang="en-US" dirty="0"/>
+              <a:t>Model checking can verify a workflow against a CWP</a:t>
+            </a:r>
+          </a:p>
+          <a:p>
+            <a:r>
+              <a:rPr lang="en-US" dirty="0"/>
+              <a:t>Requires the CWP be turned into LTL and the BPMN into </a:t>
+            </a:r>
+            <a:r>
+              <a:rPr lang="en-US" dirty="0" err="1"/>
+              <a:t>Promela</a:t>
+            </a:r>
+            <a:endParaRPr lang="en-US" dirty="0"/>
+          </a:p>
+          <a:p>
+            <a:r>
+              <a:rPr lang="en-US" dirty="0"/>
+              <a:t>SPIN verifies the BPMN satisfies the CWP</a:t>
+            </a:r>
+          </a:p>
+          <a:p>
+            <a:r>
+              <a:rPr lang="en-US" dirty="0"/>
+              <a:t>Future work is to automate the process</a:t>
+            </a:r>
+          </a:p>
+        </p:txBody>
+      </p:sp>
+    </p:spTree>
+    <p:extLst>
+      <p:ext uri="{BB962C8B-B14F-4D97-AF65-F5344CB8AC3E}">
+        <p14:creationId xmlns:p14="http://schemas.microsoft.com/office/powerpoint/2010/main" val="2963920626"/>
+      </p:ext>
+    </p:extLst>
+  </p:cSld>
+  <p:clrMapOvr>
+    <a:masterClrMapping/>
+  </p:clrMapOvr>
+</p:sld>
+</file>
+
 <file path=ppt/slides/slide3.xml><?xml version="1.0" encoding="utf-8"?>
 <p:sld xmlns:a="http://schemas.openxmlformats.org/drawingml/2006/main" xmlns:r="http://schemas.openxmlformats.org/officeDocument/2006/relationships" xmlns:p="http://schemas.openxmlformats.org/presentationml/2006/main">
   <p:cSld>

</xml_diff>

<commit_message>
Add animations to help with flow
</commit_message>
<xml_diff>
--- a/presentation/syscon-2022.pptx
+++ b/presentation/syscon-2022.pptx
@@ -1288,6 +1288,90 @@
     <p:extLst>
       <p:ext uri="{BB962C8B-B14F-4D97-AF65-F5344CB8AC3E}">
         <p14:creationId xmlns:p14="http://schemas.microsoft.com/office/powerpoint/2010/main" val="233911423"/>
+      </p:ext>
+    </p:extLst>
+  </p:cSld>
+  <p:clrMapOvr>
+    <a:masterClrMapping/>
+  </p:clrMapOvr>
+</p:notes>
+</file>
+
+<file path=ppt/notesSlides/notesSlide18.xml><?xml version="1.0" encoding="utf-8"?>
+<p:notes xmlns:a="http://schemas.openxmlformats.org/drawingml/2006/main" xmlns:r="http://schemas.openxmlformats.org/officeDocument/2006/relationships" xmlns:p="http://schemas.openxmlformats.org/presentationml/2006/main">
+  <p:cSld>
+    <p:spTree>
+      <p:nvGrpSpPr>
+        <p:cNvPr id="1" name=""/>
+        <p:cNvGrpSpPr/>
+        <p:nvPr/>
+      </p:nvGrpSpPr>
+      <p:grpSpPr>
+        <a:xfrm>
+          <a:off x="0" y="0"/>
+          <a:ext cx="0" cy="0"/>
+          <a:chOff x="0" y="0"/>
+          <a:chExt cx="0" cy="0"/>
+        </a:xfrm>
+      </p:grpSpPr>
+      <p:sp>
+        <p:nvSpPr>
+          <p:cNvPr id="2" name="Slide Image Placeholder 1"/>
+          <p:cNvSpPr>
+            <a:spLocks noGrp="1" noRot="1" noChangeAspect="1"/>
+          </p:cNvSpPr>
+          <p:nvPr>
+            <p:ph type="sldImg"/>
+          </p:nvPr>
+        </p:nvSpPr>
+        <p:spPr/>
+      </p:sp>
+      <p:sp>
+        <p:nvSpPr>
+          <p:cNvPr id="3" name="Notes Placeholder 2"/>
+          <p:cNvSpPr>
+            <a:spLocks noGrp="1"/>
+          </p:cNvSpPr>
+          <p:nvPr>
+            <p:ph type="body" idx="1"/>
+          </p:nvPr>
+        </p:nvSpPr>
+        <p:spPr/>
+        <p:txBody>
+          <a:bodyPr/>
+          <a:lstStyle/>
+          <a:p>
+            <a:endParaRPr lang="en-US" dirty="0"/>
+          </a:p>
+        </p:txBody>
+      </p:sp>
+      <p:sp>
+        <p:nvSpPr>
+          <p:cNvPr id="4" name="Slide Number Placeholder 3"/>
+          <p:cNvSpPr>
+            <a:spLocks noGrp="1"/>
+          </p:cNvSpPr>
+          <p:nvPr>
+            <p:ph type="sldNum" sz="quarter" idx="5"/>
+          </p:nvPr>
+        </p:nvSpPr>
+        <p:spPr/>
+        <p:txBody>
+          <a:bodyPr/>
+          <a:lstStyle/>
+          <a:p>
+            <a:fld id="{438ED187-F6C5-A545-9BCA-551DE666D003}" type="slidenum">
+              <a:rPr lang="en-US" smtClean="0"/>
+              <a:t>21</a:t>
+            </a:fld>
+            <a:endParaRPr lang="en-US"/>
+          </a:p>
+        </p:txBody>
+      </p:sp>
+    </p:spTree>
+    <p:extLst>
+      <p:ext uri="{BB962C8B-B14F-4D97-AF65-F5344CB8AC3E}">
+        <p14:creationId xmlns:p14="http://schemas.microsoft.com/office/powerpoint/2010/main" val="776147955"/>
       </p:ext>
     </p:extLst>
   </p:cSld>
@@ -7614,6 +7698,111 @@
   <p:clrMapOvr>
     <a:masterClrMapping/>
   </p:clrMapOvr>
+  <p:timing>
+    <p:tnLst>
+      <p:par>
+        <p:cTn id="1" dur="indefinite" restart="never" nodeType="tmRoot">
+          <p:childTnLst>
+            <p:seq concurrent="1" nextAc="seek">
+              <p:cTn id="2" dur="indefinite" nodeType="mainSeq">
+                <p:childTnLst>
+                  <p:par>
+                    <p:cTn id="3" fill="hold">
+                      <p:stCondLst>
+                        <p:cond delay="indefinite"/>
+                      </p:stCondLst>
+                      <p:childTnLst>
+                        <p:par>
+                          <p:cTn id="4" fill="hold">
+                            <p:stCondLst>
+                              <p:cond delay="0"/>
+                            </p:stCondLst>
+                            <p:childTnLst>
+                              <p:par>
+                                <p:cTn id="5" presetID="1" presetClass="entr" presetSubtype="0" fill="hold" grpId="0" nodeType="clickEffect">
+                                  <p:stCondLst>
+                                    <p:cond delay="0"/>
+                                  </p:stCondLst>
+                                  <p:childTnLst>
+                                    <p:set>
+                                      <p:cBhvr>
+                                        <p:cTn id="6" dur="1" fill="hold">
+                                          <p:stCondLst>
+                                            <p:cond delay="0"/>
+                                          </p:stCondLst>
+                                        </p:cTn>
+                                        <p:tgtEl>
+                                          <p:spTgt spid="10"/>
+                                        </p:tgtEl>
+                                        <p:attrNameLst>
+                                          <p:attrName>style.visibility</p:attrName>
+                                        </p:attrNameLst>
+                                      </p:cBhvr>
+                                      <p:to>
+                                        <p:strVal val="visible"/>
+                                      </p:to>
+                                    </p:set>
+                                  </p:childTnLst>
+                                </p:cTn>
+                              </p:par>
+                              <p:par>
+                                <p:cTn id="7" presetID="1" presetClass="entr" presetSubtype="0" fill="hold" nodeType="withEffect">
+                                  <p:stCondLst>
+                                    <p:cond delay="0"/>
+                                  </p:stCondLst>
+                                  <p:childTnLst>
+                                    <p:set>
+                                      <p:cBhvr>
+                                        <p:cTn id="8" dur="1" fill="hold">
+                                          <p:stCondLst>
+                                            <p:cond delay="0"/>
+                                          </p:stCondLst>
+                                        </p:cTn>
+                                        <p:tgtEl>
+                                          <p:spTgt spid="4"/>
+                                        </p:tgtEl>
+                                        <p:attrNameLst>
+                                          <p:attrName>style.visibility</p:attrName>
+                                        </p:attrNameLst>
+                                      </p:cBhvr>
+                                      <p:to>
+                                        <p:strVal val="visible"/>
+                                      </p:to>
+                                    </p:set>
+                                  </p:childTnLst>
+                                </p:cTn>
+                              </p:par>
+                            </p:childTnLst>
+                          </p:cTn>
+                        </p:par>
+                      </p:childTnLst>
+                    </p:cTn>
+                  </p:par>
+                </p:childTnLst>
+              </p:cTn>
+              <p:prevCondLst>
+                <p:cond evt="onPrev" delay="0">
+                  <p:tgtEl>
+                    <p:sldTgt/>
+                  </p:tgtEl>
+                </p:cond>
+              </p:prevCondLst>
+              <p:nextCondLst>
+                <p:cond evt="onNext" delay="0">
+                  <p:tgtEl>
+                    <p:sldTgt/>
+                  </p:tgtEl>
+                </p:cond>
+              </p:nextCondLst>
+            </p:seq>
+          </p:childTnLst>
+        </p:cTn>
+      </p:par>
+    </p:tnLst>
+    <p:bldLst>
+      <p:bldP spid="10" grpId="0"/>
+    </p:bldLst>
+  </p:timing>
 </p:sld>
 </file>
 
@@ -10612,6 +10801,184 @@
   <p:clrMapOvr>
     <a:masterClrMapping/>
   </p:clrMapOvr>
+  <p:timing>
+    <p:tnLst>
+      <p:par>
+        <p:cTn id="1" dur="indefinite" restart="never" nodeType="tmRoot">
+          <p:childTnLst>
+            <p:seq concurrent="1" nextAc="seek">
+              <p:cTn id="2" dur="indefinite" nodeType="mainSeq">
+                <p:childTnLst>
+                  <p:par>
+                    <p:cTn id="3" fill="hold">
+                      <p:stCondLst>
+                        <p:cond delay="indefinite"/>
+                      </p:stCondLst>
+                      <p:childTnLst>
+                        <p:par>
+                          <p:cTn id="4" fill="hold">
+                            <p:stCondLst>
+                              <p:cond delay="0"/>
+                            </p:stCondLst>
+                            <p:childTnLst>
+                              <p:par>
+                                <p:cTn id="5" presetID="1" presetClass="entr" presetSubtype="0" fill="hold" grpId="0" nodeType="clickEffect">
+                                  <p:stCondLst>
+                                    <p:cond delay="0"/>
+                                  </p:stCondLst>
+                                  <p:childTnLst>
+                                    <p:set>
+                                      <p:cBhvr>
+                                        <p:cTn id="6" dur="1" fill="hold">
+                                          <p:stCondLst>
+                                            <p:cond delay="0"/>
+                                          </p:stCondLst>
+                                        </p:cTn>
+                                        <p:tgtEl>
+                                          <p:spTgt spid="54"/>
+                                        </p:tgtEl>
+                                        <p:attrNameLst>
+                                          <p:attrName>style.visibility</p:attrName>
+                                        </p:attrNameLst>
+                                      </p:cBhvr>
+                                      <p:to>
+                                        <p:strVal val="visible"/>
+                                      </p:to>
+                                    </p:set>
+                                  </p:childTnLst>
+                                </p:cTn>
+                              </p:par>
+                              <p:par>
+                                <p:cTn id="7" presetID="1" presetClass="entr" presetSubtype="0" fill="hold" nodeType="withEffect">
+                                  <p:stCondLst>
+                                    <p:cond delay="0"/>
+                                  </p:stCondLst>
+                                  <p:childTnLst>
+                                    <p:set>
+                                      <p:cBhvr>
+                                        <p:cTn id="8" dur="1" fill="hold">
+                                          <p:stCondLst>
+                                            <p:cond delay="0"/>
+                                          </p:stCondLst>
+                                        </p:cTn>
+                                        <p:tgtEl>
+                                          <p:spTgt spid="14"/>
+                                        </p:tgtEl>
+                                        <p:attrNameLst>
+                                          <p:attrName>style.visibility</p:attrName>
+                                        </p:attrNameLst>
+                                      </p:cBhvr>
+                                      <p:to>
+                                        <p:strVal val="visible"/>
+                                      </p:to>
+                                    </p:set>
+                                  </p:childTnLst>
+                                </p:cTn>
+                              </p:par>
+                            </p:childTnLst>
+                          </p:cTn>
+                        </p:par>
+                      </p:childTnLst>
+                    </p:cTn>
+                  </p:par>
+                  <p:par>
+                    <p:cTn id="9" fill="hold">
+                      <p:stCondLst>
+                        <p:cond delay="indefinite"/>
+                      </p:stCondLst>
+                      <p:childTnLst>
+                        <p:par>
+                          <p:cTn id="10" fill="hold">
+                            <p:stCondLst>
+                              <p:cond delay="0"/>
+                            </p:stCondLst>
+                            <p:childTnLst>
+                              <p:par>
+                                <p:cTn id="11" presetID="1" presetClass="entr" presetSubtype="0" fill="hold" grpId="0" nodeType="clickEffect">
+                                  <p:stCondLst>
+                                    <p:cond delay="0"/>
+                                  </p:stCondLst>
+                                  <p:childTnLst>
+                                    <p:set>
+                                      <p:cBhvr>
+                                        <p:cTn id="12" dur="1" fill="hold">
+                                          <p:stCondLst>
+                                            <p:cond delay="0"/>
+                                          </p:stCondLst>
+                                        </p:cTn>
+                                        <p:tgtEl>
+                                          <p:spTgt spid="10"/>
+                                        </p:tgtEl>
+                                        <p:attrNameLst>
+                                          <p:attrName>style.visibility</p:attrName>
+                                        </p:attrNameLst>
+                                      </p:cBhvr>
+                                      <p:to>
+                                        <p:strVal val="visible"/>
+                                      </p:to>
+                                    </p:set>
+                                  </p:childTnLst>
+                                </p:cTn>
+                              </p:par>
+                              <p:par>
+                                <p:cTn id="13" presetID="1" presetClass="entr" presetSubtype="0" fill="hold" nodeType="withEffect">
+                                  <p:stCondLst>
+                                    <p:cond delay="0"/>
+                                  </p:stCondLst>
+                                  <p:childTnLst>
+                                    <p:set>
+                                      <p:cBhvr>
+                                        <p:cTn id="14" dur="1" fill="hold">
+                                          <p:stCondLst>
+                                            <p:cond delay="0"/>
+                                          </p:stCondLst>
+                                        </p:cTn>
+                                        <p:tgtEl>
+                                          <p:spTgt spid="15"/>
+                                        </p:tgtEl>
+                                        <p:attrNameLst>
+                                          <p:attrName>style.visibility</p:attrName>
+                                        </p:attrNameLst>
+                                      </p:cBhvr>
+                                      <p:to>
+                                        <p:strVal val="visible"/>
+                                      </p:to>
+                                    </p:set>
+                                  </p:childTnLst>
+                                </p:cTn>
+                              </p:par>
+                            </p:childTnLst>
+                          </p:cTn>
+                        </p:par>
+                      </p:childTnLst>
+                    </p:cTn>
+                  </p:par>
+                </p:childTnLst>
+              </p:cTn>
+              <p:prevCondLst>
+                <p:cond evt="onPrev" delay="0">
+                  <p:tgtEl>
+                    <p:sldTgt/>
+                  </p:tgtEl>
+                </p:cond>
+              </p:prevCondLst>
+              <p:nextCondLst>
+                <p:cond evt="onNext" delay="0">
+                  <p:tgtEl>
+                    <p:sldTgt/>
+                  </p:tgtEl>
+                </p:cond>
+              </p:nextCondLst>
+            </p:seq>
+          </p:childTnLst>
+        </p:cTn>
+      </p:par>
+    </p:tnLst>
+    <p:bldLst>
+      <p:bldP spid="10" grpId="0"/>
+      <p:bldP spid="54" grpId="0"/>
+    </p:bldLst>
+  </p:timing>
 </p:sld>
 </file>
 
@@ -17952,7 +18319,9 @@
             <a:r>
               <a:rPr lang="en-US" dirty="0">
                 <a:solidFill>
-                  <a:srgbClr val="4EC9B0"/>
+                  <a:schemeClr val="tx1">
+                    <a:lumMod val="85000"/>
+                  </a:schemeClr>
                 </a:solidFill>
                 <a:latin typeface="Menlo" panose="020B0609030804020204" pitchFamily="49" charset="0"/>
               </a:rPr>
@@ -18708,6 +19077,288 @@
   <p:clrMapOvr>
     <a:masterClrMapping/>
   </p:clrMapOvr>
+  <p:timing>
+    <p:tnLst>
+      <p:par>
+        <p:cTn id="1" dur="indefinite" restart="never" nodeType="tmRoot">
+          <p:childTnLst>
+            <p:seq concurrent="1" nextAc="seek">
+              <p:cTn id="2" dur="indefinite" nodeType="mainSeq">
+                <p:childTnLst>
+                  <p:par>
+                    <p:cTn id="3" fill="hold">
+                      <p:stCondLst>
+                        <p:cond delay="indefinite"/>
+                      </p:stCondLst>
+                      <p:childTnLst>
+                        <p:par>
+                          <p:cTn id="4" fill="hold">
+                            <p:stCondLst>
+                              <p:cond delay="0"/>
+                            </p:stCondLst>
+                            <p:childTnLst>
+                              <p:par>
+                                <p:cTn id="5" presetID="1" presetClass="entr" presetSubtype="0" fill="hold" grpId="0" nodeType="clickEffect">
+                                  <p:stCondLst>
+                                    <p:cond delay="0"/>
+                                  </p:stCondLst>
+                                  <p:childTnLst>
+                                    <p:set>
+                                      <p:cBhvr>
+                                        <p:cTn id="6" dur="1" fill="hold">
+                                          <p:stCondLst>
+                                            <p:cond delay="0"/>
+                                          </p:stCondLst>
+                                        </p:cTn>
+                                        <p:tgtEl>
+                                          <p:spTgt spid="18"/>
+                                        </p:tgtEl>
+                                        <p:attrNameLst>
+                                          <p:attrName>style.visibility</p:attrName>
+                                        </p:attrNameLst>
+                                      </p:cBhvr>
+                                      <p:to>
+                                        <p:strVal val="visible"/>
+                                      </p:to>
+                                    </p:set>
+                                  </p:childTnLst>
+                                </p:cTn>
+                              </p:par>
+                              <p:par>
+                                <p:cTn id="7" presetID="1" presetClass="entr" presetSubtype="0" fill="hold" grpId="0" nodeType="withEffect">
+                                  <p:stCondLst>
+                                    <p:cond delay="0"/>
+                                  </p:stCondLst>
+                                  <p:childTnLst>
+                                    <p:set>
+                                      <p:cBhvr>
+                                        <p:cTn id="8" dur="1" fill="hold">
+                                          <p:stCondLst>
+                                            <p:cond delay="0"/>
+                                          </p:stCondLst>
+                                        </p:cTn>
+                                        <p:tgtEl>
+                                          <p:spTgt spid="17"/>
+                                        </p:tgtEl>
+                                        <p:attrNameLst>
+                                          <p:attrName>style.visibility</p:attrName>
+                                        </p:attrNameLst>
+                                      </p:cBhvr>
+                                      <p:to>
+                                        <p:strVal val="visible"/>
+                                      </p:to>
+                                    </p:set>
+                                  </p:childTnLst>
+                                </p:cTn>
+                              </p:par>
+                              <p:par>
+                                <p:cTn id="9" presetID="1" presetClass="entr" presetSubtype="0" fill="hold" grpId="0" nodeType="withEffect">
+                                  <p:stCondLst>
+                                    <p:cond delay="0"/>
+                                  </p:stCondLst>
+                                  <p:childTnLst>
+                                    <p:set>
+                                      <p:cBhvr>
+                                        <p:cTn id="10" dur="1" fill="hold">
+                                          <p:stCondLst>
+                                            <p:cond delay="0"/>
+                                          </p:stCondLst>
+                                        </p:cTn>
+                                        <p:tgtEl>
+                                          <p:spTgt spid="23"/>
+                                        </p:tgtEl>
+                                        <p:attrNameLst>
+                                          <p:attrName>style.visibility</p:attrName>
+                                        </p:attrNameLst>
+                                      </p:cBhvr>
+                                      <p:to>
+                                        <p:strVal val="visible"/>
+                                      </p:to>
+                                    </p:set>
+                                  </p:childTnLst>
+                                </p:cTn>
+                              </p:par>
+                            </p:childTnLst>
+                          </p:cTn>
+                        </p:par>
+                      </p:childTnLst>
+                    </p:cTn>
+                  </p:par>
+                  <p:par>
+                    <p:cTn id="11" fill="hold">
+                      <p:stCondLst>
+                        <p:cond delay="indefinite"/>
+                      </p:stCondLst>
+                      <p:childTnLst>
+                        <p:par>
+                          <p:cTn id="12" fill="hold">
+                            <p:stCondLst>
+                              <p:cond delay="0"/>
+                            </p:stCondLst>
+                            <p:childTnLst>
+                              <p:par>
+                                <p:cTn id="13" presetID="1" presetClass="entr" presetSubtype="0" fill="hold" grpId="0" nodeType="clickEffect">
+                                  <p:stCondLst>
+                                    <p:cond delay="0"/>
+                                  </p:stCondLst>
+                                  <p:childTnLst>
+                                    <p:set>
+                                      <p:cBhvr>
+                                        <p:cTn id="14" dur="1" fill="hold">
+                                          <p:stCondLst>
+                                            <p:cond delay="0"/>
+                                          </p:stCondLst>
+                                        </p:cTn>
+                                        <p:tgtEl>
+                                          <p:spTgt spid="20"/>
+                                        </p:tgtEl>
+                                        <p:attrNameLst>
+                                          <p:attrName>style.visibility</p:attrName>
+                                        </p:attrNameLst>
+                                      </p:cBhvr>
+                                      <p:to>
+                                        <p:strVal val="visible"/>
+                                      </p:to>
+                                    </p:set>
+                                  </p:childTnLst>
+                                </p:cTn>
+                              </p:par>
+                              <p:par>
+                                <p:cTn id="15" presetID="1" presetClass="entr" presetSubtype="0" fill="hold" grpId="0" nodeType="withEffect">
+                                  <p:stCondLst>
+                                    <p:cond delay="0"/>
+                                  </p:stCondLst>
+                                  <p:childTnLst>
+                                    <p:set>
+                                      <p:cBhvr>
+                                        <p:cTn id="16" dur="1" fill="hold">
+                                          <p:stCondLst>
+                                            <p:cond delay="0"/>
+                                          </p:stCondLst>
+                                        </p:cTn>
+                                        <p:tgtEl>
+                                          <p:spTgt spid="19"/>
+                                        </p:tgtEl>
+                                        <p:attrNameLst>
+                                          <p:attrName>style.visibility</p:attrName>
+                                        </p:attrNameLst>
+                                      </p:cBhvr>
+                                      <p:to>
+                                        <p:strVal val="visible"/>
+                                      </p:to>
+                                    </p:set>
+                                  </p:childTnLst>
+                                </p:cTn>
+                              </p:par>
+                            </p:childTnLst>
+                          </p:cTn>
+                        </p:par>
+                      </p:childTnLst>
+                    </p:cTn>
+                  </p:par>
+                  <p:par>
+                    <p:cTn id="17" fill="hold">
+                      <p:stCondLst>
+                        <p:cond delay="indefinite"/>
+                      </p:stCondLst>
+                      <p:childTnLst>
+                        <p:par>
+                          <p:cTn id="18" fill="hold">
+                            <p:stCondLst>
+                              <p:cond delay="0"/>
+                            </p:stCondLst>
+                            <p:childTnLst>
+                              <p:par>
+                                <p:cTn id="19" presetID="1" presetClass="entr" presetSubtype="0" fill="hold" grpId="0" nodeType="clickEffect">
+                                  <p:stCondLst>
+                                    <p:cond delay="0"/>
+                                  </p:stCondLst>
+                                  <p:childTnLst>
+                                    <p:set>
+                                      <p:cBhvr>
+                                        <p:cTn id="20" dur="1" fill="hold">
+                                          <p:stCondLst>
+                                            <p:cond delay="0"/>
+                                          </p:stCondLst>
+                                        </p:cTn>
+                                        <p:tgtEl>
+                                          <p:spTgt spid="22"/>
+                                        </p:tgtEl>
+                                        <p:attrNameLst>
+                                          <p:attrName>style.visibility</p:attrName>
+                                        </p:attrNameLst>
+                                      </p:cBhvr>
+                                      <p:to>
+                                        <p:strVal val="visible"/>
+                                      </p:to>
+                                    </p:set>
+                                  </p:childTnLst>
+                                </p:cTn>
+                              </p:par>
+                              <p:par>
+                                <p:cTn id="21" presetID="1" presetClass="entr" presetSubtype="0" fill="hold" grpId="0" nodeType="withEffect">
+                                  <p:stCondLst>
+                                    <p:cond delay="0"/>
+                                  </p:stCondLst>
+                                  <p:childTnLst>
+                                    <p:set>
+                                      <p:cBhvr>
+                                        <p:cTn id="22" dur="1" fill="hold">
+                                          <p:stCondLst>
+                                            <p:cond delay="0"/>
+                                          </p:stCondLst>
+                                        </p:cTn>
+                                        <p:tgtEl>
+                                          <p:spTgt spid="21"/>
+                                        </p:tgtEl>
+                                        <p:attrNameLst>
+                                          <p:attrName>style.visibility</p:attrName>
+                                        </p:attrNameLst>
+                                      </p:cBhvr>
+                                      <p:to>
+                                        <p:strVal val="visible"/>
+                                      </p:to>
+                                    </p:set>
+                                  </p:childTnLst>
+                                </p:cTn>
+                              </p:par>
+                            </p:childTnLst>
+                          </p:cTn>
+                        </p:par>
+                      </p:childTnLst>
+                    </p:cTn>
+                  </p:par>
+                </p:childTnLst>
+              </p:cTn>
+              <p:prevCondLst>
+                <p:cond evt="onPrev" delay="0">
+                  <p:tgtEl>
+                    <p:sldTgt/>
+                  </p:tgtEl>
+                </p:cond>
+              </p:prevCondLst>
+              <p:nextCondLst>
+                <p:cond evt="onNext" delay="0">
+                  <p:tgtEl>
+                    <p:sldTgt/>
+                  </p:tgtEl>
+                </p:cond>
+              </p:nextCondLst>
+            </p:seq>
+          </p:childTnLst>
+        </p:cTn>
+      </p:par>
+    </p:tnLst>
+    <p:bldLst>
+      <p:bldP spid="17" grpId="0" animBg="1"/>
+      <p:bldP spid="18" grpId="0"/>
+      <p:bldP spid="19" grpId="0" animBg="1"/>
+      <p:bldP spid="20" grpId="0"/>
+      <p:bldP spid="21" grpId="0" animBg="1"/>
+      <p:bldP spid="22" grpId="0"/>
+      <p:bldP spid="23" grpId="0" animBg="1"/>
+    </p:bldLst>
+  </p:timing>
 </p:sld>
 </file>
 

</xml_diff>

<commit_message>
Add revisions from Keith
</commit_message>
<xml_diff>
--- a/presentation/syscon-2022.pptx
+++ b/presentation/syscon-2022.pptx
@@ -12,15 +12,15 @@
     <p:sldId id="260" r:id="rId3"/>
     <p:sldId id="261" r:id="rId4"/>
     <p:sldId id="262" r:id="rId5"/>
-    <p:sldId id="264" r:id="rId6"/>
-    <p:sldId id="265" r:id="rId7"/>
+    <p:sldId id="265" r:id="rId6"/>
+    <p:sldId id="264" r:id="rId7"/>
     <p:sldId id="266" r:id="rId8"/>
     <p:sldId id="270" r:id="rId9"/>
     <p:sldId id="279" r:id="rId10"/>
     <p:sldId id="271" r:id="rId11"/>
     <p:sldId id="280" r:id="rId12"/>
     <p:sldId id="273" r:id="rId13"/>
-    <p:sldId id="274" r:id="rId14"/>
+    <p:sldId id="285" r:id="rId14"/>
     <p:sldId id="269" r:id="rId15"/>
     <p:sldId id="275" r:id="rId16"/>
     <p:sldId id="276" r:id="rId17"/>
@@ -217,7 +217,7 @@
           <a:p>
             <a:fld id="{4F670BAA-F977-EB44-80DC-ADC002811BE9}" type="datetimeFigureOut">
               <a:rPr lang="en-US" smtClean="0"/>
-              <a:t>4/5/22</a:t>
+              <a:t>4/6/22</a:t>
             </a:fld>
             <a:endParaRPr lang="en-US"/>
           </a:p>
@@ -861,7 +861,7 @@
     </p:spTree>
     <p:extLst>
       <p:ext uri="{BB962C8B-B14F-4D97-AF65-F5344CB8AC3E}">
-        <p14:creationId xmlns:p14="http://schemas.microsoft.com/office/powerpoint/2010/main" val="1004781517"/>
+        <p14:creationId xmlns:p14="http://schemas.microsoft.com/office/powerpoint/2010/main" val="2308008410"/>
       </p:ext>
     </p:extLst>
   </p:cSld>
@@ -1257,7 +1257,37 @@
           <a:bodyPr/>
           <a:lstStyle/>
           <a:p>
+            <a:r>
+              <a:rPr lang="en-US" dirty="0"/>
+              <a:t>SPIN provided several counterexamples along the way to the final verification.</a:t>
+            </a:r>
+          </a:p>
+          <a:p>
             <a:endParaRPr lang="en-US" dirty="0"/>
+          </a:p>
+          <a:p>
+            <a:r>
+              <a:rPr lang="en-US" dirty="0"/>
+              <a:t>Sometimes the counter-examples revealed issues with the CWP definition of actionable risk awareness.</a:t>
+            </a:r>
+          </a:p>
+          <a:p>
+            <a:endParaRPr lang="en-US" dirty="0"/>
+          </a:p>
+          <a:p>
+            <a:r>
+              <a:rPr lang="en-US" dirty="0"/>
+              <a:t>Sometimes the counter-examples revealed issues with the system design to integrate human and machine reasoning for remote patient monitoring where the design did not maintain actionable risk awareness.</a:t>
+            </a:r>
+          </a:p>
+          <a:p>
+            <a:endParaRPr lang="en-US" dirty="0"/>
+          </a:p>
+          <a:p>
+            <a:r>
+              <a:rPr lang="en-US" dirty="0"/>
+              <a:t>None of the counterexamples were spotted by the designers manually.</a:t>
+            </a:r>
           </a:p>
         </p:txBody>
       </p:sp>
@@ -1454,8 +1484,38 @@
           <a:p>
             <a:r>
               <a:rPr lang="en-US" dirty="0"/>
-              <a:t>When thinking of functional integration, these differences in ability and performance challenge traditional methods such as … ASK KEITH FOR MORE HERE.</a:t>
-            </a:r>
+              <a:t>When thinking of functional integration, these differences in ability and performance challenge traditional methods.</a:t>
+            </a:r>
+          </a:p>
+          <a:p>
+            <a:endParaRPr lang="en-US" dirty="0"/>
+          </a:p>
+          <a:p>
+            <a:r>
+              <a:rPr lang="en-US" dirty="0"/>
+              <a:t>Conventional methods are event sequence diagrams and use cases. These do not directly address decisions, and they do not specify the behavior of the entire system. These are just a set of scenarios. They don’t address integrating these scenarios.</a:t>
+            </a:r>
+          </a:p>
+          <a:p>
+            <a:endParaRPr lang="en-US" dirty="0"/>
+          </a:p>
+          <a:p>
+            <a:r>
+              <a:rPr lang="en-US" dirty="0"/>
+              <a:t>Other conventional methods focus of appropriate responsibility assignments. Assignments are not integration.</a:t>
+            </a:r>
+          </a:p>
+          <a:p>
+            <a:endParaRPr lang="en-US" dirty="0"/>
+          </a:p>
+          <a:p>
+            <a:r>
+              <a:rPr lang="en-US" dirty="0"/>
+              <a:t>UML sequence charts are not functional integration. Who-should-do-what is not integration either. </a:t>
+            </a:r>
+          </a:p>
+          <a:p>
+            <a:endParaRPr lang="en-US" dirty="0"/>
           </a:p>
         </p:txBody>
       </p:sp>
@@ -1638,6 +1698,44 @@
           <a:bodyPr/>
           <a:lstStyle/>
           <a:p>
+            <a:r>
+              <a:rPr lang="en-US" dirty="0"/>
+              <a:t>Complex, distributed, asynchronous and safety-critical</a:t>
+            </a:r>
+          </a:p>
+          <a:p>
+            <a:r>
+              <a:rPr lang="en-US" dirty="0"/>
+              <a:t>Patent-pending</a:t>
+            </a:r>
+            <a:r>
+              <a:rPr lang="en-US" baseline="0" dirty="0"/>
+              <a:t> technology for a single finger-clip to capture 7 major vital signs in a single 60-90 second session.</a:t>
+            </a:r>
+          </a:p>
+          <a:p>
+            <a:r>
+              <a:rPr lang="en-US" baseline="0" dirty="0"/>
+              <a:t>The clip sends data to a smart phone app to relay to the AI Cloud Server, where numerical values are assigned and time trends analyzed.</a:t>
+            </a:r>
+          </a:p>
+          <a:p>
+            <a:r>
+              <a:rPr lang="en-US" baseline="0" dirty="0"/>
+              <a:t>An alert is generated if changes in vitals exceed healthy limits.</a:t>
+            </a:r>
+          </a:p>
+          <a:p>
+            <a:r>
+              <a:rPr lang="en-US" baseline="0" dirty="0"/>
+              <a:t>Doctors or nurses can monitor the patient’s vitals remotely with a special web app. The app prioritizes the patients with alerts, and the data of an alert can be reviewed with one click.</a:t>
+            </a:r>
+          </a:p>
+          <a:p>
+            <a:r>
+              <a:rPr lang="en-US" baseline="0" dirty="0"/>
+              <a:t> </a:t>
+            </a:r>
             <a:endParaRPr lang="en-US" dirty="0"/>
           </a:p>
         </p:txBody>
@@ -1668,7 +1766,7 @@
     </p:spTree>
     <p:extLst>
       <p:ext uri="{BB962C8B-B14F-4D97-AF65-F5344CB8AC3E}">
-        <p14:creationId xmlns:p14="http://schemas.microsoft.com/office/powerpoint/2010/main" val="1304413766"/>
+        <p14:creationId xmlns:p14="http://schemas.microsoft.com/office/powerpoint/2010/main" val="1908142626"/>
       </p:ext>
     </p:extLst>
   </p:cSld>
@@ -1722,6 +1820,37 @@
           <a:bodyPr/>
           <a:lstStyle/>
           <a:p>
+            <a:r>
+              <a:rPr lang="en-US" dirty="0"/>
+              <a:t>We distinguish between WHAT a system must</a:t>
+            </a:r>
+            <a:r>
+              <a:rPr lang="en-US" baseline="0" dirty="0"/>
+              <a:t> accomplish vs HOW it will do it.</a:t>
+            </a:r>
+          </a:p>
+          <a:p>
+            <a:r>
+              <a:rPr lang="en-US" baseline="0" dirty="0"/>
+              <a:t>Graphical standards were used to include doctors and other SMEs to participate and critique design</a:t>
+            </a:r>
+          </a:p>
+          <a:p>
+            <a:r>
+              <a:rPr lang="en-US" baseline="0" dirty="0"/>
+              <a:t>The graphs must be translated for formal model-checking. UML state machines to LTL and BPMN to </a:t>
+            </a:r>
+            <a:r>
+              <a:rPr lang="en-US" baseline="0" dirty="0" err="1"/>
+              <a:t>Promela</a:t>
+            </a:r>
+            <a:r>
+              <a:rPr lang="en-US" baseline="0" dirty="0"/>
+              <a:t>.</a:t>
+            </a:r>
+            <a:endParaRPr lang="en-US" dirty="0"/>
+          </a:p>
+          <a:p>
             <a:endParaRPr lang="en-US" dirty="0"/>
           </a:p>
         </p:txBody>
@@ -1752,7 +1881,7 @@
     </p:spTree>
     <p:extLst>
       <p:ext uri="{BB962C8B-B14F-4D97-AF65-F5344CB8AC3E}">
-        <p14:creationId xmlns:p14="http://schemas.microsoft.com/office/powerpoint/2010/main" val="1908142626"/>
+        <p14:creationId xmlns:p14="http://schemas.microsoft.com/office/powerpoint/2010/main" val="1304413766"/>
       </p:ext>
     </p:extLst>
   </p:cSld>
@@ -2273,7 +2402,7 @@
           <a:p>
             <a:fld id="{BF29B9AB-6859-C043-A124-7604E53B39CA}" type="datetimeFigureOut">
               <a:rPr lang="en-US" smtClean="0"/>
-              <a:t>4/5/22</a:t>
+              <a:t>4/6/22</a:t>
             </a:fld>
             <a:endParaRPr lang="en-US"/>
           </a:p>
@@ -2443,7 +2572,7 @@
           <a:p>
             <a:fld id="{BF29B9AB-6859-C043-A124-7604E53B39CA}" type="datetimeFigureOut">
               <a:rPr lang="en-US" smtClean="0"/>
-              <a:t>4/5/22</a:t>
+              <a:t>4/6/22</a:t>
             </a:fld>
             <a:endParaRPr lang="en-US"/>
           </a:p>
@@ -2623,7 +2752,7 @@
           <a:p>
             <a:fld id="{BF29B9AB-6859-C043-A124-7604E53B39CA}" type="datetimeFigureOut">
               <a:rPr lang="en-US" smtClean="0"/>
-              <a:t>4/5/22</a:t>
+              <a:t>4/6/22</a:t>
             </a:fld>
             <a:endParaRPr lang="en-US"/>
           </a:p>
@@ -2793,7 +2922,7 @@
           <a:p>
             <a:fld id="{BF29B9AB-6859-C043-A124-7604E53B39CA}" type="datetimeFigureOut">
               <a:rPr lang="en-US" smtClean="0"/>
-              <a:t>4/5/22</a:t>
+              <a:t>4/6/22</a:t>
             </a:fld>
             <a:endParaRPr lang="en-US"/>
           </a:p>
@@ -3039,7 +3168,7 @@
           <a:p>
             <a:fld id="{BF29B9AB-6859-C043-A124-7604E53B39CA}" type="datetimeFigureOut">
               <a:rPr lang="en-US" smtClean="0"/>
-              <a:t>4/5/22</a:t>
+              <a:t>4/6/22</a:t>
             </a:fld>
             <a:endParaRPr lang="en-US"/>
           </a:p>
@@ -3271,7 +3400,7 @@
           <a:p>
             <a:fld id="{BF29B9AB-6859-C043-A124-7604E53B39CA}" type="datetimeFigureOut">
               <a:rPr lang="en-US" smtClean="0"/>
-              <a:t>4/5/22</a:t>
+              <a:t>4/6/22</a:t>
             </a:fld>
             <a:endParaRPr lang="en-US"/>
           </a:p>
@@ -3638,7 +3767,7 @@
           <a:p>
             <a:fld id="{BF29B9AB-6859-C043-A124-7604E53B39CA}" type="datetimeFigureOut">
               <a:rPr lang="en-US" smtClean="0"/>
-              <a:t>4/5/22</a:t>
+              <a:t>4/6/22</a:t>
             </a:fld>
             <a:endParaRPr lang="en-US"/>
           </a:p>
@@ -3756,7 +3885,7 @@
           <a:p>
             <a:fld id="{BF29B9AB-6859-C043-A124-7604E53B39CA}" type="datetimeFigureOut">
               <a:rPr lang="en-US" smtClean="0"/>
-              <a:t>4/5/22</a:t>
+              <a:t>4/6/22</a:t>
             </a:fld>
             <a:endParaRPr lang="en-US"/>
           </a:p>
@@ -3851,7 +3980,7 @@
           <a:p>
             <a:fld id="{BF29B9AB-6859-C043-A124-7604E53B39CA}" type="datetimeFigureOut">
               <a:rPr lang="en-US" smtClean="0"/>
-              <a:t>4/5/22</a:t>
+              <a:t>4/6/22</a:t>
             </a:fld>
             <a:endParaRPr lang="en-US"/>
           </a:p>
@@ -4128,7 +4257,7 @@
           <a:p>
             <a:fld id="{BF29B9AB-6859-C043-A124-7604E53B39CA}" type="datetimeFigureOut">
               <a:rPr lang="en-US" smtClean="0"/>
-              <a:t>4/5/22</a:t>
+              <a:t>4/6/22</a:t>
             </a:fld>
             <a:endParaRPr lang="en-US"/>
           </a:p>
@@ -4385,7 +4514,7 @@
           <a:p>
             <a:fld id="{BF29B9AB-6859-C043-A124-7604E53B39CA}" type="datetimeFigureOut">
               <a:rPr lang="en-US" smtClean="0"/>
-              <a:t>4/5/22</a:t>
+              <a:t>4/6/22</a:t>
             </a:fld>
             <a:endParaRPr lang="en-US"/>
           </a:p>
@@ -4598,7 +4727,7 @@
           <a:p>
             <a:fld id="{BF29B9AB-6859-C043-A124-7604E53B39CA}" type="datetimeFigureOut">
               <a:rPr lang="en-US" smtClean="0"/>
-              <a:t>4/5/22</a:t>
+              <a:t>4/6/22</a:t>
             </a:fld>
             <a:endParaRPr lang="en-US"/>
           </a:p>
@@ -5331,6 +5460,10 @@
           <a:lstStyle/>
           <a:p>
             <a:r>
+              <a:rPr lang="en-US" dirty="0"/>
+              <a:t>1. </a:t>
+            </a:r>
+            <a:r>
               <a:rPr lang="en-US" kern="1200" dirty="0">
                 <a:solidFill>
                   <a:schemeClr val="tx1"/>
@@ -5339,7 +5472,7 @@
                 <a:ea typeface="+mj-ea"/>
                 <a:cs typeface="+mj-cs"/>
               </a:rPr>
-              <a:t>CWP States</a:t>
+              <a:t>State: definitions</a:t>
             </a:r>
           </a:p>
         </p:txBody>
@@ -5599,8 +5732,8 @@
           </a:prstGeom>
         </p:spPr>
       </p:pic>
-      <mc:AlternateContent xmlns:mc="http://schemas.openxmlformats.org/markup-compatibility/2006">
-        <mc:Choice xmlns:a14="http://schemas.microsoft.com/office/drawing/2010/main" Requires="a14">
+      <mc:AlternateContent xmlns:mc="http://schemas.openxmlformats.org/markup-compatibility/2006" xmlns:a14="http://schemas.microsoft.com/office/drawing/2010/main">
+        <mc:Choice Requires="a14">
           <p:sp>
             <p:nvSpPr>
               <p:cNvPr id="11" name="Rectangle 10">
@@ -5725,7 +5858,7 @@
             </p:txBody>
           </p:sp>
         </mc:Choice>
-        <mc:Fallback>
+        <mc:Fallback xmlns="">
           <p:sp>
             <p:nvSpPr>
               <p:cNvPr id="11" name="Rectangle 10">
@@ -5868,6 +6001,46 @@
           </a:p>
         </p:txBody>
       </p:sp>
+      <p:sp>
+        <p:nvSpPr>
+          <p:cNvPr id="13" name="Rectangle 12">
+            <a:extLst>
+              <a:ext uri="{FF2B5EF4-FFF2-40B4-BE49-F238E27FC236}">
+                <a16:creationId xmlns:a16="http://schemas.microsoft.com/office/drawing/2014/main" id="{B509602C-0C41-1040-A754-DB9EA114331E}"/>
+              </a:ext>
+            </a:extLst>
+          </p:cNvPr>
+          <p:cNvSpPr/>
+          <p:nvPr/>
+        </p:nvSpPr>
+        <p:spPr>
+          <a:xfrm>
+            <a:off x="7362488" y="550050"/>
+            <a:ext cx="3559974" cy="646331"/>
+          </a:xfrm>
+          <a:prstGeom prst="rect">
+            <a:avLst/>
+          </a:prstGeom>
+        </p:spPr>
+        <p:txBody>
+          <a:bodyPr wrap="square">
+            <a:spAutoFit/>
+          </a:bodyPr>
+          <a:lstStyle/>
+          <a:p>
+            <a:pPr algn="ctr"/>
+            <a:r>
+              <a:rPr lang="en-US" dirty="0">
+                <a:solidFill>
+                  <a:schemeClr val="accent5"/>
+                </a:solidFill>
+              </a:rPr>
+              <a:t>Actionable Risk Awareness in Remote Patient Monitoring</a:t>
+            </a:r>
+            <a:endParaRPr lang="en-US" dirty="0"/>
+          </a:p>
+        </p:txBody>
+      </p:sp>
     </p:spTree>
     <p:extLst>
       <p:ext uri="{BB962C8B-B14F-4D97-AF65-F5344CB8AC3E}">
@@ -5936,7 +6109,7 @@
           <a:p>
             <a:r>
               <a:rPr lang="en-US" dirty="0"/>
-              <a:t>Global Properties</a:t>
+              <a:t>2. Global Properties</a:t>
             </a:r>
             <a:endParaRPr lang="en-US" kern="1200" dirty="0">
               <a:solidFill>
@@ -6192,7 +6365,7 @@
         </p:nvSpPr>
         <p:spPr>
           <a:xfrm>
-            <a:off x="10033026" y="981459"/>
+            <a:off x="10351922" y="1529122"/>
             <a:ext cx="425303" cy="414376"/>
           </a:xfrm>
           <a:prstGeom prst="ellipse">
@@ -6492,8 +6665,8 @@
             <a:chExt cx="3833936" cy="1119963"/>
           </a:xfrm>
         </p:grpSpPr>
-        <mc:AlternateContent xmlns:mc="http://schemas.openxmlformats.org/markup-compatibility/2006">
-          <mc:Choice xmlns:a14="http://schemas.microsoft.com/office/drawing/2010/main" Requires="a14">
+        <mc:AlternateContent xmlns:mc="http://schemas.openxmlformats.org/markup-compatibility/2006" xmlns:a14="http://schemas.microsoft.com/office/drawing/2010/main">
+          <mc:Choice Requires="a14">
             <p:sp>
               <p:nvSpPr>
                 <p:cNvPr id="6" name="Rectangle 5">
@@ -6542,7 +6715,7 @@
               </p:txBody>
             </p:sp>
           </mc:Choice>
-          <mc:Fallback>
+          <mc:Fallback xmlns="">
             <p:sp>
               <p:nvSpPr>
                 <p:cNvPr id="6" name="Rectangle 5">
@@ -6587,8 +6760,8 @@
             </p:sp>
           </mc:Fallback>
         </mc:AlternateContent>
-        <mc:AlternateContent xmlns:mc="http://schemas.openxmlformats.org/markup-compatibility/2006">
-          <mc:Choice xmlns:a14="http://schemas.microsoft.com/office/drawing/2010/main" Requires="a14">
+        <mc:AlternateContent xmlns:mc="http://schemas.openxmlformats.org/markup-compatibility/2006" xmlns:a14="http://schemas.microsoft.com/office/drawing/2010/main">
+          <mc:Choice Requires="a14">
             <p:sp>
               <p:nvSpPr>
                 <p:cNvPr id="29" name="Rectangle 28">
@@ -6637,7 +6810,7 @@
               </p:txBody>
             </p:sp>
           </mc:Choice>
-          <mc:Fallback>
+          <mc:Fallback xmlns="">
             <p:sp>
               <p:nvSpPr>
                 <p:cNvPr id="29" name="Rectangle 28">
@@ -6682,8 +6855,8 @@
             </p:sp>
           </mc:Fallback>
         </mc:AlternateContent>
-        <mc:AlternateContent xmlns:mc="http://schemas.openxmlformats.org/markup-compatibility/2006">
-          <mc:Choice xmlns:a14="http://schemas.microsoft.com/office/drawing/2010/main" Requires="a14">
+        <mc:AlternateContent xmlns:mc="http://schemas.openxmlformats.org/markup-compatibility/2006" xmlns:a14="http://schemas.microsoft.com/office/drawing/2010/main">
+          <mc:Choice Requires="a14">
             <p:sp>
               <p:nvSpPr>
                 <p:cNvPr id="30" name="Rectangle 29">
@@ -6732,7 +6905,7 @@
               </p:txBody>
             </p:sp>
           </mc:Choice>
-          <mc:Fallback>
+          <mc:Fallback xmlns="">
             <p:sp>
               <p:nvSpPr>
                 <p:cNvPr id="30" name="Rectangle 29">
@@ -6777,8 +6950,8 @@
             </p:sp>
           </mc:Fallback>
         </mc:AlternateContent>
-        <mc:AlternateContent xmlns:mc="http://schemas.openxmlformats.org/markup-compatibility/2006">
-          <mc:Choice xmlns:a14="http://schemas.microsoft.com/office/drawing/2010/main" Requires="a14">
+        <mc:AlternateContent xmlns:mc="http://schemas.openxmlformats.org/markup-compatibility/2006" xmlns:a14="http://schemas.microsoft.com/office/drawing/2010/main">
+          <mc:Choice Requires="a14">
             <p:sp>
               <p:nvSpPr>
                 <p:cNvPr id="31" name="Rectangle 30">
@@ -6827,7 +7000,7 @@
               </p:txBody>
             </p:sp>
           </mc:Choice>
-          <mc:Fallback>
+          <mc:Fallback xmlns="">
             <p:sp>
               <p:nvSpPr>
                 <p:cNvPr id="31" name="Rectangle 30">
@@ -6872,8 +7045,8 @@
             </p:sp>
           </mc:Fallback>
         </mc:AlternateContent>
-        <mc:AlternateContent xmlns:mc="http://schemas.openxmlformats.org/markup-compatibility/2006">
-          <mc:Choice xmlns:a14="http://schemas.microsoft.com/office/drawing/2010/main" Requires="a14">
+        <mc:AlternateContent xmlns:mc="http://schemas.openxmlformats.org/markup-compatibility/2006" xmlns:a14="http://schemas.microsoft.com/office/drawing/2010/main">
+          <mc:Choice Requires="a14">
             <p:sp>
               <p:nvSpPr>
                 <p:cNvPr id="32" name="Rectangle 31">
@@ -6922,7 +7095,7 @@
               </p:txBody>
             </p:sp>
           </mc:Choice>
-          <mc:Fallback>
+          <mc:Fallback xmlns="">
             <p:sp>
               <p:nvSpPr>
                 <p:cNvPr id="32" name="Rectangle 31">
@@ -7360,15 +7533,15 @@
         </p:nvSpPr>
         <p:spPr>
           <a:xfrm>
-            <a:off x="386066" y="2214540"/>
-            <a:ext cx="5406416" cy="424732"/>
+            <a:off x="-6100" y="1982755"/>
+            <a:ext cx="6099050" cy="757130"/>
           </a:xfrm>
           <a:prstGeom prst="rect">
             <a:avLst/>
           </a:prstGeom>
         </p:spPr>
         <p:txBody>
-          <a:bodyPr wrap="none">
+          <a:bodyPr wrap="square">
             <a:spAutoFit/>
           </a:bodyPr>
           <a:lstStyle/>
@@ -7385,7 +7558,7 @@
               <a:rPr lang="en-US" sz="2400" dirty="0">
                 <a:latin typeface="Cambria Math" panose="02040503050406030204" pitchFamily="18" charset="0"/>
               </a:rPr>
-              <a:t>BPMN state covered by some CWP state</a:t>
+              <a:t>The system design state, when mapped to the UML state variables, is always in a state</a:t>
             </a:r>
           </a:p>
         </p:txBody>
@@ -7494,8 +7667,8 @@
             </a:p>
           </p:txBody>
         </p:sp>
-        <mc:AlternateContent xmlns:mc="http://schemas.openxmlformats.org/markup-compatibility/2006">
-          <mc:Choice xmlns:a14="http://schemas.microsoft.com/office/drawing/2010/main" Requires="a14">
+        <mc:AlternateContent xmlns:mc="http://schemas.openxmlformats.org/markup-compatibility/2006" xmlns:a14="http://schemas.microsoft.com/office/drawing/2010/main">
+          <mc:Choice Requires="a14">
             <p:sp>
               <p:nvSpPr>
                 <p:cNvPr id="48" name="Rectangle 47">
@@ -7544,7 +7717,7 @@
               </p:txBody>
             </p:sp>
           </mc:Choice>
-          <mc:Fallback>
+          <mc:Fallback xmlns="">
             <p:sp>
               <p:nvSpPr>
                 <p:cNvPr id="48" name="Rectangle 47">
@@ -7688,6 +7861,46 @@
           </p:txBody>
         </p:sp>
       </p:grpSp>
+      <p:sp>
+        <p:nvSpPr>
+          <p:cNvPr id="51" name="Rectangle 50">
+            <a:extLst>
+              <a:ext uri="{FF2B5EF4-FFF2-40B4-BE49-F238E27FC236}">
+                <a16:creationId xmlns:a16="http://schemas.microsoft.com/office/drawing/2014/main" id="{FA53A566-8144-3E4E-B1BD-E401588712FD}"/>
+              </a:ext>
+            </a:extLst>
+          </p:cNvPr>
+          <p:cNvSpPr/>
+          <p:nvPr/>
+        </p:nvSpPr>
+        <p:spPr>
+          <a:xfrm>
+            <a:off x="7362488" y="550050"/>
+            <a:ext cx="3559974" cy="646331"/>
+          </a:xfrm>
+          <a:prstGeom prst="rect">
+            <a:avLst/>
+          </a:prstGeom>
+        </p:spPr>
+        <p:txBody>
+          <a:bodyPr wrap="square">
+            <a:spAutoFit/>
+          </a:bodyPr>
+          <a:lstStyle/>
+          <a:p>
+            <a:pPr algn="ctr"/>
+            <a:r>
+              <a:rPr lang="en-US" dirty="0">
+                <a:solidFill>
+                  <a:schemeClr val="accent5"/>
+                </a:solidFill>
+              </a:rPr>
+              <a:t>Actionable Risk Awareness in Remote Patient Monitoring</a:t>
+            </a:r>
+            <a:endParaRPr lang="en-US" dirty="0"/>
+          </a:p>
+        </p:txBody>
+      </p:sp>
     </p:spTree>
     <p:extLst>
       <p:ext uri="{BB962C8B-B14F-4D97-AF65-F5344CB8AC3E}">
@@ -7861,7 +8074,7 @@
           <a:p>
             <a:r>
               <a:rPr lang="en-US" dirty="0"/>
-              <a:t>State Properties</a:t>
+              <a:t>3. State Properties</a:t>
             </a:r>
             <a:endParaRPr lang="en-US" kern="1200" dirty="0">
               <a:solidFill>
@@ -8085,55 +8298,6 @@
             <a:endParaRPr lang="en-US" sz="2400" b="0" dirty="0">
               <a:latin typeface="Cambria Math" panose="02040503050406030204" pitchFamily="18" charset="0"/>
             </a:endParaRPr>
-          </a:p>
-        </p:txBody>
-      </p:sp>
-      <p:sp>
-        <p:nvSpPr>
-          <p:cNvPr id="7" name="Oval 6">
-            <a:extLst>
-              <a:ext uri="{FF2B5EF4-FFF2-40B4-BE49-F238E27FC236}">
-                <a16:creationId xmlns:a16="http://schemas.microsoft.com/office/drawing/2014/main" id="{7C6A5C07-0483-5744-A5BB-00D79AE18B9F}"/>
-              </a:ext>
-            </a:extLst>
-          </p:cNvPr>
-          <p:cNvSpPr/>
-          <p:nvPr/>
-        </p:nvSpPr>
-        <p:spPr>
-          <a:xfrm>
-            <a:off x="10033026" y="981459"/>
-            <a:ext cx="425303" cy="414376"/>
-          </a:xfrm>
-          <a:prstGeom prst="ellipse">
-            <a:avLst/>
-          </a:prstGeom>
-        </p:spPr>
-        <p:style>
-          <a:lnRef idx="2">
-            <a:schemeClr val="accent4">
-              <a:shade val="50000"/>
-            </a:schemeClr>
-          </a:lnRef>
-          <a:fillRef idx="1">
-            <a:schemeClr val="accent4"/>
-          </a:fillRef>
-          <a:effectRef idx="0">
-            <a:schemeClr val="accent4"/>
-          </a:effectRef>
-          <a:fontRef idx="minor">
-            <a:schemeClr val="lt1"/>
-          </a:fontRef>
-        </p:style>
-        <p:txBody>
-          <a:bodyPr rtlCol="0" anchor="ctr"/>
-          <a:lstStyle/>
-          <a:p>
-            <a:pPr algn="ctr"/>
-            <a:r>
-              <a:rPr lang="en-US" sz="2400" dirty="0"/>
-              <a:t>1</a:t>
-            </a:r>
           </a:p>
         </p:txBody>
       </p:sp>
@@ -8590,8 +8754,8 @@
             </a:p>
           </p:txBody>
         </p:sp>
-        <mc:AlternateContent xmlns:mc="http://schemas.openxmlformats.org/markup-compatibility/2006">
-          <mc:Choice xmlns:a14="http://schemas.microsoft.com/office/drawing/2010/main" Requires="a14">
+        <mc:AlternateContent xmlns:mc="http://schemas.openxmlformats.org/markup-compatibility/2006" xmlns:a14="http://schemas.microsoft.com/office/drawing/2010/main">
+          <mc:Choice Requires="a14">
             <p:sp>
               <p:nvSpPr>
                 <p:cNvPr id="51" name="Rectangle 50">
@@ -8641,7 +8805,7 @@
               </p:txBody>
             </p:sp>
           </mc:Choice>
-          <mc:Fallback>
+          <mc:Fallback xmlns="">
             <p:sp>
               <p:nvSpPr>
                 <p:cNvPr id="51" name="Rectangle 50">
@@ -8686,8 +8850,8 @@
             </p:sp>
           </mc:Fallback>
         </mc:AlternateContent>
-        <mc:AlternateContent xmlns:mc="http://schemas.openxmlformats.org/markup-compatibility/2006">
-          <mc:Choice xmlns:a14="http://schemas.microsoft.com/office/drawing/2010/main" Requires="a14">
+        <mc:AlternateContent xmlns:mc="http://schemas.openxmlformats.org/markup-compatibility/2006" xmlns:a14="http://schemas.microsoft.com/office/drawing/2010/main">
+          <mc:Choice Requires="a14">
             <p:sp>
               <p:nvSpPr>
                 <p:cNvPr id="52" name="Rectangle 51">
@@ -8737,7 +8901,7 @@
               </p:txBody>
             </p:sp>
           </mc:Choice>
-          <mc:Fallback>
+          <mc:Fallback xmlns="">
             <p:sp>
               <p:nvSpPr>
                 <p:cNvPr id="52" name="Rectangle 51">
@@ -8980,8 +9144,8 @@
             </a:p>
           </p:txBody>
         </p:sp>
-        <mc:AlternateContent xmlns:mc="http://schemas.openxmlformats.org/markup-compatibility/2006">
-          <mc:Choice xmlns:a14="http://schemas.microsoft.com/office/drawing/2010/main" Requires="a14">
+        <mc:AlternateContent xmlns:mc="http://schemas.openxmlformats.org/markup-compatibility/2006" xmlns:a14="http://schemas.microsoft.com/office/drawing/2010/main">
+          <mc:Choice Requires="a14">
             <p:sp>
               <p:nvSpPr>
                 <p:cNvPr id="57" name="Rectangle 56">
@@ -9031,7 +9195,7 @@
               </p:txBody>
             </p:sp>
           </mc:Choice>
-          <mc:Fallback>
+          <mc:Fallback xmlns="">
             <p:sp>
               <p:nvSpPr>
                 <p:cNvPr id="57" name="Rectangle 56">
@@ -9120,8 +9284,8 @@
             </a:p>
           </p:txBody>
         </p:sp>
-        <mc:AlternateContent xmlns:mc="http://schemas.openxmlformats.org/markup-compatibility/2006">
-          <mc:Choice xmlns:a14="http://schemas.microsoft.com/office/drawing/2010/main" Requires="a14">
+        <mc:AlternateContent xmlns:mc="http://schemas.openxmlformats.org/markup-compatibility/2006" xmlns:a14="http://schemas.microsoft.com/office/drawing/2010/main">
+          <mc:Choice Requires="a14">
             <p:sp>
               <p:nvSpPr>
                 <p:cNvPr id="59" name="Rectangle 58">
@@ -9171,7 +9335,7 @@
               </p:txBody>
             </p:sp>
           </mc:Choice>
-          <mc:Fallback>
+          <mc:Fallback xmlns="">
             <p:sp>
               <p:nvSpPr>
                 <p:cNvPr id="59" name="Rectangle 58">
@@ -9216,8 +9380,8 @@
             </p:sp>
           </mc:Fallback>
         </mc:AlternateContent>
-        <mc:AlternateContent xmlns:mc="http://schemas.openxmlformats.org/markup-compatibility/2006">
-          <mc:Choice xmlns:a14="http://schemas.microsoft.com/office/drawing/2010/main" Requires="a14">
+        <mc:AlternateContent xmlns:mc="http://schemas.openxmlformats.org/markup-compatibility/2006" xmlns:a14="http://schemas.microsoft.com/office/drawing/2010/main">
+          <mc:Choice Requires="a14">
             <p:sp>
               <p:nvSpPr>
                 <p:cNvPr id="61" name="Rectangle 60">
@@ -9267,7 +9431,7 @@
               </p:txBody>
             </p:sp>
           </mc:Choice>
-          <mc:Fallback>
+          <mc:Fallback xmlns="">
             <p:sp>
               <p:nvSpPr>
                 <p:cNvPr id="61" name="Rectangle 60">
@@ -9312,8 +9476,8 @@
             </p:sp>
           </mc:Fallback>
         </mc:AlternateContent>
-        <mc:AlternateContent xmlns:mc="http://schemas.openxmlformats.org/markup-compatibility/2006">
-          <mc:Choice xmlns:a14="http://schemas.microsoft.com/office/drawing/2010/main" Requires="a14">
+        <mc:AlternateContent xmlns:mc="http://schemas.openxmlformats.org/markup-compatibility/2006" xmlns:a14="http://schemas.microsoft.com/office/drawing/2010/main">
+          <mc:Choice Requires="a14">
             <p:sp>
               <p:nvSpPr>
                 <p:cNvPr id="63" name="Rectangle 62">
@@ -9363,7 +9527,7 @@
               </p:txBody>
             </p:sp>
           </mc:Choice>
-          <mc:Fallback>
+          <mc:Fallback xmlns="">
             <p:sp>
               <p:nvSpPr>
                 <p:cNvPr id="63" name="Rectangle 62">
@@ -9702,8 +9866,8 @@
             </a:p>
           </p:txBody>
         </p:sp>
-        <mc:AlternateContent xmlns:mc="http://schemas.openxmlformats.org/markup-compatibility/2006">
-          <mc:Choice xmlns:a14="http://schemas.microsoft.com/office/drawing/2010/main" Requires="a14">
+        <mc:AlternateContent xmlns:mc="http://schemas.openxmlformats.org/markup-compatibility/2006" xmlns:a14="http://schemas.microsoft.com/office/drawing/2010/main">
+          <mc:Choice Requires="a14">
             <p:sp>
               <p:nvSpPr>
                 <p:cNvPr id="71" name="Rectangle 70">
@@ -9753,7 +9917,7 @@
               </p:txBody>
             </p:sp>
           </mc:Choice>
-          <mc:Fallback>
+          <mc:Fallback xmlns="">
             <p:sp>
               <p:nvSpPr>
                 <p:cNvPr id="71" name="Rectangle 70">
@@ -9798,8 +9962,8 @@
             </p:sp>
           </mc:Fallback>
         </mc:AlternateContent>
-        <mc:AlternateContent xmlns:mc="http://schemas.openxmlformats.org/markup-compatibility/2006">
-          <mc:Choice xmlns:a14="http://schemas.microsoft.com/office/drawing/2010/main" Requires="a14">
+        <mc:AlternateContent xmlns:mc="http://schemas.openxmlformats.org/markup-compatibility/2006" xmlns:a14="http://schemas.microsoft.com/office/drawing/2010/main">
+          <mc:Choice Requires="a14">
             <p:sp>
               <p:nvSpPr>
                 <p:cNvPr id="72" name="Rectangle 71">
@@ -9849,7 +10013,7 @@
               </p:txBody>
             </p:sp>
           </mc:Choice>
-          <mc:Fallback>
+          <mc:Fallback xmlns="">
             <p:sp>
               <p:nvSpPr>
                 <p:cNvPr id="72" name="Rectangle 71">
@@ -9894,8 +10058,8 @@
             </p:sp>
           </mc:Fallback>
         </mc:AlternateContent>
-        <mc:AlternateContent xmlns:mc="http://schemas.openxmlformats.org/markup-compatibility/2006">
-          <mc:Choice xmlns:a14="http://schemas.microsoft.com/office/drawing/2010/main" Requires="a14">
+        <mc:AlternateContent xmlns:mc="http://schemas.openxmlformats.org/markup-compatibility/2006" xmlns:a14="http://schemas.microsoft.com/office/drawing/2010/main">
+          <mc:Choice Requires="a14">
             <p:sp>
               <p:nvSpPr>
                 <p:cNvPr id="73" name="Rectangle 72">
@@ -9945,7 +10109,7 @@
               </p:txBody>
             </p:sp>
           </mc:Choice>
-          <mc:Fallback>
+          <mc:Fallback xmlns="">
             <p:sp>
               <p:nvSpPr>
                 <p:cNvPr id="73" name="Rectangle 72">
@@ -10184,8 +10348,8 @@
             </a:p>
           </p:txBody>
         </p:sp>
-        <mc:AlternateContent xmlns:mc="http://schemas.openxmlformats.org/markup-compatibility/2006">
-          <mc:Choice xmlns:a14="http://schemas.microsoft.com/office/drawing/2010/main" Requires="a14">
+        <mc:AlternateContent xmlns:mc="http://schemas.openxmlformats.org/markup-compatibility/2006" xmlns:a14="http://schemas.microsoft.com/office/drawing/2010/main">
+          <mc:Choice Requires="a14">
             <p:sp>
               <p:nvSpPr>
                 <p:cNvPr id="80" name="Rectangle 79">
@@ -10235,7 +10399,7 @@
               </p:txBody>
             </p:sp>
           </mc:Choice>
-          <mc:Fallback>
+          <mc:Fallback xmlns="">
             <p:sp>
               <p:nvSpPr>
                 <p:cNvPr id="80" name="Rectangle 79">
@@ -10324,8 +10488,8 @@
             </a:p>
           </p:txBody>
         </p:sp>
-        <mc:AlternateContent xmlns:mc="http://schemas.openxmlformats.org/markup-compatibility/2006">
-          <mc:Choice xmlns:a14="http://schemas.microsoft.com/office/drawing/2010/main" Requires="a14">
+        <mc:AlternateContent xmlns:mc="http://schemas.openxmlformats.org/markup-compatibility/2006" xmlns:a14="http://schemas.microsoft.com/office/drawing/2010/main">
+          <mc:Choice Requires="a14">
             <p:sp>
               <p:nvSpPr>
                 <p:cNvPr id="83" name="Rectangle 82">
@@ -10375,7 +10539,7 @@
               </p:txBody>
             </p:sp>
           </mc:Choice>
-          <mc:Fallback>
+          <mc:Fallback xmlns="">
             <p:sp>
               <p:nvSpPr>
                 <p:cNvPr id="83" name="Rectangle 82">
@@ -10509,8 +10673,8 @@
             </a:p>
           </p:txBody>
         </p:sp>
-        <mc:AlternateContent xmlns:mc="http://schemas.openxmlformats.org/markup-compatibility/2006">
-          <mc:Choice xmlns:a14="http://schemas.microsoft.com/office/drawing/2010/main" Requires="a14">
+        <mc:AlternateContent xmlns:mc="http://schemas.openxmlformats.org/markup-compatibility/2006" xmlns:a14="http://schemas.microsoft.com/office/drawing/2010/main">
+          <mc:Choice Requires="a14">
             <p:sp>
               <p:nvSpPr>
                 <p:cNvPr id="86" name="Rectangle 85">
@@ -10559,7 +10723,7 @@
               </p:txBody>
             </p:sp>
           </mc:Choice>
-          <mc:Fallback>
+          <mc:Fallback xmlns="">
             <p:sp>
               <p:nvSpPr>
                 <p:cNvPr id="86" name="Rectangle 85">
@@ -10791,6 +10955,95 @@
           </p:txBody>
         </p:sp>
       </p:grpSp>
+      <p:sp>
+        <p:nvSpPr>
+          <p:cNvPr id="60" name="Rectangle 59">
+            <a:extLst>
+              <a:ext uri="{FF2B5EF4-FFF2-40B4-BE49-F238E27FC236}">
+                <a16:creationId xmlns:a16="http://schemas.microsoft.com/office/drawing/2014/main" id="{EA39EF90-5052-9346-92F5-3ED1DBAA5F33}"/>
+              </a:ext>
+            </a:extLst>
+          </p:cNvPr>
+          <p:cNvSpPr/>
+          <p:nvPr/>
+        </p:nvSpPr>
+        <p:spPr>
+          <a:xfrm>
+            <a:off x="7362488" y="550050"/>
+            <a:ext cx="3559974" cy="646331"/>
+          </a:xfrm>
+          <a:prstGeom prst="rect">
+            <a:avLst/>
+          </a:prstGeom>
+        </p:spPr>
+        <p:txBody>
+          <a:bodyPr wrap="square">
+            <a:spAutoFit/>
+          </a:bodyPr>
+          <a:lstStyle/>
+          <a:p>
+            <a:pPr algn="ctr"/>
+            <a:r>
+              <a:rPr lang="en-US" dirty="0">
+                <a:solidFill>
+                  <a:schemeClr val="accent5"/>
+                </a:solidFill>
+              </a:rPr>
+              <a:t>Actionable Risk Awareness in Remote Patient Monitoring</a:t>
+            </a:r>
+            <a:endParaRPr lang="en-US" dirty="0"/>
+          </a:p>
+        </p:txBody>
+      </p:sp>
+      <p:sp>
+        <p:nvSpPr>
+          <p:cNvPr id="62" name="Oval 61">
+            <a:extLst>
+              <a:ext uri="{FF2B5EF4-FFF2-40B4-BE49-F238E27FC236}">
+                <a16:creationId xmlns:a16="http://schemas.microsoft.com/office/drawing/2014/main" id="{614153B0-6736-1547-920A-445DF8A4EAF8}"/>
+              </a:ext>
+            </a:extLst>
+          </p:cNvPr>
+          <p:cNvSpPr/>
+          <p:nvPr/>
+        </p:nvSpPr>
+        <p:spPr>
+          <a:xfrm>
+            <a:off x="10351922" y="1529122"/>
+            <a:ext cx="425303" cy="414376"/>
+          </a:xfrm>
+          <a:prstGeom prst="ellipse">
+            <a:avLst/>
+          </a:prstGeom>
+        </p:spPr>
+        <p:style>
+          <a:lnRef idx="2">
+            <a:schemeClr val="accent4">
+              <a:shade val="50000"/>
+            </a:schemeClr>
+          </a:lnRef>
+          <a:fillRef idx="1">
+            <a:schemeClr val="accent4"/>
+          </a:fillRef>
+          <a:effectRef idx="0">
+            <a:schemeClr val="accent4"/>
+          </a:effectRef>
+          <a:fontRef idx="minor">
+            <a:schemeClr val="lt1"/>
+          </a:fontRef>
+        </p:style>
+        <p:txBody>
+          <a:bodyPr rtlCol="0" anchor="ctr"/>
+          <a:lstStyle/>
+          <a:p>
+            <a:pPr algn="ctr"/>
+            <a:r>
+              <a:rPr lang="en-US" sz="2400" dirty="0"/>
+              <a:t>1</a:t>
+            </a:r>
+          </a:p>
+        </p:txBody>
+      </p:sp>
     </p:spTree>
     <p:extLst>
       <p:ext uri="{BB962C8B-B14F-4D97-AF65-F5344CB8AC3E}">
@@ -11022,7 +11275,7 @@
           <a:p>
             <a:r>
               <a:rPr lang="en-US" dirty="0"/>
-              <a:t>LTL for the CWP</a:t>
+              <a:t>UML Translation to Linear Temporal Logic</a:t>
             </a:r>
           </a:p>
         </p:txBody>
@@ -11071,7 +11324,7 @@
             <a:pPr algn="ctr"/>
             <a:r>
               <a:rPr lang="en-US" sz="2400" u="sng" dirty="0"/>
-              <a:t>CWP States</a:t>
+              <a:t>1. State</a:t>
             </a:r>
           </a:p>
           <a:p>
@@ -11085,7 +11338,7 @@
             </a:pPr>
             <a:r>
               <a:rPr lang="en-US" sz="2400" dirty="0"/>
-              <a:t>Conjunct inputs</a:t>
+              <a:t>Identify variables</a:t>
             </a:r>
           </a:p>
           <a:p>
@@ -11095,7 +11348,7 @@
             </a:pPr>
             <a:r>
               <a:rPr lang="en-US" sz="2400" dirty="0"/>
-              <a:t>Negate outputs</a:t>
+              <a:t>Define states</a:t>
             </a:r>
           </a:p>
           <a:p>
@@ -11151,7 +11404,7 @@
             <a:pPr algn="ctr"/>
             <a:r>
               <a:rPr lang="en-US" sz="2400" u="sng" dirty="0"/>
-              <a:t>Global Properties</a:t>
+              <a:t>2. Global Properties</a:t>
             </a:r>
             <a:r>
               <a:rPr lang="en-US" sz="2400" dirty="0"/>
@@ -11235,7 +11488,7 @@
             <a:pPr algn="ctr"/>
             <a:r>
               <a:rPr lang="en-US" sz="2400" u="sng" dirty="0"/>
-              <a:t>State Properties</a:t>
+              <a:t>3. State Properties</a:t>
             </a:r>
           </a:p>
           <a:p>
@@ -11368,10 +11621,10 @@
       </p:sp>
       <p:sp>
         <p:nvSpPr>
-          <p:cNvPr id="13" name="TextBox 12">
+          <p:cNvPr id="3" name="TextBox 2">
             <a:extLst>
               <a:ext uri="{FF2B5EF4-FFF2-40B4-BE49-F238E27FC236}">
-                <a16:creationId xmlns:a16="http://schemas.microsoft.com/office/drawing/2014/main" id="{5BC43F68-7794-194B-AE9A-0820ADA5138F}"/>
+                <a16:creationId xmlns:a16="http://schemas.microsoft.com/office/drawing/2014/main" id="{61B789F4-4336-1448-A497-C62143AC0B04}"/>
               </a:ext>
             </a:extLst>
           </p:cNvPr>
@@ -11380,8 +11633,8 @@
         </p:nvSpPr>
         <p:spPr>
           <a:xfrm>
-            <a:off x="846176" y="5475220"/>
-            <a:ext cx="10515599" cy="830997"/>
+            <a:off x="2662690" y="2299187"/>
+            <a:ext cx="704161" cy="923330"/>
           </a:xfrm>
           <a:prstGeom prst="rect">
             <a:avLst/>
@@ -11394,14 +11647,131 @@
           </a:bodyPr>
           <a:lstStyle/>
           <a:p>
+            <a:r>
+              <a:rPr lang="en-US" sz="5400" b="1" dirty="0">
+                <a:solidFill>
+                  <a:schemeClr val="accent5"/>
+                </a:solidFill>
+              </a:rPr>
+              <a:t>✓</a:t>
+            </a:r>
+          </a:p>
+        </p:txBody>
+      </p:sp>
+      <p:sp>
+        <p:nvSpPr>
+          <p:cNvPr id="10" name="TextBox 9">
+            <a:extLst>
+              <a:ext uri="{FF2B5EF4-FFF2-40B4-BE49-F238E27FC236}">
+                <a16:creationId xmlns:a16="http://schemas.microsoft.com/office/drawing/2014/main" id="{FC6E55A2-581A-9B4A-A72E-D0774EBE2E89}"/>
+              </a:ext>
+            </a:extLst>
+          </p:cNvPr>
+          <p:cNvSpPr txBox="1"/>
+          <p:nvPr/>
+        </p:nvSpPr>
+        <p:spPr>
+          <a:xfrm>
+            <a:off x="7265911" y="2297349"/>
+            <a:ext cx="704161" cy="923330"/>
+          </a:xfrm>
+          <a:prstGeom prst="rect">
+            <a:avLst/>
+          </a:prstGeom>
+          <a:noFill/>
+        </p:spPr>
+        <p:txBody>
+          <a:bodyPr wrap="square" rtlCol="0">
+            <a:spAutoFit/>
+          </a:bodyPr>
+          <a:lstStyle/>
+          <a:p>
+            <a:r>
+              <a:rPr lang="en-US" sz="5400" b="1" dirty="0">
+                <a:solidFill>
+                  <a:schemeClr val="accent5"/>
+                </a:solidFill>
+              </a:rPr>
+              <a:t>✓</a:t>
+            </a:r>
+          </a:p>
+        </p:txBody>
+      </p:sp>
+      <p:sp>
+        <p:nvSpPr>
+          <p:cNvPr id="13" name="TextBox 12">
+            <a:extLst>
+              <a:ext uri="{FF2B5EF4-FFF2-40B4-BE49-F238E27FC236}">
+                <a16:creationId xmlns:a16="http://schemas.microsoft.com/office/drawing/2014/main" id="{170A2C23-A3A8-A846-8AD9-2017FD9C761E}"/>
+              </a:ext>
+            </a:extLst>
+          </p:cNvPr>
+          <p:cNvSpPr txBox="1"/>
+          <p:nvPr/>
+        </p:nvSpPr>
+        <p:spPr>
+          <a:xfrm>
+            <a:off x="11097949" y="2295511"/>
+            <a:ext cx="704161" cy="923330"/>
+          </a:xfrm>
+          <a:prstGeom prst="rect">
+            <a:avLst/>
+          </a:prstGeom>
+          <a:noFill/>
+        </p:spPr>
+        <p:txBody>
+          <a:bodyPr wrap="square" rtlCol="0">
+            <a:spAutoFit/>
+          </a:bodyPr>
+          <a:lstStyle/>
+          <a:p>
+            <a:r>
+              <a:rPr lang="en-US" sz="5400" b="1" dirty="0">
+                <a:solidFill>
+                  <a:schemeClr val="accent5"/>
+                </a:solidFill>
+              </a:rPr>
+              <a:t>✓</a:t>
+            </a:r>
+          </a:p>
+        </p:txBody>
+      </p:sp>
+      <p:sp>
+        <p:nvSpPr>
+          <p:cNvPr id="14" name="TextBox 13">
+            <a:extLst>
+              <a:ext uri="{FF2B5EF4-FFF2-40B4-BE49-F238E27FC236}">
+                <a16:creationId xmlns:a16="http://schemas.microsoft.com/office/drawing/2014/main" id="{3F352C18-1EF2-0D46-A302-1C9F61636F8D}"/>
+              </a:ext>
+            </a:extLst>
+          </p:cNvPr>
+          <p:cNvSpPr txBox="1"/>
+          <p:nvPr/>
+        </p:nvSpPr>
+        <p:spPr>
+          <a:xfrm>
+            <a:off x="0" y="5191871"/>
+            <a:ext cx="12192000" cy="1077218"/>
+          </a:xfrm>
+          <a:prstGeom prst="rect">
+            <a:avLst/>
+          </a:prstGeom>
+          <a:noFill/>
+        </p:spPr>
+        <p:txBody>
+          <a:bodyPr wrap="square" rtlCol="0">
+            <a:spAutoFit/>
+          </a:bodyPr>
+          <a:lstStyle/>
+          <a:p>
             <a:pPr algn="ctr"/>
             <a:r>
-              <a:rPr lang="en-US" sz="4800" dirty="0">
+              <a:rPr lang="en-US" sz="3200" dirty="0">
                 <a:solidFill>
                   <a:schemeClr val="accent4"/>
                 </a:solidFill>
               </a:rPr>
-              <a:t>2 + 3(6)=20 properties to check on BPMN</a:t>
+              <a:t>2 + 3(6)=20 properties to check for actionable risk awareness in remote patient care with integrated human and machine reasoning</a:t>
             </a:r>
           </a:p>
         </p:txBody>
@@ -11409,7 +11779,7 @@
     </p:spTree>
     <p:extLst>
       <p:ext uri="{BB962C8B-B14F-4D97-AF65-F5344CB8AC3E}">
-        <p14:creationId xmlns:p14="http://schemas.microsoft.com/office/powerpoint/2010/main" val="1569113475"/>
+        <p14:creationId xmlns:p14="http://schemas.microsoft.com/office/powerpoint/2010/main" val="2071561789"/>
       </p:ext>
     </p:extLst>
   </p:cSld>
@@ -12579,7 +12949,7 @@
         <p:spPr>
           <a:xfrm>
             <a:off x="9141635" y="674466"/>
-            <a:ext cx="3050366" cy="2123658"/>
+            <a:ext cx="3050366" cy="2862322"/>
           </a:xfrm>
           <a:prstGeom prst="rect">
             <a:avLst/>
@@ -12594,23 +12964,52 @@
           <a:p>
             <a:pPr algn="ctr"/>
             <a:r>
-              <a:rPr lang="en-US" sz="4800" dirty="0"/>
-              <a:t>BPMN</a:t>
-            </a:r>
-          </a:p>
+              <a:rPr lang="en-US" sz="3600" dirty="0"/>
+              <a:t>System Design in BPMN for </a:t>
+            </a:r>
+            <a:r>
+              <a:rPr lang="en-US" sz="3600" dirty="0" err="1"/>
+              <a:t>PHware</a:t>
+            </a:r>
+            <a:r>
+              <a:rPr lang="en-US" sz="3600" dirty="0"/>
+              <a:t> Remote Patient Monitoring</a:t>
+            </a:r>
+          </a:p>
+        </p:txBody>
+      </p:sp>
+      <p:sp>
+        <p:nvSpPr>
+          <p:cNvPr id="47" name="TextBox 46">
+            <a:extLst>
+              <a:ext uri="{FF2B5EF4-FFF2-40B4-BE49-F238E27FC236}">
+                <a16:creationId xmlns:a16="http://schemas.microsoft.com/office/drawing/2014/main" id="{C188C731-07E0-C040-BC99-AD919F9C461C}"/>
+              </a:ext>
+            </a:extLst>
+          </p:cNvPr>
+          <p:cNvSpPr txBox="1"/>
+          <p:nvPr/>
+        </p:nvSpPr>
+        <p:spPr>
+          <a:xfrm>
+            <a:off x="9123064" y="4717686"/>
+            <a:ext cx="3068936" cy="1384995"/>
+          </a:xfrm>
+          <a:prstGeom prst="rect">
+            <a:avLst/>
+          </a:prstGeom>
+          <a:noFill/>
+        </p:spPr>
+        <p:txBody>
+          <a:bodyPr wrap="square" rtlCol="0">
+            <a:spAutoFit/>
+          </a:bodyPr>
+          <a:lstStyle/>
           <a:p>
             <a:pPr algn="ctr"/>
-            <a:endParaRPr lang="en-US" sz="2800" dirty="0"/>
-          </a:p>
-          <a:p>
-            <a:pPr algn="ctr"/>
-            <a:r>
-              <a:rPr lang="en-US" sz="2800" dirty="0" err="1"/>
-              <a:t>PHware</a:t>
-            </a:r>
             <a:r>
               <a:rPr lang="en-US" sz="2800" dirty="0"/>
-              <a:t> Remote Patient Monitoring</a:t>
+              <a:t>Must satisfy the actionable risk awareness CWP</a:t>
             </a:r>
           </a:p>
         </p:txBody>
@@ -13057,13 +13456,14 @@
           <a:lstStyle/>
           <a:p>
             <a:r>
+              <a:rPr lang="en-US" dirty="0"/>
+              <a:t>BPMN translation to </a:t>
+            </a:r>
+            <a:r>
               <a:rPr lang="en-US" dirty="0" err="1"/>
               <a:t>Promela</a:t>
             </a:r>
-            <a:r>
-              <a:rPr lang="en-US" dirty="0"/>
-              <a:t> for the BPMN</a:t>
-            </a:r>
+            <a:endParaRPr lang="en-US" dirty="0"/>
           </a:p>
         </p:txBody>
       </p:sp>
@@ -13111,7 +13511,7 @@
             <a:pPr algn="ctr"/>
             <a:r>
               <a:rPr lang="en-US" sz="2400" u="sng" dirty="0"/>
-              <a:t>Token Semantics</a:t>
+              <a:t>1. Token Semantics</a:t>
             </a:r>
           </a:p>
           <a:p>
@@ -13191,7 +13591,7 @@
             <a:pPr algn="ctr"/>
             <a:r>
               <a:rPr lang="en-US" sz="2400" u="sng" dirty="0"/>
-              <a:t>Define State</a:t>
+              <a:t>2. State Mapping</a:t>
             </a:r>
           </a:p>
           <a:p>
@@ -13225,7 +13625,7 @@
             </a:pPr>
             <a:r>
               <a:rPr lang="en-US" sz="2400" dirty="0"/>
-              <a:t>Update locations</a:t>
+              <a:t>Add state updates</a:t>
             </a:r>
           </a:p>
         </p:txBody>
@@ -13274,7 +13674,7 @@
             <a:pPr algn="ctr"/>
             <a:r>
               <a:rPr lang="en-US" sz="2400" u="sng" dirty="0"/>
-              <a:t>Environment (input)</a:t>
+              <a:t>3. Environment</a:t>
             </a:r>
           </a:p>
           <a:p>
@@ -13288,7 +13688,7 @@
             </a:pPr>
             <a:r>
               <a:rPr lang="en-US" sz="2400" dirty="0"/>
-              <a:t>Values</a:t>
+              <a:t>Define values</a:t>
             </a:r>
           </a:p>
           <a:p>
@@ -13433,7 +13833,7 @@
                   <a:schemeClr val="accent4"/>
                 </a:solidFill>
               </a:rPr>
-              <a:t>Additional information from designer</a:t>
+              <a:t>2 and 3 Require Help from Designer</a:t>
             </a:r>
           </a:p>
         </p:txBody>
@@ -13784,46 +14184,6 @@
       </p:sp>
       <p:sp>
         <p:nvSpPr>
-          <p:cNvPr id="13" name="TextBox 12">
-            <a:extLst>
-              <a:ext uri="{FF2B5EF4-FFF2-40B4-BE49-F238E27FC236}">
-                <a16:creationId xmlns:a16="http://schemas.microsoft.com/office/drawing/2014/main" id="{F0E471C9-7A1C-7541-AD4C-88640C5F0DF2}"/>
-              </a:ext>
-            </a:extLst>
-          </p:cNvPr>
-          <p:cNvSpPr txBox="1"/>
-          <p:nvPr/>
-        </p:nvSpPr>
-        <p:spPr>
-          <a:xfrm>
-            <a:off x="8865326" y="691883"/>
-            <a:ext cx="3326674" cy="2739211"/>
-          </a:xfrm>
-          <a:prstGeom prst="rect">
-            <a:avLst/>
-          </a:prstGeom>
-          <a:noFill/>
-        </p:spPr>
-        <p:txBody>
-          <a:bodyPr wrap="square" rtlCol="0">
-            <a:spAutoFit/>
-          </a:bodyPr>
-          <a:lstStyle/>
-          <a:p>
-            <a:pPr algn="ctr"/>
-            <a:r>
-              <a:rPr lang="en-US" sz="4800" dirty="0"/>
-              <a:t>Token Activation Semantics </a:t>
-            </a:r>
-          </a:p>
-          <a:p>
-            <a:pPr algn="ctr"/>
-            <a:endParaRPr lang="en-US" sz="2800" dirty="0"/>
-          </a:p>
-        </p:txBody>
-      </p:sp>
-      <p:sp>
-        <p:nvSpPr>
           <p:cNvPr id="11" name="Oval 10">
             <a:extLst>
               <a:ext uri="{FF2B5EF4-FFF2-40B4-BE49-F238E27FC236}">
@@ -14287,6 +14647,42 @@
           <a:p>
             <a:pPr algn="ctr"/>
             <a:endParaRPr lang="en-US"/>
+          </a:p>
+        </p:txBody>
+      </p:sp>
+      <p:sp>
+        <p:nvSpPr>
+          <p:cNvPr id="15" name="TextBox 14">
+            <a:extLst>
+              <a:ext uri="{FF2B5EF4-FFF2-40B4-BE49-F238E27FC236}">
+                <a16:creationId xmlns:a16="http://schemas.microsoft.com/office/drawing/2014/main" id="{067B5AA1-18D3-5643-BBC6-10038D6D7748}"/>
+              </a:ext>
+            </a:extLst>
+          </p:cNvPr>
+          <p:cNvSpPr txBox="1"/>
+          <p:nvPr/>
+        </p:nvSpPr>
+        <p:spPr>
+          <a:xfrm>
+            <a:off x="8897814" y="361376"/>
+            <a:ext cx="3294186" cy="1446550"/>
+          </a:xfrm>
+          <a:prstGeom prst="rect">
+            <a:avLst/>
+          </a:prstGeom>
+          <a:noFill/>
+        </p:spPr>
+        <p:txBody>
+          <a:bodyPr wrap="square" rtlCol="0">
+            <a:spAutoFit/>
+          </a:bodyPr>
+          <a:lstStyle/>
+          <a:p>
+            <a:pPr algn="ctr"/>
+            <a:r>
+              <a:rPr lang="en-US" sz="4400" dirty="0"/>
+              <a:t>1. Token Semantics</a:t>
+            </a:r>
           </a:p>
         </p:txBody>
       </p:sp>
@@ -15018,8 +15414,8 @@
         </p:nvSpPr>
         <p:spPr>
           <a:xfrm>
-            <a:off x="9559310" y="691883"/>
-            <a:ext cx="2632689" cy="2369880"/>
+            <a:off x="9559310" y="361376"/>
+            <a:ext cx="2632689" cy="1446550"/>
           </a:xfrm>
           <a:prstGeom prst="rect">
             <a:avLst/>
@@ -15034,25 +15430,9 @@
           <a:p>
             <a:pPr algn="ctr"/>
             <a:r>
-              <a:rPr lang="en-US" sz="4800" dirty="0"/>
-              <a:t>State</a:t>
-            </a:r>
-          </a:p>
-          <a:p>
-            <a:pPr algn="ctr"/>
-            <a:endParaRPr lang="en-US" sz="2800" dirty="0"/>
-          </a:p>
-          <a:p>
-            <a:pPr algn="ctr"/>
-            <a:endParaRPr lang="en-US" sz="2400" dirty="0"/>
-          </a:p>
-          <a:p>
-            <a:pPr lvl="1"/>
-            <a:endParaRPr lang="en-US" sz="2400" i="1" dirty="0"/>
-          </a:p>
-          <a:p>
-            <a:pPr algn="ctr"/>
-            <a:endParaRPr lang="en-US" sz="2400" dirty="0"/>
+              <a:rPr lang="en-US" sz="4400" dirty="0"/>
+              <a:t>2. State Mapping</a:t>
+            </a:r>
           </a:p>
         </p:txBody>
       </p:sp>
@@ -15169,7 +15549,7 @@
         </p:nvSpPr>
         <p:spPr>
           <a:xfrm>
-            <a:off x="9559308" y="1694019"/>
+            <a:off x="9559308" y="2277914"/>
             <a:ext cx="2632691" cy="1938992"/>
           </a:xfrm>
           <a:prstGeom prst="rect">
@@ -15235,7 +15615,7 @@
         </p:nvSpPr>
         <p:spPr>
           <a:xfrm>
-            <a:off x="9559309" y="3901498"/>
+            <a:off x="9559309" y="4485393"/>
             <a:ext cx="2632691" cy="1200329"/>
           </a:xfrm>
           <a:prstGeom prst="rect">
@@ -15297,7 +15677,7 @@
         </p:nvSpPr>
         <p:spPr>
           <a:xfrm>
-            <a:off x="9559308" y="5577951"/>
+            <a:off x="9559308" y="6161846"/>
             <a:ext cx="2632691" cy="461665"/>
           </a:xfrm>
           <a:prstGeom prst="rect">
@@ -15313,7 +15693,7 @@
             <a:pPr algn="ctr"/>
             <a:r>
               <a:rPr lang="en-US" sz="2400" dirty="0"/>
-              <a:t>Identify updates</a:t>
+              <a:t>Add state updates</a:t>
             </a:r>
           </a:p>
         </p:txBody>
@@ -16675,46 +17055,6 @@
       </p:sp>
       <p:sp>
         <p:nvSpPr>
-          <p:cNvPr id="13" name="TextBox 12">
-            <a:extLst>
-              <a:ext uri="{FF2B5EF4-FFF2-40B4-BE49-F238E27FC236}">
-                <a16:creationId xmlns:a16="http://schemas.microsoft.com/office/drawing/2014/main" id="{F0E471C9-7A1C-7541-AD4C-88640C5F0DF2}"/>
-              </a:ext>
-            </a:extLst>
-          </p:cNvPr>
-          <p:cNvSpPr txBox="1"/>
-          <p:nvPr/>
-        </p:nvSpPr>
-        <p:spPr>
-          <a:xfrm>
-            <a:off x="8504393" y="730125"/>
-            <a:ext cx="3478306" cy="1261884"/>
-          </a:xfrm>
-          <a:prstGeom prst="rect">
-            <a:avLst/>
-          </a:prstGeom>
-          <a:noFill/>
-        </p:spPr>
-        <p:txBody>
-          <a:bodyPr wrap="square" rtlCol="0">
-            <a:spAutoFit/>
-          </a:bodyPr>
-          <a:lstStyle/>
-          <a:p>
-            <a:pPr algn="ctr"/>
-            <a:r>
-              <a:rPr lang="en-US" sz="4800" dirty="0"/>
-              <a:t>Environment</a:t>
-            </a:r>
-          </a:p>
-          <a:p>
-            <a:pPr algn="ctr"/>
-            <a:endParaRPr lang="en-US" sz="2800" dirty="0"/>
-          </a:p>
-        </p:txBody>
-      </p:sp>
-      <p:sp>
-        <p:nvSpPr>
           <p:cNvPr id="16" name="Oval 15">
             <a:extLst>
               <a:ext uri="{FF2B5EF4-FFF2-40B4-BE49-F238E27FC236}">
@@ -16852,6 +17192,42 @@
           <a:p>
             <a:pPr algn="ctr"/>
             <a:endParaRPr lang="en-US"/>
+          </a:p>
+        </p:txBody>
+      </p:sp>
+      <p:sp>
+        <p:nvSpPr>
+          <p:cNvPr id="11" name="TextBox 10">
+            <a:extLst>
+              <a:ext uri="{FF2B5EF4-FFF2-40B4-BE49-F238E27FC236}">
+                <a16:creationId xmlns:a16="http://schemas.microsoft.com/office/drawing/2014/main" id="{CDB8F73F-5C6C-5643-AB02-4A9AD651D402}"/>
+              </a:ext>
+            </a:extLst>
+          </p:cNvPr>
+          <p:cNvSpPr txBox="1"/>
+          <p:nvPr/>
+        </p:nvSpPr>
+        <p:spPr>
+          <a:xfrm>
+            <a:off x="9559310" y="361376"/>
+            <a:ext cx="2632689" cy="1446550"/>
+          </a:xfrm>
+          <a:prstGeom prst="rect">
+            <a:avLst/>
+          </a:prstGeom>
+          <a:noFill/>
+        </p:spPr>
+        <p:txBody>
+          <a:bodyPr wrap="square" rtlCol="0">
+            <a:spAutoFit/>
+          </a:bodyPr>
+          <a:lstStyle/>
+          <a:p>
+            <a:pPr algn="ctr"/>
+            <a:r>
+              <a:rPr lang="en-US" sz="4400" dirty="0"/>
+              <a:t>2. State Mapping</a:t>
+            </a:r>
           </a:p>
         </p:txBody>
       </p:sp>
@@ -17192,34 +17568,6 @@
       </p:sp>
       <p:sp>
         <p:nvSpPr>
-          <p:cNvPr id="3" name="Title 2">
-            <a:extLst>
-              <a:ext uri="{FF2B5EF4-FFF2-40B4-BE49-F238E27FC236}">
-                <a16:creationId xmlns:a16="http://schemas.microsoft.com/office/drawing/2014/main" id="{8666535D-39CB-B946-AE8D-8499CD36E58E}"/>
-              </a:ext>
-            </a:extLst>
-          </p:cNvPr>
-          <p:cNvSpPr>
-            <a:spLocks noGrp="1"/>
-          </p:cNvSpPr>
-          <p:nvPr>
-            <p:ph type="title"/>
-          </p:nvPr>
-        </p:nvSpPr>
-        <p:spPr/>
-        <p:txBody>
-          <a:bodyPr/>
-          <a:lstStyle/>
-          <a:p>
-            <a:r>
-              <a:rPr lang="en-US" dirty="0"/>
-              <a:t>Weakest Environment Possible</a:t>
-            </a:r>
-          </a:p>
-        </p:txBody>
-      </p:sp>
-      <p:sp>
-        <p:nvSpPr>
           <p:cNvPr id="4" name="Right Arrow 3">
             <a:extLst>
               <a:ext uri="{FF2B5EF4-FFF2-40B4-BE49-F238E27FC236}">
@@ -17312,6 +17660,34 @@
             <a:r>
               <a:rPr lang="en-US" dirty="0"/>
               <a:t>Hospital</a:t>
+            </a:r>
+          </a:p>
+        </p:txBody>
+      </p:sp>
+      <p:sp>
+        <p:nvSpPr>
+          <p:cNvPr id="7" name="Title 6">
+            <a:extLst>
+              <a:ext uri="{FF2B5EF4-FFF2-40B4-BE49-F238E27FC236}">
+                <a16:creationId xmlns:a16="http://schemas.microsoft.com/office/drawing/2014/main" id="{596FFBC2-86D5-7F4C-A5A0-63174BE0235B}"/>
+              </a:ext>
+            </a:extLst>
+          </p:cNvPr>
+          <p:cNvSpPr>
+            <a:spLocks noGrp="1"/>
+          </p:cNvSpPr>
+          <p:nvPr>
+            <p:ph type="title"/>
+          </p:nvPr>
+        </p:nvSpPr>
+        <p:spPr/>
+        <p:txBody>
+          <a:bodyPr/>
+          <a:lstStyle/>
+          <a:p>
+            <a:r>
+              <a:rPr lang="en-US" dirty="0"/>
+              <a:t>3. Environment (weakest possible)</a:t>
             </a:r>
           </a:p>
         </p:txBody>
@@ -17568,7 +17944,7 @@
           <a:p>
             <a:r>
               <a:rPr lang="en-US" dirty="0"/>
-              <a:t>SPIN Verification</a:t>
+              <a:t>SPIN Verification Results</a:t>
             </a:r>
           </a:p>
         </p:txBody>
@@ -19067,6 +19443,63 @@
           </a:p>
         </p:txBody>
       </p:sp>
+      <p:sp>
+        <p:nvSpPr>
+          <p:cNvPr id="3" name="Rounded Rectangle 2">
+            <a:extLst>
+              <a:ext uri="{FF2B5EF4-FFF2-40B4-BE49-F238E27FC236}">
+                <a16:creationId xmlns:a16="http://schemas.microsoft.com/office/drawing/2014/main" id="{3A8D3558-0067-E243-9DD6-7519F408619B}"/>
+              </a:ext>
+            </a:extLst>
+          </p:cNvPr>
+          <p:cNvSpPr/>
+          <p:nvPr/>
+        </p:nvSpPr>
+        <p:spPr>
+          <a:xfrm>
+            <a:off x="968938" y="2945134"/>
+            <a:ext cx="10254124" cy="1547900"/>
+          </a:xfrm>
+          <a:prstGeom prst="roundRect">
+            <a:avLst/>
+          </a:prstGeom>
+        </p:spPr>
+        <p:style>
+          <a:lnRef idx="2">
+            <a:schemeClr val="accent5">
+              <a:shade val="50000"/>
+            </a:schemeClr>
+          </a:lnRef>
+          <a:fillRef idx="1">
+            <a:schemeClr val="accent5"/>
+          </a:fillRef>
+          <a:effectRef idx="0">
+            <a:schemeClr val="accent5"/>
+          </a:effectRef>
+          <a:fontRef idx="minor">
+            <a:schemeClr val="lt1"/>
+          </a:fontRef>
+        </p:style>
+        <p:txBody>
+          <a:bodyPr rtlCol="0" anchor="ctr"/>
+          <a:lstStyle/>
+          <a:p>
+            <a:pPr algn="ctr"/>
+            <a:r>
+              <a:rPr lang="en-US" sz="3600" dirty="0"/>
+              <a:t>The </a:t>
+            </a:r>
+            <a:r>
+              <a:rPr lang="en-US" sz="3600" dirty="0" err="1"/>
+              <a:t>PHWare</a:t>
+            </a:r>
+            <a:r>
+              <a:rPr lang="en-US" sz="3600" dirty="0"/>
+              <a:t> System Design for remote patient care implements the CWP of actionable risk awareness</a:t>
+            </a:r>
+          </a:p>
+        </p:txBody>
+      </p:sp>
     </p:spTree>
     <p:extLst>
       <p:ext uri="{BB962C8B-B14F-4D97-AF65-F5344CB8AC3E}">
@@ -19328,6 +19761,51 @@
                       </p:childTnLst>
                     </p:cTn>
                   </p:par>
+                  <p:par>
+                    <p:cTn id="23" fill="hold">
+                      <p:stCondLst>
+                        <p:cond delay="indefinite"/>
+                      </p:stCondLst>
+                      <p:childTnLst>
+                        <p:par>
+                          <p:cTn id="24" fill="hold">
+                            <p:stCondLst>
+                              <p:cond delay="0"/>
+                            </p:stCondLst>
+                            <p:childTnLst>
+                              <p:par>
+                                <p:cTn id="25" presetID="1" presetClass="entr" presetSubtype="0" fill="hold" grpId="0" nodeType="clickEffect">
+                                  <p:stCondLst>
+                                    <p:cond delay="0"/>
+                                  </p:stCondLst>
+                                  <p:childTnLst>
+                                    <p:set>
+                                      <p:cBhvr>
+                                        <p:cTn id="26" dur="1" fill="hold">
+                                          <p:stCondLst>
+                                            <p:cond delay="0"/>
+                                          </p:stCondLst>
+                                        </p:cTn>
+                                        <p:tgtEl>
+                                          <p:spTgt spid="3"/>
+                                        </p:tgtEl>
+                                        <p:attrNameLst>
+                                          <p:attrName>style.visibility</p:attrName>
+                                        </p:attrNameLst>
+                                      </p:cBhvr>
+                                      <p:to>
+                                        <p:strVal val="visible"/>
+                                      </p:to>
+                                    </p:set>
+                                  </p:childTnLst>
+                                </p:cTn>
+                              </p:par>
+                            </p:childTnLst>
+                          </p:cTn>
+                        </p:par>
+                      </p:childTnLst>
+                    </p:cTn>
+                  </p:par>
                 </p:childTnLst>
               </p:cTn>
               <p:prevCondLst>
@@ -19357,6 +19835,7 @@
       <p:bldP spid="21" grpId="0" animBg="1"/>
       <p:bldP spid="22" grpId="0"/>
       <p:bldP spid="23" grpId="0" animBg="1"/>
+      <p:bldP spid="3" grpId="0" animBg="1"/>
     </p:bldLst>
   </p:timing>
 </p:sld>
@@ -19426,7 +19905,7 @@
         <p:spPr/>
         <p:txBody>
           <a:bodyPr>
-            <a:normAutofit lnSpcReduction="10000"/>
+            <a:normAutofit/>
           </a:bodyPr>
           <a:lstStyle/>
           <a:p>
@@ -19438,31 +19917,31 @@
           <a:p>
             <a:r>
               <a:rPr lang="en-US" dirty="0"/>
-              <a:t>Vast performance differences and asynchrony challenge reasoning</a:t>
-            </a:r>
-          </a:p>
-          <a:p>
+              <a:t>CWP is a technology-neutral specification of </a:t>
+            </a:r>
+            <a:r>
+              <a:rPr lang="en-US" dirty="0">
+                <a:solidFill>
+                  <a:schemeClr val="accent5"/>
+                </a:solidFill>
+              </a:rPr>
+              <a:t>what</a:t>
+            </a:r>
             <a:r>
               <a:rPr lang="en-US" dirty="0"/>
-              <a:t>CWP is a adequate declarative specification of what an integrated human and machine reasoning system must accomplish</a:t>
+              <a:t> an integrated human and machine reasoning system must accomplish</a:t>
             </a:r>
           </a:p>
           <a:p>
             <a:r>
               <a:rPr lang="en-US" dirty="0"/>
-              <a:t>The integration itself can be defined with with workflows using BPMN</a:t>
+              <a:t>The integration itself was developed with workflows using BPMN</a:t>
             </a:r>
           </a:p>
           <a:p>
             <a:r>
               <a:rPr lang="en-US" dirty="0"/>
-              <a:t>Model checking can verify a workflow against a CWP</a:t>
-            </a:r>
-          </a:p>
-          <a:p>
-            <a:r>
-              <a:rPr lang="en-US" dirty="0"/>
-              <a:t>Requires the CWP be turned into LTL and the BPMN into </a:t>
+              <a:t>UML can be translated into LTL and BPMN into </a:t>
             </a:r>
             <a:r>
               <a:rPr lang="en-US" dirty="0" err="1"/>
@@ -19473,13 +19952,19 @@
           <a:p>
             <a:r>
               <a:rPr lang="en-US" dirty="0"/>
-              <a:t>SPIN verifies the BPMN satisfies the CWP</a:t>
+              <a:t>SPIN verified the BPMN against the CWP of actionable risk awareness</a:t>
             </a:r>
           </a:p>
           <a:p>
             <a:r>
               <a:rPr lang="en-US" dirty="0"/>
-              <a:t>Future work is to automate the process</a:t>
+              <a:t>Future work is to complete automation of translations</a:t>
+            </a:r>
+          </a:p>
+          <a:p>
+            <a:r>
+              <a:rPr lang="en-US" dirty="0"/>
+              <a:t>Raises important questions about the relationship between the system design state and the CWP state: mapping required</a:t>
             </a:r>
           </a:p>
         </p:txBody>
@@ -19736,7 +20221,22 @@
               <a:rPr lang="en-US" sz="4400" dirty="0">
                 <a:latin typeface="+mj-lt"/>
               </a:rPr>
-              <a:t>The vast difference  between humans and machines challenge conventional methods of integration</a:t>
+              <a:t>The vast difference  between humans and machines challenge</a:t>
+            </a:r>
+            <a:r>
+              <a:rPr lang="en-US" sz="4400" dirty="0">
+                <a:solidFill>
+                  <a:schemeClr val="accent5"/>
+                </a:solidFill>
+                <a:latin typeface="+mj-lt"/>
+              </a:rPr>
+              <a:t> conventional methods </a:t>
+            </a:r>
+            <a:r>
+              <a:rPr lang="en-US" sz="4400" dirty="0">
+                <a:latin typeface="+mj-lt"/>
+              </a:rPr>
+              <a:t>of integration</a:t>
             </a:r>
           </a:p>
           <a:p>
@@ -20214,8 +20714,8 @@
         </p:nvSpPr>
         <p:spPr>
           <a:xfrm>
-            <a:off x="804672" y="338328"/>
-            <a:ext cx="3877056" cy="2249424"/>
+            <a:off x="410667" y="338328"/>
+            <a:ext cx="5296070" cy="2249424"/>
           </a:xfrm>
           <a:prstGeom prst="rect">
             <a:avLst/>
@@ -20247,7 +20747,29 @@
                 <a:ea typeface="+mj-ea"/>
                 <a:cs typeface="+mj-cs"/>
               </a:rPr>
-              <a:t>Asynchrony and distribution make manual reasoning difficult at best</a:t>
+              <a:t>Asynchrony and distribution make manual </a:t>
+            </a:r>
+            <a:r>
+              <a:rPr lang="en-US" sz="3800" kern="1200" dirty="0">
+                <a:solidFill>
+                  <a:schemeClr val="accent5"/>
+                </a:solidFill>
+                <a:latin typeface="+mj-lt"/>
+                <a:ea typeface="+mj-ea"/>
+                <a:cs typeface="+mj-cs"/>
+              </a:rPr>
+              <a:t>analysis of systems </a:t>
+            </a:r>
+            <a:r>
+              <a:rPr lang="en-US" sz="3800" kern="1200" dirty="0">
+                <a:solidFill>
+                  <a:schemeClr val="tx1"/>
+                </a:solidFill>
+                <a:latin typeface="+mj-lt"/>
+                <a:ea typeface="+mj-ea"/>
+                <a:cs typeface="+mj-cs"/>
+              </a:rPr>
+              <a:t>difficult at best</a:t>
             </a:r>
           </a:p>
         </p:txBody>
@@ -20266,740 +20788,6 @@
 </file>
 
 <file path=ppt/slides/slide5.xml><?xml version="1.0" encoding="utf-8"?>
-<p:sld xmlns:a="http://schemas.openxmlformats.org/drawingml/2006/main" xmlns:r="http://schemas.openxmlformats.org/officeDocument/2006/relationships" xmlns:p="http://schemas.openxmlformats.org/presentationml/2006/main">
-  <p:cSld>
-    <p:spTree>
-      <p:nvGrpSpPr>
-        <p:cNvPr id="1" name=""/>
-        <p:cNvGrpSpPr/>
-        <p:nvPr/>
-      </p:nvGrpSpPr>
-      <p:grpSpPr>
-        <a:xfrm>
-          <a:off x="0" y="0"/>
-          <a:ext cx="0" cy="0"/>
-          <a:chOff x="0" y="0"/>
-          <a:chExt cx="0" cy="0"/>
-        </a:xfrm>
-      </p:grpSpPr>
-      <p:sp>
-        <p:nvSpPr>
-          <p:cNvPr id="2" name="Title 1">
-            <a:extLst>
-              <a:ext uri="{FF2B5EF4-FFF2-40B4-BE49-F238E27FC236}">
-                <a16:creationId xmlns:a16="http://schemas.microsoft.com/office/drawing/2014/main" id="{06E63B87-C873-8345-BA75-B0818A1D4831}"/>
-              </a:ext>
-            </a:extLst>
-          </p:cNvPr>
-          <p:cNvSpPr>
-            <a:spLocks noGrp="1"/>
-          </p:cNvSpPr>
-          <p:nvPr>
-            <p:ph type="title"/>
-          </p:nvPr>
-        </p:nvSpPr>
-        <p:spPr>
-          <a:xfrm>
-            <a:off x="838200" y="365125"/>
-            <a:ext cx="10515600" cy="1325563"/>
-          </a:xfrm>
-        </p:spPr>
-        <p:txBody>
-          <a:bodyPr/>
-          <a:lstStyle/>
-          <a:p>
-            <a:r>
-              <a:rPr lang="en-US" dirty="0"/>
-              <a:t>Proposed Solution</a:t>
-            </a:r>
-          </a:p>
-        </p:txBody>
-      </p:sp>
-      <p:sp>
-        <p:nvSpPr>
-          <p:cNvPr id="3" name="Rounded Rectangle 2">
-            <a:extLst>
-              <a:ext uri="{FF2B5EF4-FFF2-40B4-BE49-F238E27FC236}">
-                <a16:creationId xmlns:a16="http://schemas.microsoft.com/office/drawing/2014/main" id="{BFEF9592-29B2-F840-A861-E8F98BD93162}"/>
-              </a:ext>
-            </a:extLst>
-          </p:cNvPr>
-          <p:cNvSpPr/>
-          <p:nvPr/>
-        </p:nvSpPr>
-        <p:spPr>
-          <a:xfrm>
-            <a:off x="1893717" y="1888183"/>
-            <a:ext cx="2917371" cy="995942"/>
-          </a:xfrm>
-          <a:prstGeom prst="roundRect">
-            <a:avLst/>
-          </a:prstGeom>
-        </p:spPr>
-        <p:style>
-          <a:lnRef idx="2">
-            <a:schemeClr val="accent1">
-              <a:shade val="50000"/>
-            </a:schemeClr>
-          </a:lnRef>
-          <a:fillRef idx="1">
-            <a:schemeClr val="accent1"/>
-          </a:fillRef>
-          <a:effectRef idx="0">
-            <a:schemeClr val="accent1"/>
-          </a:effectRef>
-          <a:fontRef idx="minor">
-            <a:schemeClr val="lt1"/>
-          </a:fontRef>
-        </p:style>
-        <p:txBody>
-          <a:bodyPr rtlCol="0" anchor="ctr"/>
-          <a:lstStyle/>
-          <a:p>
-            <a:pPr algn="ctr"/>
-            <a:r>
-              <a:rPr lang="en-US" sz="2400" b="1" dirty="0">
-                <a:solidFill>
-                  <a:schemeClr val="accent2">
-                    <a:lumMod val="20000"/>
-                    <a:lumOff val="80000"/>
-                  </a:schemeClr>
-                </a:solidFill>
-              </a:rPr>
-              <a:t>C</a:t>
-            </a:r>
-            <a:r>
-              <a:rPr lang="en-US" sz="2400" dirty="0"/>
-              <a:t>ognitive </a:t>
-            </a:r>
-            <a:r>
-              <a:rPr lang="en-US" sz="2400" b="1" dirty="0">
-                <a:solidFill>
-                  <a:schemeClr val="accent2">
-                    <a:lumMod val="20000"/>
-                    <a:lumOff val="80000"/>
-                  </a:schemeClr>
-                </a:solidFill>
-              </a:rPr>
-              <a:t>W</a:t>
-            </a:r>
-            <a:r>
-              <a:rPr lang="en-US" sz="2400" dirty="0"/>
-              <a:t>ork </a:t>
-            </a:r>
-            <a:r>
-              <a:rPr lang="en-US" sz="2400" b="1" dirty="0">
-                <a:solidFill>
-                  <a:schemeClr val="accent2">
-                    <a:lumMod val="20000"/>
-                    <a:lumOff val="80000"/>
-                  </a:schemeClr>
-                </a:solidFill>
-              </a:rPr>
-              <a:t>P</a:t>
-            </a:r>
-            <a:r>
-              <a:rPr lang="en-US" sz="2400" dirty="0"/>
-              <a:t>roblem (CWP)</a:t>
-            </a:r>
-          </a:p>
-        </p:txBody>
-      </p:sp>
-      <p:sp>
-        <p:nvSpPr>
-          <p:cNvPr id="4" name="Rounded Rectangle 3">
-            <a:extLst>
-              <a:ext uri="{FF2B5EF4-FFF2-40B4-BE49-F238E27FC236}">
-                <a16:creationId xmlns:a16="http://schemas.microsoft.com/office/drawing/2014/main" id="{9C3A4442-0FE9-B74E-BC81-6D8EB43583D2}"/>
-              </a:ext>
-            </a:extLst>
-          </p:cNvPr>
-          <p:cNvSpPr/>
-          <p:nvPr/>
-        </p:nvSpPr>
-        <p:spPr>
-          <a:xfrm>
-            <a:off x="7034222" y="1888183"/>
-            <a:ext cx="2917371" cy="995942"/>
-          </a:xfrm>
-          <a:prstGeom prst="roundRect">
-            <a:avLst/>
-          </a:prstGeom>
-        </p:spPr>
-        <p:style>
-          <a:lnRef idx="2">
-            <a:schemeClr val="accent1">
-              <a:shade val="50000"/>
-            </a:schemeClr>
-          </a:lnRef>
-          <a:fillRef idx="1">
-            <a:schemeClr val="accent1"/>
-          </a:fillRef>
-          <a:effectRef idx="0">
-            <a:schemeClr val="accent1"/>
-          </a:effectRef>
-          <a:fontRef idx="minor">
-            <a:schemeClr val="lt1"/>
-          </a:fontRef>
-        </p:style>
-        <p:txBody>
-          <a:bodyPr rtlCol="0" anchor="ctr"/>
-          <a:lstStyle/>
-          <a:p>
-            <a:pPr algn="ctr"/>
-            <a:r>
-              <a:rPr lang="en-US" sz="2400" dirty="0"/>
-              <a:t>Workflow Model (BPMN)</a:t>
-            </a:r>
-          </a:p>
-        </p:txBody>
-      </p:sp>
-      <p:sp>
-        <p:nvSpPr>
-          <p:cNvPr id="5" name="Rounded Rectangle 4">
-            <a:extLst>
-              <a:ext uri="{FF2B5EF4-FFF2-40B4-BE49-F238E27FC236}">
-                <a16:creationId xmlns:a16="http://schemas.microsoft.com/office/drawing/2014/main" id="{5724DB66-4BAD-2648-811A-584F86CB08B1}"/>
-              </a:ext>
-            </a:extLst>
-          </p:cNvPr>
-          <p:cNvSpPr/>
-          <p:nvPr/>
-        </p:nvSpPr>
-        <p:spPr>
-          <a:xfrm>
-            <a:off x="1893718" y="3952516"/>
-            <a:ext cx="8057875" cy="995942"/>
-          </a:xfrm>
-          <a:prstGeom prst="roundRect">
-            <a:avLst/>
-          </a:prstGeom>
-        </p:spPr>
-        <p:style>
-          <a:lnRef idx="2">
-            <a:schemeClr val="accent1">
-              <a:shade val="50000"/>
-            </a:schemeClr>
-          </a:lnRef>
-          <a:fillRef idx="1">
-            <a:schemeClr val="accent1"/>
-          </a:fillRef>
-          <a:effectRef idx="0">
-            <a:schemeClr val="accent1"/>
-          </a:effectRef>
-          <a:fontRef idx="minor">
-            <a:schemeClr val="lt1"/>
-          </a:fontRef>
-        </p:style>
-        <p:txBody>
-          <a:bodyPr rtlCol="0" anchor="ctr"/>
-          <a:lstStyle/>
-          <a:p>
-            <a:pPr algn="ctr"/>
-            <a:r>
-              <a:rPr lang="en-US" sz="2400" dirty="0"/>
-              <a:t>Model Checking (SPIN)</a:t>
-            </a:r>
-          </a:p>
-        </p:txBody>
-      </p:sp>
-      <p:sp>
-        <p:nvSpPr>
-          <p:cNvPr id="9" name="Down Arrow 8">
-            <a:extLst>
-              <a:ext uri="{FF2B5EF4-FFF2-40B4-BE49-F238E27FC236}">
-                <a16:creationId xmlns:a16="http://schemas.microsoft.com/office/drawing/2014/main" id="{AFEE87E9-3196-A944-BE5C-0864691CBF71}"/>
-              </a:ext>
-            </a:extLst>
-          </p:cNvPr>
-          <p:cNvSpPr/>
-          <p:nvPr/>
-        </p:nvSpPr>
-        <p:spPr>
-          <a:xfrm>
-            <a:off x="3091146" y="3111342"/>
-            <a:ext cx="522514" cy="706180"/>
-          </a:xfrm>
-          <a:prstGeom prst="downArrow">
-            <a:avLst/>
-          </a:prstGeom>
-        </p:spPr>
-        <p:style>
-          <a:lnRef idx="2">
-            <a:schemeClr val="accent1">
-              <a:shade val="50000"/>
-            </a:schemeClr>
-          </a:lnRef>
-          <a:fillRef idx="1">
-            <a:schemeClr val="accent1"/>
-          </a:fillRef>
-          <a:effectRef idx="0">
-            <a:schemeClr val="accent1"/>
-          </a:effectRef>
-          <a:fontRef idx="minor">
-            <a:schemeClr val="lt1"/>
-          </a:fontRef>
-        </p:style>
-        <p:txBody>
-          <a:bodyPr rtlCol="0" anchor="ctr"/>
-          <a:lstStyle/>
-          <a:p>
-            <a:pPr algn="ctr"/>
-            <a:endParaRPr lang="en-US"/>
-          </a:p>
-        </p:txBody>
-      </p:sp>
-      <p:sp>
-        <p:nvSpPr>
-          <p:cNvPr id="10" name="Down Arrow 9">
-            <a:extLst>
-              <a:ext uri="{FF2B5EF4-FFF2-40B4-BE49-F238E27FC236}">
-                <a16:creationId xmlns:a16="http://schemas.microsoft.com/office/drawing/2014/main" id="{091C097D-1761-144B-A132-49B872E9A4FD}"/>
-              </a:ext>
-            </a:extLst>
-          </p:cNvPr>
-          <p:cNvSpPr/>
-          <p:nvPr/>
-        </p:nvSpPr>
-        <p:spPr>
-          <a:xfrm>
-            <a:off x="8332522" y="3111342"/>
-            <a:ext cx="522514" cy="706180"/>
-          </a:xfrm>
-          <a:prstGeom prst="downArrow">
-            <a:avLst/>
-          </a:prstGeom>
-        </p:spPr>
-        <p:style>
-          <a:lnRef idx="2">
-            <a:schemeClr val="accent1">
-              <a:shade val="50000"/>
-            </a:schemeClr>
-          </a:lnRef>
-          <a:fillRef idx="1">
-            <a:schemeClr val="accent1"/>
-          </a:fillRef>
-          <a:effectRef idx="0">
-            <a:schemeClr val="accent1"/>
-          </a:effectRef>
-          <a:fontRef idx="minor">
-            <a:schemeClr val="lt1"/>
-          </a:fontRef>
-        </p:style>
-        <p:txBody>
-          <a:bodyPr rtlCol="0" anchor="ctr"/>
-          <a:lstStyle/>
-          <a:p>
-            <a:pPr algn="ctr"/>
-            <a:endParaRPr lang="en-US"/>
-          </a:p>
-        </p:txBody>
-      </p:sp>
-      <p:sp>
-        <p:nvSpPr>
-          <p:cNvPr id="11" name="TextBox 10">
-            <a:extLst>
-              <a:ext uri="{FF2B5EF4-FFF2-40B4-BE49-F238E27FC236}">
-                <a16:creationId xmlns:a16="http://schemas.microsoft.com/office/drawing/2014/main" id="{8F3E58A2-CF02-7A44-AA41-2F9186B139D6}"/>
-              </a:ext>
-            </a:extLst>
-          </p:cNvPr>
-          <p:cNvSpPr txBox="1"/>
-          <p:nvPr/>
-        </p:nvSpPr>
-        <p:spPr>
-          <a:xfrm>
-            <a:off x="2595944" y="1390892"/>
-            <a:ext cx="1512918" cy="523220"/>
-          </a:xfrm>
-          <a:prstGeom prst="rect">
-            <a:avLst/>
-          </a:prstGeom>
-          <a:noFill/>
-        </p:spPr>
-        <p:txBody>
-          <a:bodyPr wrap="square" rtlCol="0">
-            <a:spAutoFit/>
-          </a:bodyPr>
-          <a:lstStyle/>
-          <a:p>
-            <a:pPr algn="ctr"/>
-            <a:r>
-              <a:rPr lang="en-US" sz="2800" b="1" dirty="0">
-                <a:solidFill>
-                  <a:schemeClr val="accent4"/>
-                </a:solidFill>
-              </a:rPr>
-              <a:t>What </a:t>
-            </a:r>
-          </a:p>
-        </p:txBody>
-      </p:sp>
-      <p:sp>
-        <p:nvSpPr>
-          <p:cNvPr id="12" name="TextBox 11">
-            <a:extLst>
-              <a:ext uri="{FF2B5EF4-FFF2-40B4-BE49-F238E27FC236}">
-                <a16:creationId xmlns:a16="http://schemas.microsoft.com/office/drawing/2014/main" id="{4F526622-1CF9-D74A-AD27-43D50F666ACC}"/>
-              </a:ext>
-            </a:extLst>
-          </p:cNvPr>
-          <p:cNvSpPr txBox="1"/>
-          <p:nvPr/>
-        </p:nvSpPr>
-        <p:spPr>
-          <a:xfrm>
-            <a:off x="7837320" y="1390891"/>
-            <a:ext cx="1512918" cy="523220"/>
-          </a:xfrm>
-          <a:prstGeom prst="rect">
-            <a:avLst/>
-          </a:prstGeom>
-          <a:noFill/>
-        </p:spPr>
-        <p:txBody>
-          <a:bodyPr wrap="square" rtlCol="0">
-            <a:spAutoFit/>
-          </a:bodyPr>
-          <a:lstStyle/>
-          <a:p>
-            <a:pPr algn="ctr"/>
-            <a:r>
-              <a:rPr lang="en-US" sz="2800" b="1" dirty="0">
-                <a:solidFill>
-                  <a:schemeClr val="accent4"/>
-                </a:solidFill>
-              </a:rPr>
-              <a:t>How </a:t>
-            </a:r>
-          </a:p>
-        </p:txBody>
-      </p:sp>
-      <p:sp>
-        <p:nvSpPr>
-          <p:cNvPr id="13" name="Down Arrow 12">
-            <a:extLst>
-              <a:ext uri="{FF2B5EF4-FFF2-40B4-BE49-F238E27FC236}">
-                <a16:creationId xmlns:a16="http://schemas.microsoft.com/office/drawing/2014/main" id="{C326322C-0AB4-0B4A-B3B9-2C4C99411A05}"/>
-              </a:ext>
-            </a:extLst>
-          </p:cNvPr>
-          <p:cNvSpPr/>
-          <p:nvPr/>
-        </p:nvSpPr>
-        <p:spPr>
-          <a:xfrm>
-            <a:off x="5834743" y="5100860"/>
-            <a:ext cx="522514" cy="706180"/>
-          </a:xfrm>
-          <a:prstGeom prst="downArrow">
-            <a:avLst/>
-          </a:prstGeom>
-        </p:spPr>
-        <p:style>
-          <a:lnRef idx="2">
-            <a:schemeClr val="accent1">
-              <a:shade val="50000"/>
-            </a:schemeClr>
-          </a:lnRef>
-          <a:fillRef idx="1">
-            <a:schemeClr val="accent1"/>
-          </a:fillRef>
-          <a:effectRef idx="0">
-            <a:schemeClr val="accent1"/>
-          </a:effectRef>
-          <a:fontRef idx="minor">
-            <a:schemeClr val="lt1"/>
-          </a:fontRef>
-        </p:style>
-        <p:txBody>
-          <a:bodyPr rtlCol="0" anchor="ctr"/>
-          <a:lstStyle/>
-          <a:p>
-            <a:pPr algn="ctr"/>
-            <a:endParaRPr lang="en-US"/>
-          </a:p>
-        </p:txBody>
-      </p:sp>
-      <p:sp>
-        <p:nvSpPr>
-          <p:cNvPr id="14" name="TextBox 13">
-            <a:extLst>
-              <a:ext uri="{FF2B5EF4-FFF2-40B4-BE49-F238E27FC236}">
-                <a16:creationId xmlns:a16="http://schemas.microsoft.com/office/drawing/2014/main" id="{3A3EEE1F-EE1D-8B48-90E2-F61117361955}"/>
-              </a:ext>
-            </a:extLst>
-          </p:cNvPr>
-          <p:cNvSpPr txBox="1"/>
-          <p:nvPr/>
-        </p:nvSpPr>
-        <p:spPr>
-          <a:xfrm>
-            <a:off x="2564731" y="5807040"/>
-            <a:ext cx="7062537" cy="523220"/>
-          </a:xfrm>
-          <a:prstGeom prst="rect">
-            <a:avLst/>
-          </a:prstGeom>
-          <a:noFill/>
-        </p:spPr>
-        <p:txBody>
-          <a:bodyPr wrap="square" rtlCol="0">
-            <a:spAutoFit/>
-          </a:bodyPr>
-          <a:lstStyle/>
-          <a:p>
-            <a:pPr algn="ctr"/>
-            <a:r>
-              <a:rPr lang="en-US" sz="2800" b="1" dirty="0">
-                <a:solidFill>
-                  <a:schemeClr val="accent4"/>
-                </a:solidFill>
-              </a:rPr>
-              <a:t>Does the BPMN implements the CWP?</a:t>
-            </a:r>
-          </a:p>
-        </p:txBody>
-      </p:sp>
-      <p:sp>
-        <p:nvSpPr>
-          <p:cNvPr id="15" name="TextBox 14">
-            <a:extLst>
-              <a:ext uri="{FF2B5EF4-FFF2-40B4-BE49-F238E27FC236}">
-                <a16:creationId xmlns:a16="http://schemas.microsoft.com/office/drawing/2014/main" id="{A8C257F9-442D-904E-8D83-83CD92AC876C}"/>
-              </a:ext>
-            </a:extLst>
-          </p:cNvPr>
-          <p:cNvSpPr txBox="1"/>
-          <p:nvPr/>
-        </p:nvSpPr>
-        <p:spPr>
-          <a:xfrm>
-            <a:off x="47130" y="2958940"/>
-            <a:ext cx="3044016" cy="830997"/>
-          </a:xfrm>
-          <a:prstGeom prst="rect">
-            <a:avLst/>
-          </a:prstGeom>
-          <a:noFill/>
-        </p:spPr>
-        <p:txBody>
-          <a:bodyPr wrap="square" rtlCol="0">
-            <a:spAutoFit/>
-          </a:bodyPr>
-          <a:lstStyle/>
-          <a:p>
-            <a:pPr algn="r"/>
-            <a:r>
-              <a:rPr lang="en-US" sz="2400" dirty="0">
-                <a:solidFill>
-                  <a:schemeClr val="accent6"/>
-                </a:solidFill>
-              </a:rPr>
-              <a:t>To </a:t>
-            </a:r>
-            <a:r>
-              <a:rPr lang="en-US" sz="2400" b="1" i="1" dirty="0">
-                <a:solidFill>
-                  <a:schemeClr val="accent6">
-                    <a:lumMod val="60000"/>
-                    <a:lumOff val="40000"/>
-                  </a:schemeClr>
-                </a:solidFill>
-              </a:rPr>
-              <a:t>L</a:t>
-            </a:r>
-            <a:r>
-              <a:rPr lang="en-US" sz="2400" i="1" dirty="0">
-                <a:solidFill>
-                  <a:schemeClr val="accent6"/>
-                </a:solidFill>
-              </a:rPr>
-              <a:t>inear </a:t>
-            </a:r>
-            <a:r>
-              <a:rPr lang="en-US" sz="2400" b="1" i="1" dirty="0">
-                <a:solidFill>
-                  <a:schemeClr val="accent6">
-                    <a:lumMod val="60000"/>
-                    <a:lumOff val="40000"/>
-                  </a:schemeClr>
-                </a:solidFill>
-              </a:rPr>
-              <a:t>T</a:t>
-            </a:r>
-            <a:r>
-              <a:rPr lang="en-US" sz="2400" i="1" dirty="0">
-                <a:solidFill>
-                  <a:schemeClr val="accent6"/>
-                </a:solidFill>
-              </a:rPr>
-              <a:t>emporal </a:t>
-            </a:r>
-            <a:r>
-              <a:rPr lang="en-US" sz="2400" b="1" i="1" dirty="0">
-                <a:solidFill>
-                  <a:schemeClr val="accent6">
-                    <a:lumMod val="60000"/>
-                    <a:lumOff val="40000"/>
-                  </a:schemeClr>
-                </a:solidFill>
-              </a:rPr>
-              <a:t>L</a:t>
-            </a:r>
-            <a:r>
-              <a:rPr lang="en-US" sz="2400" i="1" dirty="0">
-                <a:solidFill>
-                  <a:schemeClr val="accent6"/>
-                </a:solidFill>
-              </a:rPr>
-              <a:t>ogic</a:t>
-            </a:r>
-            <a:r>
-              <a:rPr lang="en-US" sz="2400" dirty="0">
-                <a:solidFill>
-                  <a:schemeClr val="accent6"/>
-                </a:solidFill>
-              </a:rPr>
-              <a:t> (LTL)</a:t>
-            </a:r>
-          </a:p>
-        </p:txBody>
-      </p:sp>
-      <p:sp>
-        <p:nvSpPr>
-          <p:cNvPr id="16" name="TextBox 15">
-            <a:extLst>
-              <a:ext uri="{FF2B5EF4-FFF2-40B4-BE49-F238E27FC236}">
-                <a16:creationId xmlns:a16="http://schemas.microsoft.com/office/drawing/2014/main" id="{4DCDB506-6020-CE4D-81CF-7921A3DA9069}"/>
-              </a:ext>
-            </a:extLst>
-          </p:cNvPr>
-          <p:cNvSpPr txBox="1"/>
-          <p:nvPr/>
-        </p:nvSpPr>
-        <p:spPr>
-          <a:xfrm>
-            <a:off x="8855036" y="2982502"/>
-            <a:ext cx="2917371" cy="830997"/>
-          </a:xfrm>
-          <a:prstGeom prst="rect">
-            <a:avLst/>
-          </a:prstGeom>
-          <a:noFill/>
-        </p:spPr>
-        <p:txBody>
-          <a:bodyPr wrap="square" rtlCol="0">
-            <a:spAutoFit/>
-          </a:bodyPr>
-          <a:lstStyle/>
-          <a:p>
-            <a:r>
-              <a:rPr lang="en-US" sz="2400" dirty="0">
-                <a:solidFill>
-                  <a:schemeClr val="accent6"/>
-                </a:solidFill>
-              </a:rPr>
-              <a:t>To </a:t>
-            </a:r>
-            <a:r>
-              <a:rPr lang="en-US" sz="2400" b="1" i="1" dirty="0">
-                <a:solidFill>
-                  <a:schemeClr val="accent6">
-                    <a:lumMod val="60000"/>
-                    <a:lumOff val="40000"/>
-                  </a:schemeClr>
-                </a:solidFill>
-              </a:rPr>
-              <a:t>Pro</a:t>
-            </a:r>
-            <a:r>
-              <a:rPr lang="en-US" sz="2400" i="1" dirty="0">
-                <a:solidFill>
-                  <a:schemeClr val="accent6"/>
-                </a:solidFill>
-              </a:rPr>
-              <a:t>cess </a:t>
-            </a:r>
-            <a:r>
-              <a:rPr lang="en-US" sz="2400" b="1" i="1" dirty="0">
-                <a:solidFill>
-                  <a:schemeClr val="accent6">
-                    <a:lumMod val="60000"/>
-                    <a:lumOff val="40000"/>
-                  </a:schemeClr>
-                </a:solidFill>
-              </a:rPr>
-              <a:t>Me</a:t>
-            </a:r>
-            <a:r>
-              <a:rPr lang="en-US" sz="2400" i="1" dirty="0">
-                <a:solidFill>
-                  <a:schemeClr val="accent6"/>
-                </a:solidFill>
-              </a:rPr>
-              <a:t>ta </a:t>
-            </a:r>
-            <a:r>
-              <a:rPr lang="en-US" sz="2400" b="1" i="1" dirty="0">
-                <a:solidFill>
-                  <a:schemeClr val="accent6">
-                    <a:lumMod val="60000"/>
-                    <a:lumOff val="40000"/>
-                  </a:schemeClr>
-                </a:solidFill>
-              </a:rPr>
-              <a:t>La</a:t>
-            </a:r>
-            <a:r>
-              <a:rPr lang="en-US" sz="2400" i="1" dirty="0">
-                <a:solidFill>
-                  <a:schemeClr val="accent6"/>
-                </a:solidFill>
-              </a:rPr>
-              <a:t>nguage </a:t>
-            </a:r>
-            <a:r>
-              <a:rPr lang="en-US" sz="2400" dirty="0">
-                <a:solidFill>
-                  <a:schemeClr val="accent6"/>
-                </a:solidFill>
-              </a:rPr>
-              <a:t>(</a:t>
-            </a:r>
-            <a:r>
-              <a:rPr lang="en-US" sz="2400" dirty="0" err="1">
-                <a:solidFill>
-                  <a:schemeClr val="accent6"/>
-                </a:solidFill>
-              </a:rPr>
-              <a:t>Promela</a:t>
-            </a:r>
-            <a:r>
-              <a:rPr lang="en-US" sz="2400" dirty="0">
-                <a:solidFill>
-                  <a:schemeClr val="accent6"/>
-                </a:solidFill>
-              </a:rPr>
-              <a:t>)</a:t>
-            </a:r>
-          </a:p>
-        </p:txBody>
-      </p:sp>
-    </p:spTree>
-    <p:extLst>
-      <p:ext uri="{BB962C8B-B14F-4D97-AF65-F5344CB8AC3E}">
-        <p14:creationId xmlns:p14="http://schemas.microsoft.com/office/powerpoint/2010/main" val="1078906984"/>
-      </p:ext>
-    </p:extLst>
-  </p:cSld>
-  <p:clrMapOvr>
-    <a:masterClrMapping/>
-  </p:clrMapOvr>
-</p:sld>
-</file>
-
-<file path=ppt/slides/slide6.xml><?xml version="1.0" encoding="utf-8"?>
 <p:sld xmlns:a="http://schemas.openxmlformats.org/drawingml/2006/main" xmlns:r="http://schemas.openxmlformats.org/officeDocument/2006/relationships" xmlns:p="http://schemas.openxmlformats.org/presentationml/2006/main">
   <p:cSld>
     <p:bg>
@@ -21630,6 +21418,740 @@
     <p:extLst>
       <p:ext uri="{BB962C8B-B14F-4D97-AF65-F5344CB8AC3E}">
         <p14:creationId xmlns:p14="http://schemas.microsoft.com/office/powerpoint/2010/main" val="2866605518"/>
+      </p:ext>
+    </p:extLst>
+  </p:cSld>
+  <p:clrMapOvr>
+    <a:masterClrMapping/>
+  </p:clrMapOvr>
+</p:sld>
+</file>
+
+<file path=ppt/slides/slide6.xml><?xml version="1.0" encoding="utf-8"?>
+<p:sld xmlns:a="http://schemas.openxmlformats.org/drawingml/2006/main" xmlns:r="http://schemas.openxmlformats.org/officeDocument/2006/relationships" xmlns:p="http://schemas.openxmlformats.org/presentationml/2006/main">
+  <p:cSld>
+    <p:spTree>
+      <p:nvGrpSpPr>
+        <p:cNvPr id="1" name=""/>
+        <p:cNvGrpSpPr/>
+        <p:nvPr/>
+      </p:nvGrpSpPr>
+      <p:grpSpPr>
+        <a:xfrm>
+          <a:off x="0" y="0"/>
+          <a:ext cx="0" cy="0"/>
+          <a:chOff x="0" y="0"/>
+          <a:chExt cx="0" cy="0"/>
+        </a:xfrm>
+      </p:grpSpPr>
+      <p:sp>
+        <p:nvSpPr>
+          <p:cNvPr id="2" name="Title 1">
+            <a:extLst>
+              <a:ext uri="{FF2B5EF4-FFF2-40B4-BE49-F238E27FC236}">
+                <a16:creationId xmlns:a16="http://schemas.microsoft.com/office/drawing/2014/main" id="{06E63B87-C873-8345-BA75-B0818A1D4831}"/>
+              </a:ext>
+            </a:extLst>
+          </p:cNvPr>
+          <p:cNvSpPr>
+            <a:spLocks noGrp="1"/>
+          </p:cNvSpPr>
+          <p:nvPr>
+            <p:ph type="title"/>
+          </p:nvPr>
+        </p:nvSpPr>
+        <p:spPr>
+          <a:xfrm>
+            <a:off x="838200" y="365125"/>
+            <a:ext cx="10515600" cy="1325563"/>
+          </a:xfrm>
+        </p:spPr>
+        <p:txBody>
+          <a:bodyPr/>
+          <a:lstStyle/>
+          <a:p>
+            <a:r>
+              <a:rPr lang="en-US" dirty="0"/>
+              <a:t>Proposed Solution</a:t>
+            </a:r>
+          </a:p>
+        </p:txBody>
+      </p:sp>
+      <p:sp>
+        <p:nvSpPr>
+          <p:cNvPr id="3" name="Rounded Rectangle 2">
+            <a:extLst>
+              <a:ext uri="{FF2B5EF4-FFF2-40B4-BE49-F238E27FC236}">
+                <a16:creationId xmlns:a16="http://schemas.microsoft.com/office/drawing/2014/main" id="{BFEF9592-29B2-F840-A861-E8F98BD93162}"/>
+              </a:ext>
+            </a:extLst>
+          </p:cNvPr>
+          <p:cNvSpPr/>
+          <p:nvPr/>
+        </p:nvSpPr>
+        <p:spPr>
+          <a:xfrm>
+            <a:off x="1893717" y="1888183"/>
+            <a:ext cx="2917371" cy="995942"/>
+          </a:xfrm>
+          <a:prstGeom prst="roundRect">
+            <a:avLst/>
+          </a:prstGeom>
+        </p:spPr>
+        <p:style>
+          <a:lnRef idx="2">
+            <a:schemeClr val="accent1">
+              <a:shade val="50000"/>
+            </a:schemeClr>
+          </a:lnRef>
+          <a:fillRef idx="1">
+            <a:schemeClr val="accent1"/>
+          </a:fillRef>
+          <a:effectRef idx="0">
+            <a:schemeClr val="accent1"/>
+          </a:effectRef>
+          <a:fontRef idx="minor">
+            <a:schemeClr val="lt1"/>
+          </a:fontRef>
+        </p:style>
+        <p:txBody>
+          <a:bodyPr rtlCol="0" anchor="ctr"/>
+          <a:lstStyle/>
+          <a:p>
+            <a:pPr algn="ctr"/>
+            <a:r>
+              <a:rPr lang="en-US" sz="2400" b="1" dirty="0">
+                <a:solidFill>
+                  <a:schemeClr val="accent6">
+                    <a:lumMod val="40000"/>
+                    <a:lumOff val="60000"/>
+                  </a:schemeClr>
+                </a:solidFill>
+              </a:rPr>
+              <a:t>C</a:t>
+            </a:r>
+            <a:r>
+              <a:rPr lang="en-US" sz="2400" dirty="0"/>
+              <a:t>ognitive </a:t>
+            </a:r>
+            <a:r>
+              <a:rPr lang="en-US" sz="2400" b="1" dirty="0">
+                <a:solidFill>
+                  <a:schemeClr val="accent6">
+                    <a:lumMod val="40000"/>
+                    <a:lumOff val="60000"/>
+                  </a:schemeClr>
+                </a:solidFill>
+              </a:rPr>
+              <a:t>W</a:t>
+            </a:r>
+            <a:r>
+              <a:rPr lang="en-US" sz="2400" dirty="0"/>
+              <a:t>ork </a:t>
+            </a:r>
+            <a:r>
+              <a:rPr lang="en-US" sz="2400" b="1" dirty="0">
+                <a:solidFill>
+                  <a:schemeClr val="accent6">
+                    <a:lumMod val="40000"/>
+                    <a:lumOff val="60000"/>
+                  </a:schemeClr>
+                </a:solidFill>
+              </a:rPr>
+              <a:t>P</a:t>
+            </a:r>
+            <a:r>
+              <a:rPr lang="en-US" sz="2400" dirty="0"/>
+              <a:t>roblem (UML)</a:t>
+            </a:r>
+          </a:p>
+        </p:txBody>
+      </p:sp>
+      <p:sp>
+        <p:nvSpPr>
+          <p:cNvPr id="4" name="Rounded Rectangle 3">
+            <a:extLst>
+              <a:ext uri="{FF2B5EF4-FFF2-40B4-BE49-F238E27FC236}">
+                <a16:creationId xmlns:a16="http://schemas.microsoft.com/office/drawing/2014/main" id="{9C3A4442-0FE9-B74E-BC81-6D8EB43583D2}"/>
+              </a:ext>
+            </a:extLst>
+          </p:cNvPr>
+          <p:cNvSpPr/>
+          <p:nvPr/>
+        </p:nvSpPr>
+        <p:spPr>
+          <a:xfrm>
+            <a:off x="7034222" y="1888183"/>
+            <a:ext cx="2917371" cy="995942"/>
+          </a:xfrm>
+          <a:prstGeom prst="roundRect">
+            <a:avLst/>
+          </a:prstGeom>
+        </p:spPr>
+        <p:style>
+          <a:lnRef idx="2">
+            <a:schemeClr val="accent1">
+              <a:shade val="50000"/>
+            </a:schemeClr>
+          </a:lnRef>
+          <a:fillRef idx="1">
+            <a:schemeClr val="accent1"/>
+          </a:fillRef>
+          <a:effectRef idx="0">
+            <a:schemeClr val="accent1"/>
+          </a:effectRef>
+          <a:fontRef idx="minor">
+            <a:schemeClr val="lt1"/>
+          </a:fontRef>
+        </p:style>
+        <p:txBody>
+          <a:bodyPr rtlCol="0" anchor="ctr"/>
+          <a:lstStyle/>
+          <a:p>
+            <a:pPr algn="ctr"/>
+            <a:r>
+              <a:rPr lang="en-US" sz="2400" dirty="0"/>
+              <a:t>System Design (BPMN)</a:t>
+            </a:r>
+          </a:p>
+        </p:txBody>
+      </p:sp>
+      <p:sp>
+        <p:nvSpPr>
+          <p:cNvPr id="5" name="Rounded Rectangle 4">
+            <a:extLst>
+              <a:ext uri="{FF2B5EF4-FFF2-40B4-BE49-F238E27FC236}">
+                <a16:creationId xmlns:a16="http://schemas.microsoft.com/office/drawing/2014/main" id="{5724DB66-4BAD-2648-811A-584F86CB08B1}"/>
+              </a:ext>
+            </a:extLst>
+          </p:cNvPr>
+          <p:cNvSpPr/>
+          <p:nvPr/>
+        </p:nvSpPr>
+        <p:spPr>
+          <a:xfrm>
+            <a:off x="1893718" y="3952516"/>
+            <a:ext cx="8057875" cy="995942"/>
+          </a:xfrm>
+          <a:prstGeom prst="roundRect">
+            <a:avLst/>
+          </a:prstGeom>
+        </p:spPr>
+        <p:style>
+          <a:lnRef idx="2">
+            <a:schemeClr val="accent1">
+              <a:shade val="50000"/>
+            </a:schemeClr>
+          </a:lnRef>
+          <a:fillRef idx="1">
+            <a:schemeClr val="accent1"/>
+          </a:fillRef>
+          <a:effectRef idx="0">
+            <a:schemeClr val="accent1"/>
+          </a:effectRef>
+          <a:fontRef idx="minor">
+            <a:schemeClr val="lt1"/>
+          </a:fontRef>
+        </p:style>
+        <p:txBody>
+          <a:bodyPr rtlCol="0" anchor="ctr"/>
+          <a:lstStyle/>
+          <a:p>
+            <a:pPr algn="ctr"/>
+            <a:r>
+              <a:rPr lang="en-US" sz="2400" dirty="0"/>
+              <a:t>Model Checking (SPIN)</a:t>
+            </a:r>
+          </a:p>
+        </p:txBody>
+      </p:sp>
+      <p:sp>
+        <p:nvSpPr>
+          <p:cNvPr id="9" name="Down Arrow 8">
+            <a:extLst>
+              <a:ext uri="{FF2B5EF4-FFF2-40B4-BE49-F238E27FC236}">
+                <a16:creationId xmlns:a16="http://schemas.microsoft.com/office/drawing/2014/main" id="{AFEE87E9-3196-A944-BE5C-0864691CBF71}"/>
+              </a:ext>
+            </a:extLst>
+          </p:cNvPr>
+          <p:cNvSpPr/>
+          <p:nvPr/>
+        </p:nvSpPr>
+        <p:spPr>
+          <a:xfrm>
+            <a:off x="3091146" y="3111342"/>
+            <a:ext cx="522514" cy="706180"/>
+          </a:xfrm>
+          <a:prstGeom prst="downArrow">
+            <a:avLst/>
+          </a:prstGeom>
+        </p:spPr>
+        <p:style>
+          <a:lnRef idx="2">
+            <a:schemeClr val="accent1">
+              <a:shade val="50000"/>
+            </a:schemeClr>
+          </a:lnRef>
+          <a:fillRef idx="1">
+            <a:schemeClr val="accent1"/>
+          </a:fillRef>
+          <a:effectRef idx="0">
+            <a:schemeClr val="accent1"/>
+          </a:effectRef>
+          <a:fontRef idx="minor">
+            <a:schemeClr val="lt1"/>
+          </a:fontRef>
+        </p:style>
+        <p:txBody>
+          <a:bodyPr rtlCol="0" anchor="ctr"/>
+          <a:lstStyle/>
+          <a:p>
+            <a:pPr algn="ctr"/>
+            <a:endParaRPr lang="en-US"/>
+          </a:p>
+        </p:txBody>
+      </p:sp>
+      <p:sp>
+        <p:nvSpPr>
+          <p:cNvPr id="10" name="Down Arrow 9">
+            <a:extLst>
+              <a:ext uri="{FF2B5EF4-FFF2-40B4-BE49-F238E27FC236}">
+                <a16:creationId xmlns:a16="http://schemas.microsoft.com/office/drawing/2014/main" id="{091C097D-1761-144B-A132-49B872E9A4FD}"/>
+              </a:ext>
+            </a:extLst>
+          </p:cNvPr>
+          <p:cNvSpPr/>
+          <p:nvPr/>
+        </p:nvSpPr>
+        <p:spPr>
+          <a:xfrm>
+            <a:off x="8332522" y="3111342"/>
+            <a:ext cx="522514" cy="706180"/>
+          </a:xfrm>
+          <a:prstGeom prst="downArrow">
+            <a:avLst/>
+          </a:prstGeom>
+        </p:spPr>
+        <p:style>
+          <a:lnRef idx="2">
+            <a:schemeClr val="accent1">
+              <a:shade val="50000"/>
+            </a:schemeClr>
+          </a:lnRef>
+          <a:fillRef idx="1">
+            <a:schemeClr val="accent1"/>
+          </a:fillRef>
+          <a:effectRef idx="0">
+            <a:schemeClr val="accent1"/>
+          </a:effectRef>
+          <a:fontRef idx="minor">
+            <a:schemeClr val="lt1"/>
+          </a:fontRef>
+        </p:style>
+        <p:txBody>
+          <a:bodyPr rtlCol="0" anchor="ctr"/>
+          <a:lstStyle/>
+          <a:p>
+            <a:pPr algn="ctr"/>
+            <a:endParaRPr lang="en-US"/>
+          </a:p>
+        </p:txBody>
+      </p:sp>
+      <p:sp>
+        <p:nvSpPr>
+          <p:cNvPr id="11" name="TextBox 10">
+            <a:extLst>
+              <a:ext uri="{FF2B5EF4-FFF2-40B4-BE49-F238E27FC236}">
+                <a16:creationId xmlns:a16="http://schemas.microsoft.com/office/drawing/2014/main" id="{8F3E58A2-CF02-7A44-AA41-2F9186B139D6}"/>
+              </a:ext>
+            </a:extLst>
+          </p:cNvPr>
+          <p:cNvSpPr txBox="1"/>
+          <p:nvPr/>
+        </p:nvSpPr>
+        <p:spPr>
+          <a:xfrm>
+            <a:off x="2595944" y="1390892"/>
+            <a:ext cx="1512918" cy="523220"/>
+          </a:xfrm>
+          <a:prstGeom prst="rect">
+            <a:avLst/>
+          </a:prstGeom>
+          <a:noFill/>
+        </p:spPr>
+        <p:txBody>
+          <a:bodyPr wrap="square" rtlCol="0">
+            <a:spAutoFit/>
+          </a:bodyPr>
+          <a:lstStyle/>
+          <a:p>
+            <a:pPr algn="ctr"/>
+            <a:r>
+              <a:rPr lang="en-US" sz="2800" b="1" dirty="0">
+                <a:solidFill>
+                  <a:schemeClr val="accent4"/>
+                </a:solidFill>
+              </a:rPr>
+              <a:t>What </a:t>
+            </a:r>
+          </a:p>
+        </p:txBody>
+      </p:sp>
+      <p:sp>
+        <p:nvSpPr>
+          <p:cNvPr id="12" name="TextBox 11">
+            <a:extLst>
+              <a:ext uri="{FF2B5EF4-FFF2-40B4-BE49-F238E27FC236}">
+                <a16:creationId xmlns:a16="http://schemas.microsoft.com/office/drawing/2014/main" id="{4F526622-1CF9-D74A-AD27-43D50F666ACC}"/>
+              </a:ext>
+            </a:extLst>
+          </p:cNvPr>
+          <p:cNvSpPr txBox="1"/>
+          <p:nvPr/>
+        </p:nvSpPr>
+        <p:spPr>
+          <a:xfrm>
+            <a:off x="7837320" y="1390891"/>
+            <a:ext cx="1512918" cy="523220"/>
+          </a:xfrm>
+          <a:prstGeom prst="rect">
+            <a:avLst/>
+          </a:prstGeom>
+          <a:noFill/>
+        </p:spPr>
+        <p:txBody>
+          <a:bodyPr wrap="square" rtlCol="0">
+            <a:spAutoFit/>
+          </a:bodyPr>
+          <a:lstStyle/>
+          <a:p>
+            <a:pPr algn="ctr"/>
+            <a:r>
+              <a:rPr lang="en-US" sz="2800" b="1" dirty="0">
+                <a:solidFill>
+                  <a:schemeClr val="accent4"/>
+                </a:solidFill>
+              </a:rPr>
+              <a:t>How </a:t>
+            </a:r>
+          </a:p>
+        </p:txBody>
+      </p:sp>
+      <p:sp>
+        <p:nvSpPr>
+          <p:cNvPr id="13" name="Down Arrow 12">
+            <a:extLst>
+              <a:ext uri="{FF2B5EF4-FFF2-40B4-BE49-F238E27FC236}">
+                <a16:creationId xmlns:a16="http://schemas.microsoft.com/office/drawing/2014/main" id="{C326322C-0AB4-0B4A-B3B9-2C4C99411A05}"/>
+              </a:ext>
+            </a:extLst>
+          </p:cNvPr>
+          <p:cNvSpPr/>
+          <p:nvPr/>
+        </p:nvSpPr>
+        <p:spPr>
+          <a:xfrm>
+            <a:off x="5834743" y="5100860"/>
+            <a:ext cx="522514" cy="706180"/>
+          </a:xfrm>
+          <a:prstGeom prst="downArrow">
+            <a:avLst/>
+          </a:prstGeom>
+        </p:spPr>
+        <p:style>
+          <a:lnRef idx="2">
+            <a:schemeClr val="accent1">
+              <a:shade val="50000"/>
+            </a:schemeClr>
+          </a:lnRef>
+          <a:fillRef idx="1">
+            <a:schemeClr val="accent1"/>
+          </a:fillRef>
+          <a:effectRef idx="0">
+            <a:schemeClr val="accent1"/>
+          </a:effectRef>
+          <a:fontRef idx="minor">
+            <a:schemeClr val="lt1"/>
+          </a:fontRef>
+        </p:style>
+        <p:txBody>
+          <a:bodyPr rtlCol="0" anchor="ctr"/>
+          <a:lstStyle/>
+          <a:p>
+            <a:pPr algn="ctr"/>
+            <a:endParaRPr lang="en-US"/>
+          </a:p>
+        </p:txBody>
+      </p:sp>
+      <p:sp>
+        <p:nvSpPr>
+          <p:cNvPr id="14" name="TextBox 13">
+            <a:extLst>
+              <a:ext uri="{FF2B5EF4-FFF2-40B4-BE49-F238E27FC236}">
+                <a16:creationId xmlns:a16="http://schemas.microsoft.com/office/drawing/2014/main" id="{3A3EEE1F-EE1D-8B48-90E2-F61117361955}"/>
+              </a:ext>
+            </a:extLst>
+          </p:cNvPr>
+          <p:cNvSpPr txBox="1"/>
+          <p:nvPr/>
+        </p:nvSpPr>
+        <p:spPr>
+          <a:xfrm>
+            <a:off x="2564731" y="5807040"/>
+            <a:ext cx="7062537" cy="523220"/>
+          </a:xfrm>
+          <a:prstGeom prst="rect">
+            <a:avLst/>
+          </a:prstGeom>
+          <a:noFill/>
+        </p:spPr>
+        <p:txBody>
+          <a:bodyPr wrap="square" rtlCol="0">
+            <a:spAutoFit/>
+          </a:bodyPr>
+          <a:lstStyle/>
+          <a:p>
+            <a:pPr algn="ctr"/>
+            <a:r>
+              <a:rPr lang="en-US" sz="2800" b="1" dirty="0">
+                <a:solidFill>
+                  <a:schemeClr val="accent4"/>
+                </a:solidFill>
+              </a:rPr>
+              <a:t>Does the BPMN implements the CWP?</a:t>
+            </a:r>
+          </a:p>
+        </p:txBody>
+      </p:sp>
+      <p:sp>
+        <p:nvSpPr>
+          <p:cNvPr id="15" name="TextBox 14">
+            <a:extLst>
+              <a:ext uri="{FF2B5EF4-FFF2-40B4-BE49-F238E27FC236}">
+                <a16:creationId xmlns:a16="http://schemas.microsoft.com/office/drawing/2014/main" id="{A8C257F9-442D-904E-8D83-83CD92AC876C}"/>
+              </a:ext>
+            </a:extLst>
+          </p:cNvPr>
+          <p:cNvSpPr txBox="1"/>
+          <p:nvPr/>
+        </p:nvSpPr>
+        <p:spPr>
+          <a:xfrm>
+            <a:off x="47130" y="2958940"/>
+            <a:ext cx="3044016" cy="830997"/>
+          </a:xfrm>
+          <a:prstGeom prst="rect">
+            <a:avLst/>
+          </a:prstGeom>
+          <a:noFill/>
+        </p:spPr>
+        <p:txBody>
+          <a:bodyPr wrap="square" rtlCol="0">
+            <a:spAutoFit/>
+          </a:bodyPr>
+          <a:lstStyle/>
+          <a:p>
+            <a:pPr algn="r"/>
+            <a:r>
+              <a:rPr lang="en-US" sz="2400" dirty="0">
+                <a:solidFill>
+                  <a:schemeClr val="accent6"/>
+                </a:solidFill>
+              </a:rPr>
+              <a:t>To </a:t>
+            </a:r>
+            <a:r>
+              <a:rPr lang="en-US" sz="2400" b="1" i="1" dirty="0">
+                <a:solidFill>
+                  <a:schemeClr val="accent6">
+                    <a:lumMod val="60000"/>
+                    <a:lumOff val="40000"/>
+                  </a:schemeClr>
+                </a:solidFill>
+              </a:rPr>
+              <a:t>L</a:t>
+            </a:r>
+            <a:r>
+              <a:rPr lang="en-US" sz="2400" i="1" dirty="0">
+                <a:solidFill>
+                  <a:schemeClr val="accent6"/>
+                </a:solidFill>
+              </a:rPr>
+              <a:t>inear </a:t>
+            </a:r>
+            <a:r>
+              <a:rPr lang="en-US" sz="2400" b="1" i="1" dirty="0">
+                <a:solidFill>
+                  <a:schemeClr val="accent6">
+                    <a:lumMod val="60000"/>
+                    <a:lumOff val="40000"/>
+                  </a:schemeClr>
+                </a:solidFill>
+              </a:rPr>
+              <a:t>T</a:t>
+            </a:r>
+            <a:r>
+              <a:rPr lang="en-US" sz="2400" i="1" dirty="0">
+                <a:solidFill>
+                  <a:schemeClr val="accent6"/>
+                </a:solidFill>
+              </a:rPr>
+              <a:t>emporal </a:t>
+            </a:r>
+            <a:r>
+              <a:rPr lang="en-US" sz="2400" b="1" i="1" dirty="0">
+                <a:solidFill>
+                  <a:schemeClr val="accent6">
+                    <a:lumMod val="60000"/>
+                    <a:lumOff val="40000"/>
+                  </a:schemeClr>
+                </a:solidFill>
+              </a:rPr>
+              <a:t>L</a:t>
+            </a:r>
+            <a:r>
+              <a:rPr lang="en-US" sz="2400" i="1" dirty="0">
+                <a:solidFill>
+                  <a:schemeClr val="accent6"/>
+                </a:solidFill>
+              </a:rPr>
+              <a:t>ogic</a:t>
+            </a:r>
+            <a:r>
+              <a:rPr lang="en-US" sz="2400" dirty="0">
+                <a:solidFill>
+                  <a:schemeClr val="accent6"/>
+                </a:solidFill>
+              </a:rPr>
+              <a:t> (LTL)</a:t>
+            </a:r>
+          </a:p>
+        </p:txBody>
+      </p:sp>
+      <p:sp>
+        <p:nvSpPr>
+          <p:cNvPr id="16" name="TextBox 15">
+            <a:extLst>
+              <a:ext uri="{FF2B5EF4-FFF2-40B4-BE49-F238E27FC236}">
+                <a16:creationId xmlns:a16="http://schemas.microsoft.com/office/drawing/2014/main" id="{4DCDB506-6020-CE4D-81CF-7921A3DA9069}"/>
+              </a:ext>
+            </a:extLst>
+          </p:cNvPr>
+          <p:cNvSpPr txBox="1"/>
+          <p:nvPr/>
+        </p:nvSpPr>
+        <p:spPr>
+          <a:xfrm>
+            <a:off x="8855036" y="2982502"/>
+            <a:ext cx="2917371" cy="830997"/>
+          </a:xfrm>
+          <a:prstGeom prst="rect">
+            <a:avLst/>
+          </a:prstGeom>
+          <a:noFill/>
+        </p:spPr>
+        <p:txBody>
+          <a:bodyPr wrap="square" rtlCol="0">
+            <a:spAutoFit/>
+          </a:bodyPr>
+          <a:lstStyle/>
+          <a:p>
+            <a:r>
+              <a:rPr lang="en-US" sz="2400" dirty="0">
+                <a:solidFill>
+                  <a:schemeClr val="accent6"/>
+                </a:solidFill>
+              </a:rPr>
+              <a:t>To </a:t>
+            </a:r>
+            <a:r>
+              <a:rPr lang="en-US" sz="2400" b="1" i="1" dirty="0">
+                <a:solidFill>
+                  <a:schemeClr val="accent6">
+                    <a:lumMod val="60000"/>
+                    <a:lumOff val="40000"/>
+                  </a:schemeClr>
+                </a:solidFill>
+              </a:rPr>
+              <a:t>Pro</a:t>
+            </a:r>
+            <a:r>
+              <a:rPr lang="en-US" sz="2400" i="1" dirty="0">
+                <a:solidFill>
+                  <a:schemeClr val="accent6"/>
+                </a:solidFill>
+              </a:rPr>
+              <a:t>cess </a:t>
+            </a:r>
+            <a:r>
+              <a:rPr lang="en-US" sz="2400" b="1" i="1" dirty="0">
+                <a:solidFill>
+                  <a:schemeClr val="accent6">
+                    <a:lumMod val="60000"/>
+                    <a:lumOff val="40000"/>
+                  </a:schemeClr>
+                </a:solidFill>
+              </a:rPr>
+              <a:t>Me</a:t>
+            </a:r>
+            <a:r>
+              <a:rPr lang="en-US" sz="2400" i="1" dirty="0">
+                <a:solidFill>
+                  <a:schemeClr val="accent6"/>
+                </a:solidFill>
+              </a:rPr>
+              <a:t>ta </a:t>
+            </a:r>
+            <a:r>
+              <a:rPr lang="en-US" sz="2400" b="1" i="1" dirty="0">
+                <a:solidFill>
+                  <a:schemeClr val="accent6">
+                    <a:lumMod val="60000"/>
+                    <a:lumOff val="40000"/>
+                  </a:schemeClr>
+                </a:solidFill>
+              </a:rPr>
+              <a:t>La</a:t>
+            </a:r>
+            <a:r>
+              <a:rPr lang="en-US" sz="2400" i="1" dirty="0">
+                <a:solidFill>
+                  <a:schemeClr val="accent6"/>
+                </a:solidFill>
+              </a:rPr>
+              <a:t>nguage </a:t>
+            </a:r>
+            <a:r>
+              <a:rPr lang="en-US" sz="2400" dirty="0">
+                <a:solidFill>
+                  <a:schemeClr val="accent6"/>
+                </a:solidFill>
+              </a:rPr>
+              <a:t>(</a:t>
+            </a:r>
+            <a:r>
+              <a:rPr lang="en-US" sz="2400" dirty="0" err="1">
+                <a:solidFill>
+                  <a:schemeClr val="accent6"/>
+                </a:solidFill>
+              </a:rPr>
+              <a:t>Promela</a:t>
+            </a:r>
+            <a:r>
+              <a:rPr lang="en-US" sz="2400" dirty="0">
+                <a:solidFill>
+                  <a:schemeClr val="accent6"/>
+                </a:solidFill>
+              </a:rPr>
+              <a:t>)</a:t>
+            </a:r>
+          </a:p>
+        </p:txBody>
+      </p:sp>
+    </p:spTree>
+    <p:extLst>
+      <p:ext uri="{BB962C8B-B14F-4D97-AF65-F5344CB8AC3E}">
+        <p14:creationId xmlns:p14="http://schemas.microsoft.com/office/powerpoint/2010/main" val="1078906984"/>
       </p:ext>
     </p:extLst>
   </p:cSld>
@@ -21917,7 +22439,7 @@
         <p:spPr>
           <a:xfrm>
             <a:off x="8865326" y="691883"/>
-            <a:ext cx="3326674" cy="2369880"/>
+            <a:ext cx="3326674" cy="2862322"/>
           </a:xfrm>
           <a:prstGeom prst="rect">
             <a:avLst/>
@@ -21932,19 +22454,52 @@
           <a:p>
             <a:pPr algn="ctr"/>
             <a:r>
-              <a:rPr lang="en-US" sz="4800" dirty="0"/>
-              <a:t>CWP </a:t>
-            </a:r>
-          </a:p>
+              <a:rPr lang="en-US" sz="3600" dirty="0"/>
+              <a:t>The CWP of remote patient monitoring is </a:t>
+            </a:r>
+            <a:r>
+              <a:rPr lang="en-US" sz="3600" dirty="0">
+                <a:solidFill>
+                  <a:schemeClr val="accent5"/>
+                </a:solidFill>
+              </a:rPr>
+              <a:t>actionable risk awareness</a:t>
+            </a:r>
+          </a:p>
+        </p:txBody>
+      </p:sp>
+      <p:sp>
+        <p:nvSpPr>
+          <p:cNvPr id="12" name="TextBox 11">
+            <a:extLst>
+              <a:ext uri="{FF2B5EF4-FFF2-40B4-BE49-F238E27FC236}">
+                <a16:creationId xmlns:a16="http://schemas.microsoft.com/office/drawing/2014/main" id="{EE231628-1E57-804C-9EF1-936C16F25DFF}"/>
+              </a:ext>
+            </a:extLst>
+          </p:cNvPr>
+          <p:cNvSpPr txBox="1"/>
+          <p:nvPr/>
+        </p:nvSpPr>
+        <p:spPr>
+          <a:xfrm>
+            <a:off x="8865326" y="4717686"/>
+            <a:ext cx="3326674" cy="954107"/>
+          </a:xfrm>
+          <a:prstGeom prst="rect">
+            <a:avLst/>
+          </a:prstGeom>
+          <a:noFill/>
+        </p:spPr>
+        <p:txBody>
+          <a:bodyPr wrap="square" rtlCol="0">
+            <a:spAutoFit/>
+          </a:bodyPr>
+          <a:lstStyle/>
           <a:p>
             <a:pPr algn="ctr"/>
-            <a:endParaRPr lang="en-US" sz="2800" dirty="0"/>
-          </a:p>
-          <a:p>
-            <a:pPr algn="ctr"/>
-            <a:r>
-              <a:rPr lang="en-US" sz="3600" dirty="0"/>
-              <a:t>Remote Patient Monitoring</a:t>
+            <a:r>
+              <a:rPr lang="en-US" sz="2800" dirty="0"/>
+              <a:t>Defined with a UML State diagram</a:t>
             </a:r>
           </a:p>
         </p:txBody>
@@ -22329,7 +22884,7 @@
           <a:p>
             <a:r>
               <a:rPr lang="en-US" dirty="0"/>
-              <a:t>LTL for the CWP</a:t>
+              <a:t>UML Translation to Linear Temporal Logic</a:t>
             </a:r>
           </a:p>
         </p:txBody>
@@ -22378,7 +22933,7 @@
             <a:pPr algn="ctr"/>
             <a:r>
               <a:rPr lang="en-US" sz="2400" u="sng" dirty="0"/>
-              <a:t>CWP States</a:t>
+              <a:t>1. State</a:t>
             </a:r>
           </a:p>
           <a:p>
@@ -22392,7 +22947,7 @@
             </a:pPr>
             <a:r>
               <a:rPr lang="en-US" sz="2400" dirty="0"/>
-              <a:t>Define variables</a:t>
+              <a:t>Identify variables</a:t>
             </a:r>
           </a:p>
           <a:p>
@@ -22402,7 +22957,7 @@
             </a:pPr>
             <a:r>
               <a:rPr lang="en-US" sz="2400" dirty="0"/>
-              <a:t>Conjunct inputs</a:t>
+              <a:t>Define states</a:t>
             </a:r>
           </a:p>
           <a:p>
@@ -22410,10 +22965,7 @@
               <a:buFont typeface="Arial" panose="020B0604020202020204" pitchFamily="34" charset="0"/>
               <a:buChar char="•"/>
             </a:pPr>
-            <a:r>
-              <a:rPr lang="en-US" sz="2400" dirty="0"/>
-              <a:t>Negate outputs</a:t>
-            </a:r>
+            <a:endParaRPr lang="en-US" sz="2400" dirty="0"/>
           </a:p>
         </p:txBody>
       </p:sp>
@@ -22461,7 +23013,7 @@
             <a:pPr algn="ctr"/>
             <a:r>
               <a:rPr lang="en-US" sz="2400" u="sng" dirty="0"/>
-              <a:t>Global Properties</a:t>
+              <a:t>2. Global Properties</a:t>
             </a:r>
             <a:r>
               <a:rPr lang="en-US" sz="2400" dirty="0"/>
@@ -22545,7 +23097,7 @@
             <a:pPr algn="ctr"/>
             <a:r>
               <a:rPr lang="en-US" sz="2400" u="sng" dirty="0"/>
-              <a:t>State Properties</a:t>
+              <a:t>3. State Properties</a:t>
             </a:r>
           </a:p>
           <a:p>
@@ -22783,6 +23335,10 @@
           <a:lstStyle/>
           <a:p>
             <a:r>
+              <a:rPr lang="en-US" dirty="0"/>
+              <a:t>1. </a:t>
+            </a:r>
+            <a:r>
               <a:rPr lang="en-US" kern="1200" dirty="0">
                 <a:solidFill>
                   <a:schemeClr val="tx1"/>
@@ -22791,7 +23347,7 @@
                 <a:ea typeface="+mj-ea"/>
                 <a:cs typeface="+mj-cs"/>
               </a:rPr>
-              <a:t>CWP State</a:t>
+              <a:t>State: variables </a:t>
             </a:r>
           </a:p>
         </p:txBody>
@@ -23222,6 +23778,46 @@
               <a:rPr lang="en-US" sz="3200" dirty="0"/>
               <a:t>)</a:t>
             </a:r>
+          </a:p>
+        </p:txBody>
+      </p:sp>
+      <p:sp>
+        <p:nvSpPr>
+          <p:cNvPr id="3" name="Rectangle 2">
+            <a:extLst>
+              <a:ext uri="{FF2B5EF4-FFF2-40B4-BE49-F238E27FC236}">
+                <a16:creationId xmlns:a16="http://schemas.microsoft.com/office/drawing/2014/main" id="{F3C5C6D3-20F0-524F-9E11-E91587BCD436}"/>
+              </a:ext>
+            </a:extLst>
+          </p:cNvPr>
+          <p:cNvSpPr/>
+          <p:nvPr/>
+        </p:nvSpPr>
+        <p:spPr>
+          <a:xfrm>
+            <a:off x="7362488" y="550050"/>
+            <a:ext cx="3559974" cy="646331"/>
+          </a:xfrm>
+          <a:prstGeom prst="rect">
+            <a:avLst/>
+          </a:prstGeom>
+        </p:spPr>
+        <p:txBody>
+          <a:bodyPr wrap="square">
+            <a:spAutoFit/>
+          </a:bodyPr>
+          <a:lstStyle/>
+          <a:p>
+            <a:pPr algn="ctr"/>
+            <a:r>
+              <a:rPr lang="en-US" dirty="0">
+                <a:solidFill>
+                  <a:schemeClr val="accent5"/>
+                </a:solidFill>
+              </a:rPr>
+              <a:t>Actionable Risk Awareness in Remote Patient Monitoring</a:t>
+            </a:r>
+            <a:endParaRPr lang="en-US" dirty="0"/>
           </a:p>
         </p:txBody>
       </p:sp>

</xml_diff>

<commit_message>
Add script upto BPMN
</commit_message>
<xml_diff>
--- a/presentation/syscon-2022.pptx
+++ b/presentation/syscon-2022.pptx
@@ -217,7 +217,7 @@
           <a:p>
             <a:fld id="{4F670BAA-F977-EB44-80DC-ADC002811BE9}" type="datetimeFigureOut">
               <a:rPr lang="en-US" smtClean="0"/>
-              <a:t>4/6/22</a:t>
+              <a:t>4/7/22</a:t>
             </a:fld>
             <a:endParaRPr lang="en-US"/>
           </a:p>
@@ -530,7 +530,7 @@
           <a:p>
             <a:r>
               <a:rPr lang="en-US" dirty="0"/>
-              <a:t>Human machine teaming is fast becoming ubiquitous as machine reasoning and automation is integrated into workflows.</a:t>
+              <a:t>Human machine teaming is fast becoming ubiquitous as machine reasoning and automation is integrated into workflows, and it is not uncommon for emergent, unexpected behavior, to arise in such teaming.</a:t>
             </a:r>
           </a:p>
           <a:p>
@@ -539,25 +539,7 @@
           <a:p>
             <a:r>
               <a:rPr lang="en-US" dirty="0"/>
-              <a:t>It business, it creates a capitol risk.</a:t>
-            </a:r>
-          </a:p>
-          <a:p>
-            <a:endParaRPr lang="en-US" dirty="0"/>
-          </a:p>
-          <a:p>
-            <a:r>
-              <a:rPr lang="en-US" dirty="0"/>
-              <a:t>It healthcare, it creates a health and safety risk.</a:t>
-            </a:r>
-          </a:p>
-          <a:p>
-            <a:endParaRPr lang="en-US" dirty="0"/>
-          </a:p>
-          <a:p>
-            <a:r>
-              <a:rPr lang="en-US" dirty="0"/>
-              <a:t>As workflows are defined that include automation or machine reasoning, functional integration is very important. </a:t>
+              <a:t>Identifying and analyzing emergent behavior is most important in capital, or safety, critical systems where such behavior can lead to significant harm, injury, or even loss of life.</a:t>
             </a:r>
           </a:p>
         </p:txBody>
@@ -644,7 +626,7 @@
           <a:p>
             <a:r>
               <a:rPr lang="en-US" dirty="0"/>
-              <a:t>The “object” is the state of the BPMN claiming to implement this CWP.</a:t>
+              <a:t>The first is that a system must always be in some state of the conceptual work problem. Always. So at least one of the predicates must be true at every point of the system.</a:t>
             </a:r>
           </a:p>
           <a:p>
@@ -653,7 +635,7 @@
           <a:p>
             <a:r>
               <a:rPr lang="en-US" dirty="0"/>
-              <a:t>That BPMN must have a mapping from it’s state to the variables that define the state of the CWP.</a:t>
+              <a:t>Click.</a:t>
             </a:r>
           </a:p>
           <a:p>
@@ -662,8 +644,56 @@
           <a:p>
             <a:r>
               <a:rPr lang="en-US" dirty="0"/>
-              <a:t>Every state of the BPMN must be is some state of the CWP. Always.</a:t>
-            </a:r>
+              <a:t>The second is that the system eventually arrives at the goal states: discharged or expired.</a:t>
+            </a:r>
+          </a:p>
+          <a:p>
+            <a:endParaRPr lang="en-US" dirty="0"/>
+          </a:p>
+          <a:p>
+            <a:r>
+              <a:rPr lang="en-US" dirty="0"/>
+              <a:t>This property is labeled fair and is used later in other properties. </a:t>
+            </a:r>
+          </a:p>
+          <a:p>
+            <a:endParaRPr lang="en-US" dirty="0"/>
+          </a:p>
+          <a:p>
+            <a:r>
+              <a:rPr lang="en-US" dirty="0"/>
+              <a:t>The model checker considers everything allowed by the system, however improbable, so it might be possible that the system has paths where a patient is never discharged and never dies.</a:t>
+            </a:r>
+          </a:p>
+          <a:p>
+            <a:endParaRPr lang="en-US" dirty="0"/>
+          </a:p>
+          <a:p>
+            <a:r>
+              <a:rPr lang="en-US" dirty="0"/>
+              <a:t>When analyzing systems, these impossible paths should be ignored; hence, the term fair, the model checker should only reason about fair paths or the paths that end in any one of the goal states.</a:t>
+            </a:r>
+          </a:p>
+          <a:p>
+            <a:endParaRPr lang="en-US" dirty="0"/>
+          </a:p>
+          <a:p>
+            <a:r>
+              <a:rPr lang="en-US" dirty="0"/>
+              <a:t>Additionally, the model checker must prove that at least one fair path exists in the system.</a:t>
+            </a:r>
+          </a:p>
+          <a:p>
+            <a:endParaRPr lang="en-US" dirty="0"/>
+          </a:p>
+          <a:p>
+            <a:r>
+              <a:rPr lang="en-US" dirty="0"/>
+              <a:t>That is the meaning of the second global property: at least one fair path exists.</a:t>
+            </a:r>
+          </a:p>
+          <a:p>
+            <a:endParaRPr lang="en-US" dirty="0"/>
           </a:p>
         </p:txBody>
       </p:sp>
@@ -747,6 +777,69 @@
           <a:bodyPr/>
           <a:lstStyle/>
           <a:p>
+            <a:r>
+              <a:rPr lang="en-US" dirty="0"/>
+              <a:t>There are three properties created by every state of the conceptual work problem.</a:t>
+            </a:r>
+          </a:p>
+          <a:p>
+            <a:endParaRPr lang="en-US" dirty="0"/>
+          </a:p>
+          <a:p>
+            <a:r>
+              <a:rPr lang="en-US" dirty="0"/>
+              <a:t>The first property says that the state must be reachable on some fair path of the system.</a:t>
+            </a:r>
+          </a:p>
+          <a:p>
+            <a:r>
+              <a:rPr lang="en-US" dirty="0"/>
+              <a:t>Here it is "always not  (2)"  because if the model checker finds a path to 2 in the system, then it will report that path as a witness to the existence of state 2.</a:t>
+            </a:r>
+          </a:p>
+          <a:p>
+            <a:endParaRPr lang="en-US" dirty="0"/>
+          </a:p>
+          <a:p>
+            <a:r>
+              <a:rPr lang="en-US" dirty="0"/>
+              <a:t>Click</a:t>
+            </a:r>
+          </a:p>
+          <a:p>
+            <a:endParaRPr lang="en-US" dirty="0"/>
+          </a:p>
+          <a:p>
+            <a:r>
+              <a:rPr lang="en-US" dirty="0"/>
+              <a:t>The second property is that the system is never in more than one state at a time--mode confusion. If this property is every violated, then more information must be added to the state diagram for the conceptual work problem in order to differentiate the states.</a:t>
+            </a:r>
+          </a:p>
+          <a:p>
+            <a:endParaRPr lang="en-US" dirty="0"/>
+          </a:p>
+          <a:p>
+            <a:r>
+              <a:rPr lang="en-US" dirty="0"/>
+              <a:t>Click</a:t>
+            </a:r>
+          </a:p>
+          <a:p>
+            <a:endParaRPr lang="en-US" dirty="0"/>
+          </a:p>
+          <a:p>
+            <a:r>
+              <a:rPr lang="en-US" dirty="0"/>
+              <a:t>The third property is that the system, when moving from one state to another in the state diagram only follows the defined transitions.</a:t>
+            </a:r>
+          </a:p>
+          <a:p>
+            <a:r>
+              <a:rPr lang="en-US" dirty="0"/>
+              <a:t>So anytime the system is in state 2 on some fair path, it stays in state 2 until it transitions to either state 3 or state 5. </a:t>
+            </a:r>
+          </a:p>
+          <a:p>
             <a:endParaRPr lang="en-US" dirty="0"/>
           </a:p>
         </p:txBody>
@@ -831,7 +924,19 @@
           <a:bodyPr/>
           <a:lstStyle/>
           <a:p>
+            <a:r>
+              <a:rPr lang="en-US" dirty="0"/>
+              <a:t>There are 20 properties in total that must hold for any system claiming to solve the conceptual work problem of actionable risk awareness for remote patient care for COVID 19.</a:t>
+            </a:r>
+          </a:p>
+          <a:p>
             <a:endParaRPr lang="en-US" dirty="0"/>
+          </a:p>
+          <a:p>
+            <a:r>
+              <a:rPr lang="en-US" dirty="0"/>
+              <a:t>These systems, in this work, are specified as workflows using the BPMN modeling language.</a:t>
+            </a:r>
           </a:p>
         </p:txBody>
       </p:sp>
@@ -1457,7 +1562,7 @@
           <a:p>
             <a:r>
               <a:rPr lang="en-US" dirty="0"/>
-              <a:t>There is an inherent discontinuity in performance and ability between a human and a machine. </a:t>
+              <a:t>There are two challenges to analyzing the functional integration in these workflows.</a:t>
             </a:r>
           </a:p>
           <a:p>
@@ -1466,7 +1571,7 @@
           <a:p>
             <a:r>
               <a:rPr lang="en-US" dirty="0"/>
-              <a:t>That goes both ways. </a:t>
+              <a:t>The first is the inherent discontinuity in performance and ability between a human and a machine. </a:t>
             </a:r>
           </a:p>
           <a:p>
@@ -1475,43 +1580,7 @@
           <a:p>
             <a:r>
               <a:rPr lang="en-US" dirty="0"/>
-              <a:t>There are things the machine can do that the human cannot and there are things the human can do that the machine cannot.</a:t>
-            </a:r>
-          </a:p>
-          <a:p>
-            <a:endParaRPr lang="en-US" dirty="0"/>
-          </a:p>
-          <a:p>
-            <a:r>
-              <a:rPr lang="en-US" dirty="0"/>
-              <a:t>When thinking of functional integration, these differences in ability and performance challenge traditional methods.</a:t>
-            </a:r>
-          </a:p>
-          <a:p>
-            <a:endParaRPr lang="en-US" dirty="0"/>
-          </a:p>
-          <a:p>
-            <a:r>
-              <a:rPr lang="en-US" dirty="0"/>
-              <a:t>Conventional methods are event sequence diagrams and use cases. These do not directly address decisions, and they do not specify the behavior of the entire system. These are just a set of scenarios. They don’t address integrating these scenarios.</a:t>
-            </a:r>
-          </a:p>
-          <a:p>
-            <a:endParaRPr lang="en-US" dirty="0"/>
-          </a:p>
-          <a:p>
-            <a:r>
-              <a:rPr lang="en-US" dirty="0"/>
-              <a:t>Other conventional methods focus of appropriate responsibility assignments. Assignments are not integration.</a:t>
-            </a:r>
-          </a:p>
-          <a:p>
-            <a:endParaRPr lang="en-US" dirty="0"/>
-          </a:p>
-          <a:p>
-            <a:r>
-              <a:rPr lang="en-US" dirty="0"/>
-              <a:t>UML sequence charts are not functional integration. Who-should-do-what is not integration either. </a:t>
+              <a:t>When thinking of functional integration, these differences challenge traditional analysis methods such as use cases with sequence diagrams as these do not reason about the system as a whole, through time, where unexpected behaviors arise.</a:t>
             </a:r>
           </a:p>
           <a:p>
@@ -1601,20 +1670,14 @@
           <a:p>
             <a:r>
               <a:rPr lang="en-US" dirty="0"/>
-              <a:t>Humans are not good when it comes to reasoning about asynchronous interaction.</a:t>
-            </a:r>
-          </a:p>
-          <a:p>
-            <a:endParaRPr lang="en-US" dirty="0"/>
+              <a:t>The second challenge is that humans are not good at reasoning about parallel and distributed systems.</a:t>
+            </a:r>
           </a:p>
           <a:p>
             <a:r>
               <a:rPr lang="en-US" dirty="0"/>
-              <a:t>They don’t see emergent behavior, and they don’t see unintended consequences of synchronization (or the lack thereof).</a:t>
-            </a:r>
-          </a:p>
-          <a:p>
-            <a:endParaRPr lang="en-US" dirty="0"/>
+              <a:t>Behaviors in asynchronous systems grow exponentially making it impossible to reason manually over any but the most trivial systems.</a:t>
+            </a:r>
           </a:p>
         </p:txBody>
       </p:sp>
@@ -1700,35 +1763,55 @@
           <a:p>
             <a:r>
               <a:rPr lang="en-US" dirty="0"/>
-              <a:t>Complex, distributed, asynchronous and safety-critical</a:t>
-            </a:r>
-          </a:p>
-          <a:p>
+              <a:t>An example of functional integration of human and machine reasoning is in a system for remote patient monitoring of COVID-19 patients with </a:t>
+            </a:r>
+            <a:r>
+              <a:rPr lang="en-US" dirty="0" err="1"/>
+              <a:t>Phware</a:t>
+            </a:r>
             <a:r>
               <a:rPr lang="en-US" dirty="0"/>
-              <a:t>Patent-pending</a:t>
+              <a:t>.</a:t>
+            </a:r>
+          </a:p>
+          <a:p>
+            <a:endParaRPr lang="en-US" dirty="0"/>
+          </a:p>
+          <a:p>
+            <a:r>
+              <a:rPr lang="en-US" dirty="0"/>
+              <a:t>It is a complex, distributed, asynchronous, and safety-critical system.</a:t>
+            </a:r>
+          </a:p>
+          <a:p>
+            <a:endParaRPr lang="en-US" dirty="0"/>
+          </a:p>
+          <a:p>
+            <a:r>
+              <a:rPr lang="en-US" dirty="0"/>
+              <a:t>It consists of a Patent-pending</a:t>
             </a:r>
             <a:r>
               <a:rPr lang="en-US" baseline="0" dirty="0"/>
-              <a:t> technology for a single finger-clip to capture 7 major vital signs in a single 60-90 second session.</a:t>
+              <a:t> technology for a single finger-clip to measure vital signs.</a:t>
             </a:r>
           </a:p>
           <a:p>
             <a:r>
               <a:rPr lang="en-US" baseline="0" dirty="0"/>
-              <a:t>The clip sends data to a smart phone app to relay to the AI Cloud Server, where numerical values are assigned and time trends analyzed.</a:t>
+              <a:t>Those vitals are sent by a smart phone application to the cloud for AI analysis.</a:t>
             </a:r>
           </a:p>
           <a:p>
             <a:r>
               <a:rPr lang="en-US" baseline="0" dirty="0"/>
-              <a:t>An alert is generated if changes in vitals exceed healthy limits.</a:t>
+              <a:t>The AI predicts trends, and generates alerts, if trends or values exceed healthy limits.</a:t>
             </a:r>
           </a:p>
           <a:p>
             <a:r>
               <a:rPr lang="en-US" baseline="0" dirty="0"/>
-              <a:t>Doctors or nurses can monitor the patient’s vitals remotely with a special web app. The app prioritizes the patients with alerts, and the data of an alert can be reviewed with one click.</a:t>
+              <a:t>The trends and alerts are sent to doctors or nurses that monitor the patient’s vitals remotely. </a:t>
             </a:r>
           </a:p>
           <a:p>
@@ -1736,7 +1819,21 @@
               <a:rPr lang="en-US" baseline="0" dirty="0"/>
               <a:t> </a:t>
             </a:r>
-            <a:endParaRPr lang="en-US" dirty="0"/>
+          </a:p>
+          <a:p>
+            <a:r>
+              <a:rPr lang="en-US" baseline="0" dirty="0"/>
+              <a:t>The fundamental question about this system is does it ever risk patient safety?</a:t>
+            </a:r>
+          </a:p>
+          <a:p>
+            <a:endParaRPr lang="en-US" baseline="0" dirty="0"/>
+          </a:p>
+          <a:p>
+            <a:r>
+              <a:rPr lang="en-US" baseline="0" dirty="0"/>
+              <a:t>That question cannot be answered without knowing what patient safety means and defining a way to check it on the system.</a:t>
+            </a:r>
           </a:p>
         </p:txBody>
       </p:sp>
@@ -1821,37 +1918,89 @@
           <a:lstStyle/>
           <a:p>
             <a:r>
+              <a:rPr lang="en-US" baseline="0" dirty="0"/>
+              <a:t>The solution proposed in this work is to separate WHAT a system must do from HOW it does it.</a:t>
+            </a:r>
+          </a:p>
+          <a:p>
+            <a:r>
+              <a:rPr lang="en-US" baseline="0" dirty="0"/>
+              <a:t>The meaning of  ”patient safety” is first described as a conceptual work problem.</a:t>
+            </a:r>
+          </a:p>
+          <a:p>
+            <a:r>
+              <a:rPr lang="en-US" baseline="0" dirty="0"/>
+              <a:t>It is a declarative statement in the from of a UML state diagram that describes what a system must accomplish.</a:t>
+            </a:r>
+          </a:p>
+          <a:p>
+            <a:r>
+              <a:rPr lang="en-US" baseline="0" dirty="0"/>
+              <a:t>The state diagram defines allowable states of the problem and allowable ways that problem evolves overtime until it reaches some set of goal or end states.</a:t>
+            </a:r>
+          </a:p>
+          <a:p>
+            <a:endParaRPr lang="en-US" baseline="0" dirty="0"/>
+          </a:p>
+          <a:p>
+            <a:r>
+              <a:rPr lang="en-US" baseline="0" dirty="0"/>
+              <a:t>The HOW is the system design. In this application, it is a workflow in the business process modeling notation.</a:t>
+            </a:r>
+          </a:p>
+          <a:p>
+            <a:endParaRPr lang="en-US" baseline="0" dirty="0"/>
+          </a:p>
+          <a:p>
+            <a:r>
+              <a:rPr lang="en-US" baseline="0" dirty="0"/>
+              <a:t>Graphical standards are used so that doctors and other stake holders are able to participate in the design process.</a:t>
+            </a:r>
+          </a:p>
+          <a:p>
+            <a:endParaRPr lang="en-US" dirty="0"/>
+          </a:p>
+          <a:p>
+            <a:r>
               <a:rPr lang="en-US" dirty="0"/>
-              <a:t>We distinguish between WHAT a system must</a:t>
-            </a:r>
-            <a:r>
-              <a:rPr lang="en-US" baseline="0" dirty="0"/>
-              <a:t> accomplish vs HOW it will do it.</a:t>
-            </a:r>
-          </a:p>
-          <a:p>
-            <a:r>
-              <a:rPr lang="en-US" baseline="0" dirty="0"/>
-              <a:t>Graphical standards were used to include doctors and other SMEs to participate and critique design</a:t>
-            </a:r>
-          </a:p>
-          <a:p>
-            <a:r>
-              <a:rPr lang="en-US" baseline="0" dirty="0"/>
-              <a:t>The graphs must be translated for formal model-checking. UML state machines to LTL and BPMN to </a:t>
-            </a:r>
-            <a:r>
-              <a:rPr lang="en-US" baseline="0" dirty="0" err="1"/>
+              <a:t>The WHAT and HOW are related to one another through model checking.</a:t>
+            </a:r>
+          </a:p>
+          <a:p>
+            <a:endParaRPr lang="en-US" dirty="0"/>
+          </a:p>
+          <a:p>
+            <a:r>
+              <a:rPr lang="en-US" dirty="0"/>
+              <a:t>In this application the model checker is SPIN. The WHAT is a set of linear temporal logic properties from the state diagram, and the HOW is a </a:t>
+            </a:r>
+            <a:r>
+              <a:rPr lang="en-US" dirty="0" err="1"/>
               <a:t>Promela</a:t>
             </a:r>
             <a:r>
-              <a:rPr lang="en-US" baseline="0" dirty="0"/>
-              <a:t>.</a:t>
-            </a:r>
+              <a:rPr lang="en-US" dirty="0"/>
+              <a:t> version of the system design.</a:t>
+            </a:r>
+          </a:p>
+          <a:p>
             <a:endParaRPr lang="en-US" dirty="0"/>
           </a:p>
           <a:p>
+            <a:r>
+              <a:rPr lang="en-US" dirty="0"/>
+              <a:t>The model checker then proves whether or not the system design solves the cognitive work problem.</a:t>
+            </a:r>
+          </a:p>
+          <a:p>
             <a:endParaRPr lang="en-US" dirty="0"/>
+          </a:p>
+          <a:p>
+            <a:r>
+              <a:rPr lang="en-US" dirty="0"/>
+              <a:t>This work claims that without such analysis it is difficult to argue the absence of unwanted emergent behavior in the functional integration of human and machine reasoning.</a:t>
+            </a:r>
           </a:p>
         </p:txBody>
       </p:sp>
@@ -1936,50 +2085,144 @@
           <a:lstStyle/>
           <a:p>
             <a:r>
-              <a:rPr lang="en-US" dirty="0"/>
-              <a:t>Computation Independent Model</a:t>
-            </a:r>
-          </a:p>
-          <a:p>
-            <a:r>
-              <a:rPr lang="en-US" dirty="0"/>
-              <a:t>Content based on NIH Guidelines for non-hospitalized COVID patients.</a:t>
-            </a:r>
-          </a:p>
-          <a:p>
-            <a:r>
-              <a:rPr lang="en-US" dirty="0"/>
-              <a:t>Defines the state for the functional integration—see the conditions on the edges. </a:t>
-            </a:r>
-          </a:p>
-          <a:p>
-            <a:r>
-              <a:rPr lang="en-US" dirty="0"/>
-              <a:t>Finite state machine represents-</a:t>
-            </a:r>
-          </a:p>
-          <a:p>
-            <a:pPr lvl="1"/>
-            <a:r>
-              <a:rPr lang="en-US" dirty="0"/>
-              <a:t>relevant states home care patients can occupy</a:t>
-            </a:r>
-          </a:p>
-          <a:p>
-            <a:pPr lvl="1"/>
-            <a:r>
-              <a:rPr lang="en-US" dirty="0"/>
-              <a:t>physical events and exam findings that guard state transitions.</a:t>
-            </a:r>
-          </a:p>
-          <a:p>
-            <a:r>
-              <a:rPr lang="en-US" dirty="0"/>
-              <a:t>Graphical UML standard that allowed SME participation in design.</a:t>
-            </a:r>
-          </a:p>
-          <a:p>
-            <a:endParaRPr lang="en-US" dirty="0"/>
+              <a:rPr lang="en-US" baseline="0" dirty="0"/>
+              <a:t>Patient safety is defined by the cognitive work problem of actionable risk awareness.</a:t>
+            </a:r>
+          </a:p>
+          <a:p>
+            <a:r>
+              <a:rPr lang="en-US" baseline="0" dirty="0"/>
+              <a:t>It is computation independent, defined by a UML state diagram, and complies with NIH guidelines.</a:t>
+            </a:r>
+          </a:p>
+          <a:p>
+            <a:endParaRPr lang="en-US" baseline="0" dirty="0"/>
+          </a:p>
+          <a:p>
+            <a:r>
+              <a:rPr lang="en-US" baseline="0" dirty="0"/>
+              <a:t>It starts with a positive exam. Based on the severity and the ability of the patient to be cared for at home, the doctor prescribes homecare (A) or other appropriate care (B).</a:t>
+            </a:r>
+          </a:p>
+          <a:p>
+            <a:endParaRPr lang="en-US" baseline="0" dirty="0"/>
+          </a:p>
+          <a:p>
+            <a:r>
+              <a:rPr lang="en-US" baseline="0" dirty="0"/>
+              <a:t>Click</a:t>
+            </a:r>
+          </a:p>
+          <a:p>
+            <a:endParaRPr lang="en-US" baseline="0" dirty="0"/>
+          </a:p>
+          <a:p>
+            <a:r>
+              <a:rPr lang="en-US" baseline="0" dirty="0"/>
+              <a:t>When the doctor prescribes homecare, the orders include an monitoring and exam schedule, and it is hoped that at some point an exam finds that the patient meets discharge criteria and no longer needs monitoring.</a:t>
+            </a:r>
+          </a:p>
+          <a:p>
+            <a:endParaRPr lang="en-US" baseline="0" dirty="0"/>
+          </a:p>
+          <a:p>
+            <a:r>
+              <a:rPr lang="en-US" baseline="0" dirty="0"/>
+              <a:t>Click</a:t>
+            </a:r>
+          </a:p>
+          <a:p>
+            <a:endParaRPr lang="en-US" baseline="0" dirty="0"/>
+          </a:p>
+          <a:p>
+            <a:r>
+              <a:rPr lang="en-US" baseline="0" dirty="0"/>
+              <a:t>It is also possible that the severity of the disease progresses in homecare to a point where the patient is at an elevated risk.</a:t>
+            </a:r>
+          </a:p>
+          <a:p>
+            <a:r>
+              <a:rPr lang="en-US" baseline="0" dirty="0"/>
+              <a:t>Here there is a possibility of the patient passing.</a:t>
+            </a:r>
+          </a:p>
+          <a:p>
+            <a:endParaRPr lang="en-US" baseline="0" dirty="0"/>
+          </a:p>
+          <a:p>
+            <a:r>
+              <a:rPr lang="en-US" baseline="0" dirty="0"/>
+              <a:t>Click</a:t>
+            </a:r>
+          </a:p>
+          <a:p>
+            <a:endParaRPr lang="en-US" baseline="0" dirty="0"/>
+          </a:p>
+          <a:p>
+            <a:r>
+              <a:rPr lang="en-US" baseline="0" dirty="0"/>
+              <a:t>That said, an exam may find that the patient is no longer safe at home.</a:t>
+            </a:r>
+          </a:p>
+          <a:p>
+            <a:endParaRPr lang="en-US" baseline="0" dirty="0"/>
+          </a:p>
+          <a:p>
+            <a:r>
+              <a:rPr lang="en-US" baseline="0" dirty="0"/>
+              <a:t>Click</a:t>
+            </a:r>
+          </a:p>
+          <a:p>
+            <a:endParaRPr lang="en-US" baseline="0" dirty="0"/>
+          </a:p>
+          <a:p>
+            <a:r>
+              <a:rPr lang="en-US" baseline="0" dirty="0"/>
+              <a:t>Or that the patient can still be safe at home with an appropriate change in monitoring or other prescriptions to manage the disease.</a:t>
+            </a:r>
+          </a:p>
+          <a:p>
+            <a:endParaRPr lang="en-US" baseline="0" dirty="0"/>
+          </a:p>
+          <a:p>
+            <a:r>
+              <a:rPr lang="en-US" baseline="0" dirty="0"/>
+              <a:t>Click</a:t>
+            </a:r>
+          </a:p>
+          <a:p>
+            <a:endParaRPr lang="en-US" baseline="0" dirty="0"/>
+          </a:p>
+          <a:p>
+            <a:r>
+              <a:rPr lang="en-US" baseline="0" dirty="0"/>
+              <a:t>The patient of course may pass while being cared for outside the home.</a:t>
+            </a:r>
+          </a:p>
+          <a:p>
+            <a:endParaRPr lang="en-US" baseline="0" dirty="0"/>
+          </a:p>
+          <a:p>
+            <a:r>
+              <a:rPr lang="en-US" baseline="0" dirty="0"/>
+              <a:t>Click</a:t>
+            </a:r>
+          </a:p>
+          <a:p>
+            <a:endParaRPr lang="en-US" baseline="0" dirty="0"/>
+          </a:p>
+          <a:p>
+            <a:r>
+              <a:rPr lang="en-US" baseline="0" dirty="0"/>
+              <a:t>Or recover and be discharged from care.</a:t>
+            </a:r>
+          </a:p>
+          <a:p>
+            <a:endParaRPr lang="en-US" baseline="0" dirty="0"/>
+          </a:p>
+          <a:p>
+            <a:endParaRPr lang="en-US" baseline="0" dirty="0"/>
           </a:p>
         </p:txBody>
       </p:sp>
@@ -2063,7 +2306,70 @@
           <a:bodyPr/>
           <a:lstStyle/>
           <a:p>
+            <a:r>
+              <a:rPr lang="en-US" dirty="0"/>
+              <a:t>The conceptual work problem defines the states of actionable risk awareness for the patient.</a:t>
+            </a:r>
+          </a:p>
+          <a:p>
+            <a:r>
+              <a:rPr lang="en-US" dirty="0"/>
+              <a:t>The model checker is going to show that the system only resides in those states _and_ only follows allowed transitions to the goal states.</a:t>
+            </a:r>
+          </a:p>
+          <a:p>
             <a:endParaRPr lang="en-US" dirty="0"/>
+          </a:p>
+          <a:p>
+            <a:r>
+              <a:rPr lang="en-US" dirty="0"/>
+              <a:t>To prove these claims, the state diagram for the conceptual work problem is turned into a set of properties for the model checker to verify. If all the properties pass verification, then the system solves the conceptual work problem.</a:t>
+            </a:r>
+          </a:p>
+          <a:p>
+            <a:endParaRPr lang="en-US" dirty="0"/>
+          </a:p>
+          <a:p>
+            <a:r>
+              <a:rPr lang="en-US" dirty="0"/>
+              <a:t>Click</a:t>
+            </a:r>
+          </a:p>
+          <a:p>
+            <a:endParaRPr lang="en-US" dirty="0"/>
+          </a:p>
+          <a:p>
+            <a:endParaRPr lang="en-US" dirty="0"/>
+          </a:p>
+          <a:p>
+            <a:r>
+              <a:rPr lang="en-US" dirty="0"/>
+              <a:t>These are captured in a set of properties created over three steps: first state the conditions for when the system resides in each state of the UML diagram. </a:t>
+            </a:r>
+          </a:p>
+          <a:p>
+            <a:endParaRPr lang="en-US" dirty="0"/>
+          </a:p>
+          <a:p>
+            <a:r>
+              <a:rPr lang="en-US" dirty="0"/>
+              <a:t>With those conditions defined, then we have two global properties: the a system that solves the CWP must always be in one of its defined states, and that solution must be able to reach a goal state of the CWP.</a:t>
+            </a:r>
+          </a:p>
+          <a:p>
+            <a:r>
+              <a:rPr lang="en-US" dirty="0"/>
+              <a:t>There are three additional properties for each state in the UML diagram: a system that solves the CWP must be able to reach each state, never be in two states at once, and only follow allowed edges in the UML.</a:t>
+            </a:r>
+          </a:p>
+          <a:p>
+            <a:endParaRPr lang="en-US" dirty="0"/>
+          </a:p>
+          <a:p>
+            <a:r>
+              <a:rPr lang="en-US" dirty="0"/>
+              <a:t>These three steps are discussed in detail individually.</a:t>
+            </a:r>
           </a:p>
         </p:txBody>
       </p:sp>
@@ -2147,7 +2453,55 @@
           <a:bodyPr/>
           <a:lstStyle/>
           <a:p>
+            <a:r>
+              <a:rPr lang="en-US" dirty="0"/>
+              <a:t>Every state is associated with a predicate that is true if the system is in that state and false otherwise.</a:t>
+            </a:r>
+          </a:p>
+          <a:p>
+            <a:r>
+              <a:rPr lang="en-US" dirty="0"/>
+              <a:t>The predicates are defined by the variables referenced in the conditions on the edges in the state diagram.</a:t>
+            </a:r>
+          </a:p>
+          <a:p>
+            <a:r>
+              <a:rPr lang="en-US" dirty="0"/>
+              <a:t>Here the edges look at orders, </a:t>
+            </a:r>
+            <a:r>
+              <a:rPr lang="en-US" dirty="0" err="1"/>
+              <a:t>sevNeed</a:t>
+            </a:r>
+            <a:r>
+              <a:rPr lang="en-US" dirty="0"/>
+              <a:t>, </a:t>
+            </a:r>
+            <a:r>
+              <a:rPr lang="en-US" dirty="0" err="1"/>
+              <a:t>homeCare</a:t>
+            </a:r>
+            <a:r>
+              <a:rPr lang="en-US" dirty="0"/>
+              <a:t>, and </a:t>
+            </a:r>
+            <a:r>
+              <a:rPr lang="en-US" dirty="0" err="1"/>
+              <a:t>trndSevNeed</a:t>
+            </a:r>
+            <a:r>
+              <a:rPr lang="en-US" dirty="0"/>
+              <a:t>. </a:t>
+            </a:r>
+          </a:p>
+          <a:p>
             <a:endParaRPr lang="en-US" dirty="0"/>
+          </a:p>
+          <a:p>
+            <a:r>
+              <a:rPr lang="en-US" dirty="0"/>
+              <a:t>The values of these variables determine where a system is at in the state diagram.</a:t>
+            </a:r>
           </a:p>
         </p:txBody>
       </p:sp>
@@ -2230,6 +2584,60 @@
         <p:txBody>
           <a:bodyPr/>
           <a:lstStyle/>
+          <a:p>
+            <a:endParaRPr lang="en-US" dirty="0"/>
+          </a:p>
+          <a:p>
+            <a:r>
+              <a:rPr lang="en-US" dirty="0"/>
+              <a:t>The state predicates are defined by the conditions on the transitions entering and leaving each state.</a:t>
+            </a:r>
+          </a:p>
+          <a:p>
+            <a:endParaRPr lang="en-US" dirty="0"/>
+          </a:p>
+          <a:p>
+            <a:r>
+              <a:rPr lang="en-US" dirty="0"/>
+              <a:t>Consider state 2: the conditions in A and F must both be true to reside in state 2, but that is not all.</a:t>
+            </a:r>
+          </a:p>
+          <a:p>
+            <a:endParaRPr lang="en-US" dirty="0"/>
+          </a:p>
+          <a:p>
+            <a:r>
+              <a:rPr lang="en-US" dirty="0"/>
+              <a:t>None of the conditions on edges C and D may be true, otherwise the implementation is in a different state.</a:t>
+            </a:r>
+          </a:p>
+          <a:p>
+            <a:endParaRPr lang="en-US" dirty="0"/>
+          </a:p>
+          <a:p>
+            <a:r>
+              <a:rPr lang="en-US" dirty="0"/>
+              <a:t>These requirements are captured in the predicate shown for Pt in appropriate home care</a:t>
+            </a:r>
+          </a:p>
+          <a:p>
+            <a:endParaRPr lang="en-US" dirty="0"/>
+          </a:p>
+          <a:p>
+            <a:r>
+              <a:rPr lang="en-US" dirty="0"/>
+              <a:t>There is as similar predicate defined for every state in the diagram.</a:t>
+            </a:r>
+          </a:p>
+          <a:p>
+            <a:endParaRPr lang="en-US" dirty="0"/>
+          </a:p>
+          <a:p>
+            <a:r>
+              <a:rPr lang="en-US" dirty="0"/>
+              <a:t>The predicates for each state are now used to define the properties that the model checker must verify.</a:t>
+            </a:r>
+          </a:p>
           <a:p>
             <a:endParaRPr lang="en-US" dirty="0"/>
           </a:p>
@@ -2402,7 +2810,7 @@
           <a:p>
             <a:fld id="{BF29B9AB-6859-C043-A124-7604E53B39CA}" type="datetimeFigureOut">
               <a:rPr lang="en-US" smtClean="0"/>
-              <a:t>4/6/22</a:t>
+              <a:t>4/7/22</a:t>
             </a:fld>
             <a:endParaRPr lang="en-US"/>
           </a:p>
@@ -2572,7 +2980,7 @@
           <a:p>
             <a:fld id="{BF29B9AB-6859-C043-A124-7604E53B39CA}" type="datetimeFigureOut">
               <a:rPr lang="en-US" smtClean="0"/>
-              <a:t>4/6/22</a:t>
+              <a:t>4/7/22</a:t>
             </a:fld>
             <a:endParaRPr lang="en-US"/>
           </a:p>
@@ -2752,7 +3160,7 @@
           <a:p>
             <a:fld id="{BF29B9AB-6859-C043-A124-7604E53B39CA}" type="datetimeFigureOut">
               <a:rPr lang="en-US" smtClean="0"/>
-              <a:t>4/6/22</a:t>
+              <a:t>4/7/22</a:t>
             </a:fld>
             <a:endParaRPr lang="en-US"/>
           </a:p>
@@ -2922,7 +3330,7 @@
           <a:p>
             <a:fld id="{BF29B9AB-6859-C043-A124-7604E53B39CA}" type="datetimeFigureOut">
               <a:rPr lang="en-US" smtClean="0"/>
-              <a:t>4/6/22</a:t>
+              <a:t>4/7/22</a:t>
             </a:fld>
             <a:endParaRPr lang="en-US"/>
           </a:p>
@@ -3168,7 +3576,7 @@
           <a:p>
             <a:fld id="{BF29B9AB-6859-C043-A124-7604E53B39CA}" type="datetimeFigureOut">
               <a:rPr lang="en-US" smtClean="0"/>
-              <a:t>4/6/22</a:t>
+              <a:t>4/7/22</a:t>
             </a:fld>
             <a:endParaRPr lang="en-US"/>
           </a:p>
@@ -3400,7 +3808,7 @@
           <a:p>
             <a:fld id="{BF29B9AB-6859-C043-A124-7604E53B39CA}" type="datetimeFigureOut">
               <a:rPr lang="en-US" smtClean="0"/>
-              <a:t>4/6/22</a:t>
+              <a:t>4/7/22</a:t>
             </a:fld>
             <a:endParaRPr lang="en-US"/>
           </a:p>
@@ -3767,7 +4175,7 @@
           <a:p>
             <a:fld id="{BF29B9AB-6859-C043-A124-7604E53B39CA}" type="datetimeFigureOut">
               <a:rPr lang="en-US" smtClean="0"/>
-              <a:t>4/6/22</a:t>
+              <a:t>4/7/22</a:t>
             </a:fld>
             <a:endParaRPr lang="en-US"/>
           </a:p>
@@ -3885,7 +4293,7 @@
           <a:p>
             <a:fld id="{BF29B9AB-6859-C043-A124-7604E53B39CA}" type="datetimeFigureOut">
               <a:rPr lang="en-US" smtClean="0"/>
-              <a:t>4/6/22</a:t>
+              <a:t>4/7/22</a:t>
             </a:fld>
             <a:endParaRPr lang="en-US"/>
           </a:p>
@@ -3980,7 +4388,7 @@
           <a:p>
             <a:fld id="{BF29B9AB-6859-C043-A124-7604E53B39CA}" type="datetimeFigureOut">
               <a:rPr lang="en-US" smtClean="0"/>
-              <a:t>4/6/22</a:t>
+              <a:t>4/7/22</a:t>
             </a:fld>
             <a:endParaRPr lang="en-US"/>
           </a:p>
@@ -4257,7 +4665,7 @@
           <a:p>
             <a:fld id="{BF29B9AB-6859-C043-A124-7604E53B39CA}" type="datetimeFigureOut">
               <a:rPr lang="en-US" smtClean="0"/>
-              <a:t>4/6/22</a:t>
+              <a:t>4/7/22</a:t>
             </a:fld>
             <a:endParaRPr lang="en-US"/>
           </a:p>
@@ -4514,7 +4922,7 @@
           <a:p>
             <a:fld id="{BF29B9AB-6859-C043-A124-7604E53B39CA}" type="datetimeFigureOut">
               <a:rPr lang="en-US" smtClean="0"/>
-              <a:t>4/6/22</a:t>
+              <a:t>4/7/22</a:t>
             </a:fld>
             <a:endParaRPr lang="en-US"/>
           </a:p>
@@ -4727,7 +5135,7 @@
           <a:p>
             <a:fld id="{BF29B9AB-6859-C043-A124-7604E53B39CA}" type="datetimeFigureOut">
               <a:rPr lang="en-US" smtClean="0"/>
-              <a:t>4/6/22</a:t>
+              <a:t>4/7/22</a:t>
             </a:fld>
             <a:endParaRPr lang="en-US"/>
           </a:p>
@@ -12965,16 +13373,13 @@
             <a:pPr algn="ctr"/>
             <a:r>
               <a:rPr lang="en-US" sz="3600" dirty="0"/>
-              <a:t>System Design in BPMN for </a:t>
+              <a:t>System Design in BPMN for Remote Patient Monitoring with </a:t>
             </a:r>
             <a:r>
               <a:rPr lang="en-US" sz="3600" dirty="0" err="1"/>
               <a:t>PHware</a:t>
             </a:r>
-            <a:r>
-              <a:rPr lang="en-US" sz="3600" dirty="0"/>
-              <a:t> Remote Patient Monitoring</a:t>
-            </a:r>
+            <a:endParaRPr lang="en-US" sz="3600" dirty="0"/>
           </a:p>
         </p:txBody>
       </p:sp>
@@ -17275,7 +17680,7 @@
         </p:nvSpPr>
         <p:spPr>
           <a:xfrm>
-            <a:off x="1075765" y="2799849"/>
+            <a:off x="1075765" y="2280558"/>
             <a:ext cx="10913036" cy="3416320"/>
           </a:xfrm>
           <a:prstGeom prst="rect">
@@ -17580,8 +17985,8 @@
         </p:nvSpPr>
         <p:spPr>
           <a:xfrm>
-            <a:off x="210670" y="3550024"/>
-            <a:ext cx="1255060" cy="508000"/>
+            <a:off x="112889" y="3030733"/>
+            <a:ext cx="1352841" cy="508000"/>
           </a:xfrm>
           <a:prstGeom prst="rightArrow">
             <a:avLst/>
@@ -17610,7 +18015,7 @@
             <a:pPr algn="ctr"/>
             <a:r>
               <a:rPr lang="en-US" dirty="0"/>
-              <a:t>At Home</a:t>
+              <a:t>Home</a:t>
             </a:r>
           </a:p>
         </p:txBody>
@@ -17629,8 +18034,8 @@
         </p:nvSpPr>
         <p:spPr>
           <a:xfrm>
-            <a:off x="203199" y="4254009"/>
-            <a:ext cx="1255060" cy="508000"/>
+            <a:off x="105418" y="3734718"/>
+            <a:ext cx="1352841" cy="508000"/>
           </a:xfrm>
           <a:prstGeom prst="rightArrow">
             <a:avLst/>
@@ -17692,6 +18097,95 @@
           </a:p>
         </p:txBody>
       </p:sp>
+      <p:sp>
+        <p:nvSpPr>
+          <p:cNvPr id="6" name="Right Arrow 5">
+            <a:extLst>
+              <a:ext uri="{FF2B5EF4-FFF2-40B4-BE49-F238E27FC236}">
+                <a16:creationId xmlns:a16="http://schemas.microsoft.com/office/drawing/2014/main" id="{49458940-629B-F94D-951E-42D01113FD5E}"/>
+              </a:ext>
+            </a:extLst>
+          </p:cNvPr>
+          <p:cNvSpPr/>
+          <p:nvPr/>
+        </p:nvSpPr>
+        <p:spPr>
+          <a:xfrm>
+            <a:off x="105418" y="4438703"/>
+            <a:ext cx="1352841" cy="508000"/>
+          </a:xfrm>
+          <a:prstGeom prst="rightArrow">
+            <a:avLst/>
+          </a:prstGeom>
+        </p:spPr>
+        <p:style>
+          <a:lnRef idx="2">
+            <a:schemeClr val="accent1">
+              <a:shade val="50000"/>
+            </a:schemeClr>
+          </a:lnRef>
+          <a:fillRef idx="1">
+            <a:schemeClr val="accent1"/>
+          </a:fillRef>
+          <a:effectRef idx="0">
+            <a:schemeClr val="accent1"/>
+          </a:effectRef>
+          <a:fontRef idx="minor">
+            <a:schemeClr val="lt1"/>
+          </a:fontRef>
+        </p:style>
+        <p:txBody>
+          <a:bodyPr rtlCol="0" anchor="ctr"/>
+          <a:lstStyle/>
+          <a:p>
+            <a:pPr algn="ctr"/>
+            <a:r>
+              <a:rPr lang="en-US" dirty="0"/>
+              <a:t>No Change</a:t>
+            </a:r>
+          </a:p>
+        </p:txBody>
+      </p:sp>
+      <p:sp>
+        <p:nvSpPr>
+          <p:cNvPr id="3" name="TextBox 2">
+            <a:extLst>
+              <a:ext uri="{FF2B5EF4-FFF2-40B4-BE49-F238E27FC236}">
+                <a16:creationId xmlns:a16="http://schemas.microsoft.com/office/drawing/2014/main" id="{501CF69E-61D3-8643-BE4E-A5B0FCDE9AE1}"/>
+              </a:ext>
+            </a:extLst>
+          </p:cNvPr>
+          <p:cNvSpPr txBox="1"/>
+          <p:nvPr/>
+        </p:nvSpPr>
+        <p:spPr>
+          <a:xfrm>
+            <a:off x="1494562" y="5857088"/>
+            <a:ext cx="9621673" cy="769441"/>
+          </a:xfrm>
+          <a:prstGeom prst="rect">
+            <a:avLst/>
+          </a:prstGeom>
+          <a:noFill/>
+        </p:spPr>
+        <p:txBody>
+          <a:bodyPr wrap="none" rtlCol="0">
+            <a:spAutoFit/>
+          </a:bodyPr>
+          <a:lstStyle/>
+          <a:p>
+            <a:pPr algn="ctr"/>
+            <a:r>
+              <a:rPr lang="en-US" sz="4400" dirty="0">
+                <a:solidFill>
+                  <a:schemeClr val="accent5"/>
+                </a:solidFill>
+              </a:rPr>
+              <a:t>Model Checking considers all possibilities</a:t>
+            </a:r>
+          </a:p>
+        </p:txBody>
+      </p:sp>
     </p:spTree>
     <p:extLst>
       <p:ext uri="{BB962C8B-B14F-4D97-AF65-F5344CB8AC3E}">
@@ -17702,6 +18196,222 @@
   <p:clrMapOvr>
     <a:masterClrMapping/>
   </p:clrMapOvr>
+  <p:timing>
+    <p:tnLst>
+      <p:par>
+        <p:cTn id="1" dur="indefinite" restart="never" nodeType="tmRoot">
+          <p:childTnLst>
+            <p:seq concurrent="1" nextAc="seek">
+              <p:cTn id="2" dur="indefinite" nodeType="mainSeq">
+                <p:childTnLst>
+                  <p:par>
+                    <p:cTn id="3" fill="hold">
+                      <p:stCondLst>
+                        <p:cond delay="indefinite"/>
+                      </p:stCondLst>
+                      <p:childTnLst>
+                        <p:par>
+                          <p:cTn id="4" fill="hold">
+                            <p:stCondLst>
+                              <p:cond delay="0"/>
+                            </p:stCondLst>
+                            <p:childTnLst>
+                              <p:par>
+                                <p:cTn id="5" presetID="1" presetClass="entr" presetSubtype="0" fill="hold" grpId="0" nodeType="clickEffect">
+                                  <p:stCondLst>
+                                    <p:cond delay="0"/>
+                                  </p:stCondLst>
+                                  <p:childTnLst>
+                                    <p:set>
+                                      <p:cBhvr>
+                                        <p:cTn id="6" dur="1" fill="hold">
+                                          <p:stCondLst>
+                                            <p:cond delay="0"/>
+                                          </p:stCondLst>
+                                        </p:cTn>
+                                        <p:tgtEl>
+                                          <p:spTgt spid="4"/>
+                                        </p:tgtEl>
+                                        <p:attrNameLst>
+                                          <p:attrName>style.visibility</p:attrName>
+                                        </p:attrNameLst>
+                                      </p:cBhvr>
+                                      <p:to>
+                                        <p:strVal val="visible"/>
+                                      </p:to>
+                                    </p:set>
+                                  </p:childTnLst>
+                                </p:cTn>
+                              </p:par>
+                            </p:childTnLst>
+                          </p:cTn>
+                        </p:par>
+                      </p:childTnLst>
+                    </p:cTn>
+                  </p:par>
+                  <p:par>
+                    <p:cTn id="7" fill="hold">
+                      <p:stCondLst>
+                        <p:cond delay="indefinite"/>
+                      </p:stCondLst>
+                      <p:childTnLst>
+                        <p:par>
+                          <p:cTn id="8" fill="hold">
+                            <p:stCondLst>
+                              <p:cond delay="0"/>
+                            </p:stCondLst>
+                            <p:childTnLst>
+                              <p:par>
+                                <p:cTn id="9" presetID="1" presetClass="entr" presetSubtype="0" fill="hold" grpId="0" nodeType="clickEffect">
+                                  <p:stCondLst>
+                                    <p:cond delay="0"/>
+                                  </p:stCondLst>
+                                  <p:childTnLst>
+                                    <p:set>
+                                      <p:cBhvr>
+                                        <p:cTn id="10" dur="1" fill="hold">
+                                          <p:stCondLst>
+                                            <p:cond delay="0"/>
+                                          </p:stCondLst>
+                                        </p:cTn>
+                                        <p:tgtEl>
+                                          <p:spTgt spid="5"/>
+                                        </p:tgtEl>
+                                        <p:attrNameLst>
+                                          <p:attrName>style.visibility</p:attrName>
+                                        </p:attrNameLst>
+                                      </p:cBhvr>
+                                      <p:to>
+                                        <p:strVal val="visible"/>
+                                      </p:to>
+                                    </p:set>
+                                  </p:childTnLst>
+                                </p:cTn>
+                              </p:par>
+                            </p:childTnLst>
+                          </p:cTn>
+                        </p:par>
+                      </p:childTnLst>
+                    </p:cTn>
+                  </p:par>
+                  <p:par>
+                    <p:cTn id="11" fill="hold">
+                      <p:stCondLst>
+                        <p:cond delay="indefinite"/>
+                      </p:stCondLst>
+                      <p:childTnLst>
+                        <p:par>
+                          <p:cTn id="12" fill="hold">
+                            <p:stCondLst>
+                              <p:cond delay="0"/>
+                            </p:stCondLst>
+                            <p:childTnLst>
+                              <p:par>
+                                <p:cTn id="13" presetID="1" presetClass="entr" presetSubtype="0" fill="hold" grpId="0" nodeType="clickEffect">
+                                  <p:stCondLst>
+                                    <p:cond delay="0"/>
+                                  </p:stCondLst>
+                                  <p:childTnLst>
+                                    <p:set>
+                                      <p:cBhvr>
+                                        <p:cTn id="14" dur="1" fill="hold">
+                                          <p:stCondLst>
+                                            <p:cond delay="0"/>
+                                          </p:stCondLst>
+                                        </p:cTn>
+                                        <p:tgtEl>
+                                          <p:spTgt spid="6"/>
+                                        </p:tgtEl>
+                                        <p:attrNameLst>
+                                          <p:attrName>style.visibility</p:attrName>
+                                        </p:attrNameLst>
+                                      </p:cBhvr>
+                                      <p:to>
+                                        <p:strVal val="visible"/>
+                                      </p:to>
+                                    </p:set>
+                                  </p:childTnLst>
+                                </p:cTn>
+                              </p:par>
+                            </p:childTnLst>
+                          </p:cTn>
+                        </p:par>
+                      </p:childTnLst>
+                    </p:cTn>
+                  </p:par>
+                  <p:par>
+                    <p:cTn id="15" fill="hold">
+                      <p:stCondLst>
+                        <p:cond delay="indefinite"/>
+                      </p:stCondLst>
+                      <p:childTnLst>
+                        <p:par>
+                          <p:cTn id="16" fill="hold">
+                            <p:stCondLst>
+                              <p:cond delay="0"/>
+                            </p:stCondLst>
+                            <p:childTnLst>
+                              <p:par>
+                                <p:cTn id="17" presetID="1" presetClass="entr" presetSubtype="0" fill="hold" grpId="0" nodeType="clickEffect">
+                                  <p:stCondLst>
+                                    <p:cond delay="0"/>
+                                  </p:stCondLst>
+                                  <p:childTnLst>
+                                    <p:set>
+                                      <p:cBhvr>
+                                        <p:cTn id="18" dur="1" fill="hold">
+                                          <p:stCondLst>
+                                            <p:cond delay="0"/>
+                                          </p:stCondLst>
+                                        </p:cTn>
+                                        <p:tgtEl>
+                                          <p:spTgt spid="3"/>
+                                        </p:tgtEl>
+                                        <p:attrNameLst>
+                                          <p:attrName>style.visibility</p:attrName>
+                                        </p:attrNameLst>
+                                      </p:cBhvr>
+                                      <p:to>
+                                        <p:strVal val="visible"/>
+                                      </p:to>
+                                    </p:set>
+                                  </p:childTnLst>
+                                </p:cTn>
+                              </p:par>
+                            </p:childTnLst>
+                          </p:cTn>
+                        </p:par>
+                      </p:childTnLst>
+                    </p:cTn>
+                  </p:par>
+                </p:childTnLst>
+              </p:cTn>
+              <p:prevCondLst>
+                <p:cond evt="onPrev" delay="0">
+                  <p:tgtEl>
+                    <p:sldTgt/>
+                  </p:tgtEl>
+                </p:cond>
+              </p:prevCondLst>
+              <p:nextCondLst>
+                <p:cond evt="onNext" delay="0">
+                  <p:tgtEl>
+                    <p:sldTgt/>
+                  </p:tgtEl>
+                </p:cond>
+              </p:nextCondLst>
+            </p:seq>
+          </p:childTnLst>
+        </p:cTn>
+      </p:par>
+    </p:tnLst>
+    <p:bldLst>
+      <p:bldP spid="4" grpId="0" animBg="1"/>
+      <p:bldP spid="5" grpId="0" animBg="1"/>
+      <p:bldP spid="6" grpId="0" animBg="1"/>
+      <p:bldP spid="3" grpId="0"/>
+    </p:bldLst>
+  </p:timing>
 </p:sld>
 </file>
 
@@ -19457,8 +20167,8 @@
         </p:nvSpPr>
         <p:spPr>
           <a:xfrm>
-            <a:off x="968938" y="2945134"/>
-            <a:ext cx="10254124" cy="1547900"/>
+            <a:off x="335999" y="2945134"/>
+            <a:ext cx="11427014" cy="1547900"/>
           </a:xfrm>
           <a:prstGeom prst="roundRect">
             <a:avLst/>
@@ -19495,7 +20205,7 @@
             </a:r>
             <a:r>
               <a:rPr lang="en-US" sz="3600" dirty="0"/>
-              <a:t> System Design for remote patient care implements the CWP of actionable risk awareness</a:t>
+              <a:t> System Design for remote patient care correctly implements the CWP of actionable risk awareness</a:t>
             </a:r>
           </a:p>
         </p:txBody>
@@ -19917,19 +20627,7 @@
           <a:p>
             <a:r>
               <a:rPr lang="en-US" dirty="0"/>
-              <a:t>CWP is a technology-neutral specification of </a:t>
-            </a:r>
-            <a:r>
-              <a:rPr lang="en-US" dirty="0">
-                <a:solidFill>
-                  <a:schemeClr val="accent5"/>
-                </a:solidFill>
-              </a:rPr>
-              <a:t>what</a:t>
-            </a:r>
-            <a:r>
-              <a:rPr lang="en-US" dirty="0"/>
-              <a:t> an integrated human and machine reasoning system must accomplish</a:t>
+              <a:t>CWP is a technology-neutral specification of what an integrated human and machine reasoning system must accomplish</a:t>
             </a:r>
           </a:p>
           <a:p>
@@ -20230,13 +20928,13 @@
                 </a:solidFill>
                 <a:latin typeface="+mj-lt"/>
               </a:rPr>
-              <a:t> conventional methods </a:t>
+              <a:t> </a:t>
             </a:r>
             <a:r>
               <a:rPr lang="en-US" sz="4400" dirty="0">
                 <a:latin typeface="+mj-lt"/>
               </a:rPr>
-              <a:t>of integration</a:t>
+              <a:t>conventional methods of integration</a:t>
             </a:r>
           </a:p>
           <a:p>
@@ -20751,9 +21449,6 @@
             </a:r>
             <a:r>
               <a:rPr lang="en-US" sz="3800" kern="1200" dirty="0">
-                <a:solidFill>
-                  <a:schemeClr val="accent5"/>
-                </a:solidFill>
                 <a:latin typeface="+mj-lt"/>
                 <a:ea typeface="+mj-ea"/>
                 <a:cs typeface="+mj-cs"/>
@@ -21314,13 +22009,33 @@
           <a:lstStyle/>
           <a:p>
             <a:r>
-              <a:rPr lang="en-US" sz="4000" dirty="0">
+              <a:rPr lang="en-US" sz="3600" dirty="0">
                 <a:solidFill>
                   <a:srgbClr val="FFFFFF"/>
                 </a:solidFill>
               </a:rPr>
-              <a:t>Remote Patient Monitoring</a:t>
-            </a:r>
+              <a:t>Remote Patient Monitoring with </a:t>
+            </a:r>
+            <a:r>
+              <a:rPr lang="en-US" sz="3600" dirty="0" err="1">
+                <a:solidFill>
+                  <a:srgbClr val="FFFFFF"/>
+                </a:solidFill>
+              </a:rPr>
+              <a:t>PHware</a:t>
+            </a:r>
+            <a:r>
+              <a:rPr lang="en-US" sz="3600" dirty="0"/>
+              <a:t>®</a:t>
+            </a:r>
+            <a:br>
+              <a:rPr lang="en-US" sz="3600" dirty="0"/>
+            </a:br>
+            <a:endParaRPr lang="en-US" sz="3600" dirty="0">
+              <a:solidFill>
+                <a:srgbClr val="FFFFFF"/>
+              </a:solidFill>
+            </a:endParaRPr>
           </a:p>
         </p:txBody>
       </p:sp>
@@ -21918,7 +22633,7 @@
                   <a:schemeClr val="accent4"/>
                 </a:solidFill>
               </a:rPr>
-              <a:t>Does the BPMN implements the CWP?</a:t>
+              <a:t>Does the BPMN solve the CWP?</a:t>
             </a:r>
           </a:p>
         </p:txBody>
@@ -22458,11 +23173,7 @@
               <a:t>The CWP of remote patient monitoring is </a:t>
             </a:r>
             <a:r>
-              <a:rPr lang="en-US" sz="3600" dirty="0">
-                <a:solidFill>
-                  <a:schemeClr val="accent5"/>
-                </a:solidFill>
-              </a:rPr>
+              <a:rPr lang="en-US" sz="3600" i="1" dirty="0"/>
               <a:t>actionable risk awareness</a:t>
             </a:r>
           </a:p>
@@ -23263,7 +23974,7 @@
                   <a:schemeClr val="accent4"/>
                 </a:solidFill>
               </a:rPr>
-              <a:t>2 + 3(N) properties to check on BPMN</a:t>
+              <a:t>2 + 3(N) properties to check on design</a:t>
             </a:r>
           </a:p>
         </p:txBody>

</xml_diff>

<commit_message>
Add script to end
</commit_message>
<xml_diff>
--- a/presentation/syscon-2022.pptx
+++ b/presentation/syscon-2022.pptx
@@ -1020,6 +1020,258 @@
           <a:bodyPr/>
           <a:lstStyle/>
           <a:p>
+            <a:pPr marL="0" marR="0" lvl="0" indent="0" algn="l" defTabSz="914400" rtl="0" eaLnBrk="1" fontAlgn="auto" latinLnBrk="0" hangingPunct="1">
+              <a:lnSpc>
+                <a:spcPct val="100000"/>
+              </a:lnSpc>
+              <a:spcBef>
+                <a:spcPts val="0"/>
+              </a:spcBef>
+              <a:spcAft>
+                <a:spcPts val="0"/>
+              </a:spcAft>
+              <a:buClrTx/>
+              <a:buSzTx/>
+              <a:buFontTx/>
+              <a:buNone/>
+              <a:tabLst/>
+              <a:defRPr/>
+            </a:pPr>
+            <a:r>
+              <a:rPr lang="en-US" dirty="0"/>
+              <a:t>The top portion of the workflow represents the responsibilities of the clinicians.</a:t>
+            </a:r>
+          </a:p>
+          <a:p>
+            <a:r>
+              <a:rPr lang="en-US" dirty="0"/>
+              <a:t>The workflow begins with a patient testing positive for COVID-19 and then having a subsequent exam.</a:t>
+            </a:r>
+          </a:p>
+          <a:p>
+            <a:r>
+              <a:rPr lang="en-US" dirty="0"/>
+              <a:t>Depending on the exam, the patient is prescribed home care or other appropriate care.</a:t>
+            </a:r>
+          </a:p>
+          <a:p>
+            <a:r>
+              <a:rPr lang="en-US" dirty="0"/>
+              <a:t>The orders include an exam schedule, so at some future exam, discharge criteria maybe satisfied and the patient no longer needs monitoring.</a:t>
+            </a:r>
+          </a:p>
+          <a:p>
+            <a:r>
+              <a:rPr lang="en-US" dirty="0"/>
+              <a:t>Similarly, if the patient is not in home care, but other ambulatory or hospital care, then that patient may be discharged or expire.</a:t>
+            </a:r>
+          </a:p>
+          <a:p>
+            <a:endParaRPr lang="en-US" dirty="0"/>
+          </a:p>
+          <a:p>
+            <a:r>
+              <a:rPr lang="en-US" dirty="0"/>
+              <a:t>Click.</a:t>
+            </a:r>
+          </a:p>
+          <a:p>
+            <a:endParaRPr lang="en-US" dirty="0"/>
+          </a:p>
+          <a:p>
+            <a:r>
+              <a:rPr lang="en-US" dirty="0"/>
+              <a:t>The bottom portion represents the responsibilities of the patient or those caring for the patient at home.</a:t>
+            </a:r>
+          </a:p>
+          <a:p>
+            <a:r>
+              <a:rPr lang="en-US" dirty="0"/>
+              <a:t>A patient in home care must start the doctor prescribed interventions and setup the </a:t>
+            </a:r>
+            <a:r>
+              <a:rPr lang="en-US" dirty="0" err="1"/>
+              <a:t>PHware</a:t>
+            </a:r>
+            <a:r>
+              <a:rPr lang="en-US" dirty="0"/>
+              <a:t> system.</a:t>
+            </a:r>
+          </a:p>
+          <a:p>
+            <a:r>
+              <a:rPr lang="en-US" dirty="0"/>
+              <a:t>Once </a:t>
+            </a:r>
+            <a:r>
+              <a:rPr lang="en-US" dirty="0" err="1"/>
+              <a:t>PHware</a:t>
+            </a:r>
+            <a:r>
+              <a:rPr lang="en-US" dirty="0"/>
+              <a:t> in configured, the patient follows the prescribed schedule for exams and measuring vitals.</a:t>
+            </a:r>
+          </a:p>
+          <a:p>
+            <a:r>
+              <a:rPr lang="en-US" dirty="0"/>
+              <a:t>The patient may expire in homecare, and if not, is expected to meet with the doctor or clinician at the scheduled times.</a:t>
+            </a:r>
+          </a:p>
+          <a:p>
+            <a:r>
+              <a:rPr lang="en-US" dirty="0"/>
+              <a:t>Here, the patient process ends at each exam time, and that process is restarted after an exam if needed.</a:t>
+            </a:r>
+          </a:p>
+          <a:p>
+            <a:endParaRPr lang="en-US" dirty="0"/>
+          </a:p>
+          <a:p>
+            <a:r>
+              <a:rPr lang="en-US" dirty="0"/>
+              <a:t>Click</a:t>
+            </a:r>
+          </a:p>
+          <a:p>
+            <a:endParaRPr lang="en-US" dirty="0"/>
+          </a:p>
+          <a:p>
+            <a:r>
+              <a:rPr lang="en-US" dirty="0"/>
+              <a:t>The middle portion of the workflow represents the responsibilities of the AI analytics in the cloud.</a:t>
+            </a:r>
+          </a:p>
+          <a:p>
+            <a:r>
+              <a:rPr lang="en-US" dirty="0"/>
+              <a:t>It starts when it receives vitals, and it ends after its analyses have sent their results back to the clinicians.</a:t>
+            </a:r>
+          </a:p>
+          <a:p>
+            <a:r>
+              <a:rPr lang="en-US" dirty="0"/>
+              <a:t> </a:t>
+            </a:r>
+          </a:p>
+          <a:p>
+            <a:r>
+              <a:rPr lang="en-US" dirty="0"/>
+              <a:t>Click.</a:t>
+            </a:r>
+          </a:p>
+          <a:p>
+            <a:endParaRPr lang="en-US" dirty="0"/>
+          </a:p>
+          <a:p>
+            <a:r>
+              <a:rPr lang="en-US" dirty="0"/>
+              <a:t>The vitals, and alerts, are reviewed by the appropriate clinicians depending on the alert status.</a:t>
+            </a:r>
+          </a:p>
+          <a:p>
+            <a:endParaRPr lang="en-US" dirty="0"/>
+          </a:p>
+          <a:p>
+            <a:r>
+              <a:rPr lang="en-US" dirty="0"/>
+              <a:t>Click</a:t>
+            </a:r>
+          </a:p>
+          <a:p>
+            <a:endParaRPr lang="en-US" dirty="0"/>
+          </a:p>
+          <a:p>
+            <a:r>
+              <a:rPr lang="en-US" dirty="0"/>
+              <a:t>In the presence of an alert, and based on the scheduled exam, the exam maybe rescheduled sooner.</a:t>
+            </a:r>
+          </a:p>
+          <a:p>
+            <a:endParaRPr lang="en-US" dirty="0"/>
+          </a:p>
+          <a:p>
+            <a:r>
+              <a:rPr lang="en-US" dirty="0"/>
+              <a:t>Click</a:t>
+            </a:r>
+          </a:p>
+          <a:p>
+            <a:endParaRPr lang="en-US" dirty="0"/>
+          </a:p>
+          <a:p>
+            <a:r>
+              <a:rPr lang="en-US" dirty="0"/>
+              <a:t>Similarly, in the absence of an alert, if the exam has yet to be scheduled, the normal routine exam is arranged.</a:t>
+            </a:r>
+          </a:p>
+          <a:p>
+            <a:endParaRPr lang="en-US" dirty="0"/>
+          </a:p>
+          <a:p>
+            <a:r>
+              <a:rPr lang="en-US" dirty="0"/>
+              <a:t>Click</a:t>
+            </a:r>
+          </a:p>
+          <a:p>
+            <a:endParaRPr lang="en-US" dirty="0"/>
+          </a:p>
+          <a:p>
+            <a:r>
+              <a:rPr lang="en-US" dirty="0"/>
+              <a:t>The person reviewing the vitals from the AI analytics may change the exam priority of the patient as appropriate.</a:t>
+            </a:r>
+          </a:p>
+          <a:p>
+            <a:endParaRPr lang="en-US" dirty="0"/>
+          </a:p>
+          <a:p>
+            <a:r>
+              <a:rPr lang="en-US" dirty="0"/>
+              <a:t>Click</a:t>
+            </a:r>
+          </a:p>
+          <a:p>
+            <a:endParaRPr lang="en-US" dirty="0"/>
+          </a:p>
+          <a:p>
+            <a:r>
+              <a:rPr lang="en-US" dirty="0"/>
+              <a:t>The workflow returns to the beginning if the scheduled exam is now.</a:t>
+            </a:r>
+          </a:p>
+          <a:p>
+            <a:endParaRPr lang="en-US" dirty="0"/>
+          </a:p>
+          <a:p>
+            <a:r>
+              <a:rPr lang="en-US" dirty="0"/>
+              <a:t>Click</a:t>
+            </a:r>
+          </a:p>
+          <a:p>
+            <a:endParaRPr lang="en-US" dirty="0"/>
+          </a:p>
+          <a:p>
+            <a:r>
+              <a:rPr lang="en-US" dirty="0"/>
+              <a:t>Or it returns to the monitoring state if it is not time for the exam.</a:t>
+            </a:r>
+          </a:p>
+          <a:p>
+            <a:endParaRPr lang="en-US" dirty="0"/>
+          </a:p>
+          <a:p>
+            <a:r>
+              <a:rPr lang="en-US" dirty="0"/>
+              <a:t>This workflow must be expressed in the model checkers input language for verification.</a:t>
+            </a:r>
+          </a:p>
+          <a:p>
+            <a:endParaRPr lang="en-US" dirty="0"/>
+          </a:p>
+          <a:p>
             <a:endParaRPr lang="en-US" dirty="0"/>
           </a:p>
         </p:txBody>
@@ -1041,7 +1293,7 @@
           <a:p>
             <a:fld id="{438ED187-F6C5-A545-9BCA-551DE666D003}" type="slidenum">
               <a:rPr lang="en-US" smtClean="0"/>
-              <a:t>15</a:t>
+              <a:t>14</a:t>
             </a:fld>
             <a:endParaRPr lang="en-US"/>
           </a:p>
@@ -1050,7 +1302,7 @@
     </p:spTree>
     <p:extLst>
       <p:ext uri="{BB962C8B-B14F-4D97-AF65-F5344CB8AC3E}">
-        <p14:creationId xmlns:p14="http://schemas.microsoft.com/office/powerpoint/2010/main" val="335004850"/>
+        <p14:creationId xmlns:p14="http://schemas.microsoft.com/office/powerpoint/2010/main" val="1685561370"/>
       </p:ext>
     </p:extLst>
   </p:cSld>
@@ -1106,7 +1358,7 @@
           <a:p>
             <a:r>
               <a:rPr lang="en-US" dirty="0"/>
-              <a:t>There are no attributes on the tokens.</a:t>
+              <a:t>The translation takes place in three steps with the last two requiring some help from the designer as they involve mapping the state of the workflow to that of the state diagram for the conceptual work problem being solved.</a:t>
             </a:r>
           </a:p>
         </p:txBody>
@@ -1128,7 +1380,7 @@
           <a:p>
             <a:fld id="{438ED187-F6C5-A545-9BCA-551DE666D003}" type="slidenum">
               <a:rPr lang="en-US" smtClean="0"/>
-              <a:t>16</a:t>
+              <a:t>15</a:t>
             </a:fld>
             <a:endParaRPr lang="en-US"/>
           </a:p>
@@ -1137,7 +1389,7 @@
     </p:spTree>
     <p:extLst>
       <p:ext uri="{BB962C8B-B14F-4D97-AF65-F5344CB8AC3E}">
-        <p14:creationId xmlns:p14="http://schemas.microsoft.com/office/powerpoint/2010/main" val="2558912785"/>
+        <p14:creationId xmlns:p14="http://schemas.microsoft.com/office/powerpoint/2010/main" val="335004850"/>
       </p:ext>
     </p:extLst>
   </p:cSld>
@@ -1193,7 +1445,186 @@
           <a:p>
             <a:r>
               <a:rPr lang="en-US" dirty="0"/>
-              <a:t>There are no attributes on the tokens.</a:t>
+              <a:t>The first step is to represent the BPMN token semantics in </a:t>
+            </a:r>
+            <a:r>
+              <a:rPr lang="en-US" dirty="0" err="1"/>
+              <a:t>Promela</a:t>
+            </a:r>
+            <a:r>
+              <a:rPr lang="en-US" dirty="0"/>
+              <a:t> shown in the bottom portion of the slide.</a:t>
+            </a:r>
+          </a:p>
+          <a:p>
+            <a:r>
+              <a:rPr lang="en-US" dirty="0"/>
+              <a:t>In </a:t>
+            </a:r>
+            <a:r>
+              <a:rPr lang="en-US" dirty="0" err="1"/>
+              <a:t>Promela</a:t>
+            </a:r>
+            <a:r>
+              <a:rPr lang="en-US" dirty="0"/>
+              <a:t>, a </a:t>
+            </a:r>
+            <a:r>
+              <a:rPr lang="en-US" dirty="0" err="1"/>
+              <a:t>proctype</a:t>
+            </a:r>
+            <a:r>
+              <a:rPr lang="en-US" dirty="0"/>
+              <a:t> is a process. There is one process for each actor in the workflow: clinician, AI, and Patient.</a:t>
+            </a:r>
+          </a:p>
+          <a:p>
+            <a:endParaRPr lang="en-US" dirty="0"/>
+          </a:p>
+          <a:p>
+            <a:r>
+              <a:rPr lang="en-US" dirty="0"/>
+              <a:t>Click</a:t>
+            </a:r>
+          </a:p>
+          <a:p>
+            <a:endParaRPr lang="en-US" dirty="0"/>
+          </a:p>
+          <a:p>
+            <a:r>
+              <a:rPr lang="en-US" dirty="0"/>
+              <a:t>The workflow itself relies on tokens to mark where it is in the process. Here the token is in "Start170" according to the workflow at the top of the slide.</a:t>
+            </a:r>
+          </a:p>
+          <a:p>
+            <a:r>
+              <a:rPr lang="en-US" dirty="0"/>
+              <a:t>In </a:t>
+            </a:r>
+            <a:r>
+              <a:rPr lang="en-US" dirty="0" err="1"/>
+              <a:t>Promela</a:t>
+            </a:r>
+            <a:r>
+              <a:rPr lang="en-US" dirty="0"/>
+              <a:t>, the presence of that token at the indicated workflow location is designated with a global Boolean variable. </a:t>
+            </a:r>
+          </a:p>
+          <a:p>
+            <a:r>
+              <a:rPr lang="en-US" dirty="0"/>
+              <a:t>The line pointed to with the arrows in the </a:t>
+            </a:r>
+            <a:r>
+              <a:rPr lang="en-US" dirty="0" err="1"/>
+              <a:t>Promela</a:t>
+            </a:r>
+            <a:r>
+              <a:rPr lang="en-US" dirty="0"/>
+              <a:t> checks if the token is present at the Start170 element.</a:t>
+            </a:r>
+          </a:p>
+          <a:p>
+            <a:r>
+              <a:rPr lang="en-US" dirty="0"/>
+              <a:t>If that token is present, as determined by "</a:t>
+            </a:r>
+            <a:r>
+              <a:rPr lang="en-US" dirty="0" err="1"/>
+              <a:t>hasToken</a:t>
+            </a:r>
+            <a:r>
+              <a:rPr lang="en-US" dirty="0"/>
+              <a:t>", then it is possible for that token to activate the associated element.</a:t>
+            </a:r>
+          </a:p>
+          <a:p>
+            <a:endParaRPr lang="en-US" dirty="0"/>
+          </a:p>
+          <a:p>
+            <a:r>
+              <a:rPr lang="en-US" dirty="0"/>
+              <a:t>Click.</a:t>
+            </a:r>
+          </a:p>
+          <a:p>
+            <a:endParaRPr lang="en-US" dirty="0"/>
+          </a:p>
+          <a:p>
+            <a:r>
+              <a:rPr lang="en-US" dirty="0"/>
+              <a:t>In this example, the token is first consumed, since the element is now activated.</a:t>
+            </a:r>
+          </a:p>
+          <a:p>
+            <a:endParaRPr lang="en-US" dirty="0"/>
+          </a:p>
+          <a:p>
+            <a:r>
+              <a:rPr lang="en-US" dirty="0"/>
+              <a:t>Click</a:t>
+            </a:r>
+          </a:p>
+          <a:p>
+            <a:endParaRPr lang="en-US" dirty="0"/>
+          </a:p>
+          <a:p>
+            <a:r>
+              <a:rPr lang="en-US" dirty="0"/>
+              <a:t>The element then affects the global and local state according to its definition. More on this later.</a:t>
+            </a:r>
+          </a:p>
+          <a:p>
+            <a:endParaRPr lang="en-US" dirty="0"/>
+          </a:p>
+          <a:p>
+            <a:r>
+              <a:rPr lang="en-US" dirty="0"/>
+              <a:t>Click</a:t>
+            </a:r>
+          </a:p>
+          <a:p>
+            <a:endParaRPr lang="en-US" dirty="0"/>
+          </a:p>
+          <a:p>
+            <a:r>
+              <a:rPr lang="en-US" dirty="0"/>
+              <a:t>And then the token is moved along in accordance with the workflow semantics.</a:t>
+            </a:r>
+          </a:p>
+          <a:p>
+            <a:endParaRPr lang="en-US" dirty="0"/>
+          </a:p>
+          <a:p>
+            <a:r>
+              <a:rPr lang="en-US" dirty="0"/>
+              <a:t>Click</a:t>
+            </a:r>
+          </a:p>
+          <a:p>
+            <a:endParaRPr lang="en-US" dirty="0"/>
+          </a:p>
+          <a:p>
+            <a:r>
+              <a:rPr lang="en-US" dirty="0"/>
+              <a:t>In this example, it is placed in the 04 task as indicated by the token now on that visual element at the top of the slide.</a:t>
+            </a:r>
+          </a:p>
+          <a:p>
+            <a:endParaRPr lang="en-US" dirty="0"/>
+          </a:p>
+          <a:p>
+            <a:r>
+              <a:rPr lang="en-US" dirty="0"/>
+              <a:t>These are the token semantics for BPMN workflows and how they are implemented in </a:t>
+            </a:r>
+            <a:r>
+              <a:rPr lang="en-US" dirty="0" err="1"/>
+              <a:t>Promela</a:t>
+            </a:r>
+            <a:r>
+              <a:rPr lang="en-US" dirty="0"/>
+              <a:t>.</a:t>
             </a:r>
           </a:p>
         </p:txBody>
@@ -1215,7 +1646,7 @@
           <a:p>
             <a:fld id="{438ED187-F6C5-A545-9BCA-551DE666D003}" type="slidenum">
               <a:rPr lang="en-US" smtClean="0"/>
-              <a:t>18</a:t>
+              <a:t>16</a:t>
             </a:fld>
             <a:endParaRPr lang="en-US"/>
           </a:p>
@@ -1224,7 +1655,7 @@
     </p:spTree>
     <p:extLst>
       <p:ext uri="{BB962C8B-B14F-4D97-AF65-F5344CB8AC3E}">
-        <p14:creationId xmlns:p14="http://schemas.microsoft.com/office/powerpoint/2010/main" val="1058270444"/>
+        <p14:creationId xmlns:p14="http://schemas.microsoft.com/office/powerpoint/2010/main" val="2558912785"/>
       </p:ext>
     </p:extLst>
   </p:cSld>
@@ -1278,7 +1709,124 @@
           <a:bodyPr/>
           <a:lstStyle/>
           <a:p>
+            <a:r>
+              <a:rPr lang="en-US" dirty="0"/>
+              <a:t>The workflow state must be mapped to the state of the conceptual work product.</a:t>
+            </a:r>
+          </a:p>
+          <a:p>
+            <a:r>
+              <a:rPr lang="en-US" dirty="0"/>
+              <a:t>That begins with the state variables from the state diagram: orders, </a:t>
+            </a:r>
+            <a:r>
+              <a:rPr lang="en-US" dirty="0" err="1"/>
+              <a:t>sevNeed</a:t>
+            </a:r>
+            <a:r>
+              <a:rPr lang="en-US" dirty="0"/>
+              <a:t>, </a:t>
+            </a:r>
+            <a:r>
+              <a:rPr lang="en-US" dirty="0" err="1"/>
+              <a:t>homeCare</a:t>
+            </a:r>
+            <a:r>
+              <a:rPr lang="en-US" dirty="0"/>
+              <a:t>, and </a:t>
+            </a:r>
+            <a:r>
+              <a:rPr lang="en-US" dirty="0" err="1"/>
+              <a:t>trndSevNeed</a:t>
+            </a:r>
+            <a:r>
+              <a:rPr lang="en-US" dirty="0"/>
+              <a:t>.</a:t>
+            </a:r>
+          </a:p>
+          <a:p>
             <a:endParaRPr lang="en-US" dirty="0"/>
+          </a:p>
+          <a:p>
+            <a:r>
+              <a:rPr lang="en-US" dirty="0"/>
+              <a:t>Click</a:t>
+            </a:r>
+          </a:p>
+          <a:p>
+            <a:endParaRPr lang="en-US" dirty="0"/>
+          </a:p>
+          <a:p>
+            <a:r>
+              <a:rPr lang="en-US" dirty="0"/>
+              <a:t>Additional state variables are added to the workflow for things not mentioned in the state diagram. </a:t>
+            </a:r>
+          </a:p>
+          <a:p>
+            <a:r>
+              <a:rPr lang="en-US" dirty="0"/>
+              <a:t>In this example, an alert and </a:t>
+            </a:r>
+            <a:r>
+              <a:rPr lang="en-US" dirty="0" err="1"/>
+              <a:t>examTime</a:t>
+            </a:r>
+            <a:r>
+              <a:rPr lang="en-US" dirty="0"/>
+              <a:t> is needed.</a:t>
+            </a:r>
+          </a:p>
+          <a:p>
+            <a:endParaRPr lang="en-US" dirty="0"/>
+          </a:p>
+          <a:p>
+            <a:r>
+              <a:rPr lang="en-US" dirty="0"/>
+              <a:t>Click</a:t>
+            </a:r>
+          </a:p>
+          <a:p>
+            <a:endParaRPr lang="en-US" dirty="0"/>
+          </a:p>
+          <a:p>
+            <a:r>
+              <a:rPr lang="en-US" dirty="0"/>
+              <a:t>Finally, where these variables are mutated must be identified in the workflow.</a:t>
+            </a:r>
+          </a:p>
+          <a:p>
+            <a:r>
+              <a:rPr lang="en-US" dirty="0"/>
+              <a:t>Some of these locations are shown here.</a:t>
+            </a:r>
+          </a:p>
+          <a:p>
+            <a:r>
+              <a:rPr lang="en-US" dirty="0"/>
+              <a:t>For example, on the left, the orders, </a:t>
+            </a:r>
+            <a:r>
+              <a:rPr lang="en-US" dirty="0" err="1"/>
+              <a:t>sevNeed</a:t>
+            </a:r>
+            <a:r>
+              <a:rPr lang="en-US" dirty="0"/>
+              <a:t>, and </a:t>
+            </a:r>
+            <a:r>
+              <a:rPr lang="en-US" dirty="0" err="1"/>
+              <a:t>homeCare</a:t>
+            </a:r>
+            <a:r>
+              <a:rPr lang="en-US" dirty="0"/>
+              <a:t> must be assessed and assigned during the exam.</a:t>
+            </a:r>
+          </a:p>
+          <a:p>
+            <a:r>
+              <a:rPr lang="en-US" dirty="0"/>
+              <a:t>Similarly, on the right, the exam time must be set by the scheduling tasks.</a:t>
+            </a:r>
           </a:p>
         </p:txBody>
       </p:sp>
@@ -1299,7 +1847,7 @@
           <a:p>
             <a:fld id="{438ED187-F6C5-A545-9BCA-551DE666D003}" type="slidenum">
               <a:rPr lang="en-US" smtClean="0"/>
-              <a:t>19</a:t>
+              <a:t>17</a:t>
             </a:fld>
             <a:endParaRPr lang="en-US"/>
           </a:p>
@@ -1308,7 +1856,7 @@
     </p:spTree>
     <p:extLst>
       <p:ext uri="{BB962C8B-B14F-4D97-AF65-F5344CB8AC3E}">
-        <p14:creationId xmlns:p14="http://schemas.microsoft.com/office/powerpoint/2010/main" val="3992175538"/>
+        <p14:creationId xmlns:p14="http://schemas.microsoft.com/office/powerpoint/2010/main" val="392725069"/>
       </p:ext>
     </p:extLst>
   </p:cSld>
@@ -1364,7 +1912,15 @@
           <a:p>
             <a:r>
               <a:rPr lang="en-US" dirty="0"/>
-              <a:t>SPIN provided several counterexamples along the way to the final verification.</a:t>
+              <a:t>Having identified where state updates take place, the </a:t>
+            </a:r>
+            <a:r>
+              <a:rPr lang="en-US" dirty="0" err="1"/>
+              <a:t>promela</a:t>
+            </a:r>
+            <a:r>
+              <a:rPr lang="en-US" dirty="0"/>
+              <a:t> is modified to make those updates after consuming the token and before putting the token in the next element.</a:t>
             </a:r>
           </a:p>
           <a:p>
@@ -1373,7 +1929,7 @@
           <a:p>
             <a:r>
               <a:rPr lang="en-US" dirty="0"/>
-              <a:t>Sometimes the counter-examples revealed issues with the CWP definition of actionable risk awareness.</a:t>
+              <a:t>Here we are updating whether or not the patient expires in home care.</a:t>
             </a:r>
           </a:p>
           <a:p>
@@ -1382,16 +1938,15 @@
           <a:p>
             <a:r>
               <a:rPr lang="en-US" dirty="0"/>
-              <a:t>Sometimes the counter-examples revealed issues with the system design to integrate human and machine reasoning for remote patient monitoring where the design did not maintain actionable risk awareness.</a:t>
-            </a:r>
-          </a:p>
-          <a:p>
-            <a:endParaRPr lang="en-US" dirty="0"/>
-          </a:p>
-          <a:p>
+              <a:t>It is determined by the </a:t>
+            </a:r>
+            <a:r>
+              <a:rPr lang="en-US" dirty="0" err="1"/>
+              <a:t>updatePatientMortality</a:t>
+            </a:r>
             <a:r>
               <a:rPr lang="en-US" dirty="0"/>
-              <a:t>None of the counterexamples were spotted by the designers manually.</a:t>
+              <a:t> definition that relies on the trending severity predicted by the AI and the actual severity determined by the in person exam.</a:t>
             </a:r>
           </a:p>
         </p:txBody>
@@ -1413,7 +1968,7 @@
           <a:p>
             <a:fld id="{438ED187-F6C5-A545-9BCA-551DE666D003}" type="slidenum">
               <a:rPr lang="en-US" smtClean="0"/>
-              <a:t>20</a:t>
+              <a:t>18</a:t>
             </a:fld>
             <a:endParaRPr lang="en-US"/>
           </a:p>
@@ -1422,7 +1977,7 @@
     </p:spTree>
     <p:extLst>
       <p:ext uri="{BB962C8B-B14F-4D97-AF65-F5344CB8AC3E}">
-        <p14:creationId xmlns:p14="http://schemas.microsoft.com/office/powerpoint/2010/main" val="233911423"/>
+        <p14:creationId xmlns:p14="http://schemas.microsoft.com/office/powerpoint/2010/main" val="1058270444"/>
       </p:ext>
     </p:extLst>
   </p:cSld>
@@ -1476,7 +2031,97 @@
           <a:bodyPr/>
           <a:lstStyle/>
           <a:p>
+            <a:r>
+              <a:rPr lang="en-US" dirty="0"/>
+              <a:t>The model checker has three choices in updating the patient mortality.</a:t>
+            </a:r>
+          </a:p>
+          <a:p>
             <a:endParaRPr lang="en-US" dirty="0"/>
+          </a:p>
+          <a:p>
+            <a:r>
+              <a:rPr lang="en-US" dirty="0"/>
+              <a:t>Click</a:t>
+            </a:r>
+          </a:p>
+          <a:p>
+            <a:endParaRPr lang="en-US" dirty="0"/>
+          </a:p>
+          <a:p>
+            <a:r>
+              <a:rPr lang="en-US" dirty="0"/>
+              <a:t>The first looks at the trending severity level, indicated by the green arrow, and is applicable when the patient is in home care.</a:t>
+            </a:r>
+          </a:p>
+          <a:p>
+            <a:r>
+              <a:rPr lang="en-US" dirty="0"/>
+              <a:t>The trending severity affects the risk level of the patient, and if the patient is at a higher risk, then that patient may expire.</a:t>
+            </a:r>
+          </a:p>
+          <a:p>
+            <a:endParaRPr lang="en-US" dirty="0"/>
+          </a:p>
+          <a:p>
+            <a:r>
+              <a:rPr lang="en-US" dirty="0"/>
+              <a:t>Click</a:t>
+            </a:r>
+          </a:p>
+          <a:p>
+            <a:endParaRPr lang="en-US" dirty="0"/>
+          </a:p>
+          <a:p>
+            <a:r>
+              <a:rPr lang="en-US" dirty="0"/>
+              <a:t>The second looks at the actual severity as assessed by the clinician and is applicable when the patient is in ambulatory or hospital care.</a:t>
+            </a:r>
+          </a:p>
+          <a:p>
+            <a:endParaRPr lang="en-US" dirty="0"/>
+          </a:p>
+          <a:p>
+            <a:r>
+              <a:rPr lang="en-US" dirty="0"/>
+              <a:t>In both cases, home or hospital, if the severity, trending or otherwise, exceeds the level of care that can be provided at home, then the patient may expire.</a:t>
+            </a:r>
+          </a:p>
+          <a:p>
+            <a:endParaRPr lang="en-US" dirty="0"/>
+          </a:p>
+          <a:p>
+            <a:r>
+              <a:rPr lang="en-US" dirty="0"/>
+              <a:t>Click</a:t>
+            </a:r>
+          </a:p>
+          <a:p>
+            <a:endParaRPr lang="en-US" dirty="0"/>
+          </a:p>
+          <a:p>
+            <a:r>
+              <a:rPr lang="en-US" dirty="0"/>
+              <a:t>The third choice is always available to the model checker, and that is that nothing happens to the patient.</a:t>
+            </a:r>
+          </a:p>
+          <a:p>
+            <a:endParaRPr lang="en-US" dirty="0"/>
+          </a:p>
+          <a:p>
+            <a:r>
+              <a:rPr lang="en-US" dirty="0"/>
+              <a:t>Click</a:t>
+            </a:r>
+          </a:p>
+          <a:p>
+            <a:endParaRPr lang="en-US" dirty="0"/>
+          </a:p>
+          <a:p>
+            <a:r>
+              <a:rPr lang="en-US" dirty="0"/>
+              <a:t>In this way, the model checker can reason about the patient expiring or not expiring at any time that the patient's illness exceeds home care capabilities.</a:t>
+            </a:r>
           </a:p>
         </p:txBody>
       </p:sp>
@@ -1497,7 +2142,7 @@
           <a:p>
             <a:fld id="{438ED187-F6C5-A545-9BCA-551DE666D003}" type="slidenum">
               <a:rPr lang="en-US" smtClean="0"/>
-              <a:t>21</a:t>
+              <a:t>19</a:t>
             </a:fld>
             <a:endParaRPr lang="en-US"/>
           </a:p>
@@ -1506,7 +2151,193 @@
     </p:spTree>
     <p:extLst>
       <p:ext uri="{BB962C8B-B14F-4D97-AF65-F5344CB8AC3E}">
-        <p14:creationId xmlns:p14="http://schemas.microsoft.com/office/powerpoint/2010/main" val="776147955"/>
+        <p14:creationId xmlns:p14="http://schemas.microsoft.com/office/powerpoint/2010/main" val="3992175538"/>
+      </p:ext>
+    </p:extLst>
+  </p:cSld>
+  <p:clrMapOvr>
+    <a:masterClrMapping/>
+  </p:clrMapOvr>
+</p:notes>
+</file>
+
+<file path=ppt/notesSlides/notesSlide19.xml><?xml version="1.0" encoding="utf-8"?>
+<p:notes xmlns:a="http://schemas.openxmlformats.org/drawingml/2006/main" xmlns:r="http://schemas.openxmlformats.org/officeDocument/2006/relationships" xmlns:p="http://schemas.openxmlformats.org/presentationml/2006/main">
+  <p:cSld>
+    <p:spTree>
+      <p:nvGrpSpPr>
+        <p:cNvPr id="1" name=""/>
+        <p:cNvGrpSpPr/>
+        <p:nvPr/>
+      </p:nvGrpSpPr>
+      <p:grpSpPr>
+        <a:xfrm>
+          <a:off x="0" y="0"/>
+          <a:ext cx="0" cy="0"/>
+          <a:chOff x="0" y="0"/>
+          <a:chExt cx="0" cy="0"/>
+        </a:xfrm>
+      </p:grpSpPr>
+      <p:sp>
+        <p:nvSpPr>
+          <p:cNvPr id="2" name="Slide Image Placeholder 1"/>
+          <p:cNvSpPr>
+            <a:spLocks noGrp="1" noRot="1" noChangeAspect="1"/>
+          </p:cNvSpPr>
+          <p:nvPr>
+            <p:ph type="sldImg"/>
+          </p:nvPr>
+        </p:nvSpPr>
+        <p:spPr/>
+      </p:sp>
+      <p:sp>
+        <p:nvSpPr>
+          <p:cNvPr id="3" name="Notes Placeholder 2"/>
+          <p:cNvSpPr>
+            <a:spLocks noGrp="1"/>
+          </p:cNvSpPr>
+          <p:nvPr>
+            <p:ph type="body" idx="1"/>
+          </p:nvPr>
+        </p:nvSpPr>
+        <p:spPr/>
+        <p:txBody>
+          <a:bodyPr/>
+          <a:lstStyle/>
+          <a:p>
+            <a:r>
+              <a:rPr lang="en-US" dirty="0"/>
+              <a:t>Here is the output from SPIN for verification.</a:t>
+            </a:r>
+          </a:p>
+          <a:p>
+            <a:endParaRPr lang="en-US" dirty="0"/>
+          </a:p>
+          <a:p>
+            <a:r>
+              <a:rPr lang="en-US" dirty="0"/>
+              <a:t>Click</a:t>
+            </a:r>
+          </a:p>
+          <a:p>
+            <a:endParaRPr lang="en-US" dirty="0"/>
+          </a:p>
+          <a:p>
+            <a:r>
+              <a:rPr lang="en-US" dirty="0"/>
+              <a:t>The global properties passed. Note the second reports an error, which is good, because that is a witness that at least one fair path exists in the system.</a:t>
+            </a:r>
+          </a:p>
+          <a:p>
+            <a:endParaRPr lang="en-US" dirty="0"/>
+          </a:p>
+          <a:p>
+            <a:r>
+              <a:rPr lang="en-US" dirty="0"/>
+              <a:t>Click</a:t>
+            </a:r>
+          </a:p>
+          <a:p>
+            <a:endParaRPr lang="en-US" dirty="0"/>
+          </a:p>
+          <a:p>
+            <a:r>
+              <a:rPr lang="en-US" dirty="0"/>
+              <a:t>Here are the properties for patient in appropriate home care. As before, the error is good since it says the state exists on at least one fair path.</a:t>
+            </a:r>
+          </a:p>
+          <a:p>
+            <a:endParaRPr lang="en-US" dirty="0"/>
+          </a:p>
+          <a:p>
+            <a:r>
+              <a:rPr lang="en-US" dirty="0"/>
+              <a:t>Click</a:t>
+            </a:r>
+          </a:p>
+          <a:p>
+            <a:endParaRPr lang="en-US" dirty="0"/>
+          </a:p>
+          <a:p>
+            <a:r>
+              <a:rPr lang="en-US" dirty="0"/>
+              <a:t>Finally, the total time is under 3 minutes on my laptop.</a:t>
+            </a:r>
+          </a:p>
+          <a:p>
+            <a:endParaRPr lang="en-US" dirty="0"/>
+          </a:p>
+          <a:p>
+            <a:r>
+              <a:rPr lang="en-US" dirty="0"/>
+              <a:t>Click</a:t>
+            </a:r>
+          </a:p>
+          <a:p>
+            <a:endParaRPr lang="en-US" dirty="0"/>
+          </a:p>
+          <a:p>
+            <a:r>
+              <a:rPr lang="en-US" dirty="0"/>
+              <a:t>SPIN provided several counterexamples along the way to the final verification.</a:t>
+            </a:r>
+          </a:p>
+          <a:p>
+            <a:endParaRPr lang="en-US" dirty="0"/>
+          </a:p>
+          <a:p>
+            <a:r>
+              <a:rPr lang="en-US" dirty="0"/>
+              <a:t>Sometimes the counter-examples revealed issues with the state diagram</a:t>
+            </a:r>
+          </a:p>
+          <a:p>
+            <a:endParaRPr lang="en-US" dirty="0"/>
+          </a:p>
+          <a:p>
+            <a:r>
+              <a:rPr lang="en-US" dirty="0"/>
+              <a:t>Sometimes the counter-examples revealed issues with the workflow</a:t>
+            </a:r>
+          </a:p>
+          <a:p>
+            <a:endParaRPr lang="en-US" dirty="0"/>
+          </a:p>
+          <a:p>
+            <a:r>
+              <a:rPr lang="en-US" dirty="0"/>
+              <a:t>None of the counterexamples were spotted manually by the designers---they believed the system to be correct.</a:t>
+            </a:r>
+          </a:p>
+        </p:txBody>
+      </p:sp>
+      <p:sp>
+        <p:nvSpPr>
+          <p:cNvPr id="4" name="Slide Number Placeholder 3"/>
+          <p:cNvSpPr>
+            <a:spLocks noGrp="1"/>
+          </p:cNvSpPr>
+          <p:nvPr>
+            <p:ph type="sldNum" sz="quarter" idx="5"/>
+          </p:nvPr>
+        </p:nvSpPr>
+        <p:spPr/>
+        <p:txBody>
+          <a:bodyPr/>
+          <a:lstStyle/>
+          <a:p>
+            <a:fld id="{438ED187-F6C5-A545-9BCA-551DE666D003}" type="slidenum">
+              <a:rPr lang="en-US" smtClean="0"/>
+              <a:t>20</a:t>
+            </a:fld>
+            <a:endParaRPr lang="en-US"/>
+          </a:p>
+        </p:txBody>
+      </p:sp>
+    </p:spTree>
+    <p:extLst>
+      <p:ext uri="{BB962C8B-B14F-4D97-AF65-F5344CB8AC3E}">
+        <p14:creationId xmlns:p14="http://schemas.microsoft.com/office/powerpoint/2010/main" val="233911423"/>
       </p:ext>
     </p:extLst>
   </p:cSld>
@@ -1615,6 +2446,90 @@
     <p:extLst>
       <p:ext uri="{BB962C8B-B14F-4D97-AF65-F5344CB8AC3E}">
         <p14:creationId xmlns:p14="http://schemas.microsoft.com/office/powerpoint/2010/main" val="2821759801"/>
+      </p:ext>
+    </p:extLst>
+  </p:cSld>
+  <p:clrMapOvr>
+    <a:masterClrMapping/>
+  </p:clrMapOvr>
+</p:notes>
+</file>
+
+<file path=ppt/notesSlides/notesSlide20.xml><?xml version="1.0" encoding="utf-8"?>
+<p:notes xmlns:a="http://schemas.openxmlformats.org/drawingml/2006/main" xmlns:r="http://schemas.openxmlformats.org/officeDocument/2006/relationships" xmlns:p="http://schemas.openxmlformats.org/presentationml/2006/main">
+  <p:cSld>
+    <p:spTree>
+      <p:nvGrpSpPr>
+        <p:cNvPr id="1" name=""/>
+        <p:cNvGrpSpPr/>
+        <p:nvPr/>
+      </p:nvGrpSpPr>
+      <p:grpSpPr>
+        <a:xfrm>
+          <a:off x="0" y="0"/>
+          <a:ext cx="0" cy="0"/>
+          <a:chOff x="0" y="0"/>
+          <a:chExt cx="0" cy="0"/>
+        </a:xfrm>
+      </p:grpSpPr>
+      <p:sp>
+        <p:nvSpPr>
+          <p:cNvPr id="2" name="Slide Image Placeholder 1"/>
+          <p:cNvSpPr>
+            <a:spLocks noGrp="1" noRot="1" noChangeAspect="1"/>
+          </p:cNvSpPr>
+          <p:nvPr>
+            <p:ph type="sldImg"/>
+          </p:nvPr>
+        </p:nvSpPr>
+        <p:spPr/>
+      </p:sp>
+      <p:sp>
+        <p:nvSpPr>
+          <p:cNvPr id="3" name="Notes Placeholder 2"/>
+          <p:cNvSpPr>
+            <a:spLocks noGrp="1"/>
+          </p:cNvSpPr>
+          <p:nvPr>
+            <p:ph type="body" idx="1"/>
+          </p:nvPr>
+        </p:nvSpPr>
+        <p:spPr/>
+        <p:txBody>
+          <a:bodyPr/>
+          <a:lstStyle/>
+          <a:p>
+            <a:endParaRPr lang="en-US" dirty="0"/>
+          </a:p>
+        </p:txBody>
+      </p:sp>
+      <p:sp>
+        <p:nvSpPr>
+          <p:cNvPr id="4" name="Slide Number Placeholder 3"/>
+          <p:cNvSpPr>
+            <a:spLocks noGrp="1"/>
+          </p:cNvSpPr>
+          <p:nvPr>
+            <p:ph type="sldNum" sz="quarter" idx="5"/>
+          </p:nvPr>
+        </p:nvSpPr>
+        <p:spPr/>
+        <p:txBody>
+          <a:bodyPr/>
+          <a:lstStyle/>
+          <a:p>
+            <a:fld id="{438ED187-F6C5-A545-9BCA-551DE666D003}" type="slidenum">
+              <a:rPr lang="en-US" smtClean="0"/>
+              <a:t>21</a:t>
+            </a:fld>
+            <a:endParaRPr lang="en-US"/>
+          </a:p>
+        </p:txBody>
+      </p:sp>
+    </p:spTree>
+    <p:extLst>
+      <p:ext uri="{BB962C8B-B14F-4D97-AF65-F5344CB8AC3E}">
+        <p14:creationId xmlns:p14="http://schemas.microsoft.com/office/powerpoint/2010/main" val="776147955"/>
       </p:ext>
     </p:extLst>
   </p:cSld>
@@ -12283,7 +13198,7 @@
           <p:nvPr/>
         </p:nvPicPr>
         <p:blipFill>
-          <a:blip r:embed="rId2"/>
+          <a:blip r:embed="rId3"/>
           <a:stretch>
             <a:fillRect/>
           </a:stretch>
@@ -12321,7 +13236,7 @@
             <p:nvPr/>
           </p:nvPicPr>
           <p:blipFill>
-            <a:blip r:embed="rId3"/>
+            <a:blip r:embed="rId4"/>
             <a:stretch>
               <a:fillRect/>
             </a:stretch>
@@ -12345,7 +13260,7 @@
             <p:nvPr/>
           </p:nvPicPr>
           <p:blipFill>
-            <a:blip r:embed="rId4"/>
+            <a:blip r:embed="rId5"/>
             <a:stretch>
               <a:fillRect/>
             </a:stretch>
@@ -12370,7 +13285,7 @@
           <p:nvPr/>
         </p:nvPicPr>
         <p:blipFill>
-          <a:blip r:embed="rId5"/>
+          <a:blip r:embed="rId6"/>
           <a:stretch>
             <a:fillRect/>
           </a:stretch>
@@ -12408,7 +13323,7 @@
             <p:nvPr/>
           </p:nvPicPr>
           <p:blipFill>
-            <a:blip r:embed="rId6"/>
+            <a:blip r:embed="rId7"/>
             <a:stretch>
               <a:fillRect/>
             </a:stretch>
@@ -12469,7 +13384,7 @@
           <p:nvPr/>
         </p:nvPicPr>
         <p:blipFill>
-          <a:blip r:embed="rId7"/>
+          <a:blip r:embed="rId8"/>
           <a:stretch>
             <a:fillRect/>
           </a:stretch>
@@ -12493,7 +13408,7 @@
           <p:nvPr/>
         </p:nvPicPr>
         <p:blipFill>
-          <a:blip r:embed="rId8"/>
+          <a:blip r:embed="rId9"/>
           <a:stretch>
             <a:fillRect/>
           </a:stretch>
@@ -12531,7 +13446,7 @@
             <p:nvPr/>
           </p:nvPicPr>
           <p:blipFill>
-            <a:blip r:embed="rId9"/>
+            <a:blip r:embed="rId10"/>
             <a:stretch>
               <a:fillRect/>
             </a:stretch>
@@ -12555,7 +13470,7 @@
             <p:nvPr/>
           </p:nvPicPr>
           <p:blipFill>
-            <a:blip r:embed="rId10"/>
+            <a:blip r:embed="rId11"/>
             <a:stretch>
               <a:fillRect/>
             </a:stretch>
@@ -12912,7 +13827,7 @@
                 <p:nvPr/>
               </p:nvPicPr>
               <p:blipFill>
-                <a:blip r:embed="rId11"/>
+                <a:blip r:embed="rId12"/>
                 <a:stretch>
                   <a:fillRect/>
                 </a:stretch>
@@ -15790,7 +16705,7 @@
           <p:nvPr/>
         </p:nvPicPr>
         <p:blipFill>
-          <a:blip r:embed="rId2"/>
+          <a:blip r:embed="rId3"/>
           <a:stretch>
             <a:fillRect/>
           </a:stretch>

</xml_diff>

<commit_message>
Fix coceptual to cognitive and add conclusion
</commit_message>
<xml_diff>
--- a/presentation/syscon-2022.pptx
+++ b/presentation/syscon-2022.pptx
@@ -626,7 +626,7 @@
           <a:p>
             <a:r>
               <a:rPr lang="en-US" dirty="0"/>
-              <a:t>The first is that a system must always be in some state of the conceptual work problem. Always. So at least one of the predicates must be true at every point of the system.</a:t>
+              <a:t>The first is that a system must always be in some state of the cognitive work problem. Always. So at least one of the predicates must be true at every point of the system.</a:t>
             </a:r>
           </a:p>
           <a:p>
@@ -779,7 +779,7 @@
           <a:p>
             <a:r>
               <a:rPr lang="en-US" dirty="0"/>
-              <a:t>There are three properties created by every state of the conceptual work problem.</a:t>
+              <a:t>There are three properties created by every state of the cognitive work problem.</a:t>
             </a:r>
           </a:p>
           <a:p>
@@ -812,7 +812,7 @@
           <a:p>
             <a:r>
               <a:rPr lang="en-US" dirty="0"/>
-              <a:t>The second property is that the system is never in more than one state at a time--mode confusion. If this property is every violated, then more information must be added to the state diagram for the conceptual work problem in order to differentiate the states.</a:t>
+              <a:t>The second property is that the system is never in more than one state at a time--mode confusion. If this property is every violated, then more information must be added to the state diagram for the cognitive work problem in order to differentiate the states.</a:t>
             </a:r>
           </a:p>
           <a:p>
@@ -926,7 +926,7 @@
           <a:p>
             <a:r>
               <a:rPr lang="en-US" dirty="0"/>
-              <a:t>There are 20 properties in total that must hold for any system claiming to solve the conceptual work problem of actionable risk awareness for remote patient care for COVID 19.</a:t>
+              <a:t>There are 20 properties in total that must hold for any system claiming to solve the cognitive work problem of actionable risk awareness for remote patient care for COVID 19.</a:t>
             </a:r>
           </a:p>
           <a:p>
@@ -1358,7 +1358,7 @@
           <a:p>
             <a:r>
               <a:rPr lang="en-US" dirty="0"/>
-              <a:t>The translation takes place in three steps with the last two requiring some help from the designer as they involve mapping the state of the workflow to that of the state diagram for the conceptual work problem being solved.</a:t>
+              <a:t>The translation takes place in three steps with the last two requiring some help from the designer as they involve mapping the state of the workflow to that of the state diagram for the cognitive work problem being solved.</a:t>
             </a:r>
           </a:p>
         </p:txBody>
@@ -1711,7 +1711,7 @@
           <a:p>
             <a:r>
               <a:rPr lang="en-US" dirty="0"/>
-              <a:t>The workflow state must be mapped to the state of the conceptual work product.</a:t>
+              <a:t>The workflow state must be mapped to the state of the cognitive work problem.</a:t>
             </a:r>
           </a:p>
           <a:p>
@@ -2499,7 +2499,63 @@
           <a:bodyPr/>
           <a:lstStyle/>
           <a:p>
+            <a:r>
+              <a:rPr lang="en-US" dirty="0"/>
+              <a:t>Reasoning about functional integration is hard but necessary in capital and safety critical workflows requiring a clear definition of what a system is intended to do and how it accomplishes it.</a:t>
+            </a:r>
+          </a:p>
+          <a:p>
+            <a:r>
+              <a:rPr lang="en-US" dirty="0"/>
+              <a:t>The cognitive work problem is an effective way to specify the what of integration while a workflow model specifies the how.</a:t>
+            </a:r>
+          </a:p>
+          <a:p>
+            <a:r>
+              <a:rPr lang="en-US" dirty="0"/>
+              <a:t>These can be translated to the input of a model checker to prove that a workflow solves, or does not solve, the cognitive work problem.</a:t>
+            </a:r>
+          </a:p>
+          <a:p>
+            <a:r>
+              <a:rPr lang="en-US" dirty="0"/>
+              <a:t>The translation turns the state diagram for the cognitive work problem into linear temporal logic properties and the workflow into </a:t>
+            </a:r>
+            <a:r>
+              <a:rPr lang="en-US" dirty="0" err="1"/>
+              <a:t>Promela</a:t>
+            </a:r>
             <a:endParaRPr lang="en-US" dirty="0"/>
+          </a:p>
+          <a:p>
+            <a:r>
+              <a:rPr lang="en-US" dirty="0"/>
+              <a:t>Future work is to automate the translation and to map the counter examples from the model checker back into the graphical representations.</a:t>
+            </a:r>
+          </a:p>
+          <a:p>
+            <a:r>
+              <a:rPr lang="en-US" dirty="0"/>
+              <a:t>Other work is to make explicit the mapping between the state diagram and the state of the workflow including where and how the updates take place in the workflow representation.</a:t>
+            </a:r>
+          </a:p>
+          <a:p>
+            <a:endParaRPr lang="en-US" dirty="0"/>
+          </a:p>
+          <a:p>
+            <a:r>
+              <a:rPr lang="en-US" dirty="0"/>
+              <a:t>Please see the paper for details on the specification, translation, and verification in SPIN.</a:t>
+            </a:r>
+          </a:p>
+          <a:p>
+            <a:endParaRPr lang="en-US" dirty="0"/>
+          </a:p>
+          <a:p>
+            <a:r>
+              <a:rPr lang="en-US" dirty="0"/>
+              <a:t>Thank you for your attention in viewing this presentation, and I certainly welcome questions. My contact information is available with a google search of my name with Brigham Young University.</a:t>
+            </a:r>
           </a:p>
         </p:txBody>
       </p:sp>
@@ -2840,7 +2896,7 @@
           <a:p>
             <a:r>
               <a:rPr lang="en-US" baseline="0" dirty="0"/>
-              <a:t>The meaning of  ”patient safety” is first described as a conceptual work problem.</a:t>
+              <a:t>The meaning of  ”patient safety” is first described as a cognitive work problem.</a:t>
             </a:r>
           </a:p>
           <a:p>
@@ -3223,7 +3279,7 @@
           <a:p>
             <a:r>
               <a:rPr lang="en-US" dirty="0"/>
-              <a:t>The conceptual work problem defines the states of actionable risk awareness for the patient.</a:t>
+              <a:t>The cognitive work problem defines the states of actionable risk awareness for the patient.</a:t>
             </a:r>
           </a:p>
           <a:p>
@@ -3238,53 +3294,11 @@
           <a:p>
             <a:r>
               <a:rPr lang="en-US" dirty="0"/>
-              <a:t>To prove these claims, the state diagram for the conceptual work problem is turned into a set of properties for the model checker to verify. If all the properties pass verification, then the system solves the conceptual work problem.</a:t>
+              <a:t>To prove these claims, the state diagram is turned into a set of properties for the model checker to verify. If all the properties pass verification, then the system solves the cognitive work problem.</a:t>
             </a:r>
           </a:p>
           <a:p>
             <a:endParaRPr lang="en-US" dirty="0"/>
-          </a:p>
-          <a:p>
-            <a:r>
-              <a:rPr lang="en-US" dirty="0"/>
-              <a:t>Click</a:t>
-            </a:r>
-          </a:p>
-          <a:p>
-            <a:endParaRPr lang="en-US" dirty="0"/>
-          </a:p>
-          <a:p>
-            <a:endParaRPr lang="en-US" dirty="0"/>
-          </a:p>
-          <a:p>
-            <a:r>
-              <a:rPr lang="en-US" dirty="0"/>
-              <a:t>These are captured in a set of properties created over three steps: first state the conditions for when the system resides in each state of the UML diagram. </a:t>
-            </a:r>
-          </a:p>
-          <a:p>
-            <a:endParaRPr lang="en-US" dirty="0"/>
-          </a:p>
-          <a:p>
-            <a:r>
-              <a:rPr lang="en-US" dirty="0"/>
-              <a:t>With those conditions defined, then we have two global properties: the a system that solves the CWP must always be in one of its defined states, and that solution must be able to reach a goal state of the CWP.</a:t>
-            </a:r>
-          </a:p>
-          <a:p>
-            <a:r>
-              <a:rPr lang="en-US" dirty="0"/>
-              <a:t>There are three additional properties for each state in the UML diagram: a system that solves the CWP must be able to reach each state, never be in two states at once, and only follow allowed edges in the UML.</a:t>
-            </a:r>
-          </a:p>
-          <a:p>
-            <a:endParaRPr lang="en-US" dirty="0"/>
-          </a:p>
-          <a:p>
-            <a:r>
-              <a:rPr lang="en-US" dirty="0"/>
-              <a:t>These three steps are discussed in detail individually.</a:t>
-            </a:r>
           </a:p>
         </p:txBody>
       </p:sp>

</xml_diff>

<commit_message>
Fix typo on computing states
</commit_message>
<xml_diff>
--- a/presentation/syscon-2022.pptx
+++ b/presentation/syscon-2022.pptx
@@ -131,6 +131,9 @@
     <p:ext uri="{EFAFB233-063F-42B5-8137-9DF3F51BA10A}">
       <p15:sldGuideLst xmlns:p15="http://schemas.microsoft.com/office/powerpoint/2012/main"/>
     </p:ext>
+    <p:ext uri="{2D200454-40CA-4A62-9FC3-DE9A4176ACB9}">
+      <p15:notesGuideLst xmlns:p15="http://schemas.microsoft.com/office/powerpoint/2012/main"/>
+    </p:ext>
   </p:extLst>
 </p:presentation>
 </file>
@@ -217,7 +220,7 @@
           <a:p>
             <a:fld id="{4F670BAA-F977-EB44-80DC-ADC002811BE9}" type="datetimeFigureOut">
               <a:rPr lang="en-US" smtClean="0"/>
-              <a:t>4/7/22</a:t>
+              <a:t>5/3/22</a:t>
             </a:fld>
             <a:endParaRPr lang="en-US"/>
           </a:p>
@@ -3528,7 +3531,7 @@
           <a:p>
             <a:r>
               <a:rPr lang="en-US" dirty="0"/>
-              <a:t>Consider state 2: the conditions in A and F must both be true to reside in state 2, but that is not all.</a:t>
+              <a:t>Consider state 2: at least one input condition, A or F must be true to reside in state 2, but that is not all.</a:t>
             </a:r>
           </a:p>
           <a:p>
@@ -3739,7 +3742,7 @@
           <a:p>
             <a:fld id="{BF29B9AB-6859-C043-A124-7604E53B39CA}" type="datetimeFigureOut">
               <a:rPr lang="en-US" smtClean="0"/>
-              <a:t>4/7/22</a:t>
+              <a:t>5/3/22</a:t>
             </a:fld>
             <a:endParaRPr lang="en-US"/>
           </a:p>
@@ -3909,7 +3912,7 @@
           <a:p>
             <a:fld id="{BF29B9AB-6859-C043-A124-7604E53B39CA}" type="datetimeFigureOut">
               <a:rPr lang="en-US" smtClean="0"/>
-              <a:t>4/7/22</a:t>
+              <a:t>5/3/22</a:t>
             </a:fld>
             <a:endParaRPr lang="en-US"/>
           </a:p>
@@ -4089,7 +4092,7 @@
           <a:p>
             <a:fld id="{BF29B9AB-6859-C043-A124-7604E53B39CA}" type="datetimeFigureOut">
               <a:rPr lang="en-US" smtClean="0"/>
-              <a:t>4/7/22</a:t>
+              <a:t>5/3/22</a:t>
             </a:fld>
             <a:endParaRPr lang="en-US"/>
           </a:p>
@@ -4259,7 +4262,7 @@
           <a:p>
             <a:fld id="{BF29B9AB-6859-C043-A124-7604E53B39CA}" type="datetimeFigureOut">
               <a:rPr lang="en-US" smtClean="0"/>
-              <a:t>4/7/22</a:t>
+              <a:t>5/3/22</a:t>
             </a:fld>
             <a:endParaRPr lang="en-US"/>
           </a:p>
@@ -4505,7 +4508,7 @@
           <a:p>
             <a:fld id="{BF29B9AB-6859-C043-A124-7604E53B39CA}" type="datetimeFigureOut">
               <a:rPr lang="en-US" smtClean="0"/>
-              <a:t>4/7/22</a:t>
+              <a:t>5/3/22</a:t>
             </a:fld>
             <a:endParaRPr lang="en-US"/>
           </a:p>
@@ -4737,7 +4740,7 @@
           <a:p>
             <a:fld id="{BF29B9AB-6859-C043-A124-7604E53B39CA}" type="datetimeFigureOut">
               <a:rPr lang="en-US" smtClean="0"/>
-              <a:t>4/7/22</a:t>
+              <a:t>5/3/22</a:t>
             </a:fld>
             <a:endParaRPr lang="en-US"/>
           </a:p>
@@ -5104,7 +5107,7 @@
           <a:p>
             <a:fld id="{BF29B9AB-6859-C043-A124-7604E53B39CA}" type="datetimeFigureOut">
               <a:rPr lang="en-US" smtClean="0"/>
-              <a:t>4/7/22</a:t>
+              <a:t>5/3/22</a:t>
             </a:fld>
             <a:endParaRPr lang="en-US"/>
           </a:p>
@@ -5222,7 +5225,7 @@
           <a:p>
             <a:fld id="{BF29B9AB-6859-C043-A124-7604E53B39CA}" type="datetimeFigureOut">
               <a:rPr lang="en-US" smtClean="0"/>
-              <a:t>4/7/22</a:t>
+              <a:t>5/3/22</a:t>
             </a:fld>
             <a:endParaRPr lang="en-US"/>
           </a:p>
@@ -5317,7 +5320,7 @@
           <a:p>
             <a:fld id="{BF29B9AB-6859-C043-A124-7604E53B39CA}" type="datetimeFigureOut">
               <a:rPr lang="en-US" smtClean="0"/>
-              <a:t>4/7/22</a:t>
+              <a:t>5/3/22</a:t>
             </a:fld>
             <a:endParaRPr lang="en-US"/>
           </a:p>
@@ -5594,7 +5597,7 @@
           <a:p>
             <a:fld id="{BF29B9AB-6859-C043-A124-7604E53B39CA}" type="datetimeFigureOut">
               <a:rPr lang="en-US" smtClean="0"/>
-              <a:t>4/7/22</a:t>
+              <a:t>5/3/22</a:t>
             </a:fld>
             <a:endParaRPr lang="en-US"/>
           </a:p>
@@ -5851,7 +5854,7 @@
           <a:p>
             <a:fld id="{BF29B9AB-6859-C043-A124-7604E53B39CA}" type="datetimeFigureOut">
               <a:rPr lang="en-US" smtClean="0"/>
-              <a:t>4/7/22</a:t>
+              <a:t>5/3/22</a:t>
             </a:fld>
             <a:endParaRPr lang="en-US"/>
           </a:p>
@@ -6064,7 +6067,7 @@
           <a:p>
             <a:fld id="{BF29B9AB-6859-C043-A124-7604E53B39CA}" type="datetimeFigureOut">
               <a:rPr lang="en-US" smtClean="0"/>
-              <a:t>4/7/22</a:t>
+              <a:t>5/3/22</a:t>
             </a:fld>
             <a:endParaRPr lang="en-US"/>
           </a:p>
@@ -6873,7 +6876,7 @@
               <a:rPr lang="en-US" sz="2400" b="0" dirty="0">
                 <a:latin typeface="Cambria Math" panose="02040503050406030204" pitchFamily="18" charset="0"/>
               </a:rPr>
-              <a:t>Must satisfy input conditions and</a:t>
+              <a:t>Must satisfy an input condition and</a:t>
             </a:r>
             <a:endParaRPr lang="en-US" sz="2400" dirty="0">
               <a:latin typeface="Cambria Math" panose="02040503050406030204" pitchFamily="18" charset="0"/>
@@ -7069,8 +7072,8 @@
           </a:prstGeom>
         </p:spPr>
       </p:pic>
-      <mc:AlternateContent xmlns:mc="http://schemas.openxmlformats.org/markup-compatibility/2006" xmlns:a14="http://schemas.microsoft.com/office/drawing/2010/main">
-        <mc:Choice Requires="a14">
+      <mc:AlternateContent xmlns:mc="http://schemas.openxmlformats.org/markup-compatibility/2006">
+        <mc:Choice xmlns:a14="http://schemas.microsoft.com/office/drawing/2010/main" Requires="a14">
           <p:sp>
             <p:nvSpPr>
               <p:cNvPr id="11" name="Rectangle 10">
@@ -7138,7 +7141,7 @@
                             <a:rPr lang="en-US" sz="3600" i="1">
                               <a:latin typeface="Cambria Math" panose="02040503050406030204" pitchFamily="18" charset="0"/>
                             </a:rPr>
-                            <m:t>∧</m:t>
+                            <m:t>∨</m:t>
                           </m:r>
                           <m:r>
                             <a:rPr lang="en-US" sz="3600" i="1" smtClean="0">
@@ -7195,7 +7198,7 @@
             </p:txBody>
           </p:sp>
         </mc:Choice>
-        <mc:Fallback xmlns="">
+        <mc:Fallback>
           <p:sp>
             <p:nvSpPr>
               <p:cNvPr id="11" name="Rectangle 10">

</xml_diff>

<commit_message>
Revise presentation on state definitions
</commit_message>
<xml_diff>
--- a/presentation/syscon-2022.pptx
+++ b/presentation/syscon-2022.pptx
@@ -220,7 +220,7 @@
           <a:p>
             <a:fld id="{4F670BAA-F977-EB44-80DC-ADC002811BE9}" type="datetimeFigureOut">
               <a:rPr lang="en-US" smtClean="0"/>
-              <a:t>5/3/22</a:t>
+              <a:t>5/4/22</a:t>
             </a:fld>
             <a:endParaRPr lang="en-US"/>
           </a:p>
@@ -3531,7 +3531,15 @@
           <a:p>
             <a:r>
               <a:rPr lang="en-US" dirty="0"/>
-              <a:t>Consider state 2: at least one input condition, A or F must be true to reside in state 2, but that is not all.</a:t>
+              <a:t>Consider state 2: the </a:t>
+            </a:r>
+            <a:r>
+              <a:rPr lang="en-US"/>
+              <a:t>common conditions </a:t>
+            </a:r>
+            <a:r>
+              <a:rPr lang="en-US" dirty="0"/>
+              <a:t>of  A and F must be true to reside in state 2, but that is not all.</a:t>
             </a:r>
           </a:p>
           <a:p>
@@ -3742,7 +3750,7 @@
           <a:p>
             <a:fld id="{BF29B9AB-6859-C043-A124-7604E53B39CA}" type="datetimeFigureOut">
               <a:rPr lang="en-US" smtClean="0"/>
-              <a:t>5/3/22</a:t>
+              <a:t>5/4/22</a:t>
             </a:fld>
             <a:endParaRPr lang="en-US"/>
           </a:p>
@@ -3912,7 +3920,7 @@
           <a:p>
             <a:fld id="{BF29B9AB-6859-C043-A124-7604E53B39CA}" type="datetimeFigureOut">
               <a:rPr lang="en-US" smtClean="0"/>
-              <a:t>5/3/22</a:t>
+              <a:t>5/4/22</a:t>
             </a:fld>
             <a:endParaRPr lang="en-US"/>
           </a:p>
@@ -4092,7 +4100,7 @@
           <a:p>
             <a:fld id="{BF29B9AB-6859-C043-A124-7604E53B39CA}" type="datetimeFigureOut">
               <a:rPr lang="en-US" smtClean="0"/>
-              <a:t>5/3/22</a:t>
+              <a:t>5/4/22</a:t>
             </a:fld>
             <a:endParaRPr lang="en-US"/>
           </a:p>
@@ -4262,7 +4270,7 @@
           <a:p>
             <a:fld id="{BF29B9AB-6859-C043-A124-7604E53B39CA}" type="datetimeFigureOut">
               <a:rPr lang="en-US" smtClean="0"/>
-              <a:t>5/3/22</a:t>
+              <a:t>5/4/22</a:t>
             </a:fld>
             <a:endParaRPr lang="en-US"/>
           </a:p>
@@ -4508,7 +4516,7 @@
           <a:p>
             <a:fld id="{BF29B9AB-6859-C043-A124-7604E53B39CA}" type="datetimeFigureOut">
               <a:rPr lang="en-US" smtClean="0"/>
-              <a:t>5/3/22</a:t>
+              <a:t>5/4/22</a:t>
             </a:fld>
             <a:endParaRPr lang="en-US"/>
           </a:p>
@@ -4740,7 +4748,7 @@
           <a:p>
             <a:fld id="{BF29B9AB-6859-C043-A124-7604E53B39CA}" type="datetimeFigureOut">
               <a:rPr lang="en-US" smtClean="0"/>
-              <a:t>5/3/22</a:t>
+              <a:t>5/4/22</a:t>
             </a:fld>
             <a:endParaRPr lang="en-US"/>
           </a:p>
@@ -5107,7 +5115,7 @@
           <a:p>
             <a:fld id="{BF29B9AB-6859-C043-A124-7604E53B39CA}" type="datetimeFigureOut">
               <a:rPr lang="en-US" smtClean="0"/>
-              <a:t>5/3/22</a:t>
+              <a:t>5/4/22</a:t>
             </a:fld>
             <a:endParaRPr lang="en-US"/>
           </a:p>
@@ -5225,7 +5233,7 @@
           <a:p>
             <a:fld id="{BF29B9AB-6859-C043-A124-7604E53B39CA}" type="datetimeFigureOut">
               <a:rPr lang="en-US" smtClean="0"/>
-              <a:t>5/3/22</a:t>
+              <a:t>5/4/22</a:t>
             </a:fld>
             <a:endParaRPr lang="en-US"/>
           </a:p>
@@ -5320,7 +5328,7 @@
           <a:p>
             <a:fld id="{BF29B9AB-6859-C043-A124-7604E53B39CA}" type="datetimeFigureOut">
               <a:rPr lang="en-US" smtClean="0"/>
-              <a:t>5/3/22</a:t>
+              <a:t>5/4/22</a:t>
             </a:fld>
             <a:endParaRPr lang="en-US"/>
           </a:p>
@@ -5597,7 +5605,7 @@
           <a:p>
             <a:fld id="{BF29B9AB-6859-C043-A124-7604E53B39CA}" type="datetimeFigureOut">
               <a:rPr lang="en-US" smtClean="0"/>
-              <a:t>5/3/22</a:t>
+              <a:t>5/4/22</a:t>
             </a:fld>
             <a:endParaRPr lang="en-US"/>
           </a:p>
@@ -5854,7 +5862,7 @@
           <a:p>
             <a:fld id="{BF29B9AB-6859-C043-A124-7604E53B39CA}" type="datetimeFigureOut">
               <a:rPr lang="en-US" smtClean="0"/>
-              <a:t>5/3/22</a:t>
+              <a:t>5/4/22</a:t>
             </a:fld>
             <a:endParaRPr lang="en-US"/>
           </a:p>
@@ -6067,7 +6075,7 @@
           <a:p>
             <a:fld id="{BF29B9AB-6859-C043-A124-7604E53B39CA}" type="datetimeFigureOut">
               <a:rPr lang="en-US" smtClean="0"/>
-              <a:t>5/3/22</a:t>
+              <a:t>5/4/22</a:t>
             </a:fld>
             <a:endParaRPr lang="en-US"/>
           </a:p>
@@ -7141,7 +7149,7 @@
                             <a:rPr lang="en-US" sz="3600" i="1">
                               <a:latin typeface="Cambria Math" panose="02040503050406030204" pitchFamily="18" charset="0"/>
                             </a:rPr>
-                            <m:t>∨</m:t>
+                            <m:t>∧</m:t>
                           </m:r>
                           <m:r>
                             <a:rPr lang="en-US" sz="3600" i="1" smtClean="0">

</xml_diff>